<commit_message>
Replace TechWise_Team_4_-_Project_1_Presentation.pptx... Updated Lessons Learned
</commit_message>
<xml_diff>
--- a/TechWise_Team_4_-_Project_1_Presentation.pptx
+++ b/TechWise_Team_4_-_Project_1_Presentation.pptx
@@ -125,1781 +125,6 @@
     </p:ext>
   </p:extLst>
 </p:presentation>
-</file>
-
-<file path=ppt/revisionInfo.xml><?xml version="1.0" encoding="utf-8"?>
-<p1510:revInfo xmlns:a="http://schemas.openxmlformats.org/drawingml/2006/main" xmlns:r="http://schemas.openxmlformats.org/officeDocument/2006/relationships" xmlns:p1510="http://schemas.microsoft.com/office/powerpoint/2015/10/main">
-  <p1510:revLst>
-    <p1510:client id="{2C2923EB-B073-4BCB-B55E-F43A82C91922}" v="326" dt="2022-08-20T16:31:16.962"/>
-  </p1510:revLst>
-</p1510:revInfo>
-</file>
-
-<file path=ppt/changesInfos/changesInfo1.xml><?xml version="1.0" encoding="utf-8"?>
-<pc:chgInfo xmlns:a="http://schemas.openxmlformats.org/drawingml/2006/main" xmlns:r="http://schemas.openxmlformats.org/officeDocument/2006/relationships" xmlns:ac="http://schemas.microsoft.com/office/drawing/2013/main/command" xmlns:pc="http://schemas.microsoft.com/office/powerpoint/2013/main/command">
-  <pc:docChgLst>
-    <pc:chgData name="Trainer, Jackson T" userId="5c586c50-e97e-48e7-9e83-8cb7c8eb6007" providerId="ADAL" clId="{9AB88757-B472-8340-B0AA-63F08798AF69}"/>
-    <pc:docChg chg="undo redo custSel addSld delSld modSld">
-      <pc:chgData name="Trainer, Jackson T" userId="5c586c50-e97e-48e7-9e83-8cb7c8eb6007" providerId="ADAL" clId="{9AB88757-B472-8340-B0AA-63F08798AF69}" dt="2022-08-18T02:52:08.774" v="383" actId="20577"/>
-      <pc:docMkLst>
-        <pc:docMk/>
-      </pc:docMkLst>
-      <pc:sldChg chg="modSp mod modNotesTx">
-        <pc:chgData name="Trainer, Jackson T" userId="5c586c50-e97e-48e7-9e83-8cb7c8eb6007" providerId="ADAL" clId="{9AB88757-B472-8340-B0AA-63F08798AF69}" dt="2022-08-18T02:45:01.210" v="353" actId="20577"/>
-        <pc:sldMkLst>
-          <pc:docMk/>
-          <pc:sldMk cId="4025293968" sldId="256"/>
-        </pc:sldMkLst>
-        <pc:spChg chg="mod">
-          <ac:chgData name="Trainer, Jackson T" userId="5c586c50-e97e-48e7-9e83-8cb7c8eb6007" providerId="ADAL" clId="{9AB88757-B472-8340-B0AA-63F08798AF69}" dt="2022-08-18T01:24:01.314" v="5" actId="20577"/>
-          <ac:spMkLst>
-            <pc:docMk/>
-            <pc:sldMk cId="4025293968" sldId="256"/>
-            <ac:spMk id="3" creationId="{241E9411-4F50-77A9-1B5D-1B4E09A592F9}"/>
-          </ac:spMkLst>
-        </pc:spChg>
-      </pc:sldChg>
-      <pc:sldChg chg="del">
-        <pc:chgData name="Trainer, Jackson T" userId="5c586c50-e97e-48e7-9e83-8cb7c8eb6007" providerId="ADAL" clId="{9AB88757-B472-8340-B0AA-63F08798AF69}" dt="2022-08-18T02:13:21.359" v="326" actId="2696"/>
-        <pc:sldMkLst>
-          <pc:docMk/>
-          <pc:sldMk cId="1194550057" sldId="258"/>
-        </pc:sldMkLst>
-      </pc:sldChg>
-      <pc:sldChg chg="modSp">
-        <pc:chgData name="Trainer, Jackson T" userId="5c586c50-e97e-48e7-9e83-8cb7c8eb6007" providerId="ADAL" clId="{9AB88757-B472-8340-B0AA-63F08798AF69}" dt="2022-08-18T02:09:02.743" v="313"/>
-        <pc:sldMkLst>
-          <pc:docMk/>
-          <pc:sldMk cId="1578448044" sldId="263"/>
-        </pc:sldMkLst>
-        <pc:graphicFrameChg chg="mod">
-          <ac:chgData name="Trainer, Jackson T" userId="5c586c50-e97e-48e7-9e83-8cb7c8eb6007" providerId="ADAL" clId="{9AB88757-B472-8340-B0AA-63F08798AF69}" dt="2022-08-18T02:09:02.743" v="313"/>
-          <ac:graphicFrameMkLst>
-            <pc:docMk/>
-            <pc:sldMk cId="1578448044" sldId="263"/>
-            <ac:graphicFrameMk id="5" creationId="{00000000-0000-0000-0000-000000000000}"/>
-          </ac:graphicFrameMkLst>
-        </pc:graphicFrameChg>
-      </pc:sldChg>
-      <pc:sldChg chg="addSp delSp modSp mod delAnim modNotesTx">
-        <pc:chgData name="Trainer, Jackson T" userId="5c586c50-e97e-48e7-9e83-8cb7c8eb6007" providerId="ADAL" clId="{9AB88757-B472-8340-B0AA-63F08798AF69}" dt="2022-08-18T02:51:39.521" v="374" actId="20577"/>
-        <pc:sldMkLst>
-          <pc:docMk/>
-          <pc:sldMk cId="1583176206" sldId="265"/>
-        </pc:sldMkLst>
-        <pc:spChg chg="mod">
-          <ac:chgData name="Trainer, Jackson T" userId="5c586c50-e97e-48e7-9e83-8cb7c8eb6007" providerId="ADAL" clId="{9AB88757-B472-8340-B0AA-63F08798AF69}" dt="2022-08-18T01:24:22.951" v="9" actId="26606"/>
-          <ac:spMkLst>
-            <pc:docMk/>
-            <pc:sldMk cId="1583176206" sldId="265"/>
-            <ac:spMk id="2" creationId="{14304841-5D2F-7D71-036C-F955D8788BC2}"/>
-          </ac:spMkLst>
-        </pc:spChg>
-        <pc:spChg chg="add del mod">
-          <ac:chgData name="Trainer, Jackson T" userId="5c586c50-e97e-48e7-9e83-8cb7c8eb6007" providerId="ADAL" clId="{9AB88757-B472-8340-B0AA-63F08798AF69}" dt="2022-08-18T01:24:22.951" v="9" actId="26606"/>
-          <ac:spMkLst>
-            <pc:docMk/>
-            <pc:sldMk cId="1583176206" sldId="265"/>
-            <ac:spMk id="4" creationId="{7CCB626E-3320-9A6F-E7E1-6907A0D5CECB}"/>
-          </ac:spMkLst>
-        </pc:spChg>
-        <pc:spChg chg="add del">
-          <ac:chgData name="Trainer, Jackson T" userId="5c586c50-e97e-48e7-9e83-8cb7c8eb6007" providerId="ADAL" clId="{9AB88757-B472-8340-B0AA-63F08798AF69}" dt="2022-08-18T01:24:22.951" v="9" actId="26606"/>
-          <ac:spMkLst>
-            <pc:docMk/>
-            <pc:sldMk cId="1583176206" sldId="265"/>
-            <ac:spMk id="86" creationId="{AA330523-F25B-4007-B3E5-ABB5637D160A}"/>
-          </ac:spMkLst>
-        </pc:spChg>
-        <pc:spChg chg="add del">
-          <ac:chgData name="Trainer, Jackson T" userId="5c586c50-e97e-48e7-9e83-8cb7c8eb6007" providerId="ADAL" clId="{9AB88757-B472-8340-B0AA-63F08798AF69}" dt="2022-08-18T01:24:22.936" v="8" actId="26606"/>
-          <ac:spMkLst>
-            <pc:docMk/>
-            <pc:sldMk cId="1583176206" sldId="265"/>
-            <ac:spMk id="105" creationId="{5A7802B6-FF37-40CF-A7E2-6F2A0D9A91EF}"/>
-          </ac:spMkLst>
-        </pc:spChg>
-        <pc:spChg chg="add">
-          <ac:chgData name="Trainer, Jackson T" userId="5c586c50-e97e-48e7-9e83-8cb7c8eb6007" providerId="ADAL" clId="{9AB88757-B472-8340-B0AA-63F08798AF69}" dt="2022-08-18T01:24:22.951" v="9" actId="26606"/>
-          <ac:spMkLst>
-            <pc:docMk/>
-            <pc:sldMk cId="1583176206" sldId="265"/>
-            <ac:spMk id="108" creationId="{66D61E08-70C3-48D8-BEA0-787111DC30DA}"/>
-          </ac:spMkLst>
-        </pc:spChg>
-        <pc:spChg chg="add">
-          <ac:chgData name="Trainer, Jackson T" userId="5c586c50-e97e-48e7-9e83-8cb7c8eb6007" providerId="ADAL" clId="{9AB88757-B472-8340-B0AA-63F08798AF69}" dt="2022-08-18T01:24:22.951" v="9" actId="26606"/>
-          <ac:spMkLst>
-            <pc:docMk/>
-            <pc:sldMk cId="1583176206" sldId="265"/>
-            <ac:spMk id="110" creationId="{FC55298F-0AE5-478E-AD2B-03C2614C5833}"/>
-          </ac:spMkLst>
-        </pc:spChg>
-        <pc:spChg chg="add">
-          <ac:chgData name="Trainer, Jackson T" userId="5c586c50-e97e-48e7-9e83-8cb7c8eb6007" providerId="ADAL" clId="{9AB88757-B472-8340-B0AA-63F08798AF69}" dt="2022-08-18T01:24:22.951" v="9" actId="26606"/>
-          <ac:spMkLst>
-            <pc:docMk/>
-            <pc:sldMk cId="1583176206" sldId="265"/>
-            <ac:spMk id="112" creationId="{C180E4EA-0B63-4779-A895-7E90E71088F3}"/>
-          </ac:spMkLst>
-        </pc:spChg>
-        <pc:spChg chg="add">
-          <ac:chgData name="Trainer, Jackson T" userId="5c586c50-e97e-48e7-9e83-8cb7c8eb6007" providerId="ADAL" clId="{9AB88757-B472-8340-B0AA-63F08798AF69}" dt="2022-08-18T01:24:22.951" v="9" actId="26606"/>
-          <ac:spMkLst>
-            <pc:docMk/>
-            <pc:sldMk cId="1583176206" sldId="265"/>
-            <ac:spMk id="114" creationId="{CEE01D9D-3DE8-4EED-B0D3-8F3C79CC7673}"/>
-          </ac:spMkLst>
-        </pc:spChg>
-        <pc:spChg chg="add">
-          <ac:chgData name="Trainer, Jackson T" userId="5c586c50-e97e-48e7-9e83-8cb7c8eb6007" providerId="ADAL" clId="{9AB88757-B472-8340-B0AA-63F08798AF69}" dt="2022-08-18T01:24:22.951" v="9" actId="26606"/>
-          <ac:spMkLst>
-            <pc:docMk/>
-            <pc:sldMk cId="1583176206" sldId="265"/>
-            <ac:spMk id="116" creationId="{89AF5CE9-607F-43F4-8983-DCD6DA4051FD}"/>
-          </ac:spMkLst>
-        </pc:spChg>
-        <pc:spChg chg="add">
-          <ac:chgData name="Trainer, Jackson T" userId="5c586c50-e97e-48e7-9e83-8cb7c8eb6007" providerId="ADAL" clId="{9AB88757-B472-8340-B0AA-63F08798AF69}" dt="2022-08-18T01:24:22.951" v="9" actId="26606"/>
-          <ac:spMkLst>
-            <pc:docMk/>
-            <pc:sldMk cId="1583176206" sldId="265"/>
-            <ac:spMk id="118" creationId="{6EEA2DBD-9E1E-4521-8C01-F32AD18A89E3}"/>
-          </ac:spMkLst>
-        </pc:spChg>
-        <pc:spChg chg="add">
-          <ac:chgData name="Trainer, Jackson T" userId="5c586c50-e97e-48e7-9e83-8cb7c8eb6007" providerId="ADAL" clId="{9AB88757-B472-8340-B0AA-63F08798AF69}" dt="2022-08-18T01:24:22.951" v="9" actId="26606"/>
-          <ac:spMkLst>
-            <pc:docMk/>
-            <pc:sldMk cId="1583176206" sldId="265"/>
-            <ac:spMk id="120" creationId="{15BBD2C1-BA9B-46A9-A27A-33498B169272}"/>
-          </ac:spMkLst>
-        </pc:spChg>
-        <pc:grpChg chg="add del">
-          <ac:chgData name="Trainer, Jackson T" userId="5c586c50-e97e-48e7-9e83-8cb7c8eb6007" providerId="ADAL" clId="{9AB88757-B472-8340-B0AA-63F08798AF69}" dt="2022-08-18T01:24:22.951" v="9" actId="26606"/>
-          <ac:grpSpMkLst>
-            <pc:docMk/>
-            <pc:sldMk cId="1583176206" sldId="265"/>
-            <ac:grpSpMk id="74" creationId="{B4DE830A-B531-4A3B-96F6-0ECE88B08555}"/>
-          </ac:grpSpMkLst>
-        </pc:grpChg>
-        <pc:grpChg chg="add">
-          <ac:chgData name="Trainer, Jackson T" userId="5c586c50-e97e-48e7-9e83-8cb7c8eb6007" providerId="ADAL" clId="{9AB88757-B472-8340-B0AA-63F08798AF69}" dt="2022-08-18T01:24:22.951" v="9" actId="26606"/>
-          <ac:grpSpMkLst>
-            <pc:docMk/>
-            <pc:sldMk cId="1583176206" sldId="265"/>
-            <ac:grpSpMk id="92" creationId="{88C9B83F-64CD-41C1-925F-A08801FFD0BD}"/>
-          </ac:grpSpMkLst>
-        </pc:grpChg>
-        <pc:grpChg chg="add del">
-          <ac:chgData name="Trainer, Jackson T" userId="5c586c50-e97e-48e7-9e83-8cb7c8eb6007" providerId="ADAL" clId="{9AB88757-B472-8340-B0AA-63F08798AF69}" dt="2022-08-18T01:24:22.936" v="8" actId="26606"/>
-          <ac:grpSpMkLst>
-            <pc:docMk/>
-            <pc:sldMk cId="1583176206" sldId="265"/>
-            <ac:grpSpMk id="93" creationId="{B4DE830A-B531-4A3B-96F6-0ECE88B08555}"/>
-          </ac:grpSpMkLst>
-        </pc:grpChg>
-        <pc:picChg chg="del">
-          <ac:chgData name="Trainer, Jackson T" userId="5c586c50-e97e-48e7-9e83-8cb7c8eb6007" providerId="ADAL" clId="{9AB88757-B472-8340-B0AA-63F08798AF69}" dt="2022-08-18T01:24:11.575" v="6" actId="478"/>
-          <ac:picMkLst>
-            <pc:docMk/>
-            <pc:sldMk cId="1583176206" sldId="265"/>
-            <ac:picMk id="9" creationId="{1EED6A97-55EE-ED8C-1BAD-AFB96DD38C74}"/>
-          </ac:picMkLst>
-        </pc:picChg>
-        <pc:picChg chg="add">
-          <ac:chgData name="Trainer, Jackson T" userId="5c586c50-e97e-48e7-9e83-8cb7c8eb6007" providerId="ADAL" clId="{9AB88757-B472-8340-B0AA-63F08798AF69}" dt="2022-08-18T01:24:22.951" v="9" actId="26606"/>
-          <ac:picMkLst>
-            <pc:docMk/>
-            <pc:sldMk cId="1583176206" sldId="265"/>
-            <ac:picMk id="88" creationId="{6959ABD7-A461-0C41-6665-C03D01F2CD85}"/>
-          </ac:picMkLst>
-        </pc:picChg>
-        <pc:picChg chg="add del">
-          <ac:chgData name="Trainer, Jackson T" userId="5c586c50-e97e-48e7-9e83-8cb7c8eb6007" providerId="ADAL" clId="{9AB88757-B472-8340-B0AA-63F08798AF69}" dt="2022-08-18T01:24:22.936" v="8" actId="26606"/>
-          <ac:picMkLst>
-            <pc:docMk/>
-            <pc:sldMk cId="1583176206" sldId="265"/>
-            <ac:picMk id="90" creationId="{7514F807-9666-804D-E1E3-957EE9343D12}"/>
-          </ac:picMkLst>
-        </pc:picChg>
-        <pc:cxnChg chg="add">
-          <ac:chgData name="Trainer, Jackson T" userId="5c586c50-e97e-48e7-9e83-8cb7c8eb6007" providerId="ADAL" clId="{9AB88757-B472-8340-B0AA-63F08798AF69}" dt="2022-08-18T01:24:22.951" v="9" actId="26606"/>
-          <ac:cxnSpMkLst>
-            <pc:docMk/>
-            <pc:sldMk cId="1583176206" sldId="265"/>
-            <ac:cxnSpMk id="104" creationId="{A57C1A16-B8AB-4D99-A195-A38F556A6486}"/>
-          </ac:cxnSpMkLst>
-        </pc:cxnChg>
-        <pc:cxnChg chg="add">
-          <ac:chgData name="Trainer, Jackson T" userId="5c586c50-e97e-48e7-9e83-8cb7c8eb6007" providerId="ADAL" clId="{9AB88757-B472-8340-B0AA-63F08798AF69}" dt="2022-08-18T01:24:22.951" v="9" actId="26606"/>
-          <ac:cxnSpMkLst>
-            <pc:docMk/>
-            <pc:sldMk cId="1583176206" sldId="265"/>
-            <ac:cxnSpMk id="106" creationId="{F8A9B20B-D1DD-4573-B5EC-558029519236}"/>
-          </ac:cxnSpMkLst>
-        </pc:cxnChg>
-      </pc:sldChg>
-      <pc:sldChg chg="addSp delSp modSp del mod">
-        <pc:chgData name="Trainer, Jackson T" userId="5c586c50-e97e-48e7-9e83-8cb7c8eb6007" providerId="ADAL" clId="{9AB88757-B472-8340-B0AA-63F08798AF69}" dt="2022-08-18T01:24:51.779" v="11" actId="2696"/>
-        <pc:sldMkLst>
-          <pc:docMk/>
-          <pc:sldMk cId="67418993" sldId="266"/>
-        </pc:sldMkLst>
-        <pc:spChg chg="add mod">
-          <ac:chgData name="Trainer, Jackson T" userId="5c586c50-e97e-48e7-9e83-8cb7c8eb6007" providerId="ADAL" clId="{9AB88757-B472-8340-B0AA-63F08798AF69}" dt="2022-08-18T01:24:47.496" v="10" actId="478"/>
-          <ac:spMkLst>
-            <pc:docMk/>
-            <pc:sldMk cId="67418993" sldId="266"/>
-            <ac:spMk id="6" creationId="{BED6E3AA-8EDC-9A64-8A7E-125B309F3190}"/>
-          </ac:spMkLst>
-        </pc:spChg>
-        <pc:picChg chg="del">
-          <ac:chgData name="Trainer, Jackson T" userId="5c586c50-e97e-48e7-9e83-8cb7c8eb6007" providerId="ADAL" clId="{9AB88757-B472-8340-B0AA-63F08798AF69}" dt="2022-08-18T01:24:47.496" v="10" actId="478"/>
-          <ac:picMkLst>
-            <pc:docMk/>
-            <pc:sldMk cId="67418993" sldId="266"/>
-            <ac:picMk id="7" creationId="{1867BFAE-D0FA-7E18-324B-13900A0BC377}"/>
-          </ac:picMkLst>
-        </pc:picChg>
-      </pc:sldChg>
-      <pc:sldChg chg="modNotesTx">
-        <pc:chgData name="Trainer, Jackson T" userId="5c586c50-e97e-48e7-9e83-8cb7c8eb6007" providerId="ADAL" clId="{9AB88757-B472-8340-B0AA-63F08798AF69}" dt="2022-08-18T02:44:32.790" v="346" actId="20577"/>
-        <pc:sldMkLst>
-          <pc:docMk/>
-          <pc:sldMk cId="2351012511" sldId="267"/>
-        </pc:sldMkLst>
-      </pc:sldChg>
-      <pc:sldChg chg="del">
-        <pc:chgData name="Trainer, Jackson T" userId="5c586c50-e97e-48e7-9e83-8cb7c8eb6007" providerId="ADAL" clId="{9AB88757-B472-8340-B0AA-63F08798AF69}" dt="2022-08-18T01:31:18.609" v="152" actId="2696"/>
-        <pc:sldMkLst>
-          <pc:docMk/>
-          <pc:sldMk cId="1037236571" sldId="270"/>
-        </pc:sldMkLst>
-      </pc:sldChg>
-      <pc:sldChg chg="addSp delSp modSp new mod setBg modNotesTx">
-        <pc:chgData name="Trainer, Jackson T" userId="5c586c50-e97e-48e7-9e83-8cb7c8eb6007" providerId="ADAL" clId="{9AB88757-B472-8340-B0AA-63F08798AF69}" dt="2022-08-18T02:52:08.774" v="383" actId="20577"/>
-        <pc:sldMkLst>
-          <pc:docMk/>
-          <pc:sldMk cId="879115567" sldId="272"/>
-        </pc:sldMkLst>
-        <pc:spChg chg="mod">
-          <ac:chgData name="Trainer, Jackson T" userId="5c586c50-e97e-48e7-9e83-8cb7c8eb6007" providerId="ADAL" clId="{9AB88757-B472-8340-B0AA-63F08798AF69}" dt="2022-08-18T01:37:45.436" v="170" actId="26606"/>
-          <ac:spMkLst>
-            <pc:docMk/>
-            <pc:sldMk cId="879115567" sldId="272"/>
-            <ac:spMk id="2" creationId="{7D1965F9-A78E-39ED-CE77-26B9E397DF61}"/>
-          </ac:spMkLst>
-        </pc:spChg>
-        <pc:spChg chg="del mod">
-          <ac:chgData name="Trainer, Jackson T" userId="5c586c50-e97e-48e7-9e83-8cb7c8eb6007" providerId="ADAL" clId="{9AB88757-B472-8340-B0AA-63F08798AF69}" dt="2022-08-18T01:37:45.436" v="170" actId="26606"/>
-          <ac:spMkLst>
-            <pc:docMk/>
-            <pc:sldMk cId="879115567" sldId="272"/>
-            <ac:spMk id="3" creationId="{3180A162-8893-BA77-2E66-5A614E1977BE}"/>
-          </ac:spMkLst>
-        </pc:spChg>
-        <pc:spChg chg="add">
-          <ac:chgData name="Trainer, Jackson T" userId="5c586c50-e97e-48e7-9e83-8cb7c8eb6007" providerId="ADAL" clId="{9AB88757-B472-8340-B0AA-63F08798AF69}" dt="2022-08-18T01:37:45.436" v="170" actId="26606"/>
-          <ac:spMkLst>
-            <pc:docMk/>
-            <pc:sldMk cId="879115567" sldId="272"/>
-            <ac:spMk id="9" creationId="{655AE6B0-AC9E-4167-806F-E9DB135FC46B}"/>
-          </ac:spMkLst>
-        </pc:spChg>
-        <pc:spChg chg="add">
-          <ac:chgData name="Trainer, Jackson T" userId="5c586c50-e97e-48e7-9e83-8cb7c8eb6007" providerId="ADAL" clId="{9AB88757-B472-8340-B0AA-63F08798AF69}" dt="2022-08-18T01:37:45.436" v="170" actId="26606"/>
-          <ac:spMkLst>
-            <pc:docMk/>
-            <pc:sldMk cId="879115567" sldId="272"/>
-            <ac:spMk id="22" creationId="{87BD1F4E-A66D-4C06-86DA-8D56CA7A3B41}"/>
-          </ac:spMkLst>
-        </pc:spChg>
-        <pc:grpChg chg="add">
-          <ac:chgData name="Trainer, Jackson T" userId="5c586c50-e97e-48e7-9e83-8cb7c8eb6007" providerId="ADAL" clId="{9AB88757-B472-8340-B0AA-63F08798AF69}" dt="2022-08-18T01:37:45.436" v="170" actId="26606"/>
-          <ac:grpSpMkLst>
-            <pc:docMk/>
-            <pc:sldMk cId="879115567" sldId="272"/>
-            <ac:grpSpMk id="11" creationId="{3523416A-383B-4FDC-B4C9-D8EDDFE9C043}"/>
-          </ac:grpSpMkLst>
-        </pc:grpChg>
-        <pc:graphicFrameChg chg="add">
-          <ac:chgData name="Trainer, Jackson T" userId="5c586c50-e97e-48e7-9e83-8cb7c8eb6007" providerId="ADAL" clId="{9AB88757-B472-8340-B0AA-63F08798AF69}" dt="2022-08-18T01:37:45.436" v="170" actId="26606"/>
-          <ac:graphicFrameMkLst>
-            <pc:docMk/>
-            <pc:sldMk cId="879115567" sldId="272"/>
-            <ac:graphicFrameMk id="5" creationId="{57007EBD-1241-F996-7866-3A558EF2FC54}"/>
-          </ac:graphicFrameMkLst>
-        </pc:graphicFrameChg>
-        <pc:cxnChg chg="add del">
-          <ac:chgData name="Trainer, Jackson T" userId="5c586c50-e97e-48e7-9e83-8cb7c8eb6007" providerId="ADAL" clId="{9AB88757-B472-8340-B0AA-63F08798AF69}" dt="2022-08-18T01:37:45.412" v="169" actId="26606"/>
-          <ac:cxnSpMkLst>
-            <pc:docMk/>
-            <pc:sldMk cId="879115567" sldId="272"/>
-            <ac:cxnSpMk id="8" creationId="{0B5F7E3B-C5F1-40E0-A491-558BAFBC1127}"/>
-          </ac:cxnSpMkLst>
-        </pc:cxnChg>
-      </pc:sldChg>
-      <pc:sldChg chg="addSp delSp modSp new mod setBg modNotesTx">
-        <pc:chgData name="Trainer, Jackson T" userId="5c586c50-e97e-48e7-9e83-8cb7c8eb6007" providerId="ADAL" clId="{9AB88757-B472-8340-B0AA-63F08798AF69}" dt="2022-08-18T02:45:30.351" v="361" actId="20577"/>
-        <pc:sldMkLst>
-          <pc:docMk/>
-          <pc:sldMk cId="1640556810" sldId="273"/>
-        </pc:sldMkLst>
-        <pc:spChg chg="mod">
-          <ac:chgData name="Trainer, Jackson T" userId="5c586c50-e97e-48e7-9e83-8cb7c8eb6007" providerId="ADAL" clId="{9AB88757-B472-8340-B0AA-63F08798AF69}" dt="2022-08-18T01:38:15.771" v="171" actId="26606"/>
-          <ac:spMkLst>
-            <pc:docMk/>
-            <pc:sldMk cId="1640556810" sldId="273"/>
-            <ac:spMk id="2" creationId="{87D23C5D-C351-44F8-E4DC-AFA817E1C8E8}"/>
-          </ac:spMkLst>
-        </pc:spChg>
-        <pc:spChg chg="del mod">
-          <ac:chgData name="Trainer, Jackson T" userId="5c586c50-e97e-48e7-9e83-8cb7c8eb6007" providerId="ADAL" clId="{9AB88757-B472-8340-B0AA-63F08798AF69}" dt="2022-08-18T01:38:15.771" v="171" actId="26606"/>
-          <ac:spMkLst>
-            <pc:docMk/>
-            <pc:sldMk cId="1640556810" sldId="273"/>
-            <ac:spMk id="3" creationId="{08CA4675-F89F-E0CF-DA3C-C9570C72777C}"/>
-          </ac:spMkLst>
-        </pc:spChg>
-        <pc:spChg chg="add">
-          <ac:chgData name="Trainer, Jackson T" userId="5c586c50-e97e-48e7-9e83-8cb7c8eb6007" providerId="ADAL" clId="{9AB88757-B472-8340-B0AA-63F08798AF69}" dt="2022-08-18T01:38:15.771" v="171" actId="26606"/>
-          <ac:spMkLst>
-            <pc:docMk/>
-            <pc:sldMk cId="1640556810" sldId="273"/>
-            <ac:spMk id="9" creationId="{655AE6B0-AC9E-4167-806F-E9DB135FC46B}"/>
-          </ac:spMkLst>
-        </pc:spChg>
-        <pc:spChg chg="add">
-          <ac:chgData name="Trainer, Jackson T" userId="5c586c50-e97e-48e7-9e83-8cb7c8eb6007" providerId="ADAL" clId="{9AB88757-B472-8340-B0AA-63F08798AF69}" dt="2022-08-18T01:38:15.771" v="171" actId="26606"/>
-          <ac:spMkLst>
-            <pc:docMk/>
-            <pc:sldMk cId="1640556810" sldId="273"/>
-            <ac:spMk id="22" creationId="{87BD1F4E-A66D-4C06-86DA-8D56CA7A3B41}"/>
-          </ac:spMkLst>
-        </pc:spChg>
-        <pc:grpChg chg="add">
-          <ac:chgData name="Trainer, Jackson T" userId="5c586c50-e97e-48e7-9e83-8cb7c8eb6007" providerId="ADAL" clId="{9AB88757-B472-8340-B0AA-63F08798AF69}" dt="2022-08-18T01:38:15.771" v="171" actId="26606"/>
-          <ac:grpSpMkLst>
-            <pc:docMk/>
-            <pc:sldMk cId="1640556810" sldId="273"/>
-            <ac:grpSpMk id="11" creationId="{3523416A-383B-4FDC-B4C9-D8EDDFE9C043}"/>
-          </ac:grpSpMkLst>
-        </pc:grpChg>
-        <pc:graphicFrameChg chg="add">
-          <ac:chgData name="Trainer, Jackson T" userId="5c586c50-e97e-48e7-9e83-8cb7c8eb6007" providerId="ADAL" clId="{9AB88757-B472-8340-B0AA-63F08798AF69}" dt="2022-08-18T01:38:15.771" v="171" actId="26606"/>
-          <ac:graphicFrameMkLst>
-            <pc:docMk/>
-            <pc:sldMk cId="1640556810" sldId="273"/>
-            <ac:graphicFrameMk id="5" creationId="{1827C7F4-A394-04D9-6CE1-3AC8377A45FD}"/>
-          </ac:graphicFrameMkLst>
-        </pc:graphicFrameChg>
-      </pc:sldChg>
-      <pc:sldChg chg="modSp new mod modNotesTx">
-        <pc:chgData name="Trainer, Jackson T" userId="5c586c50-e97e-48e7-9e83-8cb7c8eb6007" providerId="ADAL" clId="{9AB88757-B472-8340-B0AA-63F08798AF69}" dt="2022-08-18T02:43:47.499" v="341" actId="27636"/>
-        <pc:sldMkLst>
-          <pc:docMk/>
-          <pc:sldMk cId="1936370427" sldId="274"/>
-        </pc:sldMkLst>
-        <pc:spChg chg="mod">
-          <ac:chgData name="Trainer, Jackson T" userId="5c586c50-e97e-48e7-9e83-8cb7c8eb6007" providerId="ADAL" clId="{9AB88757-B472-8340-B0AA-63F08798AF69}" dt="2022-08-18T02:12:17.169" v="325" actId="20577"/>
-          <ac:spMkLst>
-            <pc:docMk/>
-            <pc:sldMk cId="1936370427" sldId="274"/>
-            <ac:spMk id="2" creationId="{A3EA95AE-E96A-4673-72D0-E26A3F209689}"/>
-          </ac:spMkLst>
-        </pc:spChg>
-        <pc:spChg chg="mod">
-          <ac:chgData name="Trainer, Jackson T" userId="5c586c50-e97e-48e7-9e83-8cb7c8eb6007" providerId="ADAL" clId="{9AB88757-B472-8340-B0AA-63F08798AF69}" dt="2022-08-18T02:43:47.499" v="341" actId="27636"/>
-          <ac:spMkLst>
-            <pc:docMk/>
-            <pc:sldMk cId="1936370427" sldId="274"/>
-            <ac:spMk id="3" creationId="{68C11802-55A5-5862-92D1-2B59F81CC57A}"/>
-          </ac:spMkLst>
-        </pc:spChg>
-      </pc:sldChg>
-      <pc:sldChg chg="modSp new mod">
-        <pc:chgData name="Trainer, Jackson T" userId="5c586c50-e97e-48e7-9e83-8cb7c8eb6007" providerId="ADAL" clId="{9AB88757-B472-8340-B0AA-63F08798AF69}" dt="2022-08-18T02:07:02.389" v="303" actId="20577"/>
-        <pc:sldMkLst>
-          <pc:docMk/>
-          <pc:sldMk cId="1522433238" sldId="275"/>
-        </pc:sldMkLst>
-        <pc:spChg chg="mod">
-          <ac:chgData name="Trainer, Jackson T" userId="5c586c50-e97e-48e7-9e83-8cb7c8eb6007" providerId="ADAL" clId="{9AB88757-B472-8340-B0AA-63F08798AF69}" dt="2022-08-18T01:38:56.292" v="190" actId="20577"/>
-          <ac:spMkLst>
-            <pc:docMk/>
-            <pc:sldMk cId="1522433238" sldId="275"/>
-            <ac:spMk id="2" creationId="{F8196779-F0E0-777D-841E-58882251E107}"/>
-          </ac:spMkLst>
-        </pc:spChg>
-        <pc:spChg chg="mod">
-          <ac:chgData name="Trainer, Jackson T" userId="5c586c50-e97e-48e7-9e83-8cb7c8eb6007" providerId="ADAL" clId="{9AB88757-B472-8340-B0AA-63F08798AF69}" dt="2022-08-18T02:07:02.389" v="303" actId="20577"/>
-          <ac:spMkLst>
-            <pc:docMk/>
-            <pc:sldMk cId="1522433238" sldId="275"/>
-            <ac:spMk id="3" creationId="{36F345D1-897A-12BA-1D82-A85494854F5A}"/>
-          </ac:spMkLst>
-        </pc:spChg>
-      </pc:sldChg>
-    </pc:docChg>
-  </pc:docChgLst>
-  <pc:docChgLst>
-    <pc:chgData name="Trainer, Jackson T" userId="5c586c50-e97e-48e7-9e83-8cb7c8eb6007" providerId="ADAL" clId="{2C2923EB-B073-4BCB-B55E-F43A82C91922}"/>
-    <pc:docChg chg="undo custSel addSld delSld modSld">
-      <pc:chgData name="Trainer, Jackson T" userId="5c586c50-e97e-48e7-9e83-8cb7c8eb6007" providerId="ADAL" clId="{2C2923EB-B073-4BCB-B55E-F43A82C91922}" dt="2022-08-20T16:33:35.514" v="663" actId="20577"/>
-      <pc:docMkLst>
-        <pc:docMk/>
-      </pc:docMkLst>
-      <pc:sldChg chg="modSp mod">
-        <pc:chgData name="Trainer, Jackson T" userId="5c586c50-e97e-48e7-9e83-8cb7c8eb6007" providerId="ADAL" clId="{2C2923EB-B073-4BCB-B55E-F43A82C91922}" dt="2022-08-20T16:33:35.514" v="663" actId="20577"/>
-        <pc:sldMkLst>
-          <pc:docMk/>
-          <pc:sldMk cId="4025293968" sldId="256"/>
-        </pc:sldMkLst>
-        <pc:spChg chg="mod">
-          <ac:chgData name="Trainer, Jackson T" userId="5c586c50-e97e-48e7-9e83-8cb7c8eb6007" providerId="ADAL" clId="{2C2923EB-B073-4BCB-B55E-F43A82C91922}" dt="2022-08-20T16:33:35.514" v="663" actId="20577"/>
-          <ac:spMkLst>
-            <pc:docMk/>
-            <pc:sldMk cId="4025293968" sldId="256"/>
-            <ac:spMk id="2" creationId="{FCCC880B-50B7-6B6A-31C6-643B4474E751}"/>
-          </ac:spMkLst>
-        </pc:spChg>
-        <pc:spChg chg="mod">
-          <ac:chgData name="Trainer, Jackson T" userId="5c586c50-e97e-48e7-9e83-8cb7c8eb6007" providerId="ADAL" clId="{2C2923EB-B073-4BCB-B55E-F43A82C91922}" dt="2022-08-20T14:45:40.525" v="76"/>
-          <ac:spMkLst>
-            <pc:docMk/>
-            <pc:sldMk cId="4025293968" sldId="256"/>
-            <ac:spMk id="3" creationId="{241E9411-4F50-77A9-1B5D-1B4E09A592F9}"/>
-          </ac:spMkLst>
-        </pc:spChg>
-      </pc:sldChg>
-      <pc:sldChg chg="addSp delSp modSp mod setBg delDesignElem">
-        <pc:chgData name="Trainer, Jackson T" userId="5c586c50-e97e-48e7-9e83-8cb7c8eb6007" providerId="ADAL" clId="{2C2923EB-B073-4BCB-B55E-F43A82C91922}" dt="2022-08-20T14:46:00.576" v="86" actId="26606"/>
-        <pc:sldMkLst>
-          <pc:docMk/>
-          <pc:sldMk cId="51661633" sldId="257"/>
-        </pc:sldMkLst>
-        <pc:spChg chg="mod">
-          <ac:chgData name="Trainer, Jackson T" userId="5c586c50-e97e-48e7-9e83-8cb7c8eb6007" providerId="ADAL" clId="{2C2923EB-B073-4BCB-B55E-F43A82C91922}" dt="2022-08-20T14:46:00.576" v="86" actId="26606"/>
-          <ac:spMkLst>
-            <pc:docMk/>
-            <pc:sldMk cId="51661633" sldId="257"/>
-            <ac:spMk id="2" creationId="{25DB2BE3-2BC5-1A70-6229-9E43E158489D}"/>
-          </ac:spMkLst>
-        </pc:spChg>
-        <pc:spChg chg="del">
-          <ac:chgData name="Trainer, Jackson T" userId="5c586c50-e97e-48e7-9e83-8cb7c8eb6007" providerId="ADAL" clId="{2C2923EB-B073-4BCB-B55E-F43A82C91922}" dt="2022-08-20T14:45:40.525" v="76"/>
-          <ac:spMkLst>
-            <pc:docMk/>
-            <pc:sldMk cId="51661633" sldId="257"/>
-            <ac:spMk id="54" creationId="{9F4444CE-BC8D-4D61-B303-4C05614E62AB}"/>
-          </ac:spMkLst>
-        </pc:spChg>
-        <pc:spChg chg="del">
-          <ac:chgData name="Trainer, Jackson T" userId="5c586c50-e97e-48e7-9e83-8cb7c8eb6007" providerId="ADAL" clId="{2C2923EB-B073-4BCB-B55E-F43A82C91922}" dt="2022-08-20T14:45:40.525" v="76"/>
-          <ac:spMkLst>
-            <pc:docMk/>
-            <pc:sldMk cId="51661633" sldId="257"/>
-            <ac:spMk id="56" creationId="{73772B81-181F-48B7-8826-4D9686D15DF5}"/>
-          </ac:spMkLst>
-        </pc:spChg>
-        <pc:spChg chg="del">
-          <ac:chgData name="Trainer, Jackson T" userId="5c586c50-e97e-48e7-9e83-8cb7c8eb6007" providerId="ADAL" clId="{2C2923EB-B073-4BCB-B55E-F43A82C91922}" dt="2022-08-20T14:45:40.525" v="76"/>
-          <ac:spMkLst>
-            <pc:docMk/>
-            <pc:sldMk cId="51661633" sldId="257"/>
-            <ac:spMk id="58" creationId="{B2205F6E-03C6-4E92-877C-E2482F6599AA}"/>
-          </ac:spMkLst>
-        </pc:spChg>
-        <pc:grpChg chg="add del">
-          <ac:chgData name="Trainer, Jackson T" userId="5c586c50-e97e-48e7-9e83-8cb7c8eb6007" providerId="ADAL" clId="{2C2923EB-B073-4BCB-B55E-F43A82C91922}" dt="2022-08-20T14:46:00.524" v="85" actId="26606"/>
-          <ac:grpSpMkLst>
-            <pc:docMk/>
-            <pc:sldMk cId="51661633" sldId="257"/>
-            <ac:grpSpMk id="27" creationId="{E7DEDD00-5E71-418B-9C3C-9B71B018221A}"/>
-          </ac:grpSpMkLst>
-        </pc:grpChg>
-        <pc:grpChg chg="add del">
-          <ac:chgData name="Trainer, Jackson T" userId="5c586c50-e97e-48e7-9e83-8cb7c8eb6007" providerId="ADAL" clId="{2C2923EB-B073-4BCB-B55E-F43A82C91922}" dt="2022-08-20T14:45:57.901" v="81" actId="26606"/>
-          <ac:grpSpMkLst>
-            <pc:docMk/>
-            <pc:sldMk cId="51661633" sldId="257"/>
-            <ac:grpSpMk id="30" creationId="{E7DEDD00-5E71-418B-9C3C-9B71B018221A}"/>
-          </ac:grpSpMkLst>
-        </pc:grpChg>
-        <pc:graphicFrameChg chg="mod modGraphic">
-          <ac:chgData name="Trainer, Jackson T" userId="5c586c50-e97e-48e7-9e83-8cb7c8eb6007" providerId="ADAL" clId="{2C2923EB-B073-4BCB-B55E-F43A82C91922}" dt="2022-08-20T14:46:00.576" v="86" actId="26606"/>
-          <ac:graphicFrameMkLst>
-            <pc:docMk/>
-            <pc:sldMk cId="51661633" sldId="257"/>
-            <ac:graphicFrameMk id="25" creationId="{863EF152-1B71-11C3-E200-A41BAC59FE71}"/>
-          </ac:graphicFrameMkLst>
-        </pc:graphicFrameChg>
-      </pc:sldChg>
-      <pc:sldChg chg="addSp delSp modSp mod setBg delDesignElem">
-        <pc:chgData name="Trainer, Jackson T" userId="5c586c50-e97e-48e7-9e83-8cb7c8eb6007" providerId="ADAL" clId="{2C2923EB-B073-4BCB-B55E-F43A82C91922}" dt="2022-08-20T16:31:16.962" v="647" actId="20577"/>
-        <pc:sldMkLst>
-          <pc:docMk/>
-          <pc:sldMk cId="1578448044" sldId="263"/>
-        </pc:sldMkLst>
-        <pc:spChg chg="mod">
-          <ac:chgData name="Trainer, Jackson T" userId="5c586c50-e97e-48e7-9e83-8cb7c8eb6007" providerId="ADAL" clId="{2C2923EB-B073-4BCB-B55E-F43A82C91922}" dt="2022-08-20T14:48:48.701" v="110" actId="26606"/>
-          <ac:spMkLst>
-            <pc:docMk/>
-            <pc:sldMk cId="1578448044" sldId="263"/>
-            <ac:spMk id="4" creationId="{00000000-0000-0000-0000-000000000000}"/>
-          </ac:spMkLst>
-        </pc:spChg>
-        <pc:spChg chg="del">
-          <ac:chgData name="Trainer, Jackson T" userId="5c586c50-e97e-48e7-9e83-8cb7c8eb6007" providerId="ADAL" clId="{2C2923EB-B073-4BCB-B55E-F43A82C91922}" dt="2022-08-20T14:45:40.525" v="76"/>
-          <ac:spMkLst>
-            <pc:docMk/>
-            <pc:sldMk cId="1578448044" sldId="263"/>
-            <ac:spMk id="102" creationId="{9F4444CE-BC8D-4D61-B303-4C05614E62AB}"/>
-          </ac:spMkLst>
-        </pc:spChg>
-        <pc:spChg chg="del">
-          <ac:chgData name="Trainer, Jackson T" userId="5c586c50-e97e-48e7-9e83-8cb7c8eb6007" providerId="ADAL" clId="{2C2923EB-B073-4BCB-B55E-F43A82C91922}" dt="2022-08-20T14:45:40.525" v="76"/>
-          <ac:spMkLst>
-            <pc:docMk/>
-            <pc:sldMk cId="1578448044" sldId="263"/>
-            <ac:spMk id="103" creationId="{73772B81-181F-48B7-8826-4D9686D15DF5}"/>
-          </ac:spMkLst>
-        </pc:spChg>
-        <pc:spChg chg="del">
-          <ac:chgData name="Trainer, Jackson T" userId="5c586c50-e97e-48e7-9e83-8cb7c8eb6007" providerId="ADAL" clId="{2C2923EB-B073-4BCB-B55E-F43A82C91922}" dt="2022-08-20T14:45:40.525" v="76"/>
-          <ac:spMkLst>
-            <pc:docMk/>
-            <pc:sldMk cId="1578448044" sldId="263"/>
-            <ac:spMk id="104" creationId="{B2205F6E-03C6-4E92-877C-E2482F6599AA}"/>
-          </ac:spMkLst>
-        </pc:spChg>
-        <pc:grpChg chg="add del">
-          <ac:chgData name="Trainer, Jackson T" userId="5c586c50-e97e-48e7-9e83-8cb7c8eb6007" providerId="ADAL" clId="{2C2923EB-B073-4BCB-B55E-F43A82C91922}" dt="2022-08-20T14:48:48.574" v="109" actId="26606"/>
-          <ac:grpSpMkLst>
-            <pc:docMk/>
-            <pc:sldMk cId="1578448044" sldId="263"/>
-            <ac:grpSpMk id="10" creationId="{C93797FD-7F0A-483E-966E-7FE88F8D8798}"/>
-          </ac:grpSpMkLst>
-        </pc:grpChg>
-        <pc:grpChg chg="add del">
-          <ac:chgData name="Trainer, Jackson T" userId="5c586c50-e97e-48e7-9e83-8cb7c8eb6007" providerId="ADAL" clId="{2C2923EB-B073-4BCB-B55E-F43A82C91922}" dt="2022-08-20T14:48:48.574" v="109" actId="26606"/>
-          <ac:grpSpMkLst>
-            <pc:docMk/>
-            <pc:sldMk cId="1578448044" sldId="263"/>
-            <ac:grpSpMk id="18" creationId="{E7DEDD00-5E71-418B-9C3C-9B71B018221A}"/>
-          </ac:grpSpMkLst>
-        </pc:grpChg>
-        <pc:grpChg chg="add">
-          <ac:chgData name="Trainer, Jackson T" userId="5c586c50-e97e-48e7-9e83-8cb7c8eb6007" providerId="ADAL" clId="{2C2923EB-B073-4BCB-B55E-F43A82C91922}" dt="2022-08-20T14:48:48.701" v="110" actId="26606"/>
-          <ac:grpSpMkLst>
-            <pc:docMk/>
-            <pc:sldMk cId="1578448044" sldId="263"/>
-            <ac:grpSpMk id="24" creationId="{C93797FD-7F0A-483E-966E-7FE88F8D8798}"/>
-          </ac:grpSpMkLst>
-        </pc:grpChg>
-        <pc:grpChg chg="del">
-          <ac:chgData name="Trainer, Jackson T" userId="5c586c50-e97e-48e7-9e83-8cb7c8eb6007" providerId="ADAL" clId="{2C2923EB-B073-4BCB-B55E-F43A82C91922}" dt="2022-08-20T14:45:40.525" v="76"/>
-          <ac:grpSpMkLst>
-            <pc:docMk/>
-            <pc:sldMk cId="1578448044" sldId="263"/>
-            <ac:grpSpMk id="101" creationId="{D920209C-E85B-4D6F-A56F-724F5ADA811C}"/>
-          </ac:grpSpMkLst>
-        </pc:grpChg>
-        <pc:graphicFrameChg chg="mod modGraphic">
-          <ac:chgData name="Trainer, Jackson T" userId="5c586c50-e97e-48e7-9e83-8cb7c8eb6007" providerId="ADAL" clId="{2C2923EB-B073-4BCB-B55E-F43A82C91922}" dt="2022-08-20T16:31:16.962" v="647" actId="20577"/>
-          <ac:graphicFrameMkLst>
-            <pc:docMk/>
-            <pc:sldMk cId="1578448044" sldId="263"/>
-            <ac:graphicFrameMk id="5" creationId="{00000000-0000-0000-0000-000000000000}"/>
-          </ac:graphicFrameMkLst>
-        </pc:graphicFrameChg>
-        <pc:cxnChg chg="add del">
-          <ac:chgData name="Trainer, Jackson T" userId="5c586c50-e97e-48e7-9e83-8cb7c8eb6007" providerId="ADAL" clId="{2C2923EB-B073-4BCB-B55E-F43A82C91922}" dt="2022-08-20T14:48:48.574" v="109" actId="26606"/>
-          <ac:cxnSpMkLst>
-            <pc:docMk/>
-            <pc:sldMk cId="1578448044" sldId="263"/>
-            <ac:cxnSpMk id="16" creationId="{DDB3BAEE-5BE4-4B17-A2DA-B334759C47AB}"/>
-          </ac:cxnSpMkLst>
-        </pc:cxnChg>
-        <pc:cxnChg chg="add">
-          <ac:chgData name="Trainer, Jackson T" userId="5c586c50-e97e-48e7-9e83-8cb7c8eb6007" providerId="ADAL" clId="{2C2923EB-B073-4BCB-B55E-F43A82C91922}" dt="2022-08-20T14:48:48.701" v="110" actId="26606"/>
-          <ac:cxnSpMkLst>
-            <pc:docMk/>
-            <pc:sldMk cId="1578448044" sldId="263"/>
-            <ac:cxnSpMk id="25" creationId="{DDB3BAEE-5BE4-4B17-A2DA-B334759C47AB}"/>
-          </ac:cxnSpMkLst>
-        </pc:cxnChg>
-      </pc:sldChg>
-      <pc:sldChg chg="addSp delSp modSp mod setBg addAnim delAnim modAnim setClrOvrMap delDesignElem">
-        <pc:chgData name="Trainer, Jackson T" userId="5c586c50-e97e-48e7-9e83-8cb7c8eb6007" providerId="ADAL" clId="{2C2923EB-B073-4BCB-B55E-F43A82C91922}" dt="2022-08-20T15:43:05.650" v="493"/>
-        <pc:sldMkLst>
-          <pc:docMk/>
-          <pc:sldMk cId="1583176206" sldId="265"/>
-        </pc:sldMkLst>
-        <pc:spChg chg="mod">
-          <ac:chgData name="Trainer, Jackson T" userId="5c586c50-e97e-48e7-9e83-8cb7c8eb6007" providerId="ADAL" clId="{2C2923EB-B073-4BCB-B55E-F43A82C91922}" dt="2022-08-20T14:47:33.130" v="102" actId="26606"/>
-          <ac:spMkLst>
-            <pc:docMk/>
-            <pc:sldMk cId="1583176206" sldId="265"/>
-            <ac:spMk id="2" creationId="{14304841-5D2F-7D71-036C-F955D8788BC2}"/>
-          </ac:spMkLst>
-        </pc:spChg>
-        <pc:spChg chg="add del">
-          <ac:chgData name="Trainer, Jackson T" userId="5c586c50-e97e-48e7-9e83-8cb7c8eb6007" providerId="ADAL" clId="{2C2923EB-B073-4BCB-B55E-F43A82C91922}" dt="2022-08-20T14:46:49.208" v="91" actId="26606"/>
-          <ac:spMkLst>
-            <pc:docMk/>
-            <pc:sldMk cId="1583176206" sldId="265"/>
-            <ac:spMk id="15" creationId="{AB79D876-BCFB-48E8-A406-A9DDB58B322D}"/>
-          </ac:spMkLst>
-        </pc:spChg>
-        <pc:spChg chg="add del">
-          <ac:chgData name="Trainer, Jackson T" userId="5c586c50-e97e-48e7-9e83-8cb7c8eb6007" providerId="ADAL" clId="{2C2923EB-B073-4BCB-B55E-F43A82C91922}" dt="2022-08-20T14:46:51.077" v="94" actId="26606"/>
-          <ac:spMkLst>
-            <pc:docMk/>
-            <pc:sldMk cId="1583176206" sldId="265"/>
-            <ac:spMk id="16" creationId="{FDF8837B-BAE2-489A-8F93-69216307D5A5}"/>
-          </ac:spMkLst>
-        </pc:spChg>
-        <pc:spChg chg="add del">
-          <ac:chgData name="Trainer, Jackson T" userId="5c586c50-e97e-48e7-9e83-8cb7c8eb6007" providerId="ADAL" clId="{2C2923EB-B073-4BCB-B55E-F43A82C91922}" dt="2022-08-20T14:47:33.130" v="102" actId="26606"/>
-          <ac:spMkLst>
-            <pc:docMk/>
-            <pc:sldMk cId="1583176206" sldId="265"/>
-            <ac:spMk id="29" creationId="{3D6DABB5-1FC3-4E21-AC84-4685B03C9F93}"/>
-          </ac:spMkLst>
-        </pc:spChg>
-        <pc:spChg chg="add del">
-          <ac:chgData name="Trainer, Jackson T" userId="5c586c50-e97e-48e7-9e83-8cb7c8eb6007" providerId="ADAL" clId="{2C2923EB-B073-4BCB-B55E-F43A82C91922}" dt="2022-08-20T14:47:33.130" v="102" actId="26606"/>
-          <ac:spMkLst>
-            <pc:docMk/>
-            <pc:sldMk cId="1583176206" sldId="265"/>
-            <ac:spMk id="30" creationId="{FC5790B5-250E-45E6-A05D-C3D1D459BC9D}"/>
-          </ac:spMkLst>
-        </pc:spChg>
-        <pc:spChg chg="add">
-          <ac:chgData name="Trainer, Jackson T" userId="5c586c50-e97e-48e7-9e83-8cb7c8eb6007" providerId="ADAL" clId="{2C2923EB-B073-4BCB-B55E-F43A82C91922}" dt="2022-08-20T14:47:33.130" v="102" actId="26606"/>
-          <ac:spMkLst>
-            <pc:docMk/>
-            <pc:sldMk cId="1583176206" sldId="265"/>
-            <ac:spMk id="47" creationId="{9401732C-37EE-4B98-A709-9530173F3802}"/>
-          </ac:spMkLst>
-        </pc:spChg>
-        <pc:spChg chg="del">
-          <ac:chgData name="Trainer, Jackson T" userId="5c586c50-e97e-48e7-9e83-8cb7c8eb6007" providerId="ADAL" clId="{2C2923EB-B073-4BCB-B55E-F43A82C91922}" dt="2022-08-20T14:45:40.525" v="76"/>
-          <ac:spMkLst>
-            <pc:docMk/>
-            <pc:sldMk cId="1583176206" sldId="265"/>
-            <ac:spMk id="108" creationId="{66D61E08-70C3-48D8-BEA0-787111DC30DA}"/>
-          </ac:spMkLst>
-        </pc:spChg>
-        <pc:spChg chg="del">
-          <ac:chgData name="Trainer, Jackson T" userId="5c586c50-e97e-48e7-9e83-8cb7c8eb6007" providerId="ADAL" clId="{2C2923EB-B073-4BCB-B55E-F43A82C91922}" dt="2022-08-20T14:45:40.525" v="76"/>
-          <ac:spMkLst>
-            <pc:docMk/>
-            <pc:sldMk cId="1583176206" sldId="265"/>
-            <ac:spMk id="110" creationId="{FC55298F-0AE5-478E-AD2B-03C2614C5833}"/>
-          </ac:spMkLst>
-        </pc:spChg>
-        <pc:spChg chg="del">
-          <ac:chgData name="Trainer, Jackson T" userId="5c586c50-e97e-48e7-9e83-8cb7c8eb6007" providerId="ADAL" clId="{2C2923EB-B073-4BCB-B55E-F43A82C91922}" dt="2022-08-20T14:45:40.525" v="76"/>
-          <ac:spMkLst>
-            <pc:docMk/>
-            <pc:sldMk cId="1583176206" sldId="265"/>
-            <ac:spMk id="112" creationId="{C180E4EA-0B63-4779-A895-7E90E71088F3}"/>
-          </ac:spMkLst>
-        </pc:spChg>
-        <pc:spChg chg="del">
-          <ac:chgData name="Trainer, Jackson T" userId="5c586c50-e97e-48e7-9e83-8cb7c8eb6007" providerId="ADAL" clId="{2C2923EB-B073-4BCB-B55E-F43A82C91922}" dt="2022-08-20T14:45:40.525" v="76"/>
-          <ac:spMkLst>
-            <pc:docMk/>
-            <pc:sldMk cId="1583176206" sldId="265"/>
-            <ac:spMk id="114" creationId="{CEE01D9D-3DE8-4EED-B0D3-8F3C79CC7673}"/>
-          </ac:spMkLst>
-        </pc:spChg>
-        <pc:spChg chg="del">
-          <ac:chgData name="Trainer, Jackson T" userId="5c586c50-e97e-48e7-9e83-8cb7c8eb6007" providerId="ADAL" clId="{2C2923EB-B073-4BCB-B55E-F43A82C91922}" dt="2022-08-20T14:45:40.525" v="76"/>
-          <ac:spMkLst>
-            <pc:docMk/>
-            <pc:sldMk cId="1583176206" sldId="265"/>
-            <ac:spMk id="116" creationId="{89AF5CE9-607F-43F4-8983-DCD6DA4051FD}"/>
-          </ac:spMkLst>
-        </pc:spChg>
-        <pc:spChg chg="del">
-          <ac:chgData name="Trainer, Jackson T" userId="5c586c50-e97e-48e7-9e83-8cb7c8eb6007" providerId="ADAL" clId="{2C2923EB-B073-4BCB-B55E-F43A82C91922}" dt="2022-08-20T14:45:40.525" v="76"/>
-          <ac:spMkLst>
-            <pc:docMk/>
-            <pc:sldMk cId="1583176206" sldId="265"/>
-            <ac:spMk id="118" creationId="{6EEA2DBD-9E1E-4521-8C01-F32AD18A89E3}"/>
-          </ac:spMkLst>
-        </pc:spChg>
-        <pc:spChg chg="del">
-          <ac:chgData name="Trainer, Jackson T" userId="5c586c50-e97e-48e7-9e83-8cb7c8eb6007" providerId="ADAL" clId="{2C2923EB-B073-4BCB-B55E-F43A82C91922}" dt="2022-08-20T14:45:40.525" v="76"/>
-          <ac:spMkLst>
-            <pc:docMk/>
-            <pc:sldMk cId="1583176206" sldId="265"/>
-            <ac:spMk id="120" creationId="{15BBD2C1-BA9B-46A9-A27A-33498B169272}"/>
-          </ac:spMkLst>
-        </pc:spChg>
-        <pc:grpChg chg="add del">
-          <ac:chgData name="Trainer, Jackson T" userId="5c586c50-e97e-48e7-9e83-8cb7c8eb6007" providerId="ADAL" clId="{2C2923EB-B073-4BCB-B55E-F43A82C91922}" dt="2022-08-20T14:46:49.208" v="91" actId="26606"/>
-          <ac:grpSpMkLst>
-            <pc:docMk/>
-            <pc:sldMk cId="1583176206" sldId="265"/>
-            <ac:grpSpMk id="7" creationId="{7575D7A7-3C36-4508-9BC6-70A93BD3C438}"/>
-          </ac:grpSpMkLst>
-        </pc:grpChg>
-        <pc:grpChg chg="add del">
-          <ac:chgData name="Trainer, Jackson T" userId="5c586c50-e97e-48e7-9e83-8cb7c8eb6007" providerId="ADAL" clId="{2C2923EB-B073-4BCB-B55E-F43A82C91922}" dt="2022-08-20T14:46:51.077" v="94" actId="26606"/>
-          <ac:grpSpMkLst>
-            <pc:docMk/>
-            <pc:sldMk cId="1583176206" sldId="265"/>
-            <ac:grpSpMk id="8" creationId="{03E8C8A2-D2DA-42F8-84AA-AC5AB4251D29}"/>
-          </ac:grpSpMkLst>
-        </pc:grpChg>
-        <pc:grpChg chg="add del">
-          <ac:chgData name="Trainer, Jackson T" userId="5c586c50-e97e-48e7-9e83-8cb7c8eb6007" providerId="ADAL" clId="{2C2923EB-B073-4BCB-B55E-F43A82C91922}" dt="2022-08-20T14:47:33.130" v="102" actId="26606"/>
-          <ac:grpSpMkLst>
-            <pc:docMk/>
-            <pc:sldMk cId="1583176206" sldId="265"/>
-            <ac:grpSpMk id="24" creationId="{7575D7A7-3C36-4508-9BC6-70A93BD3C438}"/>
-          </ac:grpSpMkLst>
-        </pc:grpChg>
-        <pc:grpChg chg="add del">
-          <ac:chgData name="Trainer, Jackson T" userId="5c586c50-e97e-48e7-9e83-8cb7c8eb6007" providerId="ADAL" clId="{2C2923EB-B073-4BCB-B55E-F43A82C91922}" dt="2022-08-20T14:47:33.130" v="102" actId="26606"/>
-          <ac:grpSpMkLst>
-            <pc:docMk/>
-            <pc:sldMk cId="1583176206" sldId="265"/>
-            <ac:grpSpMk id="31" creationId="{68158C4B-1BFE-4F6D-B2C1-0066FA11935A}"/>
-          </ac:grpSpMkLst>
-        </pc:grpChg>
-        <pc:grpChg chg="add">
-          <ac:chgData name="Trainer, Jackson T" userId="5c586c50-e97e-48e7-9e83-8cb7c8eb6007" providerId="ADAL" clId="{2C2923EB-B073-4BCB-B55E-F43A82C91922}" dt="2022-08-20T14:47:33.130" v="102" actId="26606"/>
-          <ac:grpSpMkLst>
-            <pc:docMk/>
-            <pc:sldMk cId="1583176206" sldId="265"/>
-            <ac:grpSpMk id="39" creationId="{749C117F-F390-437B-ADB0-57E87EFF34F5}"/>
-          </ac:grpSpMkLst>
-        </pc:grpChg>
-        <pc:grpChg chg="add">
-          <ac:chgData name="Trainer, Jackson T" userId="5c586c50-e97e-48e7-9e83-8cb7c8eb6007" providerId="ADAL" clId="{2C2923EB-B073-4BCB-B55E-F43A82C91922}" dt="2022-08-20T14:47:33.130" v="102" actId="26606"/>
-          <ac:grpSpMkLst>
-            <pc:docMk/>
-            <pc:sldMk cId="1583176206" sldId="265"/>
-            <ac:grpSpMk id="49" creationId="{654E48C8-2A00-4C54-BC9C-B18EE49E9C13}"/>
-          </ac:grpSpMkLst>
-        </pc:grpChg>
-        <pc:grpChg chg="del">
-          <ac:chgData name="Trainer, Jackson T" userId="5c586c50-e97e-48e7-9e83-8cb7c8eb6007" providerId="ADAL" clId="{2C2923EB-B073-4BCB-B55E-F43A82C91922}" dt="2022-08-20T14:45:40.525" v="76"/>
-          <ac:grpSpMkLst>
-            <pc:docMk/>
-            <pc:sldMk cId="1583176206" sldId="265"/>
-            <ac:grpSpMk id="92" creationId="{88C9B83F-64CD-41C1-925F-A08801FFD0BD}"/>
-          </ac:grpSpMkLst>
-        </pc:grpChg>
-        <pc:picChg chg="add del">
-          <ac:chgData name="Trainer, Jackson T" userId="5c586c50-e97e-48e7-9e83-8cb7c8eb6007" providerId="ADAL" clId="{2C2923EB-B073-4BCB-B55E-F43A82C91922}" dt="2022-08-20T14:46:49.208" v="91" actId="26606"/>
-          <ac:picMkLst>
-            <pc:docMk/>
-            <pc:sldMk cId="1583176206" sldId="265"/>
-            <ac:picMk id="17" creationId="{BE33C98B-90F1-4F12-9D4E-46E1A234D2B4}"/>
-          </ac:picMkLst>
-        </pc:picChg>
-        <pc:picChg chg="add del">
-          <ac:chgData name="Trainer, Jackson T" userId="5c586c50-e97e-48e7-9e83-8cb7c8eb6007" providerId="ADAL" clId="{2C2923EB-B073-4BCB-B55E-F43A82C91922}" dt="2022-08-20T14:46:51.077" v="94" actId="26606"/>
-          <ac:picMkLst>
-            <pc:docMk/>
-            <pc:sldMk cId="1583176206" sldId="265"/>
-            <ac:picMk id="22" creationId="{769A857B-48DA-DE14-2B6E-B99979E48437}"/>
-          </ac:picMkLst>
-        </pc:picChg>
-        <pc:picChg chg="add">
-          <ac:chgData name="Trainer, Jackson T" userId="5c586c50-e97e-48e7-9e83-8cb7c8eb6007" providerId="ADAL" clId="{2C2923EB-B073-4BCB-B55E-F43A82C91922}" dt="2022-08-20T14:47:33.130" v="102" actId="26606"/>
-          <ac:picMkLst>
-            <pc:docMk/>
-            <pc:sldMk cId="1583176206" sldId="265"/>
-            <ac:picMk id="36" creationId="{ABEC9C95-0206-97F7-E2AC-71C5C307D41C}"/>
-          </ac:picMkLst>
-        </pc:picChg>
-        <pc:picChg chg="del">
-          <ac:chgData name="Trainer, Jackson T" userId="5c586c50-e97e-48e7-9e83-8cb7c8eb6007" providerId="ADAL" clId="{2C2923EB-B073-4BCB-B55E-F43A82C91922}" dt="2022-08-20T14:46:33.407" v="88" actId="478"/>
-          <ac:picMkLst>
-            <pc:docMk/>
-            <pc:sldMk cId="1583176206" sldId="265"/>
-            <ac:picMk id="88" creationId="{6959ABD7-A461-0C41-6665-C03D01F2CD85}"/>
-          </ac:picMkLst>
-        </pc:picChg>
-        <pc:cxnChg chg="add del">
-          <ac:chgData name="Trainer, Jackson T" userId="5c586c50-e97e-48e7-9e83-8cb7c8eb6007" providerId="ADAL" clId="{2C2923EB-B073-4BCB-B55E-F43A82C91922}" dt="2022-08-20T14:46:49.208" v="91" actId="26606"/>
-          <ac:cxnSpMkLst>
-            <pc:docMk/>
-            <pc:sldMk cId="1583176206" sldId="265"/>
-            <ac:cxnSpMk id="13" creationId="{AE446D0E-6531-40B7-A182-FB8602439777}"/>
-          </ac:cxnSpMkLst>
-        </pc:cxnChg>
-        <pc:cxnChg chg="add del">
-          <ac:chgData name="Trainer, Jackson T" userId="5c586c50-e97e-48e7-9e83-8cb7c8eb6007" providerId="ADAL" clId="{2C2923EB-B073-4BCB-B55E-F43A82C91922}" dt="2022-08-20T14:46:51.077" v="94" actId="26606"/>
-          <ac:cxnSpMkLst>
-            <pc:docMk/>
-            <pc:sldMk cId="1583176206" sldId="265"/>
-            <ac:cxnSpMk id="14" creationId="{0DFD28A6-39F3-425F-8050-E5BF1B4523B2}"/>
-          </ac:cxnSpMkLst>
-        </pc:cxnChg>
-        <pc:cxnChg chg="add del">
-          <ac:chgData name="Trainer, Jackson T" userId="5c586c50-e97e-48e7-9e83-8cb7c8eb6007" providerId="ADAL" clId="{2C2923EB-B073-4BCB-B55E-F43A82C91922}" dt="2022-08-20T14:46:51.077" v="94" actId="26606"/>
-          <ac:cxnSpMkLst>
-            <pc:docMk/>
-            <pc:sldMk cId="1583176206" sldId="265"/>
-            <ac:cxnSpMk id="18" creationId="{B48BEE9B-A2F4-4BF3-9EAD-16E1A7FC2DC6}"/>
-          </ac:cxnSpMkLst>
-        </pc:cxnChg>
-        <pc:cxnChg chg="add del">
-          <ac:chgData name="Trainer, Jackson T" userId="5c586c50-e97e-48e7-9e83-8cb7c8eb6007" providerId="ADAL" clId="{2C2923EB-B073-4BCB-B55E-F43A82C91922}" dt="2022-08-20T14:46:49.208" v="91" actId="26606"/>
-          <ac:cxnSpMkLst>
-            <pc:docMk/>
-            <pc:sldMk cId="1583176206" sldId="265"/>
-            <ac:cxnSpMk id="19" creationId="{4256FEDC-746C-45BC-9AF9-4F33D216534A}"/>
-          </ac:cxnSpMkLst>
-        </pc:cxnChg>
-        <pc:cxnChg chg="add del">
-          <ac:chgData name="Trainer, Jackson T" userId="5c586c50-e97e-48e7-9e83-8cb7c8eb6007" providerId="ADAL" clId="{2C2923EB-B073-4BCB-B55E-F43A82C91922}" dt="2022-08-20T14:47:33.130" v="102" actId="26606"/>
-          <ac:cxnSpMkLst>
-            <pc:docMk/>
-            <pc:sldMk cId="1583176206" sldId="265"/>
-            <ac:cxnSpMk id="25" creationId="{14319AF2-886A-4C5D-B34C-17FCB0267EEB}"/>
-          </ac:cxnSpMkLst>
-        </pc:cxnChg>
-        <pc:cxnChg chg="add del">
-          <ac:chgData name="Trainer, Jackson T" userId="5c586c50-e97e-48e7-9e83-8cb7c8eb6007" providerId="ADAL" clId="{2C2923EB-B073-4BCB-B55E-F43A82C91922}" dt="2022-08-20T14:47:33.130" v="102" actId="26606"/>
-          <ac:cxnSpMkLst>
-            <pc:docMk/>
-            <pc:sldMk cId="1583176206" sldId="265"/>
-            <ac:cxnSpMk id="28" creationId="{AE446D0E-6531-40B7-A182-FB8602439777}"/>
-          </ac:cxnSpMkLst>
-        </pc:cxnChg>
-        <pc:cxnChg chg="add">
-          <ac:chgData name="Trainer, Jackson T" userId="5c586c50-e97e-48e7-9e83-8cb7c8eb6007" providerId="ADAL" clId="{2C2923EB-B073-4BCB-B55E-F43A82C91922}" dt="2022-08-20T14:47:33.130" v="102" actId="26606"/>
-          <ac:cxnSpMkLst>
-            <pc:docMk/>
-            <pc:sldMk cId="1583176206" sldId="265"/>
-            <ac:cxnSpMk id="45" creationId="{20742BC3-654B-4E41-9A6A-73A42E477639}"/>
-          </ac:cxnSpMkLst>
-        </pc:cxnChg>
-        <pc:cxnChg chg="del">
-          <ac:chgData name="Trainer, Jackson T" userId="5c586c50-e97e-48e7-9e83-8cb7c8eb6007" providerId="ADAL" clId="{2C2923EB-B073-4BCB-B55E-F43A82C91922}" dt="2022-08-20T14:45:40.525" v="76"/>
-          <ac:cxnSpMkLst>
-            <pc:docMk/>
-            <pc:sldMk cId="1583176206" sldId="265"/>
-            <ac:cxnSpMk id="104" creationId="{A57C1A16-B8AB-4D99-A195-A38F556A6486}"/>
-          </ac:cxnSpMkLst>
-        </pc:cxnChg>
-        <pc:cxnChg chg="del">
-          <ac:chgData name="Trainer, Jackson T" userId="5c586c50-e97e-48e7-9e83-8cb7c8eb6007" providerId="ADAL" clId="{2C2923EB-B073-4BCB-B55E-F43A82C91922}" dt="2022-08-20T14:45:40.525" v="76"/>
-          <ac:cxnSpMkLst>
-            <pc:docMk/>
-            <pc:sldMk cId="1583176206" sldId="265"/>
-            <ac:cxnSpMk id="106" creationId="{F8A9B20B-D1DD-4573-B5EC-558029519236}"/>
-          </ac:cxnSpMkLst>
-        </pc:cxnChg>
-      </pc:sldChg>
-      <pc:sldChg chg="addSp delSp modSp del mod">
-        <pc:chgData name="Trainer, Jackson T" userId="5c586c50-e97e-48e7-9e83-8cb7c8eb6007" providerId="ADAL" clId="{2C2923EB-B073-4BCB-B55E-F43A82C91922}" dt="2022-08-20T14:37:30.788" v="65" actId="2696"/>
-        <pc:sldMkLst>
-          <pc:docMk/>
-          <pc:sldMk cId="2351012511" sldId="267"/>
-        </pc:sldMkLst>
-        <pc:spChg chg="mod ord">
-          <ac:chgData name="Trainer, Jackson T" userId="5c586c50-e97e-48e7-9e83-8cb7c8eb6007" providerId="ADAL" clId="{2C2923EB-B073-4BCB-B55E-F43A82C91922}" dt="2022-08-20T14:35:35.585" v="38" actId="26606"/>
-          <ac:spMkLst>
-            <pc:docMk/>
-            <pc:sldMk cId="2351012511" sldId="267"/>
-            <ac:spMk id="2" creationId="{623BF4B3-910E-8CDD-2432-22CDFFFC0806}"/>
-          </ac:spMkLst>
-        </pc:spChg>
-        <pc:spChg chg="add del mod">
-          <ac:chgData name="Trainer, Jackson T" userId="5c586c50-e97e-48e7-9e83-8cb7c8eb6007" providerId="ADAL" clId="{2C2923EB-B073-4BCB-B55E-F43A82C91922}" dt="2022-08-20T14:33:29.407" v="1" actId="22"/>
-          <ac:spMkLst>
-            <pc:docMk/>
-            <pc:sldMk cId="2351012511" sldId="267"/>
-            <ac:spMk id="4" creationId="{B005AA7A-BCFC-433D-A8A9-9BAEA8E58F01}"/>
-          </ac:spMkLst>
-        </pc:spChg>
-        <pc:spChg chg="add del mod">
-          <ac:chgData name="Trainer, Jackson T" userId="5c586c50-e97e-48e7-9e83-8cb7c8eb6007" providerId="ADAL" clId="{2C2923EB-B073-4BCB-B55E-F43A82C91922}" dt="2022-08-20T14:35:24.437" v="33" actId="22"/>
-          <ac:spMkLst>
-            <pc:docMk/>
-            <pc:sldMk cId="2351012511" sldId="267"/>
-            <ac:spMk id="8" creationId="{73B6F597-0D2C-4708-B8DB-81BC820756E1}"/>
-          </ac:spMkLst>
-        </pc:spChg>
-        <pc:spChg chg="add del">
-          <ac:chgData name="Trainer, Jackson T" userId="5c586c50-e97e-48e7-9e83-8cb7c8eb6007" providerId="ADAL" clId="{2C2923EB-B073-4BCB-B55E-F43A82C91922}" dt="2022-08-20T14:35:35.585" v="38" actId="26606"/>
-          <ac:spMkLst>
-            <pc:docMk/>
-            <pc:sldMk cId="2351012511" sldId="267"/>
-            <ac:spMk id="31" creationId="{5A7802B6-FF37-40CF-A7E2-6F2A0D9A91EF}"/>
-          </ac:spMkLst>
-        </pc:spChg>
-        <pc:spChg chg="add del">
-          <ac:chgData name="Trainer, Jackson T" userId="5c586c50-e97e-48e7-9e83-8cb7c8eb6007" providerId="ADAL" clId="{2C2923EB-B073-4BCB-B55E-F43A82C91922}" dt="2022-08-20T14:33:37.150" v="5" actId="26606"/>
-          <ac:spMkLst>
-            <pc:docMk/>
-            <pc:sldMk cId="2351012511" sldId="267"/>
-            <ac:spMk id="35" creationId="{44F26032-91F7-352B-5DCA-EF1C732A0824}"/>
-          </ac:spMkLst>
-        </pc:spChg>
-        <pc:spChg chg="add del">
-          <ac:chgData name="Trainer, Jackson T" userId="5c586c50-e97e-48e7-9e83-8cb7c8eb6007" providerId="ADAL" clId="{2C2923EB-B073-4BCB-B55E-F43A82C91922}" dt="2022-08-20T14:33:37.150" v="5" actId="26606"/>
-          <ac:spMkLst>
-            <pc:docMk/>
-            <pc:sldMk cId="2351012511" sldId="267"/>
-            <ac:spMk id="38" creationId="{9F4444CE-BC8D-4D61-B303-4C05614E62AB}"/>
-          </ac:spMkLst>
-        </pc:spChg>
-        <pc:spChg chg="add del">
-          <ac:chgData name="Trainer, Jackson T" userId="5c586c50-e97e-48e7-9e83-8cb7c8eb6007" providerId="ADAL" clId="{2C2923EB-B073-4BCB-B55E-F43A82C91922}" dt="2022-08-20T14:33:37.150" v="5" actId="26606"/>
-          <ac:spMkLst>
-            <pc:docMk/>
-            <pc:sldMk cId="2351012511" sldId="267"/>
-            <ac:spMk id="40" creationId="{62423CA5-E2E1-4789-B759-9906C1C94063}"/>
-          </ac:spMkLst>
-        </pc:spChg>
-        <pc:spChg chg="add del">
-          <ac:chgData name="Trainer, Jackson T" userId="5c586c50-e97e-48e7-9e83-8cb7c8eb6007" providerId="ADAL" clId="{2C2923EB-B073-4BCB-B55E-F43A82C91922}" dt="2022-08-20T14:33:37.150" v="5" actId="26606"/>
-          <ac:spMkLst>
-            <pc:docMk/>
-            <pc:sldMk cId="2351012511" sldId="267"/>
-            <ac:spMk id="42" creationId="{73772B81-181F-48B7-8826-4D9686D15DF5}"/>
-          </ac:spMkLst>
-        </pc:spChg>
-        <pc:spChg chg="add del">
-          <ac:chgData name="Trainer, Jackson T" userId="5c586c50-e97e-48e7-9e83-8cb7c8eb6007" providerId="ADAL" clId="{2C2923EB-B073-4BCB-B55E-F43A82C91922}" dt="2022-08-20T14:33:37.150" v="5" actId="26606"/>
-          <ac:spMkLst>
-            <pc:docMk/>
-            <pc:sldMk cId="2351012511" sldId="267"/>
-            <ac:spMk id="44" creationId="{B2205F6E-03C6-4E92-877C-E2482F6599AA}"/>
-          </ac:spMkLst>
-        </pc:spChg>
-        <pc:spChg chg="add del">
-          <ac:chgData name="Trainer, Jackson T" userId="5c586c50-e97e-48e7-9e83-8cb7c8eb6007" providerId="ADAL" clId="{2C2923EB-B073-4BCB-B55E-F43A82C91922}" dt="2022-08-20T14:33:40.796" v="7" actId="26606"/>
-          <ac:spMkLst>
-            <pc:docMk/>
-            <pc:sldMk cId="2351012511" sldId="267"/>
-            <ac:spMk id="46" creationId="{7E018740-5C2B-4A41-AC1A-7E68D1EC1954}"/>
-          </ac:spMkLst>
-        </pc:spChg>
-        <pc:spChg chg="add del">
-          <ac:chgData name="Trainer, Jackson T" userId="5c586c50-e97e-48e7-9e83-8cb7c8eb6007" providerId="ADAL" clId="{2C2923EB-B073-4BCB-B55E-F43A82C91922}" dt="2022-08-20T14:33:40.796" v="7" actId="26606"/>
-          <ac:spMkLst>
-            <pc:docMk/>
-            <pc:sldMk cId="2351012511" sldId="267"/>
-            <ac:spMk id="47" creationId="{A65AC7D1-EAA9-48F5-B509-60A7F50BF703}"/>
-          </ac:spMkLst>
-        </pc:spChg>
-        <pc:spChg chg="add del">
-          <ac:chgData name="Trainer, Jackson T" userId="5c586c50-e97e-48e7-9e83-8cb7c8eb6007" providerId="ADAL" clId="{2C2923EB-B073-4BCB-B55E-F43A82C91922}" dt="2022-08-20T14:33:40.796" v="7" actId="26606"/>
-          <ac:spMkLst>
-            <pc:docMk/>
-            <pc:sldMk cId="2351012511" sldId="267"/>
-            <ac:spMk id="49" creationId="{D6320AF9-619A-4175-865B-5663E1AEF4C5}"/>
-          </ac:spMkLst>
-        </pc:spChg>
-        <pc:spChg chg="add del">
-          <ac:chgData name="Trainer, Jackson T" userId="5c586c50-e97e-48e7-9e83-8cb7c8eb6007" providerId="ADAL" clId="{2C2923EB-B073-4BCB-B55E-F43A82C91922}" dt="2022-08-20T14:33:35.826" v="3" actId="26606"/>
-          <ac:spMkLst>
-            <pc:docMk/>
-            <pc:sldMk cId="2351012511" sldId="267"/>
-            <ac:spMk id="52" creationId="{66D61E08-70C3-48D8-BEA0-787111DC30DA}"/>
-          </ac:spMkLst>
-        </pc:spChg>
-        <pc:spChg chg="add del">
-          <ac:chgData name="Trainer, Jackson T" userId="5c586c50-e97e-48e7-9e83-8cb7c8eb6007" providerId="ADAL" clId="{2C2923EB-B073-4BCB-B55E-F43A82C91922}" dt="2022-08-20T14:33:35.826" v="3" actId="26606"/>
-          <ac:spMkLst>
-            <pc:docMk/>
-            <pc:sldMk cId="2351012511" sldId="267"/>
-            <ac:spMk id="54" creationId="{FC55298F-0AE5-478E-AD2B-03C2614C5833}"/>
-          </ac:spMkLst>
-        </pc:spChg>
-        <pc:spChg chg="add del">
-          <ac:chgData name="Trainer, Jackson T" userId="5c586c50-e97e-48e7-9e83-8cb7c8eb6007" providerId="ADAL" clId="{2C2923EB-B073-4BCB-B55E-F43A82C91922}" dt="2022-08-20T14:33:40.796" v="7" actId="26606"/>
-          <ac:spMkLst>
-            <pc:docMk/>
-            <pc:sldMk cId="2351012511" sldId="267"/>
-            <ac:spMk id="55" creationId="{166F75A4-C475-4941-8EE2-B80A06A2C1BB}"/>
-          </ac:spMkLst>
-        </pc:spChg>
-        <pc:spChg chg="add del">
-          <ac:chgData name="Trainer, Jackson T" userId="5c586c50-e97e-48e7-9e83-8cb7c8eb6007" providerId="ADAL" clId="{2C2923EB-B073-4BCB-B55E-F43A82C91922}" dt="2022-08-20T14:33:35.826" v="3" actId="26606"/>
-          <ac:spMkLst>
-            <pc:docMk/>
-            <pc:sldMk cId="2351012511" sldId="267"/>
-            <ac:spMk id="56" creationId="{C180E4EA-0B63-4779-A895-7E90E71088F3}"/>
-          </ac:spMkLst>
-        </pc:spChg>
-        <pc:spChg chg="add del">
-          <ac:chgData name="Trainer, Jackson T" userId="5c586c50-e97e-48e7-9e83-8cb7c8eb6007" providerId="ADAL" clId="{2C2923EB-B073-4BCB-B55E-F43A82C91922}" dt="2022-08-20T14:33:40.796" v="7" actId="26606"/>
-          <ac:spMkLst>
-            <pc:docMk/>
-            <pc:sldMk cId="2351012511" sldId="267"/>
-            <ac:spMk id="57" creationId="{A032553A-72E8-4B0D-8405-FF9771C9AF05}"/>
-          </ac:spMkLst>
-        </pc:spChg>
-        <pc:spChg chg="add del">
-          <ac:chgData name="Trainer, Jackson T" userId="5c586c50-e97e-48e7-9e83-8cb7c8eb6007" providerId="ADAL" clId="{2C2923EB-B073-4BCB-B55E-F43A82C91922}" dt="2022-08-20T14:33:35.826" v="3" actId="26606"/>
-          <ac:spMkLst>
-            <pc:docMk/>
-            <pc:sldMk cId="2351012511" sldId="267"/>
-            <ac:spMk id="58" creationId="{CEE01D9D-3DE8-4EED-B0D3-8F3C79CC7673}"/>
-          </ac:spMkLst>
-        </pc:spChg>
-        <pc:spChg chg="add del">
-          <ac:chgData name="Trainer, Jackson T" userId="5c586c50-e97e-48e7-9e83-8cb7c8eb6007" providerId="ADAL" clId="{2C2923EB-B073-4BCB-B55E-F43A82C91922}" dt="2022-08-20T14:33:40.796" v="7" actId="26606"/>
-          <ac:spMkLst>
-            <pc:docMk/>
-            <pc:sldMk cId="2351012511" sldId="267"/>
-            <ac:spMk id="59" creationId="{765800AC-C3B9-498E-87BC-29FAE4C76B21}"/>
-          </ac:spMkLst>
-        </pc:spChg>
-        <pc:spChg chg="add del">
-          <ac:chgData name="Trainer, Jackson T" userId="5c586c50-e97e-48e7-9e83-8cb7c8eb6007" providerId="ADAL" clId="{2C2923EB-B073-4BCB-B55E-F43A82C91922}" dt="2022-08-20T14:33:35.826" v="3" actId="26606"/>
-          <ac:spMkLst>
-            <pc:docMk/>
-            <pc:sldMk cId="2351012511" sldId="267"/>
-            <ac:spMk id="60" creationId="{89AF5CE9-607F-43F4-8983-DCD6DA4051FD}"/>
-          </ac:spMkLst>
-        </pc:spChg>
-        <pc:spChg chg="add del">
-          <ac:chgData name="Trainer, Jackson T" userId="5c586c50-e97e-48e7-9e83-8cb7c8eb6007" providerId="ADAL" clId="{2C2923EB-B073-4BCB-B55E-F43A82C91922}" dt="2022-08-20T14:33:40.796" v="7" actId="26606"/>
-          <ac:spMkLst>
-            <pc:docMk/>
-            <pc:sldMk cId="2351012511" sldId="267"/>
-            <ac:spMk id="61" creationId="{1F9D6ACB-2FF4-49F9-978A-E0D5327FC635}"/>
-          </ac:spMkLst>
-        </pc:spChg>
-        <pc:spChg chg="add del">
-          <ac:chgData name="Trainer, Jackson T" userId="5c586c50-e97e-48e7-9e83-8cb7c8eb6007" providerId="ADAL" clId="{2C2923EB-B073-4BCB-B55E-F43A82C91922}" dt="2022-08-20T14:33:35.826" v="3" actId="26606"/>
-          <ac:spMkLst>
-            <pc:docMk/>
-            <pc:sldMk cId="2351012511" sldId="267"/>
-            <ac:spMk id="62" creationId="{6EEA2DBD-9E1E-4521-8C01-F32AD18A89E3}"/>
-          </ac:spMkLst>
-        </pc:spChg>
-        <pc:spChg chg="add del">
-          <ac:chgData name="Trainer, Jackson T" userId="5c586c50-e97e-48e7-9e83-8cb7c8eb6007" providerId="ADAL" clId="{2C2923EB-B073-4BCB-B55E-F43A82C91922}" dt="2022-08-20T14:33:40.796" v="7" actId="26606"/>
-          <ac:spMkLst>
-            <pc:docMk/>
-            <pc:sldMk cId="2351012511" sldId="267"/>
-            <ac:spMk id="63" creationId="{A5EC319D-0FEA-4B95-A3EA-01E35672C95B}"/>
-          </ac:spMkLst>
-        </pc:spChg>
-        <pc:spChg chg="add del">
-          <ac:chgData name="Trainer, Jackson T" userId="5c586c50-e97e-48e7-9e83-8cb7c8eb6007" providerId="ADAL" clId="{2C2923EB-B073-4BCB-B55E-F43A82C91922}" dt="2022-08-20T14:33:35.826" v="3" actId="26606"/>
-          <ac:spMkLst>
-            <pc:docMk/>
-            <pc:sldMk cId="2351012511" sldId="267"/>
-            <ac:spMk id="64" creationId="{15BBD2C1-BA9B-46A9-A27A-33498B169272}"/>
-          </ac:spMkLst>
-        </pc:spChg>
-        <pc:spChg chg="add del">
-          <ac:chgData name="Trainer, Jackson T" userId="5c586c50-e97e-48e7-9e83-8cb7c8eb6007" providerId="ADAL" clId="{2C2923EB-B073-4BCB-B55E-F43A82C91922}" dt="2022-08-20T14:33:40.796" v="7" actId="26606"/>
-          <ac:spMkLst>
-            <pc:docMk/>
-            <pc:sldMk cId="2351012511" sldId="267"/>
-            <ac:spMk id="65" creationId="{C95072A3-672D-4AB5-7E8A-BBAF3CB0E109}"/>
-          </ac:spMkLst>
-        </pc:spChg>
-        <pc:spChg chg="add del">
-          <ac:chgData name="Trainer, Jackson T" userId="5c586c50-e97e-48e7-9e83-8cb7c8eb6007" providerId="ADAL" clId="{2C2923EB-B073-4BCB-B55E-F43A82C91922}" dt="2022-08-20T14:33:43.479" v="9" actId="26606"/>
-          <ac:spMkLst>
-            <pc:docMk/>
-            <pc:sldMk cId="2351012511" sldId="267"/>
-            <ac:spMk id="67" creationId="{FD0B3142-54FC-8D04-FCE7-6078AEFF98C7}"/>
-          </ac:spMkLst>
-        </pc:spChg>
-        <pc:spChg chg="add del">
-          <ac:chgData name="Trainer, Jackson T" userId="5c586c50-e97e-48e7-9e83-8cb7c8eb6007" providerId="ADAL" clId="{2C2923EB-B073-4BCB-B55E-F43A82C91922}" dt="2022-08-20T14:33:50.125" v="11" actId="26606"/>
-          <ac:spMkLst>
-            <pc:docMk/>
-            <pc:sldMk cId="2351012511" sldId="267"/>
-            <ac:spMk id="69" creationId="{BFE5EF94-FC6F-B67A-735A-8AA250659795}"/>
-          </ac:spMkLst>
-        </pc:spChg>
-        <pc:spChg chg="add del">
-          <ac:chgData name="Trainer, Jackson T" userId="5c586c50-e97e-48e7-9e83-8cb7c8eb6007" providerId="ADAL" clId="{2C2923EB-B073-4BCB-B55E-F43A82C91922}" dt="2022-08-20T14:35:35.583" v="37" actId="26606"/>
-          <ac:spMkLst>
-            <pc:docMk/>
-            <pc:sldMk cId="2351012511" sldId="267"/>
-            <ac:spMk id="74" creationId="{03A08AF2-6738-7857-EF98-7B97EBCA63BD}"/>
-          </ac:spMkLst>
-        </pc:spChg>
-        <pc:spChg chg="add del">
-          <ac:chgData name="Trainer, Jackson T" userId="5c586c50-e97e-48e7-9e83-8cb7c8eb6007" providerId="ADAL" clId="{2C2923EB-B073-4BCB-B55E-F43A82C91922}" dt="2022-08-20T14:35:57.648" v="44" actId="478"/>
-          <ac:spMkLst>
-            <pc:docMk/>
-            <pc:sldMk cId="2351012511" sldId="267"/>
-            <ac:spMk id="76" creationId="{E53A5778-0A2A-5AE5-016F-08ADA4A0FEBB}"/>
-          </ac:spMkLst>
-        </pc:spChg>
-        <pc:spChg chg="add del">
-          <ac:chgData name="Trainer, Jackson T" userId="5c586c50-e97e-48e7-9e83-8cb7c8eb6007" providerId="ADAL" clId="{2C2923EB-B073-4BCB-B55E-F43A82C91922}" dt="2022-08-20T14:33:52.700" v="13" actId="26606"/>
-          <ac:spMkLst>
-            <pc:docMk/>
-            <pc:sldMk cId="2351012511" sldId="267"/>
-            <ac:spMk id="79" creationId="{66D61E08-70C3-48D8-BEA0-787111DC30DA}"/>
-          </ac:spMkLst>
-        </pc:spChg>
-        <pc:spChg chg="add del">
-          <ac:chgData name="Trainer, Jackson T" userId="5c586c50-e97e-48e7-9e83-8cb7c8eb6007" providerId="ADAL" clId="{2C2923EB-B073-4BCB-B55E-F43A82C91922}" dt="2022-08-20T14:33:52.700" v="13" actId="26606"/>
-          <ac:spMkLst>
-            <pc:docMk/>
-            <pc:sldMk cId="2351012511" sldId="267"/>
-            <ac:spMk id="80" creationId="{FC55298F-0AE5-478E-AD2B-03C2614C5833}"/>
-          </ac:spMkLst>
-        </pc:spChg>
-        <pc:spChg chg="add del">
-          <ac:chgData name="Trainer, Jackson T" userId="5c586c50-e97e-48e7-9e83-8cb7c8eb6007" providerId="ADAL" clId="{2C2923EB-B073-4BCB-B55E-F43A82C91922}" dt="2022-08-20T14:33:52.700" v="13" actId="26606"/>
-          <ac:spMkLst>
-            <pc:docMk/>
-            <pc:sldMk cId="2351012511" sldId="267"/>
-            <ac:spMk id="81" creationId="{C180E4EA-0B63-4779-A895-7E90E71088F3}"/>
-          </ac:spMkLst>
-        </pc:spChg>
-        <pc:spChg chg="add del">
-          <ac:chgData name="Trainer, Jackson T" userId="5c586c50-e97e-48e7-9e83-8cb7c8eb6007" providerId="ADAL" clId="{2C2923EB-B073-4BCB-B55E-F43A82C91922}" dt="2022-08-20T14:33:52.700" v="13" actId="26606"/>
-          <ac:spMkLst>
-            <pc:docMk/>
-            <pc:sldMk cId="2351012511" sldId="267"/>
-            <ac:spMk id="82" creationId="{CEE01D9D-3DE8-4EED-B0D3-8F3C79CC7673}"/>
-          </ac:spMkLst>
-        </pc:spChg>
-        <pc:spChg chg="add del">
-          <ac:chgData name="Trainer, Jackson T" userId="5c586c50-e97e-48e7-9e83-8cb7c8eb6007" providerId="ADAL" clId="{2C2923EB-B073-4BCB-B55E-F43A82C91922}" dt="2022-08-20T14:33:52.700" v="13" actId="26606"/>
-          <ac:spMkLst>
-            <pc:docMk/>
-            <pc:sldMk cId="2351012511" sldId="267"/>
-            <ac:spMk id="83" creationId="{89AF5CE9-607F-43F4-8983-DCD6DA4051FD}"/>
-          </ac:spMkLst>
-        </pc:spChg>
-        <pc:spChg chg="add del">
-          <ac:chgData name="Trainer, Jackson T" userId="5c586c50-e97e-48e7-9e83-8cb7c8eb6007" providerId="ADAL" clId="{2C2923EB-B073-4BCB-B55E-F43A82C91922}" dt="2022-08-20T14:33:52.700" v="13" actId="26606"/>
-          <ac:spMkLst>
-            <pc:docMk/>
-            <pc:sldMk cId="2351012511" sldId="267"/>
-            <ac:spMk id="84" creationId="{6EEA2DBD-9E1E-4521-8C01-F32AD18A89E3}"/>
-          </ac:spMkLst>
-        </pc:spChg>
-        <pc:spChg chg="add del">
-          <ac:chgData name="Trainer, Jackson T" userId="5c586c50-e97e-48e7-9e83-8cb7c8eb6007" providerId="ADAL" clId="{2C2923EB-B073-4BCB-B55E-F43A82C91922}" dt="2022-08-20T14:33:52.700" v="13" actId="26606"/>
-          <ac:spMkLst>
-            <pc:docMk/>
-            <pc:sldMk cId="2351012511" sldId="267"/>
-            <ac:spMk id="85" creationId="{15BBD2C1-BA9B-46A9-A27A-33498B169272}"/>
-          </ac:spMkLst>
-        </pc:spChg>
-        <pc:spChg chg="add del">
-          <ac:chgData name="Trainer, Jackson T" userId="5c586c50-e97e-48e7-9e83-8cb7c8eb6007" providerId="ADAL" clId="{2C2923EB-B073-4BCB-B55E-F43A82C91922}" dt="2022-08-20T14:33:54.223" v="15" actId="26606"/>
-          <ac:spMkLst>
-            <pc:docMk/>
-            <pc:sldMk cId="2351012511" sldId="267"/>
-            <ac:spMk id="93" creationId="{5A7802B6-FF37-40CF-A7E2-6F2A0D9A91EF}"/>
-          </ac:spMkLst>
-        </pc:spChg>
-        <pc:spChg chg="add del">
-          <ac:chgData name="Trainer, Jackson T" userId="5c586c50-e97e-48e7-9e83-8cb7c8eb6007" providerId="ADAL" clId="{2C2923EB-B073-4BCB-B55E-F43A82C91922}" dt="2022-08-20T14:33:55.677" v="17" actId="26606"/>
-          <ac:spMkLst>
-            <pc:docMk/>
-            <pc:sldMk cId="2351012511" sldId="267"/>
-            <ac:spMk id="95" creationId="{A65AC7D1-EAA9-48F5-B509-60A7F50BF703}"/>
-          </ac:spMkLst>
-        </pc:spChg>
-        <pc:spChg chg="add del">
-          <ac:chgData name="Trainer, Jackson T" userId="5c586c50-e97e-48e7-9e83-8cb7c8eb6007" providerId="ADAL" clId="{2C2923EB-B073-4BCB-B55E-F43A82C91922}" dt="2022-08-20T14:33:55.677" v="17" actId="26606"/>
-          <ac:spMkLst>
-            <pc:docMk/>
-            <pc:sldMk cId="2351012511" sldId="267"/>
-            <ac:spMk id="96" creationId="{D6320AF9-619A-4175-865B-5663E1AEF4C5}"/>
-          </ac:spMkLst>
-        </pc:spChg>
-        <pc:spChg chg="add del">
-          <ac:chgData name="Trainer, Jackson T" userId="5c586c50-e97e-48e7-9e83-8cb7c8eb6007" providerId="ADAL" clId="{2C2923EB-B073-4BCB-B55E-F43A82C91922}" dt="2022-08-20T14:33:55.677" v="17" actId="26606"/>
-          <ac:spMkLst>
-            <pc:docMk/>
-            <pc:sldMk cId="2351012511" sldId="267"/>
-            <ac:spMk id="99" creationId="{7E018740-5C2B-4A41-AC1A-7E68D1EC1954}"/>
-          </ac:spMkLst>
-        </pc:spChg>
-        <pc:spChg chg="add del">
-          <ac:chgData name="Trainer, Jackson T" userId="5c586c50-e97e-48e7-9e83-8cb7c8eb6007" providerId="ADAL" clId="{2C2923EB-B073-4BCB-B55E-F43A82C91922}" dt="2022-08-20T14:33:55.677" v="17" actId="26606"/>
-          <ac:spMkLst>
-            <pc:docMk/>
-            <pc:sldMk cId="2351012511" sldId="267"/>
-            <ac:spMk id="100" creationId="{166F75A4-C475-4941-8EE2-B80A06A2C1BB}"/>
-          </ac:spMkLst>
-        </pc:spChg>
-        <pc:spChg chg="add del">
-          <ac:chgData name="Trainer, Jackson T" userId="5c586c50-e97e-48e7-9e83-8cb7c8eb6007" providerId="ADAL" clId="{2C2923EB-B073-4BCB-B55E-F43A82C91922}" dt="2022-08-20T14:33:55.677" v="17" actId="26606"/>
-          <ac:spMkLst>
-            <pc:docMk/>
-            <pc:sldMk cId="2351012511" sldId="267"/>
-            <ac:spMk id="101" creationId="{A032553A-72E8-4B0D-8405-FF9771C9AF05}"/>
-          </ac:spMkLst>
-        </pc:spChg>
-        <pc:spChg chg="add del">
-          <ac:chgData name="Trainer, Jackson T" userId="5c586c50-e97e-48e7-9e83-8cb7c8eb6007" providerId="ADAL" clId="{2C2923EB-B073-4BCB-B55E-F43A82C91922}" dt="2022-08-20T14:33:55.677" v="17" actId="26606"/>
-          <ac:spMkLst>
-            <pc:docMk/>
-            <pc:sldMk cId="2351012511" sldId="267"/>
-            <ac:spMk id="102" creationId="{765800AC-C3B9-498E-87BC-29FAE4C76B21}"/>
-          </ac:spMkLst>
-        </pc:spChg>
-        <pc:spChg chg="add del">
-          <ac:chgData name="Trainer, Jackson T" userId="5c586c50-e97e-48e7-9e83-8cb7c8eb6007" providerId="ADAL" clId="{2C2923EB-B073-4BCB-B55E-F43A82C91922}" dt="2022-08-20T14:33:55.677" v="17" actId="26606"/>
-          <ac:spMkLst>
-            <pc:docMk/>
-            <pc:sldMk cId="2351012511" sldId="267"/>
-            <ac:spMk id="103" creationId="{1F9D6ACB-2FF4-49F9-978A-E0D5327FC635}"/>
-          </ac:spMkLst>
-        </pc:spChg>
-        <pc:spChg chg="add del">
-          <ac:chgData name="Trainer, Jackson T" userId="5c586c50-e97e-48e7-9e83-8cb7c8eb6007" providerId="ADAL" clId="{2C2923EB-B073-4BCB-B55E-F43A82C91922}" dt="2022-08-20T14:33:55.677" v="17" actId="26606"/>
-          <ac:spMkLst>
-            <pc:docMk/>
-            <pc:sldMk cId="2351012511" sldId="267"/>
-            <ac:spMk id="104" creationId="{A5EC319D-0FEA-4B95-A3EA-01E35672C95B}"/>
-          </ac:spMkLst>
-        </pc:spChg>
-        <pc:spChg chg="add del">
-          <ac:chgData name="Trainer, Jackson T" userId="5c586c50-e97e-48e7-9e83-8cb7c8eb6007" providerId="ADAL" clId="{2C2923EB-B073-4BCB-B55E-F43A82C91922}" dt="2022-08-20T14:33:55.677" v="17" actId="26606"/>
-          <ac:spMkLst>
-            <pc:docMk/>
-            <pc:sldMk cId="2351012511" sldId="267"/>
-            <ac:spMk id="105" creationId="{C95072A3-672D-4AB5-7E8A-BBAF3CB0E109}"/>
-          </ac:spMkLst>
-        </pc:spChg>
-        <pc:spChg chg="add del">
-          <ac:chgData name="Trainer, Jackson T" userId="5c586c50-e97e-48e7-9e83-8cb7c8eb6007" providerId="ADAL" clId="{2C2923EB-B073-4BCB-B55E-F43A82C91922}" dt="2022-08-20T14:33:57.807" v="19" actId="26606"/>
-          <ac:spMkLst>
-            <pc:docMk/>
-            <pc:sldMk cId="2351012511" sldId="267"/>
-            <ac:spMk id="107" creationId="{9F4444CE-BC8D-4D61-B303-4C05614E62AB}"/>
-          </ac:spMkLst>
-        </pc:spChg>
-        <pc:spChg chg="add del">
-          <ac:chgData name="Trainer, Jackson T" userId="5c586c50-e97e-48e7-9e83-8cb7c8eb6007" providerId="ADAL" clId="{2C2923EB-B073-4BCB-B55E-F43A82C91922}" dt="2022-08-20T14:33:57.807" v="19" actId="26606"/>
-          <ac:spMkLst>
-            <pc:docMk/>
-            <pc:sldMk cId="2351012511" sldId="267"/>
-            <ac:spMk id="108" creationId="{62423CA5-E2E1-4789-B759-9906C1C94063}"/>
-          </ac:spMkLst>
-        </pc:spChg>
-        <pc:spChg chg="add del">
-          <ac:chgData name="Trainer, Jackson T" userId="5c586c50-e97e-48e7-9e83-8cb7c8eb6007" providerId="ADAL" clId="{2C2923EB-B073-4BCB-B55E-F43A82C91922}" dt="2022-08-20T14:33:57.807" v="19" actId="26606"/>
-          <ac:spMkLst>
-            <pc:docMk/>
-            <pc:sldMk cId="2351012511" sldId="267"/>
-            <ac:spMk id="109" creationId="{73772B81-181F-48B7-8826-4D9686D15DF5}"/>
-          </ac:spMkLst>
-        </pc:spChg>
-        <pc:spChg chg="add del">
-          <ac:chgData name="Trainer, Jackson T" userId="5c586c50-e97e-48e7-9e83-8cb7c8eb6007" providerId="ADAL" clId="{2C2923EB-B073-4BCB-B55E-F43A82C91922}" dt="2022-08-20T14:33:57.807" v="19" actId="26606"/>
-          <ac:spMkLst>
-            <pc:docMk/>
-            <pc:sldMk cId="2351012511" sldId="267"/>
-            <ac:spMk id="110" creationId="{44F26032-91F7-352B-5DCA-EF1C732A0824}"/>
-          </ac:spMkLst>
-        </pc:spChg>
-        <pc:spChg chg="add del">
-          <ac:chgData name="Trainer, Jackson T" userId="5c586c50-e97e-48e7-9e83-8cb7c8eb6007" providerId="ADAL" clId="{2C2923EB-B073-4BCB-B55E-F43A82C91922}" dt="2022-08-20T14:33:57.807" v="19" actId="26606"/>
-          <ac:spMkLst>
-            <pc:docMk/>
-            <pc:sldMk cId="2351012511" sldId="267"/>
-            <ac:spMk id="111" creationId="{B2205F6E-03C6-4E92-877C-E2482F6599AA}"/>
-          </ac:spMkLst>
-        </pc:spChg>
-        <pc:spChg chg="add del">
-          <ac:chgData name="Trainer, Jackson T" userId="5c586c50-e97e-48e7-9e83-8cb7c8eb6007" providerId="ADAL" clId="{2C2923EB-B073-4BCB-B55E-F43A82C91922}" dt="2022-08-20T14:34:00.251" v="21" actId="26606"/>
-          <ac:spMkLst>
-            <pc:docMk/>
-            <pc:sldMk cId="2351012511" sldId="267"/>
-            <ac:spMk id="113" creationId="{BFE5EF94-FC6F-B67A-735A-8AA250659795}"/>
-          </ac:spMkLst>
-        </pc:spChg>
-        <pc:spChg chg="add del">
-          <ac:chgData name="Trainer, Jackson T" userId="5c586c50-e97e-48e7-9e83-8cb7c8eb6007" providerId="ADAL" clId="{2C2923EB-B073-4BCB-B55E-F43A82C91922}" dt="2022-08-20T14:35:18.753" v="31" actId="26606"/>
-          <ac:spMkLst>
-            <pc:docMk/>
-            <pc:sldMk cId="2351012511" sldId="267"/>
-            <ac:spMk id="115" creationId="{FD0B3142-54FC-8D04-FCE7-6078AEFF98C7}"/>
-          </ac:spMkLst>
-        </pc:spChg>
-        <pc:grpChg chg="add del">
-          <ac:chgData name="Trainer, Jackson T" userId="5c586c50-e97e-48e7-9e83-8cb7c8eb6007" providerId="ADAL" clId="{2C2923EB-B073-4BCB-B55E-F43A82C91922}" dt="2022-08-20T14:35:35.585" v="38" actId="26606"/>
-          <ac:grpSpMkLst>
-            <pc:docMk/>
-            <pc:sldMk cId="2351012511" sldId="267"/>
-            <ac:grpSpMk id="19" creationId="{B4DE830A-B531-4A3B-96F6-0ECE88B08555}"/>
-          </ac:grpSpMkLst>
-        </pc:grpChg>
-        <pc:grpChg chg="add del">
-          <ac:chgData name="Trainer, Jackson T" userId="5c586c50-e97e-48e7-9e83-8cb7c8eb6007" providerId="ADAL" clId="{2C2923EB-B073-4BCB-B55E-F43A82C91922}" dt="2022-08-20T14:35:29.702" v="35" actId="26606"/>
-          <ac:grpSpMkLst>
-            <pc:docMk/>
-            <pc:sldMk cId="2351012511" sldId="267"/>
-            <ac:grpSpMk id="33" creationId="{B4DE830A-B531-4A3B-96F6-0ECE88B08555}"/>
-          </ac:grpSpMkLst>
-        </pc:grpChg>
-        <pc:grpChg chg="add del">
-          <ac:chgData name="Trainer, Jackson T" userId="5c586c50-e97e-48e7-9e83-8cb7c8eb6007" providerId="ADAL" clId="{2C2923EB-B073-4BCB-B55E-F43A82C91922}" dt="2022-08-20T14:33:35.826" v="3" actId="26606"/>
-          <ac:grpSpMkLst>
-            <pc:docMk/>
-            <pc:sldMk cId="2351012511" sldId="267"/>
-            <ac:grpSpMk id="36" creationId="{88C9B83F-64CD-41C1-925F-A08801FFD0BD}"/>
-          </ac:grpSpMkLst>
-        </pc:grpChg>
-        <pc:grpChg chg="add del">
-          <ac:chgData name="Trainer, Jackson T" userId="5c586c50-e97e-48e7-9e83-8cb7c8eb6007" providerId="ADAL" clId="{2C2923EB-B073-4BCB-B55E-F43A82C91922}" dt="2022-08-20T14:33:52.700" v="13" actId="26606"/>
-          <ac:grpSpMkLst>
-            <pc:docMk/>
-            <pc:sldMk cId="2351012511" sldId="267"/>
-            <ac:grpSpMk id="71" creationId="{88C9B83F-64CD-41C1-925F-A08801FFD0BD}"/>
-          </ac:grpSpMkLst>
-        </pc:grpChg>
-        <pc:grpChg chg="add del">
-          <ac:chgData name="Trainer, Jackson T" userId="5c586c50-e97e-48e7-9e83-8cb7c8eb6007" providerId="ADAL" clId="{2C2923EB-B073-4BCB-B55E-F43A82C91922}" dt="2022-08-20T14:33:54.223" v="15" actId="26606"/>
-          <ac:grpSpMkLst>
-            <pc:docMk/>
-            <pc:sldMk cId="2351012511" sldId="267"/>
-            <ac:grpSpMk id="87" creationId="{B4DE830A-B531-4A3B-96F6-0ECE88B08555}"/>
-          </ac:grpSpMkLst>
-        </pc:grpChg>
-        <pc:picChg chg="add del mod ord">
-          <ac:chgData name="Trainer, Jackson T" userId="5c586c50-e97e-48e7-9e83-8cb7c8eb6007" providerId="ADAL" clId="{2C2923EB-B073-4BCB-B55E-F43A82C91922}" dt="2022-08-20T14:35:20.416" v="32" actId="478"/>
-          <ac:picMkLst>
-            <pc:docMk/>
-            <pc:sldMk cId="2351012511" sldId="267"/>
-            <ac:picMk id="6" creationId="{BA44BA5A-9DE9-4449-AF05-08C5B1ECFAA9}"/>
-          </ac:picMkLst>
-        </pc:picChg>
-        <pc:picChg chg="del">
-          <ac:chgData name="Trainer, Jackson T" userId="5c586c50-e97e-48e7-9e83-8cb7c8eb6007" providerId="ADAL" clId="{2C2923EB-B073-4BCB-B55E-F43A82C91922}" dt="2022-08-20T14:33:24.652" v="0" actId="478"/>
-          <ac:picMkLst>
-            <pc:docMk/>
-            <pc:sldMk cId="2351012511" sldId="267"/>
-            <ac:picMk id="10" creationId="{DDB8A659-F534-D033-3944-79A919AEE7E3}"/>
-          </ac:picMkLst>
-        </pc:picChg>
-        <pc:picChg chg="add mod ord">
-          <ac:chgData name="Trainer, Jackson T" userId="5c586c50-e97e-48e7-9e83-8cb7c8eb6007" providerId="ADAL" clId="{2C2923EB-B073-4BCB-B55E-F43A82C91922}" dt="2022-08-20T14:35:57.244" v="43" actId="14100"/>
-          <ac:picMkLst>
-            <pc:docMk/>
-            <pc:sldMk cId="2351012511" sldId="267"/>
-            <ac:picMk id="11" creationId="{18A00EBD-64C7-4EAE-A8CD-0B8F2913CD2E}"/>
-          </ac:picMkLst>
-        </pc:picChg>
-        <pc:cxnChg chg="add del">
-          <ac:chgData name="Trainer, Jackson T" userId="5c586c50-e97e-48e7-9e83-8cb7c8eb6007" providerId="ADAL" clId="{2C2923EB-B073-4BCB-B55E-F43A82C91922}" dt="2022-08-20T14:33:35.826" v="3" actId="26606"/>
-          <ac:cxnSpMkLst>
-            <pc:docMk/>
-            <pc:sldMk cId="2351012511" sldId="267"/>
-            <ac:cxnSpMk id="48" creationId="{A57C1A16-B8AB-4D99-A195-A38F556A6486}"/>
-          </ac:cxnSpMkLst>
-        </pc:cxnChg>
-        <pc:cxnChg chg="add del">
-          <ac:chgData name="Trainer, Jackson T" userId="5c586c50-e97e-48e7-9e83-8cb7c8eb6007" providerId="ADAL" clId="{2C2923EB-B073-4BCB-B55E-F43A82C91922}" dt="2022-08-20T14:33:35.826" v="3" actId="26606"/>
-          <ac:cxnSpMkLst>
-            <pc:docMk/>
-            <pc:sldMk cId="2351012511" sldId="267"/>
-            <ac:cxnSpMk id="50" creationId="{F8A9B20B-D1DD-4573-B5EC-558029519236}"/>
-          </ac:cxnSpMkLst>
-        </pc:cxnChg>
-        <pc:cxnChg chg="add del">
-          <ac:chgData name="Trainer, Jackson T" userId="5c586c50-e97e-48e7-9e83-8cb7c8eb6007" providerId="ADAL" clId="{2C2923EB-B073-4BCB-B55E-F43A82C91922}" dt="2022-08-20T14:33:40.796" v="7" actId="26606"/>
-          <ac:cxnSpMkLst>
-            <pc:docMk/>
-            <pc:sldMk cId="2351012511" sldId="267"/>
-            <ac:cxnSpMk id="51" creationId="{063B6EC6-D752-4EE7-908B-F8F19E8C7FEA}"/>
-          </ac:cxnSpMkLst>
-        </pc:cxnChg>
-        <pc:cxnChg chg="add del">
-          <ac:chgData name="Trainer, Jackson T" userId="5c586c50-e97e-48e7-9e83-8cb7c8eb6007" providerId="ADAL" clId="{2C2923EB-B073-4BCB-B55E-F43A82C91922}" dt="2022-08-20T14:33:40.796" v="7" actId="26606"/>
-          <ac:cxnSpMkLst>
-            <pc:docMk/>
-            <pc:sldMk cId="2351012511" sldId="267"/>
-            <ac:cxnSpMk id="53" creationId="{EFECD4E8-AD3E-4228-82A2-9461958EA94D}"/>
-          </ac:cxnSpMkLst>
-        </pc:cxnChg>
-        <pc:cxnChg chg="add del">
-          <ac:chgData name="Trainer, Jackson T" userId="5c586c50-e97e-48e7-9e83-8cb7c8eb6007" providerId="ADAL" clId="{2C2923EB-B073-4BCB-B55E-F43A82C91922}" dt="2022-08-20T14:33:52.700" v="13" actId="26606"/>
-          <ac:cxnSpMkLst>
-            <pc:docMk/>
-            <pc:sldMk cId="2351012511" sldId="267"/>
-            <ac:cxnSpMk id="77" creationId="{A57C1A16-B8AB-4D99-A195-A38F556A6486}"/>
-          </ac:cxnSpMkLst>
-        </pc:cxnChg>
-        <pc:cxnChg chg="add del">
-          <ac:chgData name="Trainer, Jackson T" userId="5c586c50-e97e-48e7-9e83-8cb7c8eb6007" providerId="ADAL" clId="{2C2923EB-B073-4BCB-B55E-F43A82C91922}" dt="2022-08-20T14:33:52.700" v="13" actId="26606"/>
-          <ac:cxnSpMkLst>
-            <pc:docMk/>
-            <pc:sldMk cId="2351012511" sldId="267"/>
-            <ac:cxnSpMk id="78" creationId="{F8A9B20B-D1DD-4573-B5EC-558029519236}"/>
-          </ac:cxnSpMkLst>
-        </pc:cxnChg>
-        <pc:cxnChg chg="add del">
-          <ac:chgData name="Trainer, Jackson T" userId="5c586c50-e97e-48e7-9e83-8cb7c8eb6007" providerId="ADAL" clId="{2C2923EB-B073-4BCB-B55E-F43A82C91922}" dt="2022-08-20T14:33:55.677" v="17" actId="26606"/>
-          <ac:cxnSpMkLst>
-            <pc:docMk/>
-            <pc:sldMk cId="2351012511" sldId="267"/>
-            <ac:cxnSpMk id="97" creationId="{063B6EC6-D752-4EE7-908B-F8F19E8C7FEA}"/>
-          </ac:cxnSpMkLst>
-        </pc:cxnChg>
-        <pc:cxnChg chg="add del">
-          <ac:chgData name="Trainer, Jackson T" userId="5c586c50-e97e-48e7-9e83-8cb7c8eb6007" providerId="ADAL" clId="{2C2923EB-B073-4BCB-B55E-F43A82C91922}" dt="2022-08-20T14:33:55.677" v="17" actId="26606"/>
-          <ac:cxnSpMkLst>
-            <pc:docMk/>
-            <pc:sldMk cId="2351012511" sldId="267"/>
-            <ac:cxnSpMk id="98" creationId="{EFECD4E8-AD3E-4228-82A2-9461958EA94D}"/>
-          </ac:cxnSpMkLst>
-        </pc:cxnChg>
-      </pc:sldChg>
-      <pc:sldChg chg="modSp">
-        <pc:chgData name="Trainer, Jackson T" userId="5c586c50-e97e-48e7-9e83-8cb7c8eb6007" providerId="ADAL" clId="{2C2923EB-B073-4BCB-B55E-F43A82C91922}" dt="2022-08-20T14:45:40.525" v="76"/>
-        <pc:sldMkLst>
-          <pc:docMk/>
-          <pc:sldMk cId="2618092111" sldId="271"/>
-        </pc:sldMkLst>
-        <pc:spChg chg="mod">
-          <ac:chgData name="Trainer, Jackson T" userId="5c586c50-e97e-48e7-9e83-8cb7c8eb6007" providerId="ADAL" clId="{2C2923EB-B073-4BCB-B55E-F43A82C91922}" dt="2022-08-20T14:45:40.525" v="76"/>
-          <ac:spMkLst>
-            <pc:docMk/>
-            <pc:sldMk cId="2618092111" sldId="271"/>
-            <ac:spMk id="2" creationId="{9181F437-42BF-C225-6E3A-D16E441CD918}"/>
-          </ac:spMkLst>
-        </pc:spChg>
-        <pc:spChg chg="mod">
-          <ac:chgData name="Trainer, Jackson T" userId="5c586c50-e97e-48e7-9e83-8cb7c8eb6007" providerId="ADAL" clId="{2C2923EB-B073-4BCB-B55E-F43A82C91922}" dt="2022-08-20T14:45:40.525" v="76"/>
-          <ac:spMkLst>
-            <pc:docMk/>
-            <pc:sldMk cId="2618092111" sldId="271"/>
-            <ac:spMk id="3" creationId="{F82CA5E5-C065-3CF5-F40A-34BE67960030}"/>
-          </ac:spMkLst>
-        </pc:spChg>
-      </pc:sldChg>
-      <pc:sldChg chg="delSp modSp mod setBg delDesignElem">
-        <pc:chgData name="Trainer, Jackson T" userId="5c586c50-e97e-48e7-9e83-8cb7c8eb6007" providerId="ADAL" clId="{2C2923EB-B073-4BCB-B55E-F43A82C91922}" dt="2022-08-20T15:25:08.210" v="488" actId="26606"/>
-        <pc:sldMkLst>
-          <pc:docMk/>
-          <pc:sldMk cId="879115567" sldId="272"/>
-        </pc:sldMkLst>
-        <pc:spChg chg="mod">
-          <ac:chgData name="Trainer, Jackson T" userId="5c586c50-e97e-48e7-9e83-8cb7c8eb6007" providerId="ADAL" clId="{2C2923EB-B073-4BCB-B55E-F43A82C91922}" dt="2022-08-20T14:48:13.134" v="106" actId="26606"/>
-          <ac:spMkLst>
-            <pc:docMk/>
-            <pc:sldMk cId="879115567" sldId="272"/>
-            <ac:spMk id="2" creationId="{7D1965F9-A78E-39ED-CE77-26B9E397DF61}"/>
-          </ac:spMkLst>
-        </pc:spChg>
-        <pc:spChg chg="del">
-          <ac:chgData name="Trainer, Jackson T" userId="5c586c50-e97e-48e7-9e83-8cb7c8eb6007" providerId="ADAL" clId="{2C2923EB-B073-4BCB-B55E-F43A82C91922}" dt="2022-08-20T14:45:40.525" v="76"/>
-          <ac:spMkLst>
-            <pc:docMk/>
-            <pc:sldMk cId="879115567" sldId="272"/>
-            <ac:spMk id="9" creationId="{655AE6B0-AC9E-4167-806F-E9DB135FC46B}"/>
-          </ac:spMkLst>
-        </pc:spChg>
-        <pc:spChg chg="del">
-          <ac:chgData name="Trainer, Jackson T" userId="5c586c50-e97e-48e7-9e83-8cb7c8eb6007" providerId="ADAL" clId="{2C2923EB-B073-4BCB-B55E-F43A82C91922}" dt="2022-08-20T14:45:40.525" v="76"/>
-          <ac:spMkLst>
-            <pc:docMk/>
-            <pc:sldMk cId="879115567" sldId="272"/>
-            <ac:spMk id="22" creationId="{87BD1F4E-A66D-4C06-86DA-8D56CA7A3B41}"/>
-          </ac:spMkLst>
-        </pc:spChg>
-        <pc:grpChg chg="del">
-          <ac:chgData name="Trainer, Jackson T" userId="5c586c50-e97e-48e7-9e83-8cb7c8eb6007" providerId="ADAL" clId="{2C2923EB-B073-4BCB-B55E-F43A82C91922}" dt="2022-08-20T14:45:40.525" v="76"/>
-          <ac:grpSpMkLst>
-            <pc:docMk/>
-            <pc:sldMk cId="879115567" sldId="272"/>
-            <ac:grpSpMk id="11" creationId="{3523416A-383B-4FDC-B4C9-D8EDDFE9C043}"/>
-          </ac:grpSpMkLst>
-        </pc:grpChg>
-        <pc:graphicFrameChg chg="mod modGraphic">
-          <ac:chgData name="Trainer, Jackson T" userId="5c586c50-e97e-48e7-9e83-8cb7c8eb6007" providerId="ADAL" clId="{2C2923EB-B073-4BCB-B55E-F43A82C91922}" dt="2022-08-20T15:25:08.210" v="488" actId="26606"/>
-          <ac:graphicFrameMkLst>
-            <pc:docMk/>
-            <pc:sldMk cId="879115567" sldId="272"/>
-            <ac:graphicFrameMk id="5" creationId="{57007EBD-1241-F996-7866-3A558EF2FC54}"/>
-          </ac:graphicFrameMkLst>
-        </pc:graphicFrameChg>
-      </pc:sldChg>
-      <pc:sldChg chg="delSp modSp mod setBg delDesignElem">
-        <pc:chgData name="Trainer, Jackson T" userId="5c586c50-e97e-48e7-9e83-8cb7c8eb6007" providerId="ADAL" clId="{2C2923EB-B073-4BCB-B55E-F43A82C91922}" dt="2022-08-20T14:48:22.634" v="107" actId="26606"/>
-        <pc:sldMkLst>
-          <pc:docMk/>
-          <pc:sldMk cId="1640556810" sldId="273"/>
-        </pc:sldMkLst>
-        <pc:spChg chg="mod">
-          <ac:chgData name="Trainer, Jackson T" userId="5c586c50-e97e-48e7-9e83-8cb7c8eb6007" providerId="ADAL" clId="{2C2923EB-B073-4BCB-B55E-F43A82C91922}" dt="2022-08-20T14:48:22.634" v="107" actId="26606"/>
-          <ac:spMkLst>
-            <pc:docMk/>
-            <pc:sldMk cId="1640556810" sldId="273"/>
-            <ac:spMk id="2" creationId="{87D23C5D-C351-44F8-E4DC-AFA817E1C8E8}"/>
-          </ac:spMkLst>
-        </pc:spChg>
-        <pc:spChg chg="del">
-          <ac:chgData name="Trainer, Jackson T" userId="5c586c50-e97e-48e7-9e83-8cb7c8eb6007" providerId="ADAL" clId="{2C2923EB-B073-4BCB-B55E-F43A82C91922}" dt="2022-08-20T14:45:40.525" v="76"/>
-          <ac:spMkLst>
-            <pc:docMk/>
-            <pc:sldMk cId="1640556810" sldId="273"/>
-            <ac:spMk id="9" creationId="{655AE6B0-AC9E-4167-806F-E9DB135FC46B}"/>
-          </ac:spMkLst>
-        </pc:spChg>
-        <pc:spChg chg="del">
-          <ac:chgData name="Trainer, Jackson T" userId="5c586c50-e97e-48e7-9e83-8cb7c8eb6007" providerId="ADAL" clId="{2C2923EB-B073-4BCB-B55E-F43A82C91922}" dt="2022-08-20T14:45:40.525" v="76"/>
-          <ac:spMkLst>
-            <pc:docMk/>
-            <pc:sldMk cId="1640556810" sldId="273"/>
-            <ac:spMk id="22" creationId="{87BD1F4E-A66D-4C06-86DA-8D56CA7A3B41}"/>
-          </ac:spMkLst>
-        </pc:spChg>
-        <pc:grpChg chg="del">
-          <ac:chgData name="Trainer, Jackson T" userId="5c586c50-e97e-48e7-9e83-8cb7c8eb6007" providerId="ADAL" clId="{2C2923EB-B073-4BCB-B55E-F43A82C91922}" dt="2022-08-20T14:45:40.525" v="76"/>
-          <ac:grpSpMkLst>
-            <pc:docMk/>
-            <pc:sldMk cId="1640556810" sldId="273"/>
-            <ac:grpSpMk id="11" creationId="{3523416A-383B-4FDC-B4C9-D8EDDFE9C043}"/>
-          </ac:grpSpMkLst>
-        </pc:grpChg>
-        <pc:graphicFrameChg chg="mod modGraphic">
-          <ac:chgData name="Trainer, Jackson T" userId="5c586c50-e97e-48e7-9e83-8cb7c8eb6007" providerId="ADAL" clId="{2C2923EB-B073-4BCB-B55E-F43A82C91922}" dt="2022-08-20T14:48:22.634" v="107" actId="26606"/>
-          <ac:graphicFrameMkLst>
-            <pc:docMk/>
-            <pc:sldMk cId="1640556810" sldId="273"/>
-            <ac:graphicFrameMk id="5" creationId="{1827C7F4-A394-04D9-6CE1-3AC8377A45FD}"/>
-          </ac:graphicFrameMkLst>
-        </pc:graphicFrameChg>
-      </pc:sldChg>
-      <pc:sldChg chg="addSp delSp modSp mod setBg">
-        <pc:chgData name="Trainer, Jackson T" userId="5c586c50-e97e-48e7-9e83-8cb7c8eb6007" providerId="ADAL" clId="{2C2923EB-B073-4BCB-B55E-F43A82C91922}" dt="2022-08-20T16:33:21.605" v="649" actId="26606"/>
-        <pc:sldMkLst>
-          <pc:docMk/>
-          <pc:sldMk cId="1936370427" sldId="274"/>
-        </pc:sldMkLst>
-        <pc:spChg chg="mod">
-          <ac:chgData name="Trainer, Jackson T" userId="5c586c50-e97e-48e7-9e83-8cb7c8eb6007" providerId="ADAL" clId="{2C2923EB-B073-4BCB-B55E-F43A82C91922}" dt="2022-08-20T14:49:13.281" v="113" actId="26606"/>
-          <ac:spMkLst>
-            <pc:docMk/>
-            <pc:sldMk cId="1936370427" sldId="274"/>
-            <ac:spMk id="2" creationId="{A3EA95AE-E96A-4673-72D0-E26A3F209689}"/>
-          </ac:spMkLst>
-        </pc:spChg>
-        <pc:spChg chg="add del mod">
-          <ac:chgData name="Trainer, Jackson T" userId="5c586c50-e97e-48e7-9e83-8cb7c8eb6007" providerId="ADAL" clId="{2C2923EB-B073-4BCB-B55E-F43A82C91922}" dt="2022-08-20T14:49:13.281" v="113" actId="26606"/>
-          <ac:spMkLst>
-            <pc:docMk/>
-            <pc:sldMk cId="1936370427" sldId="274"/>
-            <ac:spMk id="3" creationId="{68C11802-55A5-5862-92D1-2B59F81CC57A}"/>
-          </ac:spMkLst>
-        </pc:spChg>
-        <pc:graphicFrameChg chg="add del">
-          <ac:chgData name="Trainer, Jackson T" userId="5c586c50-e97e-48e7-9e83-8cb7c8eb6007" providerId="ADAL" clId="{2C2923EB-B073-4BCB-B55E-F43A82C91922}" dt="2022-08-20T14:49:13.241" v="112" actId="26606"/>
-          <ac:graphicFrameMkLst>
-            <pc:docMk/>
-            <pc:sldMk cId="1936370427" sldId="274"/>
-            <ac:graphicFrameMk id="5" creationId="{BFE470E1-716A-6AE7-81B4-BCD3F10D6E4E}"/>
-          </ac:graphicFrameMkLst>
-        </pc:graphicFrameChg>
-        <pc:graphicFrameChg chg="add mod modGraphic">
-          <ac:chgData name="Trainer, Jackson T" userId="5c586c50-e97e-48e7-9e83-8cb7c8eb6007" providerId="ADAL" clId="{2C2923EB-B073-4BCB-B55E-F43A82C91922}" dt="2022-08-20T16:33:21.605" v="649" actId="26606"/>
-          <ac:graphicFrameMkLst>
-            <pc:docMk/>
-            <pc:sldMk cId="1936370427" sldId="274"/>
-            <ac:graphicFrameMk id="7" creationId="{2345AE7D-595C-3208-7D3F-21F43DE263D7}"/>
-          </ac:graphicFrameMkLst>
-        </pc:graphicFrameChg>
-      </pc:sldChg>
-      <pc:sldChg chg="addSp delSp modSp mod modNotesTx">
-        <pc:chgData name="Trainer, Jackson T" userId="5c586c50-e97e-48e7-9e83-8cb7c8eb6007" providerId="ADAL" clId="{2C2923EB-B073-4BCB-B55E-F43A82C91922}" dt="2022-08-20T15:38:29.651" v="491"/>
-        <pc:sldMkLst>
-          <pc:docMk/>
-          <pc:sldMk cId="1522433238" sldId="275"/>
-        </pc:sldMkLst>
-        <pc:spChg chg="mod">
-          <ac:chgData name="Trainer, Jackson T" userId="5c586c50-e97e-48e7-9e83-8cb7c8eb6007" providerId="ADAL" clId="{2C2923EB-B073-4BCB-B55E-F43A82C91922}" dt="2022-08-20T14:45:40.525" v="76"/>
-          <ac:spMkLst>
-            <pc:docMk/>
-            <pc:sldMk cId="1522433238" sldId="275"/>
-            <ac:spMk id="2" creationId="{F8196779-F0E0-777D-841E-58882251E107}"/>
-          </ac:spMkLst>
-        </pc:spChg>
-        <pc:spChg chg="mod">
-          <ac:chgData name="Trainer, Jackson T" userId="5c586c50-e97e-48e7-9e83-8cb7c8eb6007" providerId="ADAL" clId="{2C2923EB-B073-4BCB-B55E-F43A82C91922}" dt="2022-08-20T14:57:13.253" v="272" actId="20577"/>
-          <ac:spMkLst>
-            <pc:docMk/>
-            <pc:sldMk cId="1522433238" sldId="275"/>
-            <ac:spMk id="3" creationId="{36F345D1-897A-12BA-1D82-A85494854F5A}"/>
-          </ac:spMkLst>
-        </pc:spChg>
-        <pc:picChg chg="add del">
-          <ac:chgData name="Trainer, Jackson T" userId="5c586c50-e97e-48e7-9e83-8cb7c8eb6007" providerId="ADAL" clId="{2C2923EB-B073-4BCB-B55E-F43A82C91922}" dt="2022-08-20T14:44:26.609" v="68" actId="22"/>
-          <ac:picMkLst>
-            <pc:docMk/>
-            <pc:sldMk cId="1522433238" sldId="275"/>
-            <ac:picMk id="5" creationId="{9CBB097B-DC06-48F2-B7B3-55B755F9CBC2}"/>
-          </ac:picMkLst>
-        </pc:picChg>
-      </pc:sldChg>
-      <pc:sldChg chg="addSp delSp modSp new del mod setBg">
-        <pc:chgData name="Trainer, Jackson T" userId="5c586c50-e97e-48e7-9e83-8cb7c8eb6007" providerId="ADAL" clId="{2C2923EB-B073-4BCB-B55E-F43A82C91922}" dt="2022-08-20T14:58:30.067" v="288" actId="2696"/>
-        <pc:sldMkLst>
-          <pc:docMk/>
-          <pc:sldMk cId="247017412" sldId="276"/>
-        </pc:sldMkLst>
-        <pc:spChg chg="mod">
-          <ac:chgData name="Trainer, Jackson T" userId="5c586c50-e97e-48e7-9e83-8cb7c8eb6007" providerId="ADAL" clId="{2C2923EB-B073-4BCB-B55E-F43A82C91922}" dt="2022-08-20T14:57:40.494" v="273" actId="26606"/>
-          <ac:spMkLst>
-            <pc:docMk/>
-            <pc:sldMk cId="247017412" sldId="276"/>
-            <ac:spMk id="2" creationId="{19F88EBC-3787-4458-9C82-44A949F627D6}"/>
-          </ac:spMkLst>
-        </pc:spChg>
-        <pc:spChg chg="del">
-          <ac:chgData name="Trainer, Jackson T" userId="5c586c50-e97e-48e7-9e83-8cb7c8eb6007" providerId="ADAL" clId="{2C2923EB-B073-4BCB-B55E-F43A82C91922}" dt="2022-08-20T14:36:05.925" v="46" actId="22"/>
-          <ac:spMkLst>
-            <pc:docMk/>
-            <pc:sldMk cId="247017412" sldId="276"/>
-            <ac:spMk id="3" creationId="{E7AA7153-B87A-4C2C-98EA-3E028D3A0FE6}"/>
-          </ac:spMkLst>
-        </pc:spChg>
-        <pc:spChg chg="add del mod">
-          <ac:chgData name="Trainer, Jackson T" userId="5c586c50-e97e-48e7-9e83-8cb7c8eb6007" providerId="ADAL" clId="{2C2923EB-B073-4BCB-B55E-F43A82C91922}" dt="2022-08-20T14:57:40.494" v="273" actId="26606"/>
-          <ac:spMkLst>
-            <pc:docMk/>
-            <pc:sldMk cId="247017412" sldId="276"/>
-            <ac:spMk id="9" creationId="{C0A99B0B-1F27-C2C4-3FBA-54324302F280}"/>
-          </ac:spMkLst>
-        </pc:spChg>
-        <pc:spChg chg="add del">
-          <ac:chgData name="Trainer, Jackson T" userId="5c586c50-e97e-48e7-9e83-8cb7c8eb6007" providerId="ADAL" clId="{2C2923EB-B073-4BCB-B55E-F43A82C91922}" dt="2022-08-20T14:47:53.659" v="105" actId="26606"/>
-          <ac:spMkLst>
-            <pc:docMk/>
-            <pc:sldMk cId="247017412" sldId="276"/>
-            <ac:spMk id="12" creationId="{333F0879-3DA0-4CB8-B35E-A0AD42558191}"/>
-          </ac:spMkLst>
-        </pc:spChg>
-        <pc:spChg chg="add del">
-          <ac:chgData name="Trainer, Jackson T" userId="5c586c50-e97e-48e7-9e83-8cb7c8eb6007" providerId="ADAL" clId="{2C2923EB-B073-4BCB-B55E-F43A82C91922}" dt="2022-08-20T14:47:53.659" v="105" actId="26606"/>
-          <ac:spMkLst>
-            <pc:docMk/>
-            <pc:sldMk cId="247017412" sldId="276"/>
-            <ac:spMk id="14" creationId="{324D2183-F388-476E-92A9-D6639D698580}"/>
-          </ac:spMkLst>
-        </pc:spChg>
-        <pc:spChg chg="add del">
-          <ac:chgData name="Trainer, Jackson T" userId="5c586c50-e97e-48e7-9e83-8cb7c8eb6007" providerId="ADAL" clId="{2C2923EB-B073-4BCB-B55E-F43A82C91922}" dt="2022-08-20T14:47:53.659" v="105" actId="26606"/>
-          <ac:spMkLst>
-            <pc:docMk/>
-            <pc:sldMk cId="247017412" sldId="276"/>
-            <ac:spMk id="16" creationId="{243462E7-1698-4B21-BE89-AEFAC7C2FEFA}"/>
-          </ac:spMkLst>
-        </pc:spChg>
-        <pc:spChg chg="add del">
-          <ac:chgData name="Trainer, Jackson T" userId="5c586c50-e97e-48e7-9e83-8cb7c8eb6007" providerId="ADAL" clId="{2C2923EB-B073-4BCB-B55E-F43A82C91922}" dt="2022-08-20T14:47:53.659" v="105" actId="26606"/>
-          <ac:spMkLst>
-            <pc:docMk/>
-            <pc:sldMk cId="247017412" sldId="276"/>
-            <ac:spMk id="18" creationId="{6C22FCAC-D7EC-4A52-B153-FF761E2235B3}"/>
-          </ac:spMkLst>
-        </pc:spChg>
-        <pc:spChg chg="add del">
-          <ac:chgData name="Trainer, Jackson T" userId="5c586c50-e97e-48e7-9e83-8cb7c8eb6007" providerId="ADAL" clId="{2C2923EB-B073-4BCB-B55E-F43A82C91922}" dt="2022-08-20T14:57:40.494" v="273" actId="26606"/>
-          <ac:spMkLst>
-            <pc:docMk/>
-            <pc:sldMk cId="247017412" sldId="276"/>
-            <ac:spMk id="23" creationId="{7E61F402-3445-458A-9A2B-D28FD288390C}"/>
-          </ac:spMkLst>
-        </pc:spChg>
-        <pc:grpChg chg="add del">
-          <ac:chgData name="Trainer, Jackson T" userId="5c586c50-e97e-48e7-9e83-8cb7c8eb6007" providerId="ADAL" clId="{2C2923EB-B073-4BCB-B55E-F43A82C91922}" dt="2022-08-20T14:57:40.494" v="273" actId="26606"/>
-          <ac:grpSpMkLst>
-            <pc:docMk/>
-            <pc:sldMk cId="247017412" sldId="276"/>
-            <ac:grpSpMk id="25" creationId="{A673C096-95AE-4644-B76C-1DF1B667DC44}"/>
-          </ac:grpSpMkLst>
-        </pc:grpChg>
-        <pc:picChg chg="add del mod ord">
-          <ac:chgData name="Trainer, Jackson T" userId="5c586c50-e97e-48e7-9e83-8cb7c8eb6007" providerId="ADAL" clId="{2C2923EB-B073-4BCB-B55E-F43A82C91922}" dt="2022-08-20T14:57:48.556" v="274" actId="478"/>
-          <ac:picMkLst>
-            <pc:docMk/>
-            <pc:sldMk cId="247017412" sldId="276"/>
-            <ac:picMk id="5" creationId="{DB678062-D422-40AF-BEA8-7D72D837D81F}"/>
-          </ac:picMkLst>
-        </pc:picChg>
-        <pc:picChg chg="add del">
-          <ac:chgData name="Trainer, Jackson T" userId="5c586c50-e97e-48e7-9e83-8cb7c8eb6007" providerId="ADAL" clId="{2C2923EB-B073-4BCB-B55E-F43A82C91922}" dt="2022-08-20T14:36:27.569" v="48" actId="22"/>
-          <ac:picMkLst>
-            <pc:docMk/>
-            <pc:sldMk cId="247017412" sldId="276"/>
-            <ac:picMk id="7" creationId="{D2CBCEB1-059C-487C-BBFF-5DDF18FDE6A4}"/>
-          </ac:picMkLst>
-        </pc:picChg>
-        <pc:picChg chg="add del mod">
-          <ac:chgData name="Trainer, Jackson T" userId="5c586c50-e97e-48e7-9e83-8cb7c8eb6007" providerId="ADAL" clId="{2C2923EB-B073-4BCB-B55E-F43A82C91922}" dt="2022-08-20T14:47:21.614" v="99"/>
-          <ac:picMkLst>
-            <pc:docMk/>
-            <pc:sldMk cId="247017412" sldId="276"/>
-            <ac:picMk id="8" creationId="{6FD8CB78-66C2-4FDB-BC0B-8AAF5DC9059C}"/>
-          </ac:picMkLst>
-        </pc:picChg>
-        <pc:cxnChg chg="add del">
-          <ac:chgData name="Trainer, Jackson T" userId="5c586c50-e97e-48e7-9e83-8cb7c8eb6007" providerId="ADAL" clId="{2C2923EB-B073-4BCB-B55E-F43A82C91922}" dt="2022-08-20T14:57:40.494" v="273" actId="26606"/>
-          <ac:cxnSpMkLst>
-            <pc:docMk/>
-            <pc:sldMk cId="247017412" sldId="276"/>
-            <ac:cxnSpMk id="31" creationId="{2BE880E9-2B86-4CDB-B5B7-308745CDD19D}"/>
-          </ac:cxnSpMkLst>
-        </pc:cxnChg>
-      </pc:sldChg>
-      <pc:sldChg chg="addSp delSp modSp new mod modNotesTx">
-        <pc:chgData name="Trainer, Jackson T" userId="5c586c50-e97e-48e7-9e83-8cb7c8eb6007" providerId="ADAL" clId="{2C2923EB-B073-4BCB-B55E-F43A82C91922}" dt="2022-08-20T14:58:39.758" v="295" actId="20577"/>
-        <pc:sldMkLst>
-          <pc:docMk/>
-          <pc:sldMk cId="651771644" sldId="277"/>
-        </pc:sldMkLst>
-        <pc:spChg chg="mod">
-          <ac:chgData name="Trainer, Jackson T" userId="5c586c50-e97e-48e7-9e83-8cb7c8eb6007" providerId="ADAL" clId="{2C2923EB-B073-4BCB-B55E-F43A82C91922}" dt="2022-08-20T14:58:25.340" v="287" actId="20577"/>
-          <ac:spMkLst>
-            <pc:docMk/>
-            <pc:sldMk cId="651771644" sldId="277"/>
-            <ac:spMk id="2" creationId="{AF32C881-9203-494D-AB52-32EFFA7C5C33}"/>
-          </ac:spMkLst>
-        </pc:spChg>
-        <pc:spChg chg="del">
-          <ac:chgData name="Trainer, Jackson T" userId="5c586c50-e97e-48e7-9e83-8cb7c8eb6007" providerId="ADAL" clId="{2C2923EB-B073-4BCB-B55E-F43A82C91922}" dt="2022-08-20T14:58:16.090" v="276" actId="22"/>
-          <ac:spMkLst>
-            <pc:docMk/>
-            <pc:sldMk cId="651771644" sldId="277"/>
-            <ac:spMk id="3" creationId="{0EFABCE1-D454-4230-A4C5-F7E2C0C2CC1F}"/>
-          </ac:spMkLst>
-        </pc:spChg>
-        <pc:picChg chg="add mod ord">
-          <ac:chgData name="Trainer, Jackson T" userId="5c586c50-e97e-48e7-9e83-8cb7c8eb6007" providerId="ADAL" clId="{2C2923EB-B073-4BCB-B55E-F43A82C91922}" dt="2022-08-20T14:58:16.090" v="276" actId="22"/>
-          <ac:picMkLst>
-            <pc:docMk/>
-            <pc:sldMk cId="651771644" sldId="277"/>
-            <ac:picMk id="5" creationId="{DC8986C5-5245-484F-A0A2-EFB9FB24263C}"/>
-          </ac:picMkLst>
-        </pc:picChg>
-      </pc:sldChg>
-      <pc:sldChg chg="new del">
-        <pc:chgData name="Trainer, Jackson T" userId="5c586c50-e97e-48e7-9e83-8cb7c8eb6007" providerId="ADAL" clId="{2C2923EB-B073-4BCB-B55E-F43A82C91922}" dt="2022-08-20T15:43:23.171" v="495" actId="2696"/>
-        <pc:sldMkLst>
-          <pc:docMk/>
-          <pc:sldMk cId="1658616272" sldId="278"/>
-        </pc:sldMkLst>
-      </pc:sldChg>
-    </pc:docChg>
-  </pc:docChgLst>
-</pc:chgInfo>
 </file>
 
 <file path=ppt/diagrams/colors1.xml><?xml version="1.0" encoding="utf-8"?>
@@ -6584,8 +4809,8 @@
     <dgm:cxn modelId="{81DB5914-1390-4B93-A1D4-0666E393E81A}" type="presOf" srcId="{25FE4225-2EFC-49D6-ABF8-1A2C9B4AA117}" destId="{F30C82B7-56BD-40FA-8D48-DC4B85110F0D}" srcOrd="0" destOrd="0" presId="urn:microsoft.com/office/officeart/2018/2/layout/IconCircleList"/>
     <dgm:cxn modelId="{A25FF015-850F-4726-AE9F-5649EA2190F5}" type="presOf" srcId="{DBE0F968-CB2F-4249-877B-F228A5E606C7}" destId="{91252E3E-44D9-40B5-83F3-4B1803E39AB7}" srcOrd="0" destOrd="0" presId="urn:microsoft.com/office/officeart/2018/2/layout/IconCircleList"/>
     <dgm:cxn modelId="{DE73E427-D6E9-4BD1-9347-D4AC15FEF1AE}" type="presOf" srcId="{6FE144F4-654A-4F04-82F2-A782B9B3620B}" destId="{F62098DB-AA4E-44DD-9BB9-09C492BED6E0}" srcOrd="0" destOrd="0" presId="urn:microsoft.com/office/officeart/2018/2/layout/IconCircleList"/>
+    <dgm:cxn modelId="{A4CB5146-F74E-4C42-ABEF-A295C8E4F2C9}" srcId="{CBA24D4F-E89B-48DA-91BA-E650DCAA6178}" destId="{ACA9C035-86BB-4CD7-B0D2-6F6FC6AEC73A}" srcOrd="1" destOrd="0" parTransId="{5FD224AD-E317-4479-99E7-D46D4098DCF2}" sibTransId="{25FE4225-2EFC-49D6-ABF8-1A2C9B4AA117}"/>
     <dgm:cxn modelId="{B8524B60-B23C-4297-9171-5B94955A8090}" type="presOf" srcId="{0BBE501B-5CD1-4A78-830E-C77CA8161064}" destId="{30BC5CBB-FFFA-428E-A1DA-6D6D31144C9F}" srcOrd="0" destOrd="0" presId="urn:microsoft.com/office/officeart/2018/2/layout/IconCircleList"/>
-    <dgm:cxn modelId="{A4CB5146-F74E-4C42-ABEF-A295C8E4F2C9}" srcId="{CBA24D4F-E89B-48DA-91BA-E650DCAA6178}" destId="{ACA9C035-86BB-4CD7-B0D2-6F6FC6AEC73A}" srcOrd="1" destOrd="0" parTransId="{5FD224AD-E317-4479-99E7-D46D4098DCF2}" sibTransId="{25FE4225-2EFC-49D6-ABF8-1A2C9B4AA117}"/>
     <dgm:cxn modelId="{E4707D6A-5A71-45CB-97A5-DAED4A1A5CF6}" type="presOf" srcId="{137D5DA5-54AA-4D31-94F4-21B70BB9F77A}" destId="{5A93CF4F-3956-4946-866C-4C477350FE1E}" srcOrd="0" destOrd="0" presId="urn:microsoft.com/office/officeart/2018/2/layout/IconCircleList"/>
     <dgm:cxn modelId="{8A7A1377-DDEA-4858-9EF5-0F1DEA4A632B}" srcId="{CBA24D4F-E89B-48DA-91BA-E650DCAA6178}" destId="{6FE144F4-654A-4F04-82F2-A782B9B3620B}" srcOrd="2" destOrd="0" parTransId="{C50AE9CA-04F1-42B5-B6A0-C9F4E8263916}" sibTransId="{4377C76D-9F26-4299-ACF3-8F711EF754DB}"/>
     <dgm:cxn modelId="{3AD7C0B6-2147-46D1-84E3-90FFD9FA0C63}" type="presOf" srcId="{9C71F28D-9B0C-4AF6-B9D2-E95D995A7734}" destId="{8F5E2AFF-637A-4448-A257-0BAEEE4C99B3}" srcOrd="0" destOrd="0" presId="urn:microsoft.com/office/officeart/2018/2/layout/IconCircleList"/>
@@ -6881,7 +5106,7 @@
 <dgm:dataModel xmlns:dgm="http://schemas.openxmlformats.org/drawingml/2006/diagram" xmlns:a="http://schemas.openxmlformats.org/drawingml/2006/main">
   <dgm:ptLst>
     <dgm:pt modelId="{EE990F0C-FAA8-49B6-A367-C1BDF2F009C4}" type="doc">
-      <dgm:prSet loTypeId="urn:microsoft.com/office/officeart/2005/8/layout/default" loCatId="list" qsTypeId="urn:microsoft.com/office/officeart/2005/8/quickstyle/simple1" qsCatId="simple" csTypeId="urn:microsoft.com/office/officeart/2005/8/colors/colorful2" csCatId="colorful"/>
+      <dgm:prSet loTypeId="urn:microsoft.com/office/officeart/2005/8/layout/default" loCatId="list" qsTypeId="urn:microsoft.com/office/officeart/2005/8/quickstyle/simple1" qsCatId="simple" csTypeId="urn:microsoft.com/office/officeart/2005/8/colors/colorful2" csCatId="colorful" phldr="1"/>
       <dgm:spPr/>
       <dgm:t>
         <a:bodyPr/>
@@ -6899,9 +5124,14 @@
         <a:lstStyle/>
         <a:p>
           <a:r>
-            <a:rPr lang="en-US"/>
-            <a:t>Creating title screens and buttons in PyGame</a:t>
+            <a:rPr lang="en-US" dirty="0"/>
+            <a:t>Using objects in Python and how to use </a:t>
           </a:r>
+          <a:r>
+            <a:rPr lang="en-US" dirty="0" err="1"/>
+            <a:t>PyGame</a:t>
+          </a:r>
+          <a:endParaRPr lang="en-US" dirty="0"/>
         </a:p>
       </dgm:t>
     </dgm:pt>
@@ -6927,78 +5157,6 @@
         </a:p>
       </dgm:t>
     </dgm:pt>
-    <dgm:pt modelId="{3D3DF41E-F585-4118-8C68-9CD80B8C4AD2}">
-      <dgm:prSet/>
-      <dgm:spPr/>
-      <dgm:t>
-        <a:bodyPr/>
-        <a:lstStyle/>
-        <a:p>
-          <a:r>
-            <a:rPr lang="en-US"/>
-            <a:t>When to take a break when troubleshooting</a:t>
-          </a:r>
-        </a:p>
-      </dgm:t>
-    </dgm:pt>
-    <dgm:pt modelId="{54266C5A-3927-4C94-B60B-59F17ECD5B88}" type="parTrans" cxnId="{062B2DEB-5CFC-4C6C-91D9-DDEC0652F33E}">
-      <dgm:prSet/>
-      <dgm:spPr/>
-      <dgm:t>
-        <a:bodyPr/>
-        <a:lstStyle/>
-        <a:p>
-          <a:endParaRPr lang="en-US"/>
-        </a:p>
-      </dgm:t>
-    </dgm:pt>
-    <dgm:pt modelId="{2B4301E7-22F3-41B3-8B7B-CF2A9D0F85B1}" type="sibTrans" cxnId="{062B2DEB-5CFC-4C6C-91D9-DDEC0652F33E}">
-      <dgm:prSet/>
-      <dgm:spPr/>
-      <dgm:t>
-        <a:bodyPr/>
-        <a:lstStyle/>
-        <a:p>
-          <a:endParaRPr lang="en-US"/>
-        </a:p>
-      </dgm:t>
-    </dgm:pt>
-    <dgm:pt modelId="{633977EA-ADE8-470A-A3B8-4219BADB8DE3}">
-      <dgm:prSet/>
-      <dgm:spPr/>
-      <dgm:t>
-        <a:bodyPr/>
-        <a:lstStyle/>
-        <a:p>
-          <a:r>
-            <a:rPr lang="en-US"/>
-            <a:t>Continuing to learn PyGame and how to render text and rectangle objects</a:t>
-          </a:r>
-        </a:p>
-      </dgm:t>
-    </dgm:pt>
-    <dgm:pt modelId="{BD0CCB38-616C-47AC-A03D-F74D3C7F395C}" type="parTrans" cxnId="{0DC6950F-4F38-4EA5-9958-39F53A30DA31}">
-      <dgm:prSet/>
-      <dgm:spPr/>
-      <dgm:t>
-        <a:bodyPr/>
-        <a:lstStyle/>
-        <a:p>
-          <a:endParaRPr lang="en-US"/>
-        </a:p>
-      </dgm:t>
-    </dgm:pt>
-    <dgm:pt modelId="{CA0CDAD4-D645-436A-BD16-B0CF35C4150D}" type="sibTrans" cxnId="{0DC6950F-4F38-4EA5-9958-39F53A30DA31}">
-      <dgm:prSet/>
-      <dgm:spPr/>
-      <dgm:t>
-        <a:bodyPr/>
-        <a:lstStyle/>
-        <a:p>
-          <a:endParaRPr lang="en-US"/>
-        </a:p>
-      </dgm:t>
-    </dgm:pt>
     <dgm:pt modelId="{847E8B83-AEBA-4669-86CD-C19EAEEF2802}">
       <dgm:prSet/>
       <dgm:spPr/>
@@ -7007,8 +5165,8 @@
         <a:lstStyle/>
         <a:p>
           <a:r>
-            <a:rPr lang="en-US"/>
-            <a:t>Using objects in Python and how to pass objects</a:t>
+            <a:rPr lang="en-US" dirty="0"/>
+            <a:t>Create development schedule and stick to it</a:t>
           </a:r>
         </a:p>
       </dgm:t>
@@ -7035,7 +5193,7 @@
         </a:p>
       </dgm:t>
     </dgm:pt>
-    <dgm:pt modelId="{401CAF31-31D4-4C78-AEFF-616A1E7E2045}">
+    <dgm:pt modelId="{97A2FAE2-1C7E-472B-84B8-978A5914A2B8}">
       <dgm:prSet/>
       <dgm:spPr/>
       <dgm:t>
@@ -7044,120 +5202,7 @@
         <a:p>
           <a:r>
             <a:rPr lang="en-US" dirty="0"/>
-            <a:t>Working with mouse events in </a:t>
-          </a:r>
-          <a:r>
-            <a:rPr lang="en-US" dirty="0" err="1"/>
-            <a:t>PyGame</a:t>
-          </a:r>
-          <a:endParaRPr lang="en-US" dirty="0"/>
-        </a:p>
-      </dgm:t>
-    </dgm:pt>
-    <dgm:pt modelId="{48DDB85B-88C7-484A-874C-F8E9DCFE77D3}" type="parTrans" cxnId="{B360179A-4582-4EE6-8D11-1ABE12F86CCF}">
-      <dgm:prSet/>
-      <dgm:spPr/>
-      <dgm:t>
-        <a:bodyPr/>
-        <a:lstStyle/>
-        <a:p>
-          <a:endParaRPr lang="en-US"/>
-        </a:p>
-      </dgm:t>
-    </dgm:pt>
-    <dgm:pt modelId="{6D9DB9AC-36DA-4B6A-AA5D-859EFAE461A5}" type="sibTrans" cxnId="{B360179A-4582-4EE6-8D11-1ABE12F86CCF}">
-      <dgm:prSet/>
-      <dgm:spPr/>
-      <dgm:t>
-        <a:bodyPr/>
-        <a:lstStyle/>
-        <a:p>
-          <a:endParaRPr lang="en-US"/>
-        </a:p>
-      </dgm:t>
-    </dgm:pt>
-    <dgm:pt modelId="{20EF8C46-755B-4FD6-BAE7-13E0E65D5574}">
-      <dgm:prSet/>
-      <dgm:spPr/>
-      <dgm:t>
-        <a:bodyPr/>
-        <a:lstStyle/>
-        <a:p>
-          <a:r>
-            <a:rPr lang="en-US"/>
-            <a:t>Game loops with multiple loops</a:t>
-          </a:r>
-        </a:p>
-      </dgm:t>
-    </dgm:pt>
-    <dgm:pt modelId="{EF98B06A-B833-4223-A0A0-08F8CA972166}" type="parTrans" cxnId="{9DB11A43-206E-4714-BEDD-8CE454085BC1}">
-      <dgm:prSet/>
-      <dgm:spPr/>
-      <dgm:t>
-        <a:bodyPr/>
-        <a:lstStyle/>
-        <a:p>
-          <a:endParaRPr lang="en-US"/>
-        </a:p>
-      </dgm:t>
-    </dgm:pt>
-    <dgm:pt modelId="{8C728335-FEC9-403A-A7EB-D15162879DF5}" type="sibTrans" cxnId="{9DB11A43-206E-4714-BEDD-8CE454085BC1}">
-      <dgm:prSet/>
-      <dgm:spPr/>
-      <dgm:t>
-        <a:bodyPr/>
-        <a:lstStyle/>
-        <a:p>
-          <a:endParaRPr lang="en-US"/>
-        </a:p>
-      </dgm:t>
-    </dgm:pt>
-    <dgm:pt modelId="{D1972712-8668-4603-8E8E-14428B07E087}">
-      <dgm:prSet/>
-      <dgm:spPr/>
-      <dgm:t>
-        <a:bodyPr/>
-        <a:lstStyle/>
-        <a:p>
-          <a:r>
-            <a:rPr lang="en-US"/>
-            <a:t>Continuing to learn PyGame and how to render text and rectangle objects</a:t>
-          </a:r>
-        </a:p>
-      </dgm:t>
-    </dgm:pt>
-    <dgm:pt modelId="{21BC99F6-3C16-44CA-BBC3-6FB8CCFD4A57}" type="parTrans" cxnId="{C4122227-9089-4AFF-9F87-944C3F485474}">
-      <dgm:prSet/>
-      <dgm:spPr/>
-      <dgm:t>
-        <a:bodyPr/>
-        <a:lstStyle/>
-        <a:p>
-          <a:endParaRPr lang="en-US"/>
-        </a:p>
-      </dgm:t>
-    </dgm:pt>
-    <dgm:pt modelId="{8BED4B82-9866-41D5-BB30-19E5F128EFDA}" type="sibTrans" cxnId="{C4122227-9089-4AFF-9F87-944C3F485474}">
-      <dgm:prSet/>
-      <dgm:spPr/>
-      <dgm:t>
-        <a:bodyPr/>
-        <a:lstStyle/>
-        <a:p>
-          <a:endParaRPr lang="en-US"/>
-        </a:p>
-      </dgm:t>
-    </dgm:pt>
-    <dgm:pt modelId="{97A2FAE2-1C7E-472B-84B8-978A5914A2B8}">
-      <dgm:prSet/>
-      <dgm:spPr/>
-      <dgm:t>
-        <a:bodyPr/>
-        <a:lstStyle/>
-        <a:p>
-          <a:r>
-            <a:rPr lang="en-US"/>
-            <a:t>Create wireframes before starting work on GUI</a:t>
+            <a:t>Make sure naming convention is clear</a:t>
           </a:r>
         </a:p>
       </dgm:t>
@@ -7184,7 +5229,7 @@
         </a:p>
       </dgm:t>
     </dgm:pt>
-    <dgm:pt modelId="{EFC1119F-1299-4643-972A-D4050C668685}">
+    <dgm:pt modelId="{D438D363-DFE0-6A47-BC42-39EFFA1D0300}">
       <dgm:prSet/>
       <dgm:spPr/>
       <dgm:t>
@@ -7192,13 +5237,13 @@
         <a:lstStyle/>
         <a:p>
           <a:r>
-            <a:rPr lang="en-US"/>
-            <a:t>Git and merge conflicts</a:t>
+            <a:rPr lang="en-US" dirty="0"/>
+            <a:t>Keep minimum viable product simple</a:t>
           </a:r>
         </a:p>
       </dgm:t>
     </dgm:pt>
-    <dgm:pt modelId="{9DF65CEA-A267-40E1-8284-7B1D78614EC4}" type="parTrans" cxnId="{E8824F7A-9C9A-450B-A67A-ED0FE99BBB13}">
+    <dgm:pt modelId="{83E36F1C-3A3F-5545-8BA4-B20896364B25}" type="parTrans" cxnId="{589820A9-A0F3-184C-8194-D475CA8EF7AD}">
       <dgm:prSet/>
       <dgm:spPr/>
       <dgm:t>
@@ -7209,7 +5254,7 @@
         </a:p>
       </dgm:t>
     </dgm:pt>
-    <dgm:pt modelId="{7BCF4701-3B41-4B42-90BC-6A90D57FB7D7}" type="sibTrans" cxnId="{E8824F7A-9C9A-450B-A67A-ED0FE99BBB13}">
+    <dgm:pt modelId="{47DA3A77-C316-9341-A65B-16C4938D2B14}" type="sibTrans" cxnId="{589820A9-A0F3-184C-8194-D475CA8EF7AD}">
       <dgm:prSet/>
       <dgm:spPr/>
       <dgm:t>
@@ -7220,7 +5265,7 @@
         </a:p>
       </dgm:t>
     </dgm:pt>
-    <dgm:pt modelId="{574D53C8-E6F3-42BF-954F-9FEDB77B3703}">
+    <dgm:pt modelId="{D0F94F81-3D80-7840-9339-A1D613776EDB}">
       <dgm:prSet/>
       <dgm:spPr/>
       <dgm:t>
@@ -7228,13 +5273,13 @@
         <a:lstStyle/>
         <a:p>
           <a:r>
-            <a:rPr lang="en-US"/>
-            <a:t>Start with the program logic and focus GUI in the beginning.</a:t>
+            <a:rPr lang="en-US" dirty="0"/>
+            <a:t>Git and merge conflicts</a:t>
           </a:r>
         </a:p>
       </dgm:t>
     </dgm:pt>
-    <dgm:pt modelId="{3052CA6D-665A-43C9-AB70-CCFDAE848827}" type="parTrans" cxnId="{76B47524-A433-4D23-BC34-A9384404016D}">
+    <dgm:pt modelId="{DEB5736E-48D1-9E45-B3BD-EF9CC5F7C8BF}" type="parTrans" cxnId="{2E3F03A3-DEA8-6448-924E-EA9A85CAEE2C}">
       <dgm:prSet/>
       <dgm:spPr/>
       <dgm:t>
@@ -7245,43 +5290,7 @@
         </a:p>
       </dgm:t>
     </dgm:pt>
-    <dgm:pt modelId="{17F1C338-444C-4785-AAFB-7F0E547DD96D}" type="sibTrans" cxnId="{76B47524-A433-4D23-BC34-A9384404016D}">
-      <dgm:prSet/>
-      <dgm:spPr/>
-      <dgm:t>
-        <a:bodyPr/>
-        <a:lstStyle/>
-        <a:p>
-          <a:endParaRPr lang="en-US"/>
-        </a:p>
-      </dgm:t>
-    </dgm:pt>
-    <dgm:pt modelId="{746C6CF6-0A93-49B9-9F8B-31A82ACD7E7B}">
-      <dgm:prSet/>
-      <dgm:spPr/>
-      <dgm:t>
-        <a:bodyPr/>
-        <a:lstStyle/>
-        <a:p>
-          <a:r>
-            <a:rPr lang="en-US"/>
-            <a:t>Make sure naming convention is clear</a:t>
-          </a:r>
-        </a:p>
-      </dgm:t>
-    </dgm:pt>
-    <dgm:pt modelId="{1A69525A-255F-47A6-9C63-E5BB600C531D}" type="parTrans" cxnId="{3D5E6EC2-B263-43D4-B4F8-6568347EA925}">
-      <dgm:prSet/>
-      <dgm:spPr/>
-      <dgm:t>
-        <a:bodyPr/>
-        <a:lstStyle/>
-        <a:p>
-          <a:endParaRPr lang="en-US"/>
-        </a:p>
-      </dgm:t>
-    </dgm:pt>
-    <dgm:pt modelId="{6FDF27F3-CD58-44CF-B2AC-CE84689FEFFE}" type="sibTrans" cxnId="{3D5E6EC2-B263-43D4-B4F8-6568347EA925}">
+    <dgm:pt modelId="{4CAF6348-BFB6-1748-9FC4-DB870521F0B5}" type="sibTrans" cxnId="{2E3F03A3-DEA8-6448-924E-EA9A85CAEE2C}">
       <dgm:prSet/>
       <dgm:spPr/>
       <dgm:t>
@@ -7306,6 +5315,17 @@
         </a:p>
       </dgm:t>
     </dgm:pt>
+    <dgm:pt modelId="{80C4F05B-D664-4895-BDBA-C3D11C48790E}" type="sibTrans" cxnId="{392371D7-94E7-47A8-8EEB-41C0724056FB}">
+      <dgm:prSet/>
+      <dgm:spPr/>
+      <dgm:t>
+        <a:bodyPr/>
+        <a:lstStyle/>
+        <a:p>
+          <a:endParaRPr lang="en-US"/>
+        </a:p>
+      </dgm:t>
+    </dgm:pt>
     <dgm:pt modelId="{31B708E0-B7D6-43CF-9489-7B293B3FF374}" type="parTrans" cxnId="{392371D7-94E7-47A8-8EEB-41C0724056FB}">
       <dgm:prSet/>
       <dgm:spPr/>
@@ -7317,7 +5337,32 @@
         </a:p>
       </dgm:t>
     </dgm:pt>
-    <dgm:pt modelId="{80C4F05B-D664-4895-BDBA-C3D11C48790E}" type="sibTrans" cxnId="{392371D7-94E7-47A8-8EEB-41C0724056FB}">
+    <dgm:pt modelId="{A8B9BB61-3AFC-6540-8DEC-26298FEB1229}">
+      <dgm:prSet/>
+      <dgm:spPr/>
+      <dgm:t>
+        <a:bodyPr/>
+        <a:lstStyle/>
+        <a:p>
+          <a:r>
+            <a:rPr lang="en-US" dirty="0"/>
+            <a:t>It's OK to take a break when troubleshooting</a:t>
+          </a:r>
+        </a:p>
+      </dgm:t>
+    </dgm:pt>
+    <dgm:pt modelId="{E5492FDB-A35B-6640-A09B-6D7CCCB94F4B}" type="parTrans" cxnId="{D1B34FE3-C5CC-5542-ACAC-CD41EFD30DFC}">
+      <dgm:prSet/>
+      <dgm:spPr/>
+      <dgm:t>
+        <a:bodyPr/>
+        <a:lstStyle/>
+        <a:p>
+          <a:endParaRPr lang="en-US"/>
+        </a:p>
+      </dgm:t>
+    </dgm:pt>
+    <dgm:pt modelId="{449FD059-2501-664C-885D-28267043B9E8}" type="sibTrans" cxnId="{D1B34FE3-C5CC-5542-ACAC-CD41EFD30DFC}">
       <dgm:prSet/>
       <dgm:spPr/>
       <dgm:t>
@@ -7338,7 +5383,7 @@
       <dgm:spPr/>
     </dgm:pt>
     <dgm:pt modelId="{D5357FA2-08D5-4337-BA1B-046E3C367060}" type="pres">
-      <dgm:prSet presAssocID="{2C81C331-0ABA-4F47-B3DC-A28A8D0BA496}" presName="node" presStyleLbl="node1" presStyleIdx="0" presStyleCnt="12">
+      <dgm:prSet presAssocID="{2C81C331-0ABA-4F47-B3DC-A28A8D0BA496}" presName="node" presStyleLbl="node1" presStyleIdx="0" presStyleCnt="7">
         <dgm:presLayoutVars>
           <dgm:bulletEnabled val="1"/>
         </dgm:presLayoutVars>
@@ -7349,32 +5394,20 @@
       <dgm:prSet presAssocID="{FFD3B416-D696-4CD7-84F3-35E9D0624F96}" presName="sibTrans" presStyleCnt="0"/>
       <dgm:spPr/>
     </dgm:pt>
-    <dgm:pt modelId="{6915ED24-DAA1-4262-AE31-DEF590A9FEB4}" type="pres">
-      <dgm:prSet presAssocID="{3D3DF41E-F585-4118-8C68-9CD80B8C4AD2}" presName="node" presStyleLbl="node1" presStyleIdx="1" presStyleCnt="12">
+    <dgm:pt modelId="{DB6F22DC-FF56-8D40-A2C9-3CB192FDCAF1}" type="pres">
+      <dgm:prSet presAssocID="{D438D363-DFE0-6A47-BC42-39EFFA1D0300}" presName="node" presStyleLbl="node1" presStyleIdx="1" presStyleCnt="7">
         <dgm:presLayoutVars>
           <dgm:bulletEnabled val="1"/>
         </dgm:presLayoutVars>
       </dgm:prSet>
       <dgm:spPr/>
     </dgm:pt>
-    <dgm:pt modelId="{17BABC32-B84D-4BD5-90BC-ED2DA840FA4B}" type="pres">
-      <dgm:prSet presAssocID="{2B4301E7-22F3-41B3-8B7B-CF2A9D0F85B1}" presName="sibTrans" presStyleCnt="0"/>
-      <dgm:spPr/>
-    </dgm:pt>
-    <dgm:pt modelId="{CBE09C6D-1F15-419E-8DF5-F503B143B868}" type="pres">
-      <dgm:prSet presAssocID="{633977EA-ADE8-470A-A3B8-4219BADB8DE3}" presName="node" presStyleLbl="node1" presStyleIdx="2" presStyleCnt="12">
-        <dgm:presLayoutVars>
-          <dgm:bulletEnabled val="1"/>
-        </dgm:presLayoutVars>
-      </dgm:prSet>
-      <dgm:spPr/>
-    </dgm:pt>
-    <dgm:pt modelId="{A3F50178-76E9-4E18-AAA3-EC4235E5BB4B}" type="pres">
-      <dgm:prSet presAssocID="{CA0CDAD4-D645-436A-BD16-B0CF35C4150D}" presName="sibTrans" presStyleCnt="0"/>
+    <dgm:pt modelId="{A6B271E9-D754-BD44-99A4-50A20BBA3B36}" type="pres">
+      <dgm:prSet presAssocID="{47DA3A77-C316-9341-A65B-16C4938D2B14}" presName="sibTrans" presStyleCnt="0"/>
       <dgm:spPr/>
     </dgm:pt>
     <dgm:pt modelId="{F01806D4-9AAD-4217-87C9-28874C7D7290}" type="pres">
-      <dgm:prSet presAssocID="{847E8B83-AEBA-4669-86CD-C19EAEEF2802}" presName="node" presStyleLbl="node1" presStyleIdx="3" presStyleCnt="12">
+      <dgm:prSet presAssocID="{847E8B83-AEBA-4669-86CD-C19EAEEF2802}" presName="node" presStyleLbl="node1" presStyleIdx="2" presStyleCnt="7">
         <dgm:presLayoutVars>
           <dgm:bulletEnabled val="1"/>
         </dgm:presLayoutVars>
@@ -7385,44 +5418,8 @@
       <dgm:prSet presAssocID="{02AA933B-9C01-4737-9DC8-0DC3DB1C9D96}" presName="sibTrans" presStyleCnt="0"/>
       <dgm:spPr/>
     </dgm:pt>
-    <dgm:pt modelId="{4ADAF9E2-27B9-454C-9357-86A6F4C1BCF3}" type="pres">
-      <dgm:prSet presAssocID="{401CAF31-31D4-4C78-AEFF-616A1E7E2045}" presName="node" presStyleLbl="node1" presStyleIdx="4" presStyleCnt="12">
-        <dgm:presLayoutVars>
-          <dgm:bulletEnabled val="1"/>
-        </dgm:presLayoutVars>
-      </dgm:prSet>
-      <dgm:spPr/>
-    </dgm:pt>
-    <dgm:pt modelId="{3088315D-6BB6-4546-9455-4393BEACEBEB}" type="pres">
-      <dgm:prSet presAssocID="{6D9DB9AC-36DA-4B6A-AA5D-859EFAE461A5}" presName="sibTrans" presStyleCnt="0"/>
-      <dgm:spPr/>
-    </dgm:pt>
-    <dgm:pt modelId="{280F7D6D-817B-4614-8514-7BBB5F81EDC2}" type="pres">
-      <dgm:prSet presAssocID="{20EF8C46-755B-4FD6-BAE7-13E0E65D5574}" presName="node" presStyleLbl="node1" presStyleIdx="5" presStyleCnt="12">
-        <dgm:presLayoutVars>
-          <dgm:bulletEnabled val="1"/>
-        </dgm:presLayoutVars>
-      </dgm:prSet>
-      <dgm:spPr/>
-    </dgm:pt>
-    <dgm:pt modelId="{F12DEBC4-AC69-4E2D-B5EB-C0A95A9F8E21}" type="pres">
-      <dgm:prSet presAssocID="{8C728335-FEC9-403A-A7EB-D15162879DF5}" presName="sibTrans" presStyleCnt="0"/>
-      <dgm:spPr/>
-    </dgm:pt>
-    <dgm:pt modelId="{9C435DF9-30AD-4F9A-9563-72B5D5BBF0CA}" type="pres">
-      <dgm:prSet presAssocID="{D1972712-8668-4603-8E8E-14428B07E087}" presName="node" presStyleLbl="node1" presStyleIdx="6" presStyleCnt="12">
-        <dgm:presLayoutVars>
-          <dgm:bulletEnabled val="1"/>
-        </dgm:presLayoutVars>
-      </dgm:prSet>
-      <dgm:spPr/>
-    </dgm:pt>
-    <dgm:pt modelId="{F212A4BE-737E-485E-9A48-BEAD214B16FF}" type="pres">
-      <dgm:prSet presAssocID="{8BED4B82-9866-41D5-BB30-19E5F128EFDA}" presName="sibTrans" presStyleCnt="0"/>
-      <dgm:spPr/>
-    </dgm:pt>
     <dgm:pt modelId="{F53A575B-0528-423D-AEC5-48D59396253A}" type="pres">
-      <dgm:prSet presAssocID="{97A2FAE2-1C7E-472B-84B8-978A5914A2B8}" presName="node" presStyleLbl="node1" presStyleIdx="7" presStyleCnt="12">
+      <dgm:prSet presAssocID="{97A2FAE2-1C7E-472B-84B8-978A5914A2B8}" presName="node" presStyleLbl="node1" presStyleIdx="3" presStyleCnt="7">
         <dgm:presLayoutVars>
           <dgm:bulletEnabled val="1"/>
         </dgm:presLayoutVars>
@@ -7433,44 +5430,32 @@
       <dgm:prSet presAssocID="{849999D8-51D3-4848-BA52-BE5CB244023B}" presName="sibTrans" presStyleCnt="0"/>
       <dgm:spPr/>
     </dgm:pt>
-    <dgm:pt modelId="{280FDA87-53BC-41E0-81E2-567898C607B6}" type="pres">
-      <dgm:prSet presAssocID="{EFC1119F-1299-4643-972A-D4050C668685}" presName="node" presStyleLbl="node1" presStyleIdx="8" presStyleCnt="12">
+    <dgm:pt modelId="{A659FA33-1BC3-4E55-A422-F0F12090C59D}" type="pres">
+      <dgm:prSet presAssocID="{C0A12D0B-DAE6-4BEF-9DB0-593754897FE7}" presName="node" presStyleLbl="node1" presStyleIdx="4" presStyleCnt="7">
         <dgm:presLayoutVars>
           <dgm:bulletEnabled val="1"/>
         </dgm:presLayoutVars>
       </dgm:prSet>
       <dgm:spPr/>
     </dgm:pt>
-    <dgm:pt modelId="{BF0BDCF1-5D65-4C02-B0D8-6C57EACD6872}" type="pres">
-      <dgm:prSet presAssocID="{7BCF4701-3B41-4B42-90BC-6A90D57FB7D7}" presName="sibTrans" presStyleCnt="0"/>
+    <dgm:pt modelId="{6B2201AA-0D50-CE43-8FC4-C39F0DA6238B}" type="pres">
+      <dgm:prSet presAssocID="{80C4F05B-D664-4895-BDBA-C3D11C48790E}" presName="sibTrans" presStyleCnt="0"/>
       <dgm:spPr/>
     </dgm:pt>
-    <dgm:pt modelId="{D24047CB-A5BE-48A7-BB25-8F1353ACBDB5}" type="pres">
-      <dgm:prSet presAssocID="{574D53C8-E6F3-42BF-954F-9FEDB77B3703}" presName="node" presStyleLbl="node1" presStyleIdx="9" presStyleCnt="12">
+    <dgm:pt modelId="{0F08A518-1939-1942-B433-7D3960B5CB76}" type="pres">
+      <dgm:prSet presAssocID="{D0F94F81-3D80-7840-9339-A1D613776EDB}" presName="node" presStyleLbl="node1" presStyleIdx="5" presStyleCnt="7" custLinFactNeighborX="0" custLinFactNeighborY="1942">
         <dgm:presLayoutVars>
           <dgm:bulletEnabled val="1"/>
         </dgm:presLayoutVars>
       </dgm:prSet>
       <dgm:spPr/>
     </dgm:pt>
-    <dgm:pt modelId="{148ADAE7-4F82-4785-975B-9D31983909F4}" type="pres">
-      <dgm:prSet presAssocID="{17F1C338-444C-4785-AAFB-7F0E547DD96D}" presName="sibTrans" presStyleCnt="0"/>
+    <dgm:pt modelId="{BD72DD59-8DF1-234B-973F-A03E9F107989}" type="pres">
+      <dgm:prSet presAssocID="{4CAF6348-BFB6-1748-9FC4-DB870521F0B5}" presName="sibTrans" presStyleCnt="0"/>
       <dgm:spPr/>
     </dgm:pt>
-    <dgm:pt modelId="{8487C520-7D6A-4C16-86B0-20446BD15EA8}" type="pres">
-      <dgm:prSet presAssocID="{746C6CF6-0A93-49B9-9F8B-31A82ACD7E7B}" presName="node" presStyleLbl="node1" presStyleIdx="10" presStyleCnt="12">
-        <dgm:presLayoutVars>
-          <dgm:bulletEnabled val="1"/>
-        </dgm:presLayoutVars>
-      </dgm:prSet>
-      <dgm:spPr/>
-    </dgm:pt>
-    <dgm:pt modelId="{E64A7DD2-F5B7-4064-84BF-F986972FCA7E}" type="pres">
-      <dgm:prSet presAssocID="{6FDF27F3-CD58-44CF-B2AC-CE84689FEFFE}" presName="sibTrans" presStyleCnt="0"/>
-      <dgm:spPr/>
-    </dgm:pt>
-    <dgm:pt modelId="{A659FA33-1BC3-4E55-A422-F0F12090C59D}" type="pres">
-      <dgm:prSet presAssocID="{C0A12D0B-DAE6-4BEF-9DB0-593754897FE7}" presName="node" presStyleLbl="node1" presStyleIdx="11" presStyleCnt="12">
+    <dgm:pt modelId="{D835B4A0-925E-CA4D-8BFA-E52457CA0F58}" type="pres">
+      <dgm:prSet presAssocID="{A8B9BB61-3AFC-6540-8DEC-26298FEB1229}" presName="node" presStyleLbl="node1" presStyleIdx="6" presStyleCnt="7">
         <dgm:presLayoutVars>
           <dgm:bulletEnabled val="1"/>
         </dgm:presLayoutVars>
@@ -7479,54 +5464,34 @@
     </dgm:pt>
   </dgm:ptLst>
   <dgm:cxnLst>
-    <dgm:cxn modelId="{0DC6950F-4F38-4EA5-9958-39F53A30DA31}" srcId="{EE990F0C-FAA8-49B6-A367-C1BDF2F009C4}" destId="{633977EA-ADE8-470A-A3B8-4219BADB8DE3}" srcOrd="2" destOrd="0" parTransId="{BD0CCB38-616C-47AC-A03D-F74D3C7F395C}" sibTransId="{CA0CDAD4-D645-436A-BD16-B0CF35C4150D}"/>
-    <dgm:cxn modelId="{CE2B2616-653A-40E7-8054-0E14430E530D}" type="presOf" srcId="{746C6CF6-0A93-49B9-9F8B-31A82ACD7E7B}" destId="{8487C520-7D6A-4C16-86B0-20446BD15EA8}" srcOrd="0" destOrd="0" presId="urn:microsoft.com/office/officeart/2005/8/layout/default"/>
-    <dgm:cxn modelId="{36DA7921-1C2C-4116-9EAA-1BF18DF9C174}" type="presOf" srcId="{574D53C8-E6F3-42BF-954F-9FEDB77B3703}" destId="{D24047CB-A5BE-48A7-BB25-8F1353ACBDB5}" srcOrd="0" destOrd="0" presId="urn:microsoft.com/office/officeart/2005/8/layout/default"/>
-    <dgm:cxn modelId="{76B47524-A433-4D23-BC34-A9384404016D}" srcId="{EE990F0C-FAA8-49B6-A367-C1BDF2F009C4}" destId="{574D53C8-E6F3-42BF-954F-9FEDB77B3703}" srcOrd="9" destOrd="0" parTransId="{3052CA6D-665A-43C9-AB70-CCFDAE848827}" sibTransId="{17F1C338-444C-4785-AAFB-7F0E547DD96D}"/>
-    <dgm:cxn modelId="{C4122227-9089-4AFF-9F87-944C3F485474}" srcId="{EE990F0C-FAA8-49B6-A367-C1BDF2F009C4}" destId="{D1972712-8668-4603-8E8E-14428B07E087}" srcOrd="6" destOrd="0" parTransId="{21BC99F6-3C16-44CA-BBC3-6FB8CCFD4A57}" sibTransId="{8BED4B82-9866-41D5-BB30-19E5F128EFDA}"/>
-    <dgm:cxn modelId="{82132627-1A5F-42A5-B9F3-CDB311BC0BC9}" srcId="{EE990F0C-FAA8-49B6-A367-C1BDF2F009C4}" destId="{97A2FAE2-1C7E-472B-84B8-978A5914A2B8}" srcOrd="7" destOrd="0" parTransId="{C5CB1528-F702-48BC-AA74-9BFA47052943}" sibTransId="{849999D8-51D3-4848-BA52-BE5CB244023B}"/>
+    <dgm:cxn modelId="{82132627-1A5F-42A5-B9F3-CDB311BC0BC9}" srcId="{EE990F0C-FAA8-49B6-A367-C1BDF2F009C4}" destId="{97A2FAE2-1C7E-472B-84B8-978A5914A2B8}" srcOrd="3" destOrd="0" parTransId="{C5CB1528-F702-48BC-AA74-9BFA47052943}" sibTransId="{849999D8-51D3-4848-BA52-BE5CB244023B}"/>
+    <dgm:cxn modelId="{2550E042-6BA4-484D-8A32-E792850A0647}" type="presOf" srcId="{EE990F0C-FAA8-49B6-A367-C1BDF2F009C4}" destId="{537BD5B9-19DF-4433-9813-5426E0756F06}" srcOrd="0" destOrd="0" presId="urn:microsoft.com/office/officeart/2005/8/layout/default"/>
+    <dgm:cxn modelId="{3DA8BE4A-0D48-4D27-A570-B3FB3EAC2947}" type="presOf" srcId="{97A2FAE2-1C7E-472B-84B8-978A5914A2B8}" destId="{F53A575B-0528-423D-AEC5-48D59396253A}" srcOrd="0" destOrd="0" presId="urn:microsoft.com/office/officeart/2005/8/layout/default"/>
     <dgm:cxn modelId="{81489D5E-44BA-42FE-8E14-BCF00BBC1ACF}" type="presOf" srcId="{2C81C331-0ABA-4F47-B3DC-A28A8D0BA496}" destId="{D5357FA2-08D5-4337-BA1B-046E3C367060}" srcOrd="0" destOrd="0" presId="urn:microsoft.com/office/officeart/2005/8/layout/default"/>
-    <dgm:cxn modelId="{2550E042-6BA4-484D-8A32-E792850A0647}" type="presOf" srcId="{EE990F0C-FAA8-49B6-A367-C1BDF2F009C4}" destId="{537BD5B9-19DF-4433-9813-5426E0756F06}" srcOrd="0" destOrd="0" presId="urn:microsoft.com/office/officeart/2005/8/layout/default"/>
-    <dgm:cxn modelId="{9DB11A43-206E-4714-BEDD-8CE454085BC1}" srcId="{EE990F0C-FAA8-49B6-A367-C1BDF2F009C4}" destId="{20EF8C46-755B-4FD6-BAE7-13E0E65D5574}" srcOrd="5" destOrd="0" parTransId="{EF98B06A-B833-4223-A0A0-08F8CA972166}" sibTransId="{8C728335-FEC9-403A-A7EB-D15162879DF5}"/>
-    <dgm:cxn modelId="{35795268-8943-4EF2-9B4B-0794689DDB48}" type="presOf" srcId="{20EF8C46-755B-4FD6-BAE7-13E0E65D5574}" destId="{280F7D6D-817B-4614-8514-7BBB5F81EDC2}" srcOrd="0" destOrd="0" presId="urn:microsoft.com/office/officeart/2005/8/layout/default"/>
-    <dgm:cxn modelId="{3DA8BE4A-0D48-4D27-A570-B3FB3EAC2947}" type="presOf" srcId="{97A2FAE2-1C7E-472B-84B8-978A5914A2B8}" destId="{F53A575B-0528-423D-AEC5-48D59396253A}" srcOrd="0" destOrd="0" presId="urn:microsoft.com/office/officeart/2005/8/layout/default"/>
-    <dgm:cxn modelId="{B7C3D275-492D-4B58-ADCE-E83F3D0C4D0D}" type="presOf" srcId="{EFC1119F-1299-4643-972A-D4050C668685}" destId="{280FDA87-53BC-41E0-81E2-567898C607B6}" srcOrd="0" destOrd="0" presId="urn:microsoft.com/office/officeart/2005/8/layout/default"/>
     <dgm:cxn modelId="{972AD776-25C9-471A-91DB-058C25BDDFBC}" srcId="{EE990F0C-FAA8-49B6-A367-C1BDF2F009C4}" destId="{2C81C331-0ABA-4F47-B3DC-A28A8D0BA496}" srcOrd="0" destOrd="0" parTransId="{2B422E19-4212-42D2-A14C-0BA4D18B00D9}" sibTransId="{FFD3B416-D696-4CD7-84F3-35E9D0624F96}"/>
-    <dgm:cxn modelId="{E8824F7A-9C9A-450B-A67A-ED0FE99BBB13}" srcId="{EE990F0C-FAA8-49B6-A367-C1BDF2F009C4}" destId="{EFC1119F-1299-4643-972A-D4050C668685}" srcOrd="8" destOrd="0" parTransId="{9DF65CEA-A267-40E1-8284-7B1D78614EC4}" sibTransId="{7BCF4701-3B41-4B42-90BC-6A90D57FB7D7}"/>
-    <dgm:cxn modelId="{C398088A-C967-469C-BDC2-C2752A88423C}" type="presOf" srcId="{D1972712-8668-4603-8E8E-14428B07E087}" destId="{9C435DF9-30AD-4F9A-9563-72B5D5BBF0CA}" srcOrd="0" destOrd="0" presId="urn:microsoft.com/office/officeart/2005/8/layout/default"/>
+    <dgm:cxn modelId="{CB2FFB7B-7D53-6B4F-AE2A-F043BF2497BD}" type="presOf" srcId="{D0F94F81-3D80-7840-9339-A1D613776EDB}" destId="{0F08A518-1939-1942-B433-7D3960B5CB76}" srcOrd="0" destOrd="0" presId="urn:microsoft.com/office/officeart/2005/8/layout/default"/>
     <dgm:cxn modelId="{C4B98290-6E26-43E0-8FEC-072834BB39DC}" type="presOf" srcId="{C0A12D0B-DAE6-4BEF-9DB0-593754897FE7}" destId="{A659FA33-1BC3-4E55-A422-F0F12090C59D}" srcOrd="0" destOrd="0" presId="urn:microsoft.com/office/officeart/2005/8/layout/default"/>
-    <dgm:cxn modelId="{18A04595-1196-4DEA-939F-D8F5A2480D61}" type="presOf" srcId="{633977EA-ADE8-470A-A3B8-4219BADB8DE3}" destId="{CBE09C6D-1F15-419E-8DF5-F503B143B868}" srcOrd="0" destOrd="0" presId="urn:microsoft.com/office/officeart/2005/8/layout/default"/>
     <dgm:cxn modelId="{3F7AF996-0588-4ACC-92D5-D86F12D92BB9}" type="presOf" srcId="{847E8B83-AEBA-4669-86CD-C19EAEEF2802}" destId="{F01806D4-9AAD-4217-87C9-28874C7D7290}" srcOrd="0" destOrd="0" presId="urn:microsoft.com/office/officeart/2005/8/layout/default"/>
-    <dgm:cxn modelId="{B360179A-4582-4EE6-8D11-1ABE12F86CCF}" srcId="{EE990F0C-FAA8-49B6-A367-C1BDF2F009C4}" destId="{401CAF31-31D4-4C78-AEFF-616A1E7E2045}" srcOrd="4" destOrd="0" parTransId="{48DDB85B-88C7-484A-874C-F8E9DCFE77D3}" sibTransId="{6D9DB9AC-36DA-4B6A-AA5D-859EFAE461A5}"/>
-    <dgm:cxn modelId="{68FC62A4-DEBD-47B9-B7A5-C0C6055BE63C}" srcId="{EE990F0C-FAA8-49B6-A367-C1BDF2F009C4}" destId="{847E8B83-AEBA-4669-86CD-C19EAEEF2802}" srcOrd="3" destOrd="0" parTransId="{19A70BFF-FE45-4E4C-9D95-032602CAC05D}" sibTransId="{02AA933B-9C01-4737-9DC8-0DC3DB1C9D96}"/>
-    <dgm:cxn modelId="{3EEE46A8-6D12-41C4-9F75-1A1653F6C7DF}" type="presOf" srcId="{3D3DF41E-F585-4118-8C68-9CD80B8C4AD2}" destId="{6915ED24-DAA1-4262-AE31-DEF590A9FEB4}" srcOrd="0" destOrd="0" presId="urn:microsoft.com/office/officeart/2005/8/layout/default"/>
-    <dgm:cxn modelId="{3D5E6EC2-B263-43D4-B4F8-6568347EA925}" srcId="{EE990F0C-FAA8-49B6-A367-C1BDF2F009C4}" destId="{746C6CF6-0A93-49B9-9F8B-31A82ACD7E7B}" srcOrd="10" destOrd="0" parTransId="{1A69525A-255F-47A6-9C63-E5BB600C531D}" sibTransId="{6FDF27F3-CD58-44CF-B2AC-CE84689FEFFE}"/>
-    <dgm:cxn modelId="{C870CBC5-2F72-4543-8B98-668625362A7F}" type="presOf" srcId="{401CAF31-31D4-4C78-AEFF-616A1E7E2045}" destId="{4ADAF9E2-27B9-454C-9357-86A6F4C1BCF3}" srcOrd="0" destOrd="0" presId="urn:microsoft.com/office/officeart/2005/8/layout/default"/>
-    <dgm:cxn modelId="{392371D7-94E7-47A8-8EEB-41C0724056FB}" srcId="{EE990F0C-FAA8-49B6-A367-C1BDF2F009C4}" destId="{C0A12D0B-DAE6-4BEF-9DB0-593754897FE7}" srcOrd="11" destOrd="0" parTransId="{31B708E0-B7D6-43CF-9489-7B293B3FF374}" sibTransId="{80C4F05B-D664-4895-BDBA-C3D11C48790E}"/>
-    <dgm:cxn modelId="{062B2DEB-5CFC-4C6C-91D9-DDEC0652F33E}" srcId="{EE990F0C-FAA8-49B6-A367-C1BDF2F009C4}" destId="{3D3DF41E-F585-4118-8C68-9CD80B8C4AD2}" srcOrd="1" destOrd="0" parTransId="{54266C5A-3927-4C94-B60B-59F17ECD5B88}" sibTransId="{2B4301E7-22F3-41B3-8B7B-CF2A9D0F85B1}"/>
+    <dgm:cxn modelId="{2E3F03A3-DEA8-6448-924E-EA9A85CAEE2C}" srcId="{EE990F0C-FAA8-49B6-A367-C1BDF2F009C4}" destId="{D0F94F81-3D80-7840-9339-A1D613776EDB}" srcOrd="5" destOrd="0" parTransId="{DEB5736E-48D1-9E45-B3BD-EF9CC5F7C8BF}" sibTransId="{4CAF6348-BFB6-1748-9FC4-DB870521F0B5}"/>
+    <dgm:cxn modelId="{68FC62A4-DEBD-47B9-B7A5-C0C6055BE63C}" srcId="{EE990F0C-FAA8-49B6-A367-C1BDF2F009C4}" destId="{847E8B83-AEBA-4669-86CD-C19EAEEF2802}" srcOrd="2" destOrd="0" parTransId="{19A70BFF-FE45-4E4C-9D95-032602CAC05D}" sibTransId="{02AA933B-9C01-4737-9DC8-0DC3DB1C9D96}"/>
+    <dgm:cxn modelId="{589820A9-A0F3-184C-8194-D475CA8EF7AD}" srcId="{EE990F0C-FAA8-49B6-A367-C1BDF2F009C4}" destId="{D438D363-DFE0-6A47-BC42-39EFFA1D0300}" srcOrd="1" destOrd="0" parTransId="{83E36F1C-3A3F-5545-8BA4-B20896364B25}" sibTransId="{47DA3A77-C316-9341-A65B-16C4938D2B14}"/>
+    <dgm:cxn modelId="{59A0EACD-62D9-4748-85FD-8A575F3A22C1}" type="presOf" srcId="{D438D363-DFE0-6A47-BC42-39EFFA1D0300}" destId="{DB6F22DC-FF56-8D40-A2C9-3CB192FDCAF1}" srcOrd="0" destOrd="0" presId="urn:microsoft.com/office/officeart/2005/8/layout/default"/>
+    <dgm:cxn modelId="{392371D7-94E7-47A8-8EEB-41C0724056FB}" srcId="{EE990F0C-FAA8-49B6-A367-C1BDF2F009C4}" destId="{C0A12D0B-DAE6-4BEF-9DB0-593754897FE7}" srcOrd="4" destOrd="0" parTransId="{31B708E0-B7D6-43CF-9489-7B293B3FF374}" sibTransId="{80C4F05B-D664-4895-BDBA-C3D11C48790E}"/>
+    <dgm:cxn modelId="{F4C241D9-04E3-AB43-8053-0314DBD365A0}" type="presOf" srcId="{A8B9BB61-3AFC-6540-8DEC-26298FEB1229}" destId="{D835B4A0-925E-CA4D-8BFA-E52457CA0F58}" srcOrd="0" destOrd="0" presId="urn:microsoft.com/office/officeart/2005/8/layout/default"/>
+    <dgm:cxn modelId="{D1B34FE3-C5CC-5542-ACAC-CD41EFD30DFC}" srcId="{EE990F0C-FAA8-49B6-A367-C1BDF2F009C4}" destId="{A8B9BB61-3AFC-6540-8DEC-26298FEB1229}" srcOrd="6" destOrd="0" parTransId="{E5492FDB-A35B-6640-A09B-6D7CCCB94F4B}" sibTransId="{449FD059-2501-664C-885D-28267043B9E8}"/>
     <dgm:cxn modelId="{A7F12D66-283E-4407-9BDD-8BDDF684EAB4}" type="presParOf" srcId="{537BD5B9-19DF-4433-9813-5426E0756F06}" destId="{D5357FA2-08D5-4337-BA1B-046E3C367060}" srcOrd="0" destOrd="0" presId="urn:microsoft.com/office/officeart/2005/8/layout/default"/>
     <dgm:cxn modelId="{5DE5C9BF-D6A9-415C-BCBF-29A37512E0D7}" type="presParOf" srcId="{537BD5B9-19DF-4433-9813-5426E0756F06}" destId="{27BC0FE5-9B9D-4DC8-A379-80CF65C93AEC}" srcOrd="1" destOrd="0" presId="urn:microsoft.com/office/officeart/2005/8/layout/default"/>
-    <dgm:cxn modelId="{432B8F80-F5B4-4291-8C12-D19A513B39BE}" type="presParOf" srcId="{537BD5B9-19DF-4433-9813-5426E0756F06}" destId="{6915ED24-DAA1-4262-AE31-DEF590A9FEB4}" srcOrd="2" destOrd="0" presId="urn:microsoft.com/office/officeart/2005/8/layout/default"/>
-    <dgm:cxn modelId="{C6EAAB42-0600-4776-ADE9-1A7AE0D54742}" type="presParOf" srcId="{537BD5B9-19DF-4433-9813-5426E0756F06}" destId="{17BABC32-B84D-4BD5-90BC-ED2DA840FA4B}" srcOrd="3" destOrd="0" presId="urn:microsoft.com/office/officeart/2005/8/layout/default"/>
-    <dgm:cxn modelId="{75BC8017-9149-4D58-B9BA-779DD8CF6E0C}" type="presParOf" srcId="{537BD5B9-19DF-4433-9813-5426E0756F06}" destId="{CBE09C6D-1F15-419E-8DF5-F503B143B868}" srcOrd="4" destOrd="0" presId="urn:microsoft.com/office/officeart/2005/8/layout/default"/>
-    <dgm:cxn modelId="{ED44387C-C7CB-40AA-B0E8-FBA0359A7C11}" type="presParOf" srcId="{537BD5B9-19DF-4433-9813-5426E0756F06}" destId="{A3F50178-76E9-4E18-AAA3-EC4235E5BB4B}" srcOrd="5" destOrd="0" presId="urn:microsoft.com/office/officeart/2005/8/layout/default"/>
-    <dgm:cxn modelId="{BB25B7F5-3830-4AF8-B306-E654546141B7}" type="presParOf" srcId="{537BD5B9-19DF-4433-9813-5426E0756F06}" destId="{F01806D4-9AAD-4217-87C9-28874C7D7290}" srcOrd="6" destOrd="0" presId="urn:microsoft.com/office/officeart/2005/8/layout/default"/>
-    <dgm:cxn modelId="{F2CDE415-1EF3-49CD-A9C6-57994391E033}" type="presParOf" srcId="{537BD5B9-19DF-4433-9813-5426E0756F06}" destId="{13107432-11B8-4CF0-8F10-54C1B9D3C227}" srcOrd="7" destOrd="0" presId="urn:microsoft.com/office/officeart/2005/8/layout/default"/>
-    <dgm:cxn modelId="{142AC23F-E186-4EBD-BDF5-9709FF977E12}" type="presParOf" srcId="{537BD5B9-19DF-4433-9813-5426E0756F06}" destId="{4ADAF9E2-27B9-454C-9357-86A6F4C1BCF3}" srcOrd="8" destOrd="0" presId="urn:microsoft.com/office/officeart/2005/8/layout/default"/>
-    <dgm:cxn modelId="{972921A9-CA03-4FB7-B252-2CAC4F2B747F}" type="presParOf" srcId="{537BD5B9-19DF-4433-9813-5426E0756F06}" destId="{3088315D-6BB6-4546-9455-4393BEACEBEB}" srcOrd="9" destOrd="0" presId="urn:microsoft.com/office/officeart/2005/8/layout/default"/>
-    <dgm:cxn modelId="{1AFF551B-829C-417C-A511-8488F4DD4088}" type="presParOf" srcId="{537BD5B9-19DF-4433-9813-5426E0756F06}" destId="{280F7D6D-817B-4614-8514-7BBB5F81EDC2}" srcOrd="10" destOrd="0" presId="urn:microsoft.com/office/officeart/2005/8/layout/default"/>
-    <dgm:cxn modelId="{A34259D0-79D0-46D2-8D1D-33EE011D4979}" type="presParOf" srcId="{537BD5B9-19DF-4433-9813-5426E0756F06}" destId="{F12DEBC4-AC69-4E2D-B5EB-C0A95A9F8E21}" srcOrd="11" destOrd="0" presId="urn:microsoft.com/office/officeart/2005/8/layout/default"/>
-    <dgm:cxn modelId="{4BBA66F0-BC9C-4C7C-86C9-1BDEECFDA775}" type="presParOf" srcId="{537BD5B9-19DF-4433-9813-5426E0756F06}" destId="{9C435DF9-30AD-4F9A-9563-72B5D5BBF0CA}" srcOrd="12" destOrd="0" presId="urn:microsoft.com/office/officeart/2005/8/layout/default"/>
-    <dgm:cxn modelId="{C66C2556-510B-4150-A960-BC01D2E3F275}" type="presParOf" srcId="{537BD5B9-19DF-4433-9813-5426E0756F06}" destId="{F212A4BE-737E-485E-9A48-BEAD214B16FF}" srcOrd="13" destOrd="0" presId="urn:microsoft.com/office/officeart/2005/8/layout/default"/>
-    <dgm:cxn modelId="{B1C048F0-F65A-4F9E-9EFD-C926489E5429}" type="presParOf" srcId="{537BD5B9-19DF-4433-9813-5426E0756F06}" destId="{F53A575B-0528-423D-AEC5-48D59396253A}" srcOrd="14" destOrd="0" presId="urn:microsoft.com/office/officeart/2005/8/layout/default"/>
-    <dgm:cxn modelId="{FC771D42-E029-4AC9-BE8E-CB7390A394A6}" type="presParOf" srcId="{537BD5B9-19DF-4433-9813-5426E0756F06}" destId="{012320BC-86D2-4E4E-910C-444BDB974AED}" srcOrd="15" destOrd="0" presId="urn:microsoft.com/office/officeart/2005/8/layout/default"/>
-    <dgm:cxn modelId="{CA23965B-16F8-4D92-9CA3-4B4162872B75}" type="presParOf" srcId="{537BD5B9-19DF-4433-9813-5426E0756F06}" destId="{280FDA87-53BC-41E0-81E2-567898C607B6}" srcOrd="16" destOrd="0" presId="urn:microsoft.com/office/officeart/2005/8/layout/default"/>
-    <dgm:cxn modelId="{85E3079C-5532-445C-926C-07327FF82F86}" type="presParOf" srcId="{537BD5B9-19DF-4433-9813-5426E0756F06}" destId="{BF0BDCF1-5D65-4C02-B0D8-6C57EACD6872}" srcOrd="17" destOrd="0" presId="urn:microsoft.com/office/officeart/2005/8/layout/default"/>
-    <dgm:cxn modelId="{3F43EA7F-FA3E-406E-B69D-7984B21CB51F}" type="presParOf" srcId="{537BD5B9-19DF-4433-9813-5426E0756F06}" destId="{D24047CB-A5BE-48A7-BB25-8F1353ACBDB5}" srcOrd="18" destOrd="0" presId="urn:microsoft.com/office/officeart/2005/8/layout/default"/>
-    <dgm:cxn modelId="{4653ECC6-0CA1-41FB-9B98-F2E753059235}" type="presParOf" srcId="{537BD5B9-19DF-4433-9813-5426E0756F06}" destId="{148ADAE7-4F82-4785-975B-9D31983909F4}" srcOrd="19" destOrd="0" presId="urn:microsoft.com/office/officeart/2005/8/layout/default"/>
-    <dgm:cxn modelId="{461E4448-32E5-4DA8-AC97-D94B67DC7F10}" type="presParOf" srcId="{537BD5B9-19DF-4433-9813-5426E0756F06}" destId="{8487C520-7D6A-4C16-86B0-20446BD15EA8}" srcOrd="20" destOrd="0" presId="urn:microsoft.com/office/officeart/2005/8/layout/default"/>
-    <dgm:cxn modelId="{608AB184-AF79-4A3B-8D07-AA5849BD5E39}" type="presParOf" srcId="{537BD5B9-19DF-4433-9813-5426E0756F06}" destId="{E64A7DD2-F5B7-4064-84BF-F986972FCA7E}" srcOrd="21" destOrd="0" presId="urn:microsoft.com/office/officeart/2005/8/layout/default"/>
-    <dgm:cxn modelId="{AD8E4014-2D1A-4501-86DA-C15960E1CB21}" type="presParOf" srcId="{537BD5B9-19DF-4433-9813-5426E0756F06}" destId="{A659FA33-1BC3-4E55-A422-F0F12090C59D}" srcOrd="22" destOrd="0" presId="urn:microsoft.com/office/officeart/2005/8/layout/default"/>
+    <dgm:cxn modelId="{841EEEF9-076F-A94F-A7D7-10C67A0CAE7B}" type="presParOf" srcId="{537BD5B9-19DF-4433-9813-5426E0756F06}" destId="{DB6F22DC-FF56-8D40-A2C9-3CB192FDCAF1}" srcOrd="2" destOrd="0" presId="urn:microsoft.com/office/officeart/2005/8/layout/default"/>
+    <dgm:cxn modelId="{F20D043F-003B-BE4A-BB1B-ABD1DB87EF5A}" type="presParOf" srcId="{537BD5B9-19DF-4433-9813-5426E0756F06}" destId="{A6B271E9-D754-BD44-99A4-50A20BBA3B36}" srcOrd="3" destOrd="0" presId="urn:microsoft.com/office/officeart/2005/8/layout/default"/>
+    <dgm:cxn modelId="{BB25B7F5-3830-4AF8-B306-E654546141B7}" type="presParOf" srcId="{537BD5B9-19DF-4433-9813-5426E0756F06}" destId="{F01806D4-9AAD-4217-87C9-28874C7D7290}" srcOrd="4" destOrd="0" presId="urn:microsoft.com/office/officeart/2005/8/layout/default"/>
+    <dgm:cxn modelId="{F2CDE415-1EF3-49CD-A9C6-57994391E033}" type="presParOf" srcId="{537BD5B9-19DF-4433-9813-5426E0756F06}" destId="{13107432-11B8-4CF0-8F10-54C1B9D3C227}" srcOrd="5" destOrd="0" presId="urn:microsoft.com/office/officeart/2005/8/layout/default"/>
+    <dgm:cxn modelId="{B1C048F0-F65A-4F9E-9EFD-C926489E5429}" type="presParOf" srcId="{537BD5B9-19DF-4433-9813-5426E0756F06}" destId="{F53A575B-0528-423D-AEC5-48D59396253A}" srcOrd="6" destOrd="0" presId="urn:microsoft.com/office/officeart/2005/8/layout/default"/>
+    <dgm:cxn modelId="{FC771D42-E029-4AC9-BE8E-CB7390A394A6}" type="presParOf" srcId="{537BD5B9-19DF-4433-9813-5426E0756F06}" destId="{012320BC-86D2-4E4E-910C-444BDB974AED}" srcOrd="7" destOrd="0" presId="urn:microsoft.com/office/officeart/2005/8/layout/default"/>
+    <dgm:cxn modelId="{AD8E4014-2D1A-4501-86DA-C15960E1CB21}" type="presParOf" srcId="{537BD5B9-19DF-4433-9813-5426E0756F06}" destId="{A659FA33-1BC3-4E55-A422-F0F12090C59D}" srcOrd="8" destOrd="0" presId="urn:microsoft.com/office/officeart/2005/8/layout/default"/>
+    <dgm:cxn modelId="{CFCDA901-9135-7944-9CB7-0C64EF948D96}" type="presParOf" srcId="{537BD5B9-19DF-4433-9813-5426E0756F06}" destId="{6B2201AA-0D50-CE43-8FC4-C39F0DA6238B}" srcOrd="9" destOrd="0" presId="urn:microsoft.com/office/officeart/2005/8/layout/default"/>
+    <dgm:cxn modelId="{8E8473AD-8483-5240-B32C-8A5D104F9B9E}" type="presParOf" srcId="{537BD5B9-19DF-4433-9813-5426E0756F06}" destId="{0F08A518-1939-1942-B433-7D3960B5CB76}" srcOrd="10" destOrd="0" presId="urn:microsoft.com/office/officeart/2005/8/layout/default"/>
+    <dgm:cxn modelId="{52241FE8-DA71-714A-B775-9D4327BB8468}" type="presParOf" srcId="{537BD5B9-19DF-4433-9813-5426E0756F06}" destId="{BD72DD59-8DF1-234B-973F-A03E9F107989}" srcOrd="11" destOrd="0" presId="urn:microsoft.com/office/officeart/2005/8/layout/default"/>
+    <dgm:cxn modelId="{A4FD3F36-EB40-DA4C-94EA-2B0FB4361A7C}" type="presParOf" srcId="{537BD5B9-19DF-4433-9813-5426E0756F06}" destId="{D835B4A0-925E-CA4D-8BFA-E52457CA0F58}" srcOrd="12" destOrd="0" presId="urn:microsoft.com/office/officeart/2005/8/layout/default"/>
   </dgm:cxnLst>
   <dgm:bg/>
   <dgm:whole/>
@@ -8435,9 +6400,9 @@
     <dgm:cxn modelId="{45D7012E-5820-4CF6-88D4-5ECB89783B07}" type="presOf" srcId="{6C0821F6-789E-CD4D-BD0A-E3851A25FAE5}" destId="{02D21F99-6C7D-40B9-BAC3-1341C00970AD}" srcOrd="0" destOrd="2" presId="urn:microsoft.com/office/officeart/2005/8/layout/hProcess11"/>
     <dgm:cxn modelId="{1AA76F35-7D5D-4AA6-8106-2BFB20E93A1C}" srcId="{294CDB9D-009F-5B49-9286-90D1F22A1E16}" destId="{374F837A-1520-437D-80DE-1EF619606244}" srcOrd="4" destOrd="0" parTransId="{926F8B1A-1C41-472B-A5A9-3C42BF8D18B2}" sibTransId="{35232D6D-703B-4F58-8319-C5E42F3D9D43}"/>
     <dgm:cxn modelId="{34F0D239-6C25-6147-B56C-9C372D693DCB}" srcId="{A82EBBEB-02CA-450A-ADF0-7E1C99D8D2D1}" destId="{294CDB9D-009F-5B49-9286-90D1F22A1E16}" srcOrd="2" destOrd="0" parTransId="{DB551A7B-61D6-DE4F-89F7-33D154E320B9}" sibTransId="{6587BFF8-7C17-DE46-B297-48E6E8BA1851}"/>
-    <dgm:cxn modelId="{26ECF161-6F59-4967-A46F-BD0A9951FCAB}" type="presOf" srcId="{2703B0CF-F793-4644-83BA-C215313AFF3E}" destId="{35204B96-18E3-49B9-B3D6-D4256D94798B}" srcOrd="0" destOrd="1" presId="urn:microsoft.com/office/officeart/2005/8/layout/hProcess11"/>
     <dgm:cxn modelId="{6457D246-5177-4E9E-963C-AF3F8794D1D4}" type="presOf" srcId="{11AE9903-8A7D-40BB-AF2D-0827DA2C4880}" destId="{7DBAB459-7B6F-4AAF-B3BC-491469E7AAF9}" srcOrd="0" destOrd="0" presId="urn:microsoft.com/office/officeart/2005/8/layout/hProcess11"/>
     <dgm:cxn modelId="{2AD5104E-5328-46CA-931C-A26D48DA9C85}" type="presOf" srcId="{7B24B178-A662-C744-AC3E-22CFAAB12B4F}" destId="{6548A055-792D-4255-864C-7AA71706D50A}" srcOrd="0" destOrd="1" presId="urn:microsoft.com/office/officeart/2005/8/layout/hProcess11"/>
+    <dgm:cxn modelId="{26ECF161-6F59-4967-A46F-BD0A9951FCAB}" type="presOf" srcId="{2703B0CF-F793-4644-83BA-C215313AFF3E}" destId="{35204B96-18E3-49B9-B3D6-D4256D94798B}" srcOrd="0" destOrd="1" presId="urn:microsoft.com/office/officeart/2005/8/layout/hProcess11"/>
     <dgm:cxn modelId="{AEAD4472-CA42-4AEC-A23A-650244F03338}" type="presOf" srcId="{294CDB9D-009F-5B49-9286-90D1F22A1E16}" destId="{02D21F99-6C7D-40B9-BAC3-1341C00970AD}" srcOrd="0" destOrd="0" presId="urn:microsoft.com/office/officeart/2005/8/layout/hProcess11"/>
     <dgm:cxn modelId="{339FF576-4B56-45EC-85B1-C87A9D4B4333}" type="presOf" srcId="{EC55A131-F4F6-564E-9334-7BDDE6D9DBAC}" destId="{6548A055-792D-4255-864C-7AA71706D50A}" srcOrd="0" destOrd="3" presId="urn:microsoft.com/office/officeart/2005/8/layout/hProcess11"/>
     <dgm:cxn modelId="{D04B8B77-A4AB-4A20-9861-F4D92B9AB16E}" type="presOf" srcId="{7D632751-95B2-43DA-B091-7C4AD76DFB14}" destId="{6548A055-792D-4255-864C-7AA71706D50A}" srcOrd="0" destOrd="5" presId="urn:microsoft.com/office/officeart/2005/8/layout/hProcess11"/>
@@ -10132,8 +8097,8 @@
       </dsp:nvSpPr>
       <dsp:spPr>
         <a:xfrm>
-          <a:off x="1172" y="477556"/>
-          <a:ext cx="1476746" cy="886047"/>
+          <a:off x="48170" y="660"/>
+          <a:ext cx="2210431" cy="1326259"/>
         </a:xfrm>
         <a:prstGeom prst="rect">
           <a:avLst/>
@@ -10174,12 +8139,12 @@
         </a:fontRef>
       </dsp:style>
       <dsp:txBody>
-        <a:bodyPr spcFirstLastPara="0" vert="horz" wrap="square" lIns="53340" tIns="53340" rIns="53340" bIns="53340" numCol="1" spcCol="1270" anchor="ctr" anchorCtr="0">
+        <a:bodyPr spcFirstLastPara="0" vert="horz" wrap="square" lIns="83820" tIns="83820" rIns="83820" bIns="83820" numCol="1" spcCol="1270" anchor="ctr" anchorCtr="0">
           <a:noAutofit/>
         </a:bodyPr>
         <a:lstStyle/>
         <a:p>
-          <a:pPr marL="0" lvl="0" indent="0" algn="ctr" defTabSz="622300">
+          <a:pPr marL="0" lvl="0" indent="0" algn="ctr" defTabSz="977900">
             <a:lnSpc>
               <a:spcPct val="90000"/>
             </a:lnSpc>
@@ -10192,34 +8157,39 @@
             <a:buNone/>
           </a:pPr>
           <a:r>
-            <a:rPr lang="en-US" sz="1400" kern="1200"/>
-            <a:t>Creating title screens and buttons in PyGame</a:t>
+            <a:rPr lang="en-US" sz="2200" kern="1200" dirty="0"/>
+            <a:t>Using objects in Python and how to use </a:t>
           </a:r>
+          <a:r>
+            <a:rPr lang="en-US" sz="2200" kern="1200" dirty="0" err="1"/>
+            <a:t>PyGame</a:t>
+          </a:r>
+          <a:endParaRPr lang="en-US" sz="2200" kern="1200" dirty="0"/>
         </a:p>
       </dsp:txBody>
       <dsp:txXfrm>
-        <a:off x="1172" y="477556"/>
-        <a:ext cx="1476746" cy="886047"/>
+        <a:off x="48170" y="660"/>
+        <a:ext cx="2210431" cy="1326259"/>
       </dsp:txXfrm>
     </dsp:sp>
-    <dsp:sp modelId="{6915ED24-DAA1-4262-AE31-DEF590A9FEB4}">
+    <dsp:sp modelId="{DB6F22DC-FF56-8D40-A2C9-3CB192FDCAF1}">
       <dsp:nvSpPr>
         <dsp:cNvPr id="0" name=""/>
         <dsp:cNvSpPr/>
       </dsp:nvSpPr>
       <dsp:spPr>
         <a:xfrm>
-          <a:off x="1625593" y="477556"/>
-          <a:ext cx="1476746" cy="886047"/>
+          <a:off x="2479645" y="660"/>
+          <a:ext cx="2210431" cy="1326259"/>
         </a:xfrm>
         <a:prstGeom prst="rect">
           <a:avLst/>
         </a:prstGeom>
         <a:solidFill>
           <a:schemeClr val="accent2">
-            <a:hueOff val="305741"/>
-            <a:satOff val="-325"/>
-            <a:lumOff val="250"/>
+            <a:hueOff val="560526"/>
+            <a:satOff val="-595"/>
+            <a:lumOff val="457"/>
             <a:alphaOff val="0"/>
           </a:schemeClr>
         </a:solidFill>
@@ -10251,12 +8221,12 @@
         </a:fontRef>
       </dsp:style>
       <dsp:txBody>
-        <a:bodyPr spcFirstLastPara="0" vert="horz" wrap="square" lIns="53340" tIns="53340" rIns="53340" bIns="53340" numCol="1" spcCol="1270" anchor="ctr" anchorCtr="0">
+        <a:bodyPr spcFirstLastPara="0" vert="horz" wrap="square" lIns="83820" tIns="83820" rIns="83820" bIns="83820" numCol="1" spcCol="1270" anchor="ctr" anchorCtr="0">
           <a:noAutofit/>
         </a:bodyPr>
         <a:lstStyle/>
         <a:p>
-          <a:pPr marL="0" lvl="0" indent="0" algn="ctr" defTabSz="622300">
+          <a:pPr marL="0" lvl="0" indent="0" algn="ctr" defTabSz="977900">
             <a:lnSpc>
               <a:spcPct val="90000"/>
             </a:lnSpc>
@@ -10269,34 +8239,34 @@
             <a:buNone/>
           </a:pPr>
           <a:r>
-            <a:rPr lang="en-US" sz="1400" kern="1200"/>
-            <a:t>When to take a break when troubleshooting</a:t>
+            <a:rPr lang="en-US" sz="2200" kern="1200" dirty="0"/>
+            <a:t>Keep minimum viable product simple</a:t>
           </a:r>
         </a:p>
       </dsp:txBody>
       <dsp:txXfrm>
-        <a:off x="1625593" y="477556"/>
-        <a:ext cx="1476746" cy="886047"/>
+        <a:off x="2479645" y="660"/>
+        <a:ext cx="2210431" cy="1326259"/>
       </dsp:txXfrm>
     </dsp:sp>
-    <dsp:sp modelId="{CBE09C6D-1F15-419E-8DF5-F503B143B868}">
+    <dsp:sp modelId="{F01806D4-9AAD-4217-87C9-28874C7D7290}">
       <dsp:nvSpPr>
         <dsp:cNvPr id="0" name=""/>
         <dsp:cNvSpPr/>
       </dsp:nvSpPr>
       <dsp:spPr>
         <a:xfrm>
-          <a:off x="3250014" y="477556"/>
-          <a:ext cx="1476746" cy="886047"/>
+          <a:off x="4911120" y="660"/>
+          <a:ext cx="2210431" cy="1326259"/>
         </a:xfrm>
         <a:prstGeom prst="rect">
           <a:avLst/>
         </a:prstGeom>
         <a:solidFill>
           <a:schemeClr val="accent2">
-            <a:hueOff val="611483"/>
-            <a:satOff val="-649"/>
-            <a:lumOff val="499"/>
+            <a:hueOff val="1121052"/>
+            <a:satOff val="-1191"/>
+            <a:lumOff val="915"/>
             <a:alphaOff val="0"/>
           </a:schemeClr>
         </a:solidFill>
@@ -10328,12 +8298,12 @@
         </a:fontRef>
       </dsp:style>
       <dsp:txBody>
-        <a:bodyPr spcFirstLastPara="0" vert="horz" wrap="square" lIns="53340" tIns="53340" rIns="53340" bIns="53340" numCol="1" spcCol="1270" anchor="ctr" anchorCtr="0">
+        <a:bodyPr spcFirstLastPara="0" vert="horz" wrap="square" lIns="83820" tIns="83820" rIns="83820" bIns="83820" numCol="1" spcCol="1270" anchor="ctr" anchorCtr="0">
           <a:noAutofit/>
         </a:bodyPr>
         <a:lstStyle/>
         <a:p>
-          <a:pPr marL="0" lvl="0" indent="0" algn="ctr" defTabSz="622300">
+          <a:pPr marL="0" lvl="0" indent="0" algn="ctr" defTabSz="977900">
             <a:lnSpc>
               <a:spcPct val="90000"/>
             </a:lnSpc>
@@ -10346,34 +8316,34 @@
             <a:buNone/>
           </a:pPr>
           <a:r>
-            <a:rPr lang="en-US" sz="1400" kern="1200"/>
-            <a:t>Continuing to learn PyGame and how to render text and rectangle objects</a:t>
+            <a:rPr lang="en-US" sz="2200" kern="1200" dirty="0"/>
+            <a:t>Create development schedule and stick to it</a:t>
           </a:r>
         </a:p>
       </dsp:txBody>
       <dsp:txXfrm>
-        <a:off x="3250014" y="477556"/>
-        <a:ext cx="1476746" cy="886047"/>
+        <a:off x="4911120" y="660"/>
+        <a:ext cx="2210431" cy="1326259"/>
       </dsp:txXfrm>
     </dsp:sp>
-    <dsp:sp modelId="{F01806D4-9AAD-4217-87C9-28874C7D7290}">
+    <dsp:sp modelId="{F53A575B-0528-423D-AEC5-48D59396253A}">
       <dsp:nvSpPr>
         <dsp:cNvPr id="0" name=""/>
         <dsp:cNvSpPr/>
       </dsp:nvSpPr>
       <dsp:spPr>
         <a:xfrm>
-          <a:off x="4874435" y="477556"/>
-          <a:ext cx="1476746" cy="886047"/>
+          <a:off x="7342595" y="660"/>
+          <a:ext cx="2210431" cy="1326259"/>
         </a:xfrm>
         <a:prstGeom prst="rect">
           <a:avLst/>
         </a:prstGeom>
         <a:solidFill>
           <a:schemeClr val="accent2">
-            <a:hueOff val="917224"/>
-            <a:satOff val="-974"/>
-            <a:lumOff val="749"/>
+            <a:hueOff val="1681577"/>
+            <a:satOff val="-1786"/>
+            <a:lumOff val="1372"/>
             <a:alphaOff val="0"/>
           </a:schemeClr>
         </a:solidFill>
@@ -10405,12 +8375,12 @@
         </a:fontRef>
       </dsp:style>
       <dsp:txBody>
-        <a:bodyPr spcFirstLastPara="0" vert="horz" wrap="square" lIns="53340" tIns="53340" rIns="53340" bIns="53340" numCol="1" spcCol="1270" anchor="ctr" anchorCtr="0">
+        <a:bodyPr spcFirstLastPara="0" vert="horz" wrap="square" lIns="83820" tIns="83820" rIns="83820" bIns="83820" numCol="1" spcCol="1270" anchor="ctr" anchorCtr="0">
           <a:noAutofit/>
         </a:bodyPr>
         <a:lstStyle/>
         <a:p>
-          <a:pPr marL="0" lvl="0" indent="0" algn="ctr" defTabSz="622300">
+          <a:pPr marL="0" lvl="0" indent="0" algn="ctr" defTabSz="977900">
             <a:lnSpc>
               <a:spcPct val="90000"/>
             </a:lnSpc>
@@ -10423,34 +8393,34 @@
             <a:buNone/>
           </a:pPr>
           <a:r>
-            <a:rPr lang="en-US" sz="1400" kern="1200"/>
-            <a:t>Using objects in Python and how to pass objects</a:t>
+            <a:rPr lang="en-US" sz="2200" kern="1200" dirty="0"/>
+            <a:t>Make sure naming convention is clear</a:t>
           </a:r>
         </a:p>
       </dsp:txBody>
       <dsp:txXfrm>
-        <a:off x="4874435" y="477556"/>
-        <a:ext cx="1476746" cy="886047"/>
+        <a:off x="7342595" y="660"/>
+        <a:ext cx="2210431" cy="1326259"/>
       </dsp:txXfrm>
     </dsp:sp>
-    <dsp:sp modelId="{4ADAF9E2-27B9-454C-9357-86A6F4C1BCF3}">
+    <dsp:sp modelId="{A659FA33-1BC3-4E55-A422-F0F12090C59D}">
       <dsp:nvSpPr>
         <dsp:cNvPr id="0" name=""/>
         <dsp:cNvSpPr/>
       </dsp:nvSpPr>
       <dsp:spPr>
         <a:xfrm>
-          <a:off x="6498857" y="477556"/>
-          <a:ext cx="1476746" cy="886047"/>
+          <a:off x="1263907" y="1547963"/>
+          <a:ext cx="2210431" cy="1326259"/>
         </a:xfrm>
         <a:prstGeom prst="rect">
           <a:avLst/>
         </a:prstGeom>
         <a:solidFill>
           <a:schemeClr val="accent2">
-            <a:hueOff val="1222965"/>
-            <a:satOff val="-1299"/>
-            <a:lumOff val="998"/>
+            <a:hueOff val="2242103"/>
+            <a:satOff val="-2381"/>
+            <a:lumOff val="1830"/>
             <a:alphaOff val="0"/>
           </a:schemeClr>
         </a:solidFill>
@@ -10482,12 +8452,12 @@
         </a:fontRef>
       </dsp:style>
       <dsp:txBody>
-        <a:bodyPr spcFirstLastPara="0" vert="horz" wrap="square" lIns="53340" tIns="53340" rIns="53340" bIns="53340" numCol="1" spcCol="1270" anchor="ctr" anchorCtr="0">
+        <a:bodyPr spcFirstLastPara="0" vert="horz" wrap="square" lIns="83820" tIns="83820" rIns="83820" bIns="83820" numCol="1" spcCol="1270" anchor="ctr" anchorCtr="0">
           <a:noAutofit/>
         </a:bodyPr>
         <a:lstStyle/>
         <a:p>
-          <a:pPr marL="0" lvl="0" indent="0" algn="ctr" defTabSz="622300">
+          <a:pPr marL="0" lvl="0" indent="0" algn="ctr" defTabSz="977900">
             <a:lnSpc>
               <a:spcPct val="90000"/>
             </a:lnSpc>
@@ -10500,39 +8470,34 @@
             <a:buNone/>
           </a:pPr>
           <a:r>
-            <a:rPr lang="en-US" sz="1400" kern="1200" dirty="0"/>
-            <a:t>Working with mouse events in </a:t>
+            <a:rPr lang="en-US" sz="2200" kern="1200" dirty="0"/>
+            <a:t>Constant communication with team</a:t>
           </a:r>
-          <a:r>
-            <a:rPr lang="en-US" sz="1400" kern="1200" dirty="0" err="1"/>
-            <a:t>PyGame</a:t>
-          </a:r>
-          <a:endParaRPr lang="en-US" sz="1400" kern="1200" dirty="0"/>
         </a:p>
       </dsp:txBody>
       <dsp:txXfrm>
-        <a:off x="6498857" y="477556"/>
-        <a:ext cx="1476746" cy="886047"/>
+        <a:off x="1263907" y="1547963"/>
+        <a:ext cx="2210431" cy="1326259"/>
       </dsp:txXfrm>
     </dsp:sp>
-    <dsp:sp modelId="{280F7D6D-817B-4614-8514-7BBB5F81EDC2}">
+    <dsp:sp modelId="{0F08A518-1939-1942-B433-7D3960B5CB76}">
       <dsp:nvSpPr>
         <dsp:cNvPr id="0" name=""/>
         <dsp:cNvSpPr/>
       </dsp:nvSpPr>
       <dsp:spPr>
         <a:xfrm>
-          <a:off x="8123278" y="477556"/>
-          <a:ext cx="1476746" cy="886047"/>
+          <a:off x="3695382" y="1548623"/>
+          <a:ext cx="2210431" cy="1326259"/>
         </a:xfrm>
         <a:prstGeom prst="rect">
           <a:avLst/>
         </a:prstGeom>
         <a:solidFill>
           <a:schemeClr val="accent2">
-            <a:hueOff val="1528707"/>
-            <a:satOff val="-1624"/>
-            <a:lumOff val="1248"/>
+            <a:hueOff val="2802629"/>
+            <a:satOff val="-2977"/>
+            <a:lumOff val="2287"/>
             <a:alphaOff val="0"/>
           </a:schemeClr>
         </a:solidFill>
@@ -10564,12 +8529,12 @@
         </a:fontRef>
       </dsp:style>
       <dsp:txBody>
-        <a:bodyPr spcFirstLastPara="0" vert="horz" wrap="square" lIns="53340" tIns="53340" rIns="53340" bIns="53340" numCol="1" spcCol="1270" anchor="ctr" anchorCtr="0">
+        <a:bodyPr spcFirstLastPara="0" vert="horz" wrap="square" lIns="83820" tIns="83820" rIns="83820" bIns="83820" numCol="1" spcCol="1270" anchor="ctr" anchorCtr="0">
           <a:noAutofit/>
         </a:bodyPr>
         <a:lstStyle/>
         <a:p>
-          <a:pPr marL="0" lvl="0" indent="0" algn="ctr" defTabSz="622300">
+          <a:pPr marL="0" lvl="0" indent="0" algn="ctr" defTabSz="977900">
             <a:lnSpc>
               <a:spcPct val="90000"/>
             </a:lnSpc>
@@ -10582,410 +8547,25 @@
             <a:buNone/>
           </a:pPr>
           <a:r>
-            <a:rPr lang="en-US" sz="1400" kern="1200"/>
-            <a:t>Game loops with multiple loops</a:t>
+            <a:rPr lang="en-US" sz="2200" kern="1200" dirty="0"/>
+            <a:t>Git and merge conflicts</a:t>
           </a:r>
         </a:p>
       </dsp:txBody>
       <dsp:txXfrm>
-        <a:off x="8123278" y="477556"/>
-        <a:ext cx="1476746" cy="886047"/>
+        <a:off x="3695382" y="1548623"/>
+        <a:ext cx="2210431" cy="1326259"/>
       </dsp:txXfrm>
     </dsp:sp>
-    <dsp:sp modelId="{9C435DF9-30AD-4F9A-9563-72B5D5BBF0CA}">
+    <dsp:sp modelId="{D835B4A0-925E-CA4D-8BFA-E52457CA0F58}">
       <dsp:nvSpPr>
         <dsp:cNvPr id="0" name=""/>
         <dsp:cNvSpPr/>
       </dsp:nvSpPr>
       <dsp:spPr>
         <a:xfrm>
-          <a:off x="1172" y="1511278"/>
-          <a:ext cx="1476746" cy="886047"/>
-        </a:xfrm>
-        <a:prstGeom prst="rect">
-          <a:avLst/>
-        </a:prstGeom>
-        <a:solidFill>
-          <a:schemeClr val="accent2">
-            <a:hueOff val="1834448"/>
-            <a:satOff val="-1948"/>
-            <a:lumOff val="1497"/>
-            <a:alphaOff val="0"/>
-          </a:schemeClr>
-        </a:solidFill>
-        <a:ln w="15875" cap="flat" cmpd="sng" algn="ctr">
-          <a:solidFill>
-            <a:schemeClr val="lt1">
-              <a:hueOff val="0"/>
-              <a:satOff val="0"/>
-              <a:lumOff val="0"/>
-              <a:alphaOff val="0"/>
-            </a:schemeClr>
-          </a:solidFill>
-          <a:prstDash val="solid"/>
-        </a:ln>
-        <a:effectLst/>
-      </dsp:spPr>
-      <dsp:style>
-        <a:lnRef idx="2">
-          <a:scrgbClr r="0" g="0" b="0"/>
-        </a:lnRef>
-        <a:fillRef idx="1">
-          <a:scrgbClr r="0" g="0" b="0"/>
-        </a:fillRef>
-        <a:effectRef idx="0">
-          <a:scrgbClr r="0" g="0" b="0"/>
-        </a:effectRef>
-        <a:fontRef idx="minor">
-          <a:schemeClr val="lt1"/>
-        </a:fontRef>
-      </dsp:style>
-      <dsp:txBody>
-        <a:bodyPr spcFirstLastPara="0" vert="horz" wrap="square" lIns="53340" tIns="53340" rIns="53340" bIns="53340" numCol="1" spcCol="1270" anchor="ctr" anchorCtr="0">
-          <a:noAutofit/>
-        </a:bodyPr>
-        <a:lstStyle/>
-        <a:p>
-          <a:pPr marL="0" lvl="0" indent="0" algn="ctr" defTabSz="622300">
-            <a:lnSpc>
-              <a:spcPct val="90000"/>
-            </a:lnSpc>
-            <a:spcBef>
-              <a:spcPct val="0"/>
-            </a:spcBef>
-            <a:spcAft>
-              <a:spcPct val="35000"/>
-            </a:spcAft>
-            <a:buNone/>
-          </a:pPr>
-          <a:r>
-            <a:rPr lang="en-US" sz="1400" kern="1200"/>
-            <a:t>Continuing to learn PyGame and how to render text and rectangle objects</a:t>
-          </a:r>
-        </a:p>
-      </dsp:txBody>
-      <dsp:txXfrm>
-        <a:off x="1172" y="1511278"/>
-        <a:ext cx="1476746" cy="886047"/>
-      </dsp:txXfrm>
-    </dsp:sp>
-    <dsp:sp modelId="{F53A575B-0528-423D-AEC5-48D59396253A}">
-      <dsp:nvSpPr>
-        <dsp:cNvPr id="0" name=""/>
-        <dsp:cNvSpPr/>
-      </dsp:nvSpPr>
-      <dsp:spPr>
-        <a:xfrm>
-          <a:off x="1625593" y="1511278"/>
-          <a:ext cx="1476746" cy="886047"/>
-        </a:xfrm>
-        <a:prstGeom prst="rect">
-          <a:avLst/>
-        </a:prstGeom>
-        <a:solidFill>
-          <a:schemeClr val="accent2">
-            <a:hueOff val="2140189"/>
-            <a:satOff val="-2273"/>
-            <a:lumOff val="1747"/>
-            <a:alphaOff val="0"/>
-          </a:schemeClr>
-        </a:solidFill>
-        <a:ln w="15875" cap="flat" cmpd="sng" algn="ctr">
-          <a:solidFill>
-            <a:schemeClr val="lt1">
-              <a:hueOff val="0"/>
-              <a:satOff val="0"/>
-              <a:lumOff val="0"/>
-              <a:alphaOff val="0"/>
-            </a:schemeClr>
-          </a:solidFill>
-          <a:prstDash val="solid"/>
-        </a:ln>
-        <a:effectLst/>
-      </dsp:spPr>
-      <dsp:style>
-        <a:lnRef idx="2">
-          <a:scrgbClr r="0" g="0" b="0"/>
-        </a:lnRef>
-        <a:fillRef idx="1">
-          <a:scrgbClr r="0" g="0" b="0"/>
-        </a:fillRef>
-        <a:effectRef idx="0">
-          <a:scrgbClr r="0" g="0" b="0"/>
-        </a:effectRef>
-        <a:fontRef idx="minor">
-          <a:schemeClr val="lt1"/>
-        </a:fontRef>
-      </dsp:style>
-      <dsp:txBody>
-        <a:bodyPr spcFirstLastPara="0" vert="horz" wrap="square" lIns="53340" tIns="53340" rIns="53340" bIns="53340" numCol="1" spcCol="1270" anchor="ctr" anchorCtr="0">
-          <a:noAutofit/>
-        </a:bodyPr>
-        <a:lstStyle/>
-        <a:p>
-          <a:pPr marL="0" lvl="0" indent="0" algn="ctr" defTabSz="622300">
-            <a:lnSpc>
-              <a:spcPct val="90000"/>
-            </a:lnSpc>
-            <a:spcBef>
-              <a:spcPct val="0"/>
-            </a:spcBef>
-            <a:spcAft>
-              <a:spcPct val="35000"/>
-            </a:spcAft>
-            <a:buNone/>
-          </a:pPr>
-          <a:r>
-            <a:rPr lang="en-US" sz="1400" kern="1200"/>
-            <a:t>Create wireframes before starting work on GUI</a:t>
-          </a:r>
-        </a:p>
-      </dsp:txBody>
-      <dsp:txXfrm>
-        <a:off x="1625593" y="1511278"/>
-        <a:ext cx="1476746" cy="886047"/>
-      </dsp:txXfrm>
-    </dsp:sp>
-    <dsp:sp modelId="{280FDA87-53BC-41E0-81E2-567898C607B6}">
-      <dsp:nvSpPr>
-        <dsp:cNvPr id="0" name=""/>
-        <dsp:cNvSpPr/>
-      </dsp:nvSpPr>
-      <dsp:spPr>
-        <a:xfrm>
-          <a:off x="3250014" y="1511278"/>
-          <a:ext cx="1476746" cy="886047"/>
-        </a:xfrm>
-        <a:prstGeom prst="rect">
-          <a:avLst/>
-        </a:prstGeom>
-        <a:solidFill>
-          <a:schemeClr val="accent2">
-            <a:hueOff val="2445931"/>
-            <a:satOff val="-2598"/>
-            <a:lumOff val="1996"/>
-            <a:alphaOff val="0"/>
-          </a:schemeClr>
-        </a:solidFill>
-        <a:ln w="15875" cap="flat" cmpd="sng" algn="ctr">
-          <a:solidFill>
-            <a:schemeClr val="lt1">
-              <a:hueOff val="0"/>
-              <a:satOff val="0"/>
-              <a:lumOff val="0"/>
-              <a:alphaOff val="0"/>
-            </a:schemeClr>
-          </a:solidFill>
-          <a:prstDash val="solid"/>
-        </a:ln>
-        <a:effectLst/>
-      </dsp:spPr>
-      <dsp:style>
-        <a:lnRef idx="2">
-          <a:scrgbClr r="0" g="0" b="0"/>
-        </a:lnRef>
-        <a:fillRef idx="1">
-          <a:scrgbClr r="0" g="0" b="0"/>
-        </a:fillRef>
-        <a:effectRef idx="0">
-          <a:scrgbClr r="0" g="0" b="0"/>
-        </a:effectRef>
-        <a:fontRef idx="minor">
-          <a:schemeClr val="lt1"/>
-        </a:fontRef>
-      </dsp:style>
-      <dsp:txBody>
-        <a:bodyPr spcFirstLastPara="0" vert="horz" wrap="square" lIns="53340" tIns="53340" rIns="53340" bIns="53340" numCol="1" spcCol="1270" anchor="ctr" anchorCtr="0">
-          <a:noAutofit/>
-        </a:bodyPr>
-        <a:lstStyle/>
-        <a:p>
-          <a:pPr marL="0" lvl="0" indent="0" algn="ctr" defTabSz="622300">
-            <a:lnSpc>
-              <a:spcPct val="90000"/>
-            </a:lnSpc>
-            <a:spcBef>
-              <a:spcPct val="0"/>
-            </a:spcBef>
-            <a:spcAft>
-              <a:spcPct val="35000"/>
-            </a:spcAft>
-            <a:buNone/>
-          </a:pPr>
-          <a:r>
-            <a:rPr lang="en-US" sz="1400" kern="1200"/>
-            <a:t>Git and merge conflicts</a:t>
-          </a:r>
-        </a:p>
-      </dsp:txBody>
-      <dsp:txXfrm>
-        <a:off x="3250014" y="1511278"/>
-        <a:ext cx="1476746" cy="886047"/>
-      </dsp:txXfrm>
-    </dsp:sp>
-    <dsp:sp modelId="{D24047CB-A5BE-48A7-BB25-8F1353ACBDB5}">
-      <dsp:nvSpPr>
-        <dsp:cNvPr id="0" name=""/>
-        <dsp:cNvSpPr/>
-      </dsp:nvSpPr>
-      <dsp:spPr>
-        <a:xfrm>
-          <a:off x="4874435" y="1511278"/>
-          <a:ext cx="1476746" cy="886047"/>
-        </a:xfrm>
-        <a:prstGeom prst="rect">
-          <a:avLst/>
-        </a:prstGeom>
-        <a:solidFill>
-          <a:schemeClr val="accent2">
-            <a:hueOff val="2751672"/>
-            <a:satOff val="-2923"/>
-            <a:lumOff val="2246"/>
-            <a:alphaOff val="0"/>
-          </a:schemeClr>
-        </a:solidFill>
-        <a:ln w="15875" cap="flat" cmpd="sng" algn="ctr">
-          <a:solidFill>
-            <a:schemeClr val="lt1">
-              <a:hueOff val="0"/>
-              <a:satOff val="0"/>
-              <a:lumOff val="0"/>
-              <a:alphaOff val="0"/>
-            </a:schemeClr>
-          </a:solidFill>
-          <a:prstDash val="solid"/>
-        </a:ln>
-        <a:effectLst/>
-      </dsp:spPr>
-      <dsp:style>
-        <a:lnRef idx="2">
-          <a:scrgbClr r="0" g="0" b="0"/>
-        </a:lnRef>
-        <a:fillRef idx="1">
-          <a:scrgbClr r="0" g="0" b="0"/>
-        </a:fillRef>
-        <a:effectRef idx="0">
-          <a:scrgbClr r="0" g="0" b="0"/>
-        </a:effectRef>
-        <a:fontRef idx="minor">
-          <a:schemeClr val="lt1"/>
-        </a:fontRef>
-      </dsp:style>
-      <dsp:txBody>
-        <a:bodyPr spcFirstLastPara="0" vert="horz" wrap="square" lIns="53340" tIns="53340" rIns="53340" bIns="53340" numCol="1" spcCol="1270" anchor="ctr" anchorCtr="0">
-          <a:noAutofit/>
-        </a:bodyPr>
-        <a:lstStyle/>
-        <a:p>
-          <a:pPr marL="0" lvl="0" indent="0" algn="ctr" defTabSz="622300">
-            <a:lnSpc>
-              <a:spcPct val="90000"/>
-            </a:lnSpc>
-            <a:spcBef>
-              <a:spcPct val="0"/>
-            </a:spcBef>
-            <a:spcAft>
-              <a:spcPct val="35000"/>
-            </a:spcAft>
-            <a:buNone/>
-          </a:pPr>
-          <a:r>
-            <a:rPr lang="en-US" sz="1400" kern="1200"/>
-            <a:t>Start with the program logic and focus GUI in the beginning.</a:t>
-          </a:r>
-        </a:p>
-      </dsp:txBody>
-      <dsp:txXfrm>
-        <a:off x="4874435" y="1511278"/>
-        <a:ext cx="1476746" cy="886047"/>
-      </dsp:txXfrm>
-    </dsp:sp>
-    <dsp:sp modelId="{8487C520-7D6A-4C16-86B0-20446BD15EA8}">
-      <dsp:nvSpPr>
-        <dsp:cNvPr id="0" name=""/>
-        <dsp:cNvSpPr/>
-      </dsp:nvSpPr>
-      <dsp:spPr>
-        <a:xfrm>
-          <a:off x="6498857" y="1511278"/>
-          <a:ext cx="1476746" cy="886047"/>
-        </a:xfrm>
-        <a:prstGeom prst="rect">
-          <a:avLst/>
-        </a:prstGeom>
-        <a:solidFill>
-          <a:schemeClr val="accent2">
-            <a:hueOff val="3057414"/>
-            <a:satOff val="-3247"/>
-            <a:lumOff val="2495"/>
-            <a:alphaOff val="0"/>
-          </a:schemeClr>
-        </a:solidFill>
-        <a:ln w="15875" cap="flat" cmpd="sng" algn="ctr">
-          <a:solidFill>
-            <a:schemeClr val="lt1">
-              <a:hueOff val="0"/>
-              <a:satOff val="0"/>
-              <a:lumOff val="0"/>
-              <a:alphaOff val="0"/>
-            </a:schemeClr>
-          </a:solidFill>
-          <a:prstDash val="solid"/>
-        </a:ln>
-        <a:effectLst/>
-      </dsp:spPr>
-      <dsp:style>
-        <a:lnRef idx="2">
-          <a:scrgbClr r="0" g="0" b="0"/>
-        </a:lnRef>
-        <a:fillRef idx="1">
-          <a:scrgbClr r="0" g="0" b="0"/>
-        </a:fillRef>
-        <a:effectRef idx="0">
-          <a:scrgbClr r="0" g="0" b="0"/>
-        </a:effectRef>
-        <a:fontRef idx="minor">
-          <a:schemeClr val="lt1"/>
-        </a:fontRef>
-      </dsp:style>
-      <dsp:txBody>
-        <a:bodyPr spcFirstLastPara="0" vert="horz" wrap="square" lIns="53340" tIns="53340" rIns="53340" bIns="53340" numCol="1" spcCol="1270" anchor="ctr" anchorCtr="0">
-          <a:noAutofit/>
-        </a:bodyPr>
-        <a:lstStyle/>
-        <a:p>
-          <a:pPr marL="0" lvl="0" indent="0" algn="ctr" defTabSz="622300">
-            <a:lnSpc>
-              <a:spcPct val="90000"/>
-            </a:lnSpc>
-            <a:spcBef>
-              <a:spcPct val="0"/>
-            </a:spcBef>
-            <a:spcAft>
-              <a:spcPct val="35000"/>
-            </a:spcAft>
-            <a:buNone/>
-          </a:pPr>
-          <a:r>
-            <a:rPr lang="en-US" sz="1400" kern="1200"/>
-            <a:t>Make sure naming convention is clear</a:t>
-          </a:r>
-        </a:p>
-      </dsp:txBody>
-      <dsp:txXfrm>
-        <a:off x="6498857" y="1511278"/>
-        <a:ext cx="1476746" cy="886047"/>
-      </dsp:txXfrm>
-    </dsp:sp>
-    <dsp:sp modelId="{A659FA33-1BC3-4E55-A422-F0F12090C59D}">
-      <dsp:nvSpPr>
-        <dsp:cNvPr id="0" name=""/>
-        <dsp:cNvSpPr/>
-      </dsp:nvSpPr>
-      <dsp:spPr>
-        <a:xfrm>
-          <a:off x="8123278" y="1511278"/>
-          <a:ext cx="1476746" cy="886047"/>
+          <a:off x="6126857" y="1547963"/>
+          <a:ext cx="2210431" cy="1326259"/>
         </a:xfrm>
         <a:prstGeom prst="rect">
           <a:avLst/>
@@ -11026,12 +8606,12 @@
         </a:fontRef>
       </dsp:style>
       <dsp:txBody>
-        <a:bodyPr spcFirstLastPara="0" vert="horz" wrap="square" lIns="53340" tIns="53340" rIns="53340" bIns="53340" numCol="1" spcCol="1270" anchor="ctr" anchorCtr="0">
+        <a:bodyPr spcFirstLastPara="0" vert="horz" wrap="square" lIns="83820" tIns="83820" rIns="83820" bIns="83820" numCol="1" spcCol="1270" anchor="ctr" anchorCtr="0">
           <a:noAutofit/>
         </a:bodyPr>
         <a:lstStyle/>
         <a:p>
-          <a:pPr marL="0" lvl="0" indent="0" algn="ctr" defTabSz="622300">
+          <a:pPr marL="0" lvl="0" indent="0" algn="ctr" defTabSz="977900">
             <a:lnSpc>
               <a:spcPct val="90000"/>
             </a:lnSpc>
@@ -11044,14 +8624,14 @@
             <a:buNone/>
           </a:pPr>
           <a:r>
-            <a:rPr lang="en-US" sz="1400" kern="1200" dirty="0"/>
-            <a:t>Constant communication with team</a:t>
+            <a:rPr lang="en-US" sz="2200" kern="1200" dirty="0"/>
+            <a:t>It's OK to take a break when troubleshooting</a:t>
           </a:r>
         </a:p>
       </dsp:txBody>
       <dsp:txXfrm>
-        <a:off x="8123278" y="1511278"/>
-        <a:ext cx="1476746" cy="886047"/>
+        <a:off x="6126857" y="1547963"/>
+        <a:ext cx="2210431" cy="1326259"/>
       </dsp:txXfrm>
     </dsp:sp>
   </dsp:spTree>
@@ -18757,7 +16337,7 @@
           <a:p>
             <a:fld id="{30F92E9B-1B1A-0447-AE91-559C5C836551}" type="datetimeFigureOut">
               <a:rPr lang="en-US" smtClean="0"/>
-              <a:t>8/20/2022</a:t>
+              <a:t>8/20/22</a:t>
             </a:fld>
             <a:endParaRPr lang="en-US"/>
           </a:p>
@@ -20356,7 +17936,7 @@
             <a:fld id="{B61BEF0D-F0BB-DE4B-95CE-6DB70DBA9567}" type="datetimeFigureOut">
               <a:rPr lang="en-US" smtClean="0"/>
               <a:pPr/>
-              <a:t>8/20/2022</a:t>
+              <a:t>8/20/22</a:t>
             </a:fld>
             <a:endParaRPr lang="en-US" dirty="0"/>
           </a:p>
@@ -20682,7 +18262,7 @@
             <a:fld id="{B61BEF0D-F0BB-DE4B-95CE-6DB70DBA9567}" type="datetimeFigureOut">
               <a:rPr lang="en-US" smtClean="0"/>
               <a:pPr/>
-              <a:t>8/20/2022</a:t>
+              <a:t>8/20/22</a:t>
             </a:fld>
             <a:endParaRPr lang="en-US" dirty="0"/>
           </a:p>
@@ -20932,7 +18512,7 @@
             <a:fld id="{B61BEF0D-F0BB-DE4B-95CE-6DB70DBA9567}" type="datetimeFigureOut">
               <a:rPr lang="en-US" smtClean="0"/>
               <a:pPr/>
-              <a:t>8/20/2022</a:t>
+              <a:t>8/20/22</a:t>
             </a:fld>
             <a:endParaRPr lang="en-US" dirty="0"/>
           </a:p>
@@ -21273,7 +18853,7 @@
             <a:fld id="{B61BEF0D-F0BB-DE4B-95CE-6DB70DBA9567}" type="datetimeFigureOut">
               <a:rPr lang="en-US" smtClean="0"/>
               <a:pPr/>
-              <a:t>8/20/2022</a:t>
+              <a:t>8/20/22</a:t>
             </a:fld>
             <a:endParaRPr lang="en-US" dirty="0"/>
           </a:p>
@@ -21622,7 +19202,7 @@
             <a:fld id="{B61BEF0D-F0BB-DE4B-95CE-6DB70DBA9567}" type="datetimeFigureOut">
               <a:rPr lang="en-US" smtClean="0"/>
               <a:pPr/>
-              <a:t>8/20/2022</a:t>
+              <a:t>8/20/22</a:t>
             </a:fld>
             <a:endParaRPr lang="en-US" dirty="0"/>
           </a:p>
@@ -21998,7 +19578,7 @@
             <a:fld id="{B61BEF0D-F0BB-DE4B-95CE-6DB70DBA9567}" type="datetimeFigureOut">
               <a:rPr lang="en-US" smtClean="0"/>
               <a:pPr/>
-              <a:t>8/20/2022</a:t>
+              <a:t>8/20/22</a:t>
             </a:fld>
             <a:endParaRPr lang="en-US" dirty="0"/>
           </a:p>
@@ -22470,7 +20050,7 @@
             <a:fld id="{B61BEF0D-F0BB-DE4B-95CE-6DB70DBA9567}" type="datetimeFigureOut">
               <a:rPr lang="en-US" smtClean="0"/>
               <a:pPr/>
-              <a:t>8/20/2022</a:t>
+              <a:t>8/20/22</a:t>
             </a:fld>
             <a:endParaRPr lang="en-US" dirty="0"/>
           </a:p>
@@ -22676,7 +20256,7 @@
           <a:p>
             <a:fld id="{55C6B4A9-1611-4792-9094-5F34BCA07E0B}" type="datetimeFigureOut">
               <a:rPr lang="en-US" smtClean="0"/>
-              <a:t>8/20/2022</a:t>
+              <a:t>8/20/22</a:t>
             </a:fld>
             <a:endParaRPr lang="en-US" dirty="0"/>
           </a:p>
@@ -22888,7 +20468,7 @@
             <a:fld id="{B61BEF0D-F0BB-DE4B-95CE-6DB70DBA9567}" type="datetimeFigureOut">
               <a:rPr lang="en-US" smtClean="0"/>
               <a:pPr/>
-              <a:t>8/20/2022</a:t>
+              <a:t>8/20/22</a:t>
             </a:fld>
             <a:endParaRPr lang="en-US" dirty="0"/>
           </a:p>
@@ -23122,7 +20702,7 @@
             <a:fld id="{B61BEF0D-F0BB-DE4B-95CE-6DB70DBA9567}" type="datetimeFigureOut">
               <a:rPr lang="en-US" smtClean="0"/>
               <a:pPr/>
-              <a:t>8/20/2022</a:t>
+              <a:t>8/20/22</a:t>
             </a:fld>
             <a:endParaRPr lang="en-US" dirty="0"/>
           </a:p>
@@ -23372,7 +20952,7 @@
             <a:fld id="{B61BEF0D-F0BB-DE4B-95CE-6DB70DBA9567}" type="datetimeFigureOut">
               <a:rPr lang="en-US" smtClean="0"/>
               <a:pPr/>
-              <a:t>8/20/2022</a:t>
+              <a:t>8/20/22</a:t>
             </a:fld>
             <a:endParaRPr lang="en-US" dirty="0"/>
           </a:p>
@@ -23671,7 +21251,7 @@
           <a:p>
             <a:fld id="{EB712588-04B1-427B-82EE-E8DB90309F08}" type="datetimeFigureOut">
               <a:rPr lang="en-US" smtClean="0"/>
-              <a:t>8/20/2022</a:t>
+              <a:t>8/20/22</a:t>
             </a:fld>
             <a:endParaRPr lang="en-US" dirty="0"/>
           </a:p>
@@ -24066,7 +21646,7 @@
             <a:fld id="{B61BEF0D-F0BB-DE4B-95CE-6DB70DBA9567}" type="datetimeFigureOut">
               <a:rPr lang="en-US" smtClean="0"/>
               <a:pPr/>
-              <a:t>8/20/2022</a:t>
+              <a:t>8/20/22</a:t>
             </a:fld>
             <a:endParaRPr lang="en-US" dirty="0"/>
           </a:p>
@@ -24217,7 +21797,7 @@
             <a:fld id="{B61BEF0D-F0BB-DE4B-95CE-6DB70DBA9567}" type="datetimeFigureOut">
               <a:rPr lang="en-US" smtClean="0"/>
               <a:pPr/>
-              <a:t>8/20/2022</a:t>
+              <a:t>8/20/22</a:t>
             </a:fld>
             <a:endParaRPr lang="en-US" dirty="0"/>
           </a:p>
@@ -24345,7 +21925,7 @@
             <a:fld id="{B61BEF0D-F0BB-DE4B-95CE-6DB70DBA9567}" type="datetimeFigureOut">
               <a:rPr lang="en-US" smtClean="0"/>
               <a:pPr/>
-              <a:t>8/20/2022</a:t>
+              <a:t>8/20/22</a:t>
             </a:fld>
             <a:endParaRPr lang="en-US" dirty="0"/>
           </a:p>
@@ -24601,7 +22181,7 @@
           <a:p>
             <a:fld id="{42A54C80-263E-416B-A8E0-580EDEADCBDC}" type="datetimeFigureOut">
               <a:rPr lang="en-US" smtClean="0"/>
-              <a:t>8/20/2022</a:t>
+              <a:t>8/20/22</a:t>
             </a:fld>
             <a:endParaRPr lang="en-US" dirty="0"/>
           </a:p>
@@ -24917,7 +22497,7 @@
             <a:fld id="{B61BEF0D-F0BB-DE4B-95CE-6DB70DBA9567}" type="datetimeFigureOut">
               <a:rPr lang="en-US" smtClean="0"/>
               <a:pPr/>
-              <a:t>8/20/2022</a:t>
+              <a:t>8/20/22</a:t>
             </a:fld>
             <a:endParaRPr lang="en-US" dirty="0"/>
           </a:p>
@@ -25270,7 +22850,7 @@
             <a:fld id="{B61BEF0D-F0BB-DE4B-95CE-6DB70DBA9567}" type="datetimeFigureOut">
               <a:rPr lang="en-US" smtClean="0"/>
               <a:pPr/>
-              <a:t>8/20/2022</a:t>
+              <a:t>8/20/22</a:t>
             </a:fld>
             <a:endParaRPr lang="en-US" dirty="0"/>
           </a:p>
@@ -27158,7 +24738,7 @@
             <p:ph idx="1"/>
             <p:extLst>
               <p:ext uri="{D42A27DB-BD31-4B8C-83A1-F6EECF244321}">
-                <p14:modId xmlns:p14="http://schemas.microsoft.com/office/powerpoint/2010/main" val="3912587291"/>
+                <p14:modId xmlns:p14="http://schemas.microsoft.com/office/powerpoint/2010/main" val="3048995378"/>
               </p:ext>
             </p:extLst>
           </p:nvPr>

</xml_diff>

<commit_message>
Replace TechWise_Team_4_-_Project_1_Presentation.pptx Flipped calendar and future opportunities.
</commit_message>
<xml_diff>
--- a/TechWise_Team_4_-_Project_1_Presentation.pptx
+++ b/TechWise_Team_4_-_Project_1_Presentation.pptx
@@ -15,8 +15,8 @@
     <p:sldId id="265" r:id="rId6"/>
     <p:sldId id="272" r:id="rId7"/>
     <p:sldId id="273" r:id="rId8"/>
-    <p:sldId id="263" r:id="rId9"/>
-    <p:sldId id="274" r:id="rId10"/>
+    <p:sldId id="274" r:id="rId9"/>
+    <p:sldId id="263" r:id="rId10"/>
     <p:sldId id="271" r:id="rId11"/>
   </p:sldIdLst>
   <p:sldSz cx="12192000" cy="6858000"/>
@@ -2758,753 +2758,6 @@
 </file>
 
 <file path=ppt/diagrams/colors4.xml><?xml version="1.0" encoding="utf-8"?>
-<dgm:colorsDef xmlns:dgm="http://schemas.openxmlformats.org/drawingml/2006/diagram" xmlns:a="http://schemas.openxmlformats.org/drawingml/2006/main" uniqueId="urn:microsoft.com/office/officeart/2005/8/colors/accent3_2">
-  <dgm:title val=""/>
-  <dgm:desc val=""/>
-  <dgm:catLst>
-    <dgm:cat type="accent3" pri="11200"/>
-  </dgm:catLst>
-  <dgm:styleLbl name="node0">
-    <dgm:fillClrLst meth="repeat">
-      <a:schemeClr val="accent3"/>
-    </dgm:fillClrLst>
-    <dgm:linClrLst meth="repeat">
-      <a:schemeClr val="lt1"/>
-    </dgm:linClrLst>
-    <dgm:effectClrLst/>
-    <dgm:txLinClrLst/>
-    <dgm:txFillClrLst/>
-    <dgm:txEffectClrLst/>
-  </dgm:styleLbl>
-  <dgm:styleLbl name="node1">
-    <dgm:fillClrLst meth="repeat">
-      <a:schemeClr val="accent3"/>
-    </dgm:fillClrLst>
-    <dgm:linClrLst meth="repeat">
-      <a:schemeClr val="lt1"/>
-    </dgm:linClrLst>
-    <dgm:effectClrLst/>
-    <dgm:txLinClrLst/>
-    <dgm:txFillClrLst/>
-    <dgm:txEffectClrLst/>
-  </dgm:styleLbl>
-  <dgm:styleLbl name="alignNode1">
-    <dgm:fillClrLst meth="repeat">
-      <a:schemeClr val="accent3"/>
-    </dgm:fillClrLst>
-    <dgm:linClrLst meth="repeat">
-      <a:schemeClr val="accent3"/>
-    </dgm:linClrLst>
-    <dgm:effectClrLst/>
-    <dgm:txLinClrLst/>
-    <dgm:txFillClrLst/>
-    <dgm:txEffectClrLst/>
-  </dgm:styleLbl>
-  <dgm:styleLbl name="lnNode1">
-    <dgm:fillClrLst meth="repeat">
-      <a:schemeClr val="accent3"/>
-    </dgm:fillClrLst>
-    <dgm:linClrLst meth="repeat">
-      <a:schemeClr val="lt1"/>
-    </dgm:linClrLst>
-    <dgm:effectClrLst/>
-    <dgm:txLinClrLst/>
-    <dgm:txFillClrLst/>
-    <dgm:txEffectClrLst/>
-  </dgm:styleLbl>
-  <dgm:styleLbl name="vennNode1">
-    <dgm:fillClrLst meth="repeat">
-      <a:schemeClr val="accent3">
-        <a:alpha val="50000"/>
-      </a:schemeClr>
-    </dgm:fillClrLst>
-    <dgm:linClrLst meth="repeat">
-      <a:schemeClr val="lt1"/>
-    </dgm:linClrLst>
-    <dgm:effectClrLst/>
-    <dgm:txLinClrLst/>
-    <dgm:txFillClrLst/>
-    <dgm:txEffectClrLst/>
-  </dgm:styleLbl>
-  <dgm:styleLbl name="node2">
-    <dgm:fillClrLst meth="repeat">
-      <a:schemeClr val="accent3"/>
-    </dgm:fillClrLst>
-    <dgm:linClrLst meth="repeat">
-      <a:schemeClr val="lt1"/>
-    </dgm:linClrLst>
-    <dgm:effectClrLst/>
-    <dgm:txLinClrLst/>
-    <dgm:txFillClrLst/>
-    <dgm:txEffectClrLst/>
-  </dgm:styleLbl>
-  <dgm:styleLbl name="node3">
-    <dgm:fillClrLst meth="repeat">
-      <a:schemeClr val="accent3"/>
-    </dgm:fillClrLst>
-    <dgm:linClrLst meth="repeat">
-      <a:schemeClr val="lt1"/>
-    </dgm:linClrLst>
-    <dgm:effectClrLst/>
-    <dgm:txLinClrLst/>
-    <dgm:txFillClrLst/>
-    <dgm:txEffectClrLst/>
-  </dgm:styleLbl>
-  <dgm:styleLbl name="node4">
-    <dgm:fillClrLst meth="repeat">
-      <a:schemeClr val="accent3"/>
-    </dgm:fillClrLst>
-    <dgm:linClrLst meth="repeat">
-      <a:schemeClr val="lt1"/>
-    </dgm:linClrLst>
-    <dgm:effectClrLst/>
-    <dgm:txLinClrLst/>
-    <dgm:txFillClrLst/>
-    <dgm:txEffectClrLst/>
-  </dgm:styleLbl>
-  <dgm:styleLbl name="fgImgPlace1">
-    <dgm:fillClrLst meth="repeat">
-      <a:schemeClr val="accent3">
-        <a:tint val="50000"/>
-      </a:schemeClr>
-    </dgm:fillClrLst>
-    <dgm:linClrLst meth="repeat">
-      <a:schemeClr val="lt1"/>
-    </dgm:linClrLst>
-    <dgm:effectClrLst/>
-    <dgm:txLinClrLst/>
-    <dgm:txFillClrLst meth="repeat">
-      <a:schemeClr val="lt1"/>
-    </dgm:txFillClrLst>
-    <dgm:txEffectClrLst/>
-  </dgm:styleLbl>
-  <dgm:styleLbl name="alignImgPlace1">
-    <dgm:fillClrLst meth="repeat">
-      <a:schemeClr val="accent3">
-        <a:tint val="50000"/>
-      </a:schemeClr>
-    </dgm:fillClrLst>
-    <dgm:linClrLst meth="repeat">
-      <a:schemeClr val="lt1"/>
-    </dgm:linClrLst>
-    <dgm:effectClrLst/>
-    <dgm:txLinClrLst/>
-    <dgm:txFillClrLst meth="repeat">
-      <a:schemeClr val="lt1"/>
-    </dgm:txFillClrLst>
-    <dgm:txEffectClrLst/>
-  </dgm:styleLbl>
-  <dgm:styleLbl name="bgImgPlace1">
-    <dgm:fillClrLst meth="repeat">
-      <a:schemeClr val="accent3">
-        <a:tint val="50000"/>
-      </a:schemeClr>
-    </dgm:fillClrLst>
-    <dgm:linClrLst meth="repeat">
-      <a:schemeClr val="lt1"/>
-    </dgm:linClrLst>
-    <dgm:effectClrLst/>
-    <dgm:txLinClrLst/>
-    <dgm:txFillClrLst meth="repeat">
-      <a:schemeClr val="lt1"/>
-    </dgm:txFillClrLst>
-    <dgm:txEffectClrLst/>
-  </dgm:styleLbl>
-  <dgm:styleLbl name="sibTrans2D1">
-    <dgm:fillClrLst meth="repeat">
-      <a:schemeClr val="accent3">
-        <a:tint val="60000"/>
-      </a:schemeClr>
-    </dgm:fillClrLst>
-    <dgm:linClrLst meth="repeat">
-      <a:schemeClr val="accent3">
-        <a:tint val="60000"/>
-      </a:schemeClr>
-    </dgm:linClrLst>
-    <dgm:effectClrLst/>
-    <dgm:txLinClrLst/>
-    <dgm:txFillClrLst/>
-    <dgm:txEffectClrLst/>
-  </dgm:styleLbl>
-  <dgm:styleLbl name="fgSibTrans2D1">
-    <dgm:fillClrLst meth="repeat">
-      <a:schemeClr val="accent3">
-        <a:tint val="60000"/>
-      </a:schemeClr>
-    </dgm:fillClrLst>
-    <dgm:linClrLst meth="repeat">
-      <a:schemeClr val="accent3">
-        <a:tint val="60000"/>
-      </a:schemeClr>
-    </dgm:linClrLst>
-    <dgm:effectClrLst/>
-    <dgm:txLinClrLst/>
-    <dgm:txFillClrLst/>
-    <dgm:txEffectClrLst/>
-  </dgm:styleLbl>
-  <dgm:styleLbl name="bgSibTrans2D1">
-    <dgm:fillClrLst meth="repeat">
-      <a:schemeClr val="accent3">
-        <a:tint val="60000"/>
-      </a:schemeClr>
-    </dgm:fillClrLst>
-    <dgm:linClrLst meth="repeat">
-      <a:schemeClr val="accent3">
-        <a:tint val="60000"/>
-      </a:schemeClr>
-    </dgm:linClrLst>
-    <dgm:effectClrLst/>
-    <dgm:txLinClrLst/>
-    <dgm:txFillClrLst/>
-    <dgm:txEffectClrLst/>
-  </dgm:styleLbl>
-  <dgm:styleLbl name="sibTrans1D1">
-    <dgm:fillClrLst meth="repeat">
-      <a:schemeClr val="accent3"/>
-    </dgm:fillClrLst>
-    <dgm:linClrLst meth="repeat">
-      <a:schemeClr val="accent3"/>
-    </dgm:linClrLst>
-    <dgm:effectClrLst/>
-    <dgm:txLinClrLst/>
-    <dgm:txFillClrLst meth="repeat">
-      <a:schemeClr val="tx1"/>
-    </dgm:txFillClrLst>
-    <dgm:txEffectClrLst/>
-  </dgm:styleLbl>
-  <dgm:styleLbl name="callout">
-    <dgm:fillClrLst meth="repeat">
-      <a:schemeClr val="accent3"/>
-    </dgm:fillClrLst>
-    <dgm:linClrLst meth="repeat">
-      <a:schemeClr val="accent3">
-        <a:tint val="50000"/>
-      </a:schemeClr>
-    </dgm:linClrLst>
-    <dgm:effectClrLst/>
-    <dgm:txLinClrLst/>
-    <dgm:txFillClrLst meth="repeat">
-      <a:schemeClr val="tx1"/>
-    </dgm:txFillClrLst>
-    <dgm:txEffectClrLst/>
-  </dgm:styleLbl>
-  <dgm:styleLbl name="asst0">
-    <dgm:fillClrLst meth="repeat">
-      <a:schemeClr val="accent3"/>
-    </dgm:fillClrLst>
-    <dgm:linClrLst meth="repeat">
-      <a:schemeClr val="lt1"/>
-    </dgm:linClrLst>
-    <dgm:effectClrLst/>
-    <dgm:txLinClrLst/>
-    <dgm:txFillClrLst/>
-    <dgm:txEffectClrLst/>
-  </dgm:styleLbl>
-  <dgm:styleLbl name="asst1">
-    <dgm:fillClrLst meth="repeat">
-      <a:schemeClr val="accent3"/>
-    </dgm:fillClrLst>
-    <dgm:linClrLst meth="repeat">
-      <a:schemeClr val="lt1"/>
-    </dgm:linClrLst>
-    <dgm:effectClrLst/>
-    <dgm:txLinClrLst/>
-    <dgm:txFillClrLst/>
-    <dgm:txEffectClrLst/>
-  </dgm:styleLbl>
-  <dgm:styleLbl name="asst2">
-    <dgm:fillClrLst meth="repeat">
-      <a:schemeClr val="accent3"/>
-    </dgm:fillClrLst>
-    <dgm:linClrLst meth="repeat">
-      <a:schemeClr val="lt1"/>
-    </dgm:linClrLst>
-    <dgm:effectClrLst/>
-    <dgm:txLinClrLst/>
-    <dgm:txFillClrLst/>
-    <dgm:txEffectClrLst/>
-  </dgm:styleLbl>
-  <dgm:styleLbl name="asst3">
-    <dgm:fillClrLst meth="repeat">
-      <a:schemeClr val="accent3"/>
-    </dgm:fillClrLst>
-    <dgm:linClrLst meth="repeat">
-      <a:schemeClr val="lt1"/>
-    </dgm:linClrLst>
-    <dgm:effectClrLst/>
-    <dgm:txLinClrLst/>
-    <dgm:txFillClrLst/>
-    <dgm:txEffectClrLst/>
-  </dgm:styleLbl>
-  <dgm:styleLbl name="asst4">
-    <dgm:fillClrLst meth="repeat">
-      <a:schemeClr val="accent3"/>
-    </dgm:fillClrLst>
-    <dgm:linClrLst meth="repeat">
-      <a:schemeClr val="lt1"/>
-    </dgm:linClrLst>
-    <dgm:effectClrLst/>
-    <dgm:txLinClrLst/>
-    <dgm:txFillClrLst/>
-    <dgm:txEffectClrLst/>
-  </dgm:styleLbl>
-  <dgm:styleLbl name="parChTrans2D1">
-    <dgm:fillClrLst meth="repeat">
-      <a:schemeClr val="accent3">
-        <a:tint val="60000"/>
-      </a:schemeClr>
-    </dgm:fillClrLst>
-    <dgm:linClrLst meth="repeat">
-      <a:schemeClr val="accent3">
-        <a:tint val="60000"/>
-      </a:schemeClr>
-    </dgm:linClrLst>
-    <dgm:effectClrLst/>
-    <dgm:txLinClrLst/>
-    <dgm:txFillClrLst meth="repeat">
-      <a:schemeClr val="lt1"/>
-    </dgm:txFillClrLst>
-    <dgm:txEffectClrLst/>
-  </dgm:styleLbl>
-  <dgm:styleLbl name="parChTrans2D2">
-    <dgm:fillClrLst meth="repeat">
-      <a:schemeClr val="accent3"/>
-    </dgm:fillClrLst>
-    <dgm:linClrLst meth="repeat">
-      <a:schemeClr val="accent3"/>
-    </dgm:linClrLst>
-    <dgm:effectClrLst/>
-    <dgm:txLinClrLst/>
-    <dgm:txFillClrLst meth="repeat">
-      <a:schemeClr val="lt1"/>
-    </dgm:txFillClrLst>
-    <dgm:txEffectClrLst/>
-  </dgm:styleLbl>
-  <dgm:styleLbl name="parChTrans2D3">
-    <dgm:fillClrLst meth="repeat">
-      <a:schemeClr val="accent3"/>
-    </dgm:fillClrLst>
-    <dgm:linClrLst meth="repeat">
-      <a:schemeClr val="accent3"/>
-    </dgm:linClrLst>
-    <dgm:effectClrLst/>
-    <dgm:txLinClrLst/>
-    <dgm:txFillClrLst meth="repeat">
-      <a:schemeClr val="lt1"/>
-    </dgm:txFillClrLst>
-    <dgm:txEffectClrLst/>
-  </dgm:styleLbl>
-  <dgm:styleLbl name="parChTrans2D4">
-    <dgm:fillClrLst meth="repeat">
-      <a:schemeClr val="accent3"/>
-    </dgm:fillClrLst>
-    <dgm:linClrLst meth="repeat">
-      <a:schemeClr val="accent3"/>
-    </dgm:linClrLst>
-    <dgm:effectClrLst/>
-    <dgm:txLinClrLst/>
-    <dgm:txFillClrLst meth="repeat">
-      <a:schemeClr val="lt1"/>
-    </dgm:txFillClrLst>
-    <dgm:txEffectClrLst/>
-  </dgm:styleLbl>
-  <dgm:styleLbl name="parChTrans1D1">
-    <dgm:fillClrLst meth="repeat">
-      <a:schemeClr val="accent3"/>
-    </dgm:fillClrLst>
-    <dgm:linClrLst meth="repeat">
-      <a:schemeClr val="accent3">
-        <a:shade val="60000"/>
-      </a:schemeClr>
-    </dgm:linClrLst>
-    <dgm:effectClrLst/>
-    <dgm:txLinClrLst/>
-    <dgm:txFillClrLst meth="repeat">
-      <a:schemeClr val="tx1"/>
-    </dgm:txFillClrLst>
-    <dgm:txEffectClrLst/>
-  </dgm:styleLbl>
-  <dgm:styleLbl name="parChTrans1D2">
-    <dgm:fillClrLst meth="repeat">
-      <a:schemeClr val="accent3"/>
-    </dgm:fillClrLst>
-    <dgm:linClrLst meth="repeat">
-      <a:schemeClr val="accent3">
-        <a:shade val="60000"/>
-      </a:schemeClr>
-    </dgm:linClrLst>
-    <dgm:effectClrLst/>
-    <dgm:txLinClrLst/>
-    <dgm:txFillClrLst meth="repeat">
-      <a:schemeClr val="tx1"/>
-    </dgm:txFillClrLst>
-    <dgm:txEffectClrLst/>
-  </dgm:styleLbl>
-  <dgm:styleLbl name="parChTrans1D3">
-    <dgm:fillClrLst meth="repeat">
-      <a:schemeClr val="accent3"/>
-    </dgm:fillClrLst>
-    <dgm:linClrLst meth="repeat">
-      <a:schemeClr val="accent3">
-        <a:shade val="80000"/>
-      </a:schemeClr>
-    </dgm:linClrLst>
-    <dgm:effectClrLst/>
-    <dgm:txLinClrLst/>
-    <dgm:txFillClrLst meth="repeat">
-      <a:schemeClr val="tx1"/>
-    </dgm:txFillClrLst>
-    <dgm:txEffectClrLst/>
-  </dgm:styleLbl>
-  <dgm:styleLbl name="parChTrans1D4">
-    <dgm:fillClrLst meth="repeat">
-      <a:schemeClr val="accent3"/>
-    </dgm:fillClrLst>
-    <dgm:linClrLst meth="repeat">
-      <a:schemeClr val="accent3">
-        <a:shade val="80000"/>
-      </a:schemeClr>
-    </dgm:linClrLst>
-    <dgm:effectClrLst/>
-    <dgm:txLinClrLst/>
-    <dgm:txFillClrLst meth="repeat">
-      <a:schemeClr val="tx1"/>
-    </dgm:txFillClrLst>
-    <dgm:txEffectClrLst/>
-  </dgm:styleLbl>
-  <dgm:styleLbl name="fgAcc1">
-    <dgm:fillClrLst meth="repeat">
-      <a:schemeClr val="lt1">
-        <a:alpha val="90000"/>
-      </a:schemeClr>
-    </dgm:fillClrLst>
-    <dgm:linClrLst meth="repeat">
-      <a:schemeClr val="accent3"/>
-    </dgm:linClrLst>
-    <dgm:effectClrLst/>
-    <dgm:txLinClrLst/>
-    <dgm:txFillClrLst meth="repeat">
-      <a:schemeClr val="dk1"/>
-    </dgm:txFillClrLst>
-    <dgm:txEffectClrLst/>
-  </dgm:styleLbl>
-  <dgm:styleLbl name="conFgAcc1">
-    <dgm:fillClrLst meth="repeat">
-      <a:schemeClr val="lt1">
-        <a:alpha val="90000"/>
-      </a:schemeClr>
-    </dgm:fillClrLst>
-    <dgm:linClrLst meth="repeat">
-      <a:schemeClr val="accent3"/>
-    </dgm:linClrLst>
-    <dgm:effectClrLst/>
-    <dgm:txLinClrLst/>
-    <dgm:txFillClrLst meth="repeat">
-      <a:schemeClr val="dk1"/>
-    </dgm:txFillClrLst>
-    <dgm:txEffectClrLst/>
-  </dgm:styleLbl>
-  <dgm:styleLbl name="alignAcc1">
-    <dgm:fillClrLst meth="repeat">
-      <a:schemeClr val="lt1">
-        <a:alpha val="90000"/>
-      </a:schemeClr>
-    </dgm:fillClrLst>
-    <dgm:linClrLst meth="repeat">
-      <a:schemeClr val="accent3"/>
-    </dgm:linClrLst>
-    <dgm:effectClrLst/>
-    <dgm:txLinClrLst/>
-    <dgm:txFillClrLst meth="repeat">
-      <a:schemeClr val="dk1"/>
-    </dgm:txFillClrLst>
-    <dgm:txEffectClrLst/>
-  </dgm:styleLbl>
-  <dgm:styleLbl name="trAlignAcc1">
-    <dgm:fillClrLst meth="repeat">
-      <a:schemeClr val="lt1">
-        <a:alpha val="40000"/>
-      </a:schemeClr>
-    </dgm:fillClrLst>
-    <dgm:linClrLst meth="repeat">
-      <a:schemeClr val="accent3"/>
-    </dgm:linClrLst>
-    <dgm:effectClrLst/>
-    <dgm:txLinClrLst/>
-    <dgm:txFillClrLst meth="repeat">
-      <a:schemeClr val="dk1"/>
-    </dgm:txFillClrLst>
-    <dgm:txEffectClrLst/>
-  </dgm:styleLbl>
-  <dgm:styleLbl name="bgAcc1">
-    <dgm:fillClrLst meth="repeat">
-      <a:schemeClr val="lt1">
-        <a:alpha val="90000"/>
-      </a:schemeClr>
-    </dgm:fillClrLst>
-    <dgm:linClrLst meth="repeat">
-      <a:schemeClr val="accent3"/>
-    </dgm:linClrLst>
-    <dgm:effectClrLst/>
-    <dgm:txLinClrLst/>
-    <dgm:txFillClrLst meth="repeat">
-      <a:schemeClr val="dk1"/>
-    </dgm:txFillClrLst>
-    <dgm:txEffectClrLst/>
-  </dgm:styleLbl>
-  <dgm:styleLbl name="solidFgAcc1">
-    <dgm:fillClrLst meth="repeat">
-      <a:schemeClr val="lt1"/>
-    </dgm:fillClrLst>
-    <dgm:linClrLst meth="repeat">
-      <a:schemeClr val="accent3"/>
-    </dgm:linClrLst>
-    <dgm:effectClrLst/>
-    <dgm:txLinClrLst/>
-    <dgm:txFillClrLst meth="repeat">
-      <a:schemeClr val="dk1"/>
-    </dgm:txFillClrLst>
-    <dgm:txEffectClrLst/>
-  </dgm:styleLbl>
-  <dgm:styleLbl name="solidAlignAcc1">
-    <dgm:fillClrLst meth="repeat">
-      <a:schemeClr val="lt1"/>
-    </dgm:fillClrLst>
-    <dgm:linClrLst meth="repeat">
-      <a:schemeClr val="accent3"/>
-    </dgm:linClrLst>
-    <dgm:effectClrLst/>
-    <dgm:txLinClrLst/>
-    <dgm:txFillClrLst meth="repeat">
-      <a:schemeClr val="dk1"/>
-    </dgm:txFillClrLst>
-    <dgm:txEffectClrLst/>
-  </dgm:styleLbl>
-  <dgm:styleLbl name="solidBgAcc1">
-    <dgm:fillClrLst meth="repeat">
-      <a:schemeClr val="lt1"/>
-    </dgm:fillClrLst>
-    <dgm:linClrLst meth="repeat">
-      <a:schemeClr val="accent3"/>
-    </dgm:linClrLst>
-    <dgm:effectClrLst/>
-    <dgm:txLinClrLst/>
-    <dgm:txFillClrLst meth="repeat">
-      <a:schemeClr val="dk1"/>
-    </dgm:txFillClrLst>
-    <dgm:txEffectClrLst/>
-  </dgm:styleLbl>
-  <dgm:styleLbl name="fgAccFollowNode1">
-    <dgm:fillClrLst meth="repeat">
-      <a:schemeClr val="accent3">
-        <a:alpha val="90000"/>
-        <a:tint val="40000"/>
-      </a:schemeClr>
-    </dgm:fillClrLst>
-    <dgm:linClrLst meth="repeat">
-      <a:schemeClr val="accent3">
-        <a:alpha val="90000"/>
-        <a:tint val="40000"/>
-      </a:schemeClr>
-    </dgm:linClrLst>
-    <dgm:effectClrLst/>
-    <dgm:txLinClrLst/>
-    <dgm:txFillClrLst meth="repeat">
-      <a:schemeClr val="dk1"/>
-    </dgm:txFillClrLst>
-    <dgm:txEffectClrLst/>
-  </dgm:styleLbl>
-  <dgm:styleLbl name="alignAccFollowNode1">
-    <dgm:fillClrLst meth="repeat">
-      <a:schemeClr val="accent3">
-        <a:alpha val="90000"/>
-        <a:tint val="40000"/>
-      </a:schemeClr>
-    </dgm:fillClrLst>
-    <dgm:linClrLst meth="repeat">
-      <a:schemeClr val="accent3">
-        <a:alpha val="90000"/>
-        <a:tint val="40000"/>
-      </a:schemeClr>
-    </dgm:linClrLst>
-    <dgm:effectClrLst/>
-    <dgm:txLinClrLst/>
-    <dgm:txFillClrLst meth="repeat">
-      <a:schemeClr val="dk1"/>
-    </dgm:txFillClrLst>
-    <dgm:txEffectClrLst/>
-  </dgm:styleLbl>
-  <dgm:styleLbl name="bgAccFollowNode1">
-    <dgm:fillClrLst meth="repeat">
-      <a:schemeClr val="accent3">
-        <a:alpha val="90000"/>
-        <a:tint val="40000"/>
-      </a:schemeClr>
-    </dgm:fillClrLst>
-    <dgm:linClrLst meth="repeat">
-      <a:schemeClr val="accent3">
-        <a:alpha val="90000"/>
-        <a:tint val="40000"/>
-      </a:schemeClr>
-    </dgm:linClrLst>
-    <dgm:effectClrLst/>
-    <dgm:txLinClrLst/>
-    <dgm:txFillClrLst meth="repeat">
-      <a:schemeClr val="dk1"/>
-    </dgm:txFillClrLst>
-    <dgm:txEffectClrLst/>
-  </dgm:styleLbl>
-  <dgm:styleLbl name="fgAcc0">
-    <dgm:fillClrLst meth="repeat">
-      <a:schemeClr val="lt1">
-        <a:alpha val="90000"/>
-      </a:schemeClr>
-    </dgm:fillClrLst>
-    <dgm:linClrLst meth="repeat">
-      <a:schemeClr val="accent3"/>
-    </dgm:linClrLst>
-    <dgm:effectClrLst/>
-    <dgm:txLinClrLst/>
-    <dgm:txFillClrLst meth="repeat">
-      <a:schemeClr val="dk1"/>
-    </dgm:txFillClrLst>
-    <dgm:txEffectClrLst/>
-  </dgm:styleLbl>
-  <dgm:styleLbl name="fgAcc2">
-    <dgm:fillClrLst meth="repeat">
-      <a:schemeClr val="lt1">
-        <a:alpha val="90000"/>
-      </a:schemeClr>
-    </dgm:fillClrLst>
-    <dgm:linClrLst meth="repeat">
-      <a:schemeClr val="accent3"/>
-    </dgm:linClrLst>
-    <dgm:effectClrLst/>
-    <dgm:txLinClrLst/>
-    <dgm:txFillClrLst meth="repeat">
-      <a:schemeClr val="dk1"/>
-    </dgm:txFillClrLst>
-    <dgm:txEffectClrLst/>
-  </dgm:styleLbl>
-  <dgm:styleLbl name="fgAcc3">
-    <dgm:fillClrLst meth="repeat">
-      <a:schemeClr val="lt1">
-        <a:alpha val="90000"/>
-      </a:schemeClr>
-    </dgm:fillClrLst>
-    <dgm:linClrLst meth="repeat">
-      <a:schemeClr val="accent3"/>
-    </dgm:linClrLst>
-    <dgm:effectClrLst/>
-    <dgm:txLinClrLst/>
-    <dgm:txFillClrLst meth="repeat">
-      <a:schemeClr val="dk1"/>
-    </dgm:txFillClrLst>
-    <dgm:txEffectClrLst/>
-  </dgm:styleLbl>
-  <dgm:styleLbl name="fgAcc4">
-    <dgm:fillClrLst meth="repeat">
-      <a:schemeClr val="lt1">
-        <a:alpha val="90000"/>
-      </a:schemeClr>
-    </dgm:fillClrLst>
-    <dgm:linClrLst meth="repeat">
-      <a:schemeClr val="accent3"/>
-    </dgm:linClrLst>
-    <dgm:effectClrLst/>
-    <dgm:txLinClrLst/>
-    <dgm:txFillClrLst meth="repeat">
-      <a:schemeClr val="dk1"/>
-    </dgm:txFillClrLst>
-    <dgm:txEffectClrLst/>
-  </dgm:styleLbl>
-  <dgm:styleLbl name="bgShp">
-    <dgm:fillClrLst meth="repeat">
-      <a:schemeClr val="accent3">
-        <a:tint val="40000"/>
-      </a:schemeClr>
-    </dgm:fillClrLst>
-    <dgm:linClrLst meth="repeat">
-      <a:schemeClr val="accent3"/>
-    </dgm:linClrLst>
-    <dgm:effectClrLst/>
-    <dgm:txLinClrLst/>
-    <dgm:txFillClrLst meth="repeat">
-      <a:schemeClr val="dk1"/>
-    </dgm:txFillClrLst>
-    <dgm:txEffectClrLst/>
-  </dgm:styleLbl>
-  <dgm:styleLbl name="dkBgShp">
-    <dgm:fillClrLst meth="repeat">
-      <a:schemeClr val="accent3">
-        <a:shade val="80000"/>
-      </a:schemeClr>
-    </dgm:fillClrLst>
-    <dgm:linClrLst meth="repeat">
-      <a:schemeClr val="accent3"/>
-    </dgm:linClrLst>
-    <dgm:effectClrLst/>
-    <dgm:txLinClrLst/>
-    <dgm:txFillClrLst meth="repeat">
-      <a:schemeClr val="lt1"/>
-    </dgm:txFillClrLst>
-    <dgm:txEffectClrLst/>
-  </dgm:styleLbl>
-  <dgm:styleLbl name="trBgShp">
-    <dgm:fillClrLst meth="repeat">
-      <a:schemeClr val="accent3">
-        <a:tint val="50000"/>
-        <a:alpha val="40000"/>
-      </a:schemeClr>
-    </dgm:fillClrLst>
-    <dgm:linClrLst meth="repeat">
-      <a:schemeClr val="accent3"/>
-    </dgm:linClrLst>
-    <dgm:effectClrLst/>
-    <dgm:txLinClrLst/>
-    <dgm:txFillClrLst meth="repeat">
-      <a:schemeClr val="lt1"/>
-    </dgm:txFillClrLst>
-    <dgm:txEffectClrLst/>
-  </dgm:styleLbl>
-  <dgm:styleLbl name="fgShp">
-    <dgm:fillClrLst meth="repeat">
-      <a:schemeClr val="accent3">
-        <a:tint val="60000"/>
-      </a:schemeClr>
-    </dgm:fillClrLst>
-    <dgm:linClrLst meth="repeat">
-      <a:schemeClr val="lt1"/>
-    </dgm:linClrLst>
-    <dgm:effectClrLst/>
-    <dgm:txLinClrLst/>
-    <dgm:txFillClrLst meth="repeat">
-      <a:schemeClr val="dk1"/>
-    </dgm:txFillClrLst>
-    <dgm:txEffectClrLst/>
-  </dgm:styleLbl>
-  <dgm:styleLbl name="revTx">
-    <dgm:fillClrLst meth="repeat">
-      <a:schemeClr val="lt1">
-        <a:alpha val="0"/>
-      </a:schemeClr>
-    </dgm:fillClrLst>
-    <dgm:linClrLst meth="repeat">
-      <a:schemeClr val="dk1">
-        <a:alpha val="0"/>
-      </a:schemeClr>
-    </dgm:linClrLst>
-    <dgm:effectClrLst/>
-    <dgm:txLinClrLst/>
-    <dgm:txFillClrLst meth="repeat">
-      <a:schemeClr val="tx1"/>
-    </dgm:txFillClrLst>
-    <dgm:txEffectClrLst/>
-  </dgm:styleLbl>
-</dgm:colorsDef>
-</file>
-
-<file path=ppt/diagrams/colors5.xml><?xml version="1.0" encoding="utf-8"?>
 <dgm:colorsDef xmlns:dgm="http://schemas.openxmlformats.org/drawingml/2006/diagram" xmlns:a="http://schemas.openxmlformats.org/drawingml/2006/main" uniqueId="urn:microsoft.com/office/officeart/2005/8/colors/colorful2">
   <dgm:title val=""/>
   <dgm:desc val=""/>
@@ -4253,6 +3506,753 @@
     <dgm:fillClrLst meth="repeat">
       <a:schemeClr val="accent2">
         <a:tint val="40000"/>
+      </a:schemeClr>
+    </dgm:fillClrLst>
+    <dgm:linClrLst meth="repeat">
+      <a:schemeClr val="lt1"/>
+    </dgm:linClrLst>
+    <dgm:effectClrLst/>
+    <dgm:txLinClrLst/>
+    <dgm:txFillClrLst meth="repeat">
+      <a:schemeClr val="dk1"/>
+    </dgm:txFillClrLst>
+    <dgm:txEffectClrLst/>
+  </dgm:styleLbl>
+  <dgm:styleLbl name="revTx">
+    <dgm:fillClrLst meth="repeat">
+      <a:schemeClr val="lt1">
+        <a:alpha val="0"/>
+      </a:schemeClr>
+    </dgm:fillClrLst>
+    <dgm:linClrLst meth="repeat">
+      <a:schemeClr val="dk1">
+        <a:alpha val="0"/>
+      </a:schemeClr>
+    </dgm:linClrLst>
+    <dgm:effectClrLst/>
+    <dgm:txLinClrLst/>
+    <dgm:txFillClrLst meth="repeat">
+      <a:schemeClr val="tx1"/>
+    </dgm:txFillClrLst>
+    <dgm:txEffectClrLst/>
+  </dgm:styleLbl>
+</dgm:colorsDef>
+</file>
+
+<file path=ppt/diagrams/colors5.xml><?xml version="1.0" encoding="utf-8"?>
+<dgm:colorsDef xmlns:dgm="http://schemas.openxmlformats.org/drawingml/2006/diagram" xmlns:a="http://schemas.openxmlformats.org/drawingml/2006/main" uniqueId="urn:microsoft.com/office/officeart/2005/8/colors/accent3_2">
+  <dgm:title val=""/>
+  <dgm:desc val=""/>
+  <dgm:catLst>
+    <dgm:cat type="accent3" pri="11200"/>
+  </dgm:catLst>
+  <dgm:styleLbl name="node0">
+    <dgm:fillClrLst meth="repeat">
+      <a:schemeClr val="accent3"/>
+    </dgm:fillClrLst>
+    <dgm:linClrLst meth="repeat">
+      <a:schemeClr val="lt1"/>
+    </dgm:linClrLst>
+    <dgm:effectClrLst/>
+    <dgm:txLinClrLst/>
+    <dgm:txFillClrLst/>
+    <dgm:txEffectClrLst/>
+  </dgm:styleLbl>
+  <dgm:styleLbl name="node1">
+    <dgm:fillClrLst meth="repeat">
+      <a:schemeClr val="accent3"/>
+    </dgm:fillClrLst>
+    <dgm:linClrLst meth="repeat">
+      <a:schemeClr val="lt1"/>
+    </dgm:linClrLst>
+    <dgm:effectClrLst/>
+    <dgm:txLinClrLst/>
+    <dgm:txFillClrLst/>
+    <dgm:txEffectClrLst/>
+  </dgm:styleLbl>
+  <dgm:styleLbl name="alignNode1">
+    <dgm:fillClrLst meth="repeat">
+      <a:schemeClr val="accent3"/>
+    </dgm:fillClrLst>
+    <dgm:linClrLst meth="repeat">
+      <a:schemeClr val="accent3"/>
+    </dgm:linClrLst>
+    <dgm:effectClrLst/>
+    <dgm:txLinClrLst/>
+    <dgm:txFillClrLst/>
+    <dgm:txEffectClrLst/>
+  </dgm:styleLbl>
+  <dgm:styleLbl name="lnNode1">
+    <dgm:fillClrLst meth="repeat">
+      <a:schemeClr val="accent3"/>
+    </dgm:fillClrLst>
+    <dgm:linClrLst meth="repeat">
+      <a:schemeClr val="lt1"/>
+    </dgm:linClrLst>
+    <dgm:effectClrLst/>
+    <dgm:txLinClrLst/>
+    <dgm:txFillClrLst/>
+    <dgm:txEffectClrLst/>
+  </dgm:styleLbl>
+  <dgm:styleLbl name="vennNode1">
+    <dgm:fillClrLst meth="repeat">
+      <a:schemeClr val="accent3">
+        <a:alpha val="50000"/>
+      </a:schemeClr>
+    </dgm:fillClrLst>
+    <dgm:linClrLst meth="repeat">
+      <a:schemeClr val="lt1"/>
+    </dgm:linClrLst>
+    <dgm:effectClrLst/>
+    <dgm:txLinClrLst/>
+    <dgm:txFillClrLst/>
+    <dgm:txEffectClrLst/>
+  </dgm:styleLbl>
+  <dgm:styleLbl name="node2">
+    <dgm:fillClrLst meth="repeat">
+      <a:schemeClr val="accent3"/>
+    </dgm:fillClrLst>
+    <dgm:linClrLst meth="repeat">
+      <a:schemeClr val="lt1"/>
+    </dgm:linClrLst>
+    <dgm:effectClrLst/>
+    <dgm:txLinClrLst/>
+    <dgm:txFillClrLst/>
+    <dgm:txEffectClrLst/>
+  </dgm:styleLbl>
+  <dgm:styleLbl name="node3">
+    <dgm:fillClrLst meth="repeat">
+      <a:schemeClr val="accent3"/>
+    </dgm:fillClrLst>
+    <dgm:linClrLst meth="repeat">
+      <a:schemeClr val="lt1"/>
+    </dgm:linClrLst>
+    <dgm:effectClrLst/>
+    <dgm:txLinClrLst/>
+    <dgm:txFillClrLst/>
+    <dgm:txEffectClrLst/>
+  </dgm:styleLbl>
+  <dgm:styleLbl name="node4">
+    <dgm:fillClrLst meth="repeat">
+      <a:schemeClr val="accent3"/>
+    </dgm:fillClrLst>
+    <dgm:linClrLst meth="repeat">
+      <a:schemeClr val="lt1"/>
+    </dgm:linClrLst>
+    <dgm:effectClrLst/>
+    <dgm:txLinClrLst/>
+    <dgm:txFillClrLst/>
+    <dgm:txEffectClrLst/>
+  </dgm:styleLbl>
+  <dgm:styleLbl name="fgImgPlace1">
+    <dgm:fillClrLst meth="repeat">
+      <a:schemeClr val="accent3">
+        <a:tint val="50000"/>
+      </a:schemeClr>
+    </dgm:fillClrLst>
+    <dgm:linClrLst meth="repeat">
+      <a:schemeClr val="lt1"/>
+    </dgm:linClrLst>
+    <dgm:effectClrLst/>
+    <dgm:txLinClrLst/>
+    <dgm:txFillClrLst meth="repeat">
+      <a:schemeClr val="lt1"/>
+    </dgm:txFillClrLst>
+    <dgm:txEffectClrLst/>
+  </dgm:styleLbl>
+  <dgm:styleLbl name="alignImgPlace1">
+    <dgm:fillClrLst meth="repeat">
+      <a:schemeClr val="accent3">
+        <a:tint val="50000"/>
+      </a:schemeClr>
+    </dgm:fillClrLst>
+    <dgm:linClrLst meth="repeat">
+      <a:schemeClr val="lt1"/>
+    </dgm:linClrLst>
+    <dgm:effectClrLst/>
+    <dgm:txLinClrLst/>
+    <dgm:txFillClrLst meth="repeat">
+      <a:schemeClr val="lt1"/>
+    </dgm:txFillClrLst>
+    <dgm:txEffectClrLst/>
+  </dgm:styleLbl>
+  <dgm:styleLbl name="bgImgPlace1">
+    <dgm:fillClrLst meth="repeat">
+      <a:schemeClr val="accent3">
+        <a:tint val="50000"/>
+      </a:schemeClr>
+    </dgm:fillClrLst>
+    <dgm:linClrLst meth="repeat">
+      <a:schemeClr val="lt1"/>
+    </dgm:linClrLst>
+    <dgm:effectClrLst/>
+    <dgm:txLinClrLst/>
+    <dgm:txFillClrLst meth="repeat">
+      <a:schemeClr val="lt1"/>
+    </dgm:txFillClrLst>
+    <dgm:txEffectClrLst/>
+  </dgm:styleLbl>
+  <dgm:styleLbl name="sibTrans2D1">
+    <dgm:fillClrLst meth="repeat">
+      <a:schemeClr val="accent3">
+        <a:tint val="60000"/>
+      </a:schemeClr>
+    </dgm:fillClrLst>
+    <dgm:linClrLst meth="repeat">
+      <a:schemeClr val="accent3">
+        <a:tint val="60000"/>
+      </a:schemeClr>
+    </dgm:linClrLst>
+    <dgm:effectClrLst/>
+    <dgm:txLinClrLst/>
+    <dgm:txFillClrLst/>
+    <dgm:txEffectClrLst/>
+  </dgm:styleLbl>
+  <dgm:styleLbl name="fgSibTrans2D1">
+    <dgm:fillClrLst meth="repeat">
+      <a:schemeClr val="accent3">
+        <a:tint val="60000"/>
+      </a:schemeClr>
+    </dgm:fillClrLst>
+    <dgm:linClrLst meth="repeat">
+      <a:schemeClr val="accent3">
+        <a:tint val="60000"/>
+      </a:schemeClr>
+    </dgm:linClrLst>
+    <dgm:effectClrLst/>
+    <dgm:txLinClrLst/>
+    <dgm:txFillClrLst/>
+    <dgm:txEffectClrLst/>
+  </dgm:styleLbl>
+  <dgm:styleLbl name="bgSibTrans2D1">
+    <dgm:fillClrLst meth="repeat">
+      <a:schemeClr val="accent3">
+        <a:tint val="60000"/>
+      </a:schemeClr>
+    </dgm:fillClrLst>
+    <dgm:linClrLst meth="repeat">
+      <a:schemeClr val="accent3">
+        <a:tint val="60000"/>
+      </a:schemeClr>
+    </dgm:linClrLst>
+    <dgm:effectClrLst/>
+    <dgm:txLinClrLst/>
+    <dgm:txFillClrLst/>
+    <dgm:txEffectClrLst/>
+  </dgm:styleLbl>
+  <dgm:styleLbl name="sibTrans1D1">
+    <dgm:fillClrLst meth="repeat">
+      <a:schemeClr val="accent3"/>
+    </dgm:fillClrLst>
+    <dgm:linClrLst meth="repeat">
+      <a:schemeClr val="accent3"/>
+    </dgm:linClrLst>
+    <dgm:effectClrLst/>
+    <dgm:txLinClrLst/>
+    <dgm:txFillClrLst meth="repeat">
+      <a:schemeClr val="tx1"/>
+    </dgm:txFillClrLst>
+    <dgm:txEffectClrLst/>
+  </dgm:styleLbl>
+  <dgm:styleLbl name="callout">
+    <dgm:fillClrLst meth="repeat">
+      <a:schemeClr val="accent3"/>
+    </dgm:fillClrLst>
+    <dgm:linClrLst meth="repeat">
+      <a:schemeClr val="accent3">
+        <a:tint val="50000"/>
+      </a:schemeClr>
+    </dgm:linClrLst>
+    <dgm:effectClrLst/>
+    <dgm:txLinClrLst/>
+    <dgm:txFillClrLst meth="repeat">
+      <a:schemeClr val="tx1"/>
+    </dgm:txFillClrLst>
+    <dgm:txEffectClrLst/>
+  </dgm:styleLbl>
+  <dgm:styleLbl name="asst0">
+    <dgm:fillClrLst meth="repeat">
+      <a:schemeClr val="accent3"/>
+    </dgm:fillClrLst>
+    <dgm:linClrLst meth="repeat">
+      <a:schemeClr val="lt1"/>
+    </dgm:linClrLst>
+    <dgm:effectClrLst/>
+    <dgm:txLinClrLst/>
+    <dgm:txFillClrLst/>
+    <dgm:txEffectClrLst/>
+  </dgm:styleLbl>
+  <dgm:styleLbl name="asst1">
+    <dgm:fillClrLst meth="repeat">
+      <a:schemeClr val="accent3"/>
+    </dgm:fillClrLst>
+    <dgm:linClrLst meth="repeat">
+      <a:schemeClr val="lt1"/>
+    </dgm:linClrLst>
+    <dgm:effectClrLst/>
+    <dgm:txLinClrLst/>
+    <dgm:txFillClrLst/>
+    <dgm:txEffectClrLst/>
+  </dgm:styleLbl>
+  <dgm:styleLbl name="asst2">
+    <dgm:fillClrLst meth="repeat">
+      <a:schemeClr val="accent3"/>
+    </dgm:fillClrLst>
+    <dgm:linClrLst meth="repeat">
+      <a:schemeClr val="lt1"/>
+    </dgm:linClrLst>
+    <dgm:effectClrLst/>
+    <dgm:txLinClrLst/>
+    <dgm:txFillClrLst/>
+    <dgm:txEffectClrLst/>
+  </dgm:styleLbl>
+  <dgm:styleLbl name="asst3">
+    <dgm:fillClrLst meth="repeat">
+      <a:schemeClr val="accent3"/>
+    </dgm:fillClrLst>
+    <dgm:linClrLst meth="repeat">
+      <a:schemeClr val="lt1"/>
+    </dgm:linClrLst>
+    <dgm:effectClrLst/>
+    <dgm:txLinClrLst/>
+    <dgm:txFillClrLst/>
+    <dgm:txEffectClrLst/>
+  </dgm:styleLbl>
+  <dgm:styleLbl name="asst4">
+    <dgm:fillClrLst meth="repeat">
+      <a:schemeClr val="accent3"/>
+    </dgm:fillClrLst>
+    <dgm:linClrLst meth="repeat">
+      <a:schemeClr val="lt1"/>
+    </dgm:linClrLst>
+    <dgm:effectClrLst/>
+    <dgm:txLinClrLst/>
+    <dgm:txFillClrLst/>
+    <dgm:txEffectClrLst/>
+  </dgm:styleLbl>
+  <dgm:styleLbl name="parChTrans2D1">
+    <dgm:fillClrLst meth="repeat">
+      <a:schemeClr val="accent3">
+        <a:tint val="60000"/>
+      </a:schemeClr>
+    </dgm:fillClrLst>
+    <dgm:linClrLst meth="repeat">
+      <a:schemeClr val="accent3">
+        <a:tint val="60000"/>
+      </a:schemeClr>
+    </dgm:linClrLst>
+    <dgm:effectClrLst/>
+    <dgm:txLinClrLst/>
+    <dgm:txFillClrLst meth="repeat">
+      <a:schemeClr val="lt1"/>
+    </dgm:txFillClrLst>
+    <dgm:txEffectClrLst/>
+  </dgm:styleLbl>
+  <dgm:styleLbl name="parChTrans2D2">
+    <dgm:fillClrLst meth="repeat">
+      <a:schemeClr val="accent3"/>
+    </dgm:fillClrLst>
+    <dgm:linClrLst meth="repeat">
+      <a:schemeClr val="accent3"/>
+    </dgm:linClrLst>
+    <dgm:effectClrLst/>
+    <dgm:txLinClrLst/>
+    <dgm:txFillClrLst meth="repeat">
+      <a:schemeClr val="lt1"/>
+    </dgm:txFillClrLst>
+    <dgm:txEffectClrLst/>
+  </dgm:styleLbl>
+  <dgm:styleLbl name="parChTrans2D3">
+    <dgm:fillClrLst meth="repeat">
+      <a:schemeClr val="accent3"/>
+    </dgm:fillClrLst>
+    <dgm:linClrLst meth="repeat">
+      <a:schemeClr val="accent3"/>
+    </dgm:linClrLst>
+    <dgm:effectClrLst/>
+    <dgm:txLinClrLst/>
+    <dgm:txFillClrLst meth="repeat">
+      <a:schemeClr val="lt1"/>
+    </dgm:txFillClrLst>
+    <dgm:txEffectClrLst/>
+  </dgm:styleLbl>
+  <dgm:styleLbl name="parChTrans2D4">
+    <dgm:fillClrLst meth="repeat">
+      <a:schemeClr val="accent3"/>
+    </dgm:fillClrLst>
+    <dgm:linClrLst meth="repeat">
+      <a:schemeClr val="accent3"/>
+    </dgm:linClrLst>
+    <dgm:effectClrLst/>
+    <dgm:txLinClrLst/>
+    <dgm:txFillClrLst meth="repeat">
+      <a:schemeClr val="lt1"/>
+    </dgm:txFillClrLst>
+    <dgm:txEffectClrLst/>
+  </dgm:styleLbl>
+  <dgm:styleLbl name="parChTrans1D1">
+    <dgm:fillClrLst meth="repeat">
+      <a:schemeClr val="accent3"/>
+    </dgm:fillClrLst>
+    <dgm:linClrLst meth="repeat">
+      <a:schemeClr val="accent3">
+        <a:shade val="60000"/>
+      </a:schemeClr>
+    </dgm:linClrLst>
+    <dgm:effectClrLst/>
+    <dgm:txLinClrLst/>
+    <dgm:txFillClrLst meth="repeat">
+      <a:schemeClr val="tx1"/>
+    </dgm:txFillClrLst>
+    <dgm:txEffectClrLst/>
+  </dgm:styleLbl>
+  <dgm:styleLbl name="parChTrans1D2">
+    <dgm:fillClrLst meth="repeat">
+      <a:schemeClr val="accent3"/>
+    </dgm:fillClrLst>
+    <dgm:linClrLst meth="repeat">
+      <a:schemeClr val="accent3">
+        <a:shade val="60000"/>
+      </a:schemeClr>
+    </dgm:linClrLst>
+    <dgm:effectClrLst/>
+    <dgm:txLinClrLst/>
+    <dgm:txFillClrLst meth="repeat">
+      <a:schemeClr val="tx1"/>
+    </dgm:txFillClrLst>
+    <dgm:txEffectClrLst/>
+  </dgm:styleLbl>
+  <dgm:styleLbl name="parChTrans1D3">
+    <dgm:fillClrLst meth="repeat">
+      <a:schemeClr val="accent3"/>
+    </dgm:fillClrLst>
+    <dgm:linClrLst meth="repeat">
+      <a:schemeClr val="accent3">
+        <a:shade val="80000"/>
+      </a:schemeClr>
+    </dgm:linClrLst>
+    <dgm:effectClrLst/>
+    <dgm:txLinClrLst/>
+    <dgm:txFillClrLst meth="repeat">
+      <a:schemeClr val="tx1"/>
+    </dgm:txFillClrLst>
+    <dgm:txEffectClrLst/>
+  </dgm:styleLbl>
+  <dgm:styleLbl name="parChTrans1D4">
+    <dgm:fillClrLst meth="repeat">
+      <a:schemeClr val="accent3"/>
+    </dgm:fillClrLst>
+    <dgm:linClrLst meth="repeat">
+      <a:schemeClr val="accent3">
+        <a:shade val="80000"/>
+      </a:schemeClr>
+    </dgm:linClrLst>
+    <dgm:effectClrLst/>
+    <dgm:txLinClrLst/>
+    <dgm:txFillClrLst meth="repeat">
+      <a:schemeClr val="tx1"/>
+    </dgm:txFillClrLst>
+    <dgm:txEffectClrLst/>
+  </dgm:styleLbl>
+  <dgm:styleLbl name="fgAcc1">
+    <dgm:fillClrLst meth="repeat">
+      <a:schemeClr val="lt1">
+        <a:alpha val="90000"/>
+      </a:schemeClr>
+    </dgm:fillClrLst>
+    <dgm:linClrLst meth="repeat">
+      <a:schemeClr val="accent3"/>
+    </dgm:linClrLst>
+    <dgm:effectClrLst/>
+    <dgm:txLinClrLst/>
+    <dgm:txFillClrLst meth="repeat">
+      <a:schemeClr val="dk1"/>
+    </dgm:txFillClrLst>
+    <dgm:txEffectClrLst/>
+  </dgm:styleLbl>
+  <dgm:styleLbl name="conFgAcc1">
+    <dgm:fillClrLst meth="repeat">
+      <a:schemeClr val="lt1">
+        <a:alpha val="90000"/>
+      </a:schemeClr>
+    </dgm:fillClrLst>
+    <dgm:linClrLst meth="repeat">
+      <a:schemeClr val="accent3"/>
+    </dgm:linClrLst>
+    <dgm:effectClrLst/>
+    <dgm:txLinClrLst/>
+    <dgm:txFillClrLst meth="repeat">
+      <a:schemeClr val="dk1"/>
+    </dgm:txFillClrLst>
+    <dgm:txEffectClrLst/>
+  </dgm:styleLbl>
+  <dgm:styleLbl name="alignAcc1">
+    <dgm:fillClrLst meth="repeat">
+      <a:schemeClr val="lt1">
+        <a:alpha val="90000"/>
+      </a:schemeClr>
+    </dgm:fillClrLst>
+    <dgm:linClrLst meth="repeat">
+      <a:schemeClr val="accent3"/>
+    </dgm:linClrLst>
+    <dgm:effectClrLst/>
+    <dgm:txLinClrLst/>
+    <dgm:txFillClrLst meth="repeat">
+      <a:schemeClr val="dk1"/>
+    </dgm:txFillClrLst>
+    <dgm:txEffectClrLst/>
+  </dgm:styleLbl>
+  <dgm:styleLbl name="trAlignAcc1">
+    <dgm:fillClrLst meth="repeat">
+      <a:schemeClr val="lt1">
+        <a:alpha val="40000"/>
+      </a:schemeClr>
+    </dgm:fillClrLst>
+    <dgm:linClrLst meth="repeat">
+      <a:schemeClr val="accent3"/>
+    </dgm:linClrLst>
+    <dgm:effectClrLst/>
+    <dgm:txLinClrLst/>
+    <dgm:txFillClrLst meth="repeat">
+      <a:schemeClr val="dk1"/>
+    </dgm:txFillClrLst>
+    <dgm:txEffectClrLst/>
+  </dgm:styleLbl>
+  <dgm:styleLbl name="bgAcc1">
+    <dgm:fillClrLst meth="repeat">
+      <a:schemeClr val="lt1">
+        <a:alpha val="90000"/>
+      </a:schemeClr>
+    </dgm:fillClrLst>
+    <dgm:linClrLst meth="repeat">
+      <a:schemeClr val="accent3"/>
+    </dgm:linClrLst>
+    <dgm:effectClrLst/>
+    <dgm:txLinClrLst/>
+    <dgm:txFillClrLst meth="repeat">
+      <a:schemeClr val="dk1"/>
+    </dgm:txFillClrLst>
+    <dgm:txEffectClrLst/>
+  </dgm:styleLbl>
+  <dgm:styleLbl name="solidFgAcc1">
+    <dgm:fillClrLst meth="repeat">
+      <a:schemeClr val="lt1"/>
+    </dgm:fillClrLst>
+    <dgm:linClrLst meth="repeat">
+      <a:schemeClr val="accent3"/>
+    </dgm:linClrLst>
+    <dgm:effectClrLst/>
+    <dgm:txLinClrLst/>
+    <dgm:txFillClrLst meth="repeat">
+      <a:schemeClr val="dk1"/>
+    </dgm:txFillClrLst>
+    <dgm:txEffectClrLst/>
+  </dgm:styleLbl>
+  <dgm:styleLbl name="solidAlignAcc1">
+    <dgm:fillClrLst meth="repeat">
+      <a:schemeClr val="lt1"/>
+    </dgm:fillClrLst>
+    <dgm:linClrLst meth="repeat">
+      <a:schemeClr val="accent3"/>
+    </dgm:linClrLst>
+    <dgm:effectClrLst/>
+    <dgm:txLinClrLst/>
+    <dgm:txFillClrLst meth="repeat">
+      <a:schemeClr val="dk1"/>
+    </dgm:txFillClrLst>
+    <dgm:txEffectClrLst/>
+  </dgm:styleLbl>
+  <dgm:styleLbl name="solidBgAcc1">
+    <dgm:fillClrLst meth="repeat">
+      <a:schemeClr val="lt1"/>
+    </dgm:fillClrLst>
+    <dgm:linClrLst meth="repeat">
+      <a:schemeClr val="accent3"/>
+    </dgm:linClrLst>
+    <dgm:effectClrLst/>
+    <dgm:txLinClrLst/>
+    <dgm:txFillClrLst meth="repeat">
+      <a:schemeClr val="dk1"/>
+    </dgm:txFillClrLst>
+    <dgm:txEffectClrLst/>
+  </dgm:styleLbl>
+  <dgm:styleLbl name="fgAccFollowNode1">
+    <dgm:fillClrLst meth="repeat">
+      <a:schemeClr val="accent3">
+        <a:alpha val="90000"/>
+        <a:tint val="40000"/>
+      </a:schemeClr>
+    </dgm:fillClrLst>
+    <dgm:linClrLst meth="repeat">
+      <a:schemeClr val="accent3">
+        <a:alpha val="90000"/>
+        <a:tint val="40000"/>
+      </a:schemeClr>
+    </dgm:linClrLst>
+    <dgm:effectClrLst/>
+    <dgm:txLinClrLst/>
+    <dgm:txFillClrLst meth="repeat">
+      <a:schemeClr val="dk1"/>
+    </dgm:txFillClrLst>
+    <dgm:txEffectClrLst/>
+  </dgm:styleLbl>
+  <dgm:styleLbl name="alignAccFollowNode1">
+    <dgm:fillClrLst meth="repeat">
+      <a:schemeClr val="accent3">
+        <a:alpha val="90000"/>
+        <a:tint val="40000"/>
+      </a:schemeClr>
+    </dgm:fillClrLst>
+    <dgm:linClrLst meth="repeat">
+      <a:schemeClr val="accent3">
+        <a:alpha val="90000"/>
+        <a:tint val="40000"/>
+      </a:schemeClr>
+    </dgm:linClrLst>
+    <dgm:effectClrLst/>
+    <dgm:txLinClrLst/>
+    <dgm:txFillClrLst meth="repeat">
+      <a:schemeClr val="dk1"/>
+    </dgm:txFillClrLst>
+    <dgm:txEffectClrLst/>
+  </dgm:styleLbl>
+  <dgm:styleLbl name="bgAccFollowNode1">
+    <dgm:fillClrLst meth="repeat">
+      <a:schemeClr val="accent3">
+        <a:alpha val="90000"/>
+        <a:tint val="40000"/>
+      </a:schemeClr>
+    </dgm:fillClrLst>
+    <dgm:linClrLst meth="repeat">
+      <a:schemeClr val="accent3">
+        <a:alpha val="90000"/>
+        <a:tint val="40000"/>
+      </a:schemeClr>
+    </dgm:linClrLst>
+    <dgm:effectClrLst/>
+    <dgm:txLinClrLst/>
+    <dgm:txFillClrLst meth="repeat">
+      <a:schemeClr val="dk1"/>
+    </dgm:txFillClrLst>
+    <dgm:txEffectClrLst/>
+  </dgm:styleLbl>
+  <dgm:styleLbl name="fgAcc0">
+    <dgm:fillClrLst meth="repeat">
+      <a:schemeClr val="lt1">
+        <a:alpha val="90000"/>
+      </a:schemeClr>
+    </dgm:fillClrLst>
+    <dgm:linClrLst meth="repeat">
+      <a:schemeClr val="accent3"/>
+    </dgm:linClrLst>
+    <dgm:effectClrLst/>
+    <dgm:txLinClrLst/>
+    <dgm:txFillClrLst meth="repeat">
+      <a:schemeClr val="dk1"/>
+    </dgm:txFillClrLst>
+    <dgm:txEffectClrLst/>
+  </dgm:styleLbl>
+  <dgm:styleLbl name="fgAcc2">
+    <dgm:fillClrLst meth="repeat">
+      <a:schemeClr val="lt1">
+        <a:alpha val="90000"/>
+      </a:schemeClr>
+    </dgm:fillClrLst>
+    <dgm:linClrLst meth="repeat">
+      <a:schemeClr val="accent3"/>
+    </dgm:linClrLst>
+    <dgm:effectClrLst/>
+    <dgm:txLinClrLst/>
+    <dgm:txFillClrLst meth="repeat">
+      <a:schemeClr val="dk1"/>
+    </dgm:txFillClrLst>
+    <dgm:txEffectClrLst/>
+  </dgm:styleLbl>
+  <dgm:styleLbl name="fgAcc3">
+    <dgm:fillClrLst meth="repeat">
+      <a:schemeClr val="lt1">
+        <a:alpha val="90000"/>
+      </a:schemeClr>
+    </dgm:fillClrLst>
+    <dgm:linClrLst meth="repeat">
+      <a:schemeClr val="accent3"/>
+    </dgm:linClrLst>
+    <dgm:effectClrLst/>
+    <dgm:txLinClrLst/>
+    <dgm:txFillClrLst meth="repeat">
+      <a:schemeClr val="dk1"/>
+    </dgm:txFillClrLst>
+    <dgm:txEffectClrLst/>
+  </dgm:styleLbl>
+  <dgm:styleLbl name="fgAcc4">
+    <dgm:fillClrLst meth="repeat">
+      <a:schemeClr val="lt1">
+        <a:alpha val="90000"/>
+      </a:schemeClr>
+    </dgm:fillClrLst>
+    <dgm:linClrLst meth="repeat">
+      <a:schemeClr val="accent3"/>
+    </dgm:linClrLst>
+    <dgm:effectClrLst/>
+    <dgm:txLinClrLst/>
+    <dgm:txFillClrLst meth="repeat">
+      <a:schemeClr val="dk1"/>
+    </dgm:txFillClrLst>
+    <dgm:txEffectClrLst/>
+  </dgm:styleLbl>
+  <dgm:styleLbl name="bgShp">
+    <dgm:fillClrLst meth="repeat">
+      <a:schemeClr val="accent3">
+        <a:tint val="40000"/>
+      </a:schemeClr>
+    </dgm:fillClrLst>
+    <dgm:linClrLst meth="repeat">
+      <a:schemeClr val="accent3"/>
+    </dgm:linClrLst>
+    <dgm:effectClrLst/>
+    <dgm:txLinClrLst/>
+    <dgm:txFillClrLst meth="repeat">
+      <a:schemeClr val="dk1"/>
+    </dgm:txFillClrLst>
+    <dgm:txEffectClrLst/>
+  </dgm:styleLbl>
+  <dgm:styleLbl name="dkBgShp">
+    <dgm:fillClrLst meth="repeat">
+      <a:schemeClr val="accent3">
+        <a:shade val="80000"/>
+      </a:schemeClr>
+    </dgm:fillClrLst>
+    <dgm:linClrLst meth="repeat">
+      <a:schemeClr val="accent3"/>
+    </dgm:linClrLst>
+    <dgm:effectClrLst/>
+    <dgm:txLinClrLst/>
+    <dgm:txFillClrLst meth="repeat">
+      <a:schemeClr val="lt1"/>
+    </dgm:txFillClrLst>
+    <dgm:txEffectClrLst/>
+  </dgm:styleLbl>
+  <dgm:styleLbl name="trBgShp">
+    <dgm:fillClrLst meth="repeat">
+      <a:schemeClr val="accent3">
+        <a:tint val="50000"/>
+        <a:alpha val="40000"/>
+      </a:schemeClr>
+    </dgm:fillClrLst>
+    <dgm:linClrLst meth="repeat">
+      <a:schemeClr val="accent3"/>
+    </dgm:linClrLst>
+    <dgm:effectClrLst/>
+    <dgm:txLinClrLst/>
+    <dgm:txFillClrLst meth="repeat">
+      <a:schemeClr val="lt1"/>
+    </dgm:txFillClrLst>
+    <dgm:txEffectClrLst/>
+  </dgm:styleLbl>
+  <dgm:styleLbl name="fgShp">
+    <dgm:fillClrLst meth="repeat">
+      <a:schemeClr val="accent3">
+        <a:tint val="60000"/>
       </a:schemeClr>
     </dgm:fillClrLst>
     <dgm:linClrLst meth="repeat">
@@ -5506,6 +5506,540 @@
 <file path=ppt/diagrams/data4.xml><?xml version="1.0" encoding="utf-8"?>
 <dgm:dataModel xmlns:dgm="http://schemas.openxmlformats.org/drawingml/2006/diagram" xmlns:a="http://schemas.openxmlformats.org/drawingml/2006/main">
   <dgm:ptLst>
+    <dgm:pt modelId="{D18A70FB-C6B8-4D41-8E25-76E705DFC639}" type="doc">
+      <dgm:prSet loTypeId="urn:microsoft.com/office/officeart/2005/8/layout/default" loCatId="list" qsTypeId="urn:microsoft.com/office/officeart/2005/8/quickstyle/simple1" qsCatId="simple" csTypeId="urn:microsoft.com/office/officeart/2005/8/colors/colorful2" csCatId="colorful"/>
+      <dgm:spPr/>
+      <dgm:t>
+        <a:bodyPr/>
+        <a:lstStyle/>
+        <a:p>
+          <a:endParaRPr lang="en-US"/>
+        </a:p>
+      </dgm:t>
+    </dgm:pt>
+    <dgm:pt modelId="{1C23550A-44CA-479B-ABEE-39F4EFB63893}">
+      <dgm:prSet/>
+      <dgm:spPr/>
+      <dgm:t>
+        <a:bodyPr/>
+        <a:lstStyle/>
+        <a:p>
+          <a:r>
+            <a:rPr lang="en-US"/>
+            <a:t>Legal word checking</a:t>
+          </a:r>
+        </a:p>
+      </dgm:t>
+    </dgm:pt>
+    <dgm:pt modelId="{A03FA08C-7F35-4BE1-9151-30727F97B412}" type="parTrans" cxnId="{E6779B19-6F04-46EA-A61E-7F016C9C6E3F}">
+      <dgm:prSet/>
+      <dgm:spPr/>
+      <dgm:t>
+        <a:bodyPr/>
+        <a:lstStyle/>
+        <a:p>
+          <a:endParaRPr lang="en-US"/>
+        </a:p>
+      </dgm:t>
+    </dgm:pt>
+    <dgm:pt modelId="{BEA31556-536E-404B-BEC6-B8671E30073A}" type="sibTrans" cxnId="{E6779B19-6F04-46EA-A61E-7F016C9C6E3F}">
+      <dgm:prSet/>
+      <dgm:spPr/>
+      <dgm:t>
+        <a:bodyPr/>
+        <a:lstStyle/>
+        <a:p>
+          <a:endParaRPr lang="en-US"/>
+        </a:p>
+      </dgm:t>
+    </dgm:pt>
+    <dgm:pt modelId="{5FB70007-B1CA-4F61-B5D9-38C0C9E119E6}">
+      <dgm:prSet/>
+      <dgm:spPr/>
+      <dgm:t>
+        <a:bodyPr/>
+        <a:lstStyle/>
+        <a:p>
+          <a:r>
+            <a:rPr lang="en-US"/>
+            <a:t>Custom legal word checking dictionaries</a:t>
+          </a:r>
+        </a:p>
+      </dgm:t>
+    </dgm:pt>
+    <dgm:pt modelId="{CEA2B7D3-4208-4166-AD58-7AE7F338DDFD}" type="parTrans" cxnId="{07AE5629-6E32-4177-B4D9-A922E5B469E9}">
+      <dgm:prSet/>
+      <dgm:spPr/>
+      <dgm:t>
+        <a:bodyPr/>
+        <a:lstStyle/>
+        <a:p>
+          <a:endParaRPr lang="en-US"/>
+        </a:p>
+      </dgm:t>
+    </dgm:pt>
+    <dgm:pt modelId="{B8C39E32-8237-48A2-8826-5D1128C98C66}" type="sibTrans" cxnId="{07AE5629-6E32-4177-B4D9-A922E5B469E9}">
+      <dgm:prSet/>
+      <dgm:spPr/>
+      <dgm:t>
+        <a:bodyPr/>
+        <a:lstStyle/>
+        <a:p>
+          <a:endParaRPr lang="en-US"/>
+        </a:p>
+      </dgm:t>
+    </dgm:pt>
+    <dgm:pt modelId="{9A3BFD81-B03D-4DFF-ACAA-FB7FBF6A173F}">
+      <dgm:prSet/>
+      <dgm:spPr/>
+      <dgm:t>
+        <a:bodyPr/>
+        <a:lstStyle/>
+        <a:p>
+          <a:r>
+            <a:rPr lang="en-US"/>
+            <a:t>Acronyms</a:t>
+          </a:r>
+        </a:p>
+      </dgm:t>
+    </dgm:pt>
+    <dgm:pt modelId="{4E89DF91-A1DD-4895-8CC3-965F9A591A19}" type="parTrans" cxnId="{2F87CD70-4B7A-4C19-99E4-8733B7AFBEF0}">
+      <dgm:prSet/>
+      <dgm:spPr/>
+      <dgm:t>
+        <a:bodyPr/>
+        <a:lstStyle/>
+        <a:p>
+          <a:endParaRPr lang="en-US"/>
+        </a:p>
+      </dgm:t>
+    </dgm:pt>
+    <dgm:pt modelId="{86DECF8C-7C1C-483D-B257-AEFB0B39540C}" type="sibTrans" cxnId="{2F87CD70-4B7A-4C19-99E4-8733B7AFBEF0}">
+      <dgm:prSet/>
+      <dgm:spPr/>
+      <dgm:t>
+        <a:bodyPr/>
+        <a:lstStyle/>
+        <a:p>
+          <a:endParaRPr lang="en-US"/>
+        </a:p>
+      </dgm:t>
+    </dgm:pt>
+    <dgm:pt modelId="{7652E984-63FA-4A4C-9E81-8D9FE7EBF82C}">
+      <dgm:prSet/>
+      <dgm:spPr/>
+      <dgm:t>
+        <a:bodyPr/>
+        <a:lstStyle/>
+        <a:p>
+          <a:r>
+            <a:rPr lang="en-US"/>
+            <a:t>Foreign language</a:t>
+          </a:r>
+        </a:p>
+      </dgm:t>
+    </dgm:pt>
+    <dgm:pt modelId="{42C0C48C-4D99-4C4E-B857-7D8B8C57E7C9}" type="parTrans" cxnId="{1D4A9E82-C755-4C4C-B859-10C1047B4449}">
+      <dgm:prSet/>
+      <dgm:spPr/>
+      <dgm:t>
+        <a:bodyPr/>
+        <a:lstStyle/>
+        <a:p>
+          <a:endParaRPr lang="en-US"/>
+        </a:p>
+      </dgm:t>
+    </dgm:pt>
+    <dgm:pt modelId="{F4994F22-2FF4-4A7A-8F53-4277C5AE353D}" type="sibTrans" cxnId="{1D4A9E82-C755-4C4C-B859-10C1047B4449}">
+      <dgm:prSet/>
+      <dgm:spPr/>
+      <dgm:t>
+        <a:bodyPr/>
+        <a:lstStyle/>
+        <a:p>
+          <a:endParaRPr lang="en-US"/>
+        </a:p>
+      </dgm:t>
+    </dgm:pt>
+    <dgm:pt modelId="{B21AE485-6E47-4FF8-8D4C-72F3377E8B56}">
+      <dgm:prSet/>
+      <dgm:spPr/>
+      <dgm:t>
+        <a:bodyPr/>
+        <a:lstStyle/>
+        <a:p>
+          <a:r>
+            <a:rPr lang="en-US"/>
+            <a:t>Slang</a:t>
+          </a:r>
+        </a:p>
+      </dgm:t>
+    </dgm:pt>
+    <dgm:pt modelId="{1C29C88C-EEFD-4F47-B649-2EA7E7F6E02C}" type="parTrans" cxnId="{C6C2421A-7384-4264-9AE5-781B3F48DD43}">
+      <dgm:prSet/>
+      <dgm:spPr/>
+      <dgm:t>
+        <a:bodyPr/>
+        <a:lstStyle/>
+        <a:p>
+          <a:endParaRPr lang="en-US"/>
+        </a:p>
+      </dgm:t>
+    </dgm:pt>
+    <dgm:pt modelId="{42F66939-761F-49BC-B8C4-A2D024FDFDDF}" type="sibTrans" cxnId="{C6C2421A-7384-4264-9AE5-781B3F48DD43}">
+      <dgm:prSet/>
+      <dgm:spPr/>
+      <dgm:t>
+        <a:bodyPr/>
+        <a:lstStyle/>
+        <a:p>
+          <a:endParaRPr lang="en-US"/>
+        </a:p>
+      </dgm:t>
+    </dgm:pt>
+    <dgm:pt modelId="{5D6971A4-C7F8-4EA7-824F-11F73AE92D62}">
+      <dgm:prSet/>
+      <dgm:spPr/>
+      <dgm:t>
+        <a:bodyPr/>
+        <a:lstStyle/>
+        <a:p>
+          <a:r>
+            <a:rPr lang="en-US"/>
+            <a:t>Display word definitions</a:t>
+          </a:r>
+        </a:p>
+      </dgm:t>
+    </dgm:pt>
+    <dgm:pt modelId="{AFC705A3-C25E-40C3-999A-A3A976FB7724}" type="parTrans" cxnId="{280A34A8-85AC-4B2B-A798-8BE5A9DCFCFE}">
+      <dgm:prSet/>
+      <dgm:spPr/>
+      <dgm:t>
+        <a:bodyPr/>
+        <a:lstStyle/>
+        <a:p>
+          <a:endParaRPr lang="en-US"/>
+        </a:p>
+      </dgm:t>
+    </dgm:pt>
+    <dgm:pt modelId="{0A131A74-41DB-42ED-938A-FBA28BCFE8CF}" type="sibTrans" cxnId="{280A34A8-85AC-4B2B-A798-8BE5A9DCFCFE}">
+      <dgm:prSet/>
+      <dgm:spPr/>
+      <dgm:t>
+        <a:bodyPr/>
+        <a:lstStyle/>
+        <a:p>
+          <a:endParaRPr lang="en-US"/>
+        </a:p>
+      </dgm:t>
+    </dgm:pt>
+    <dgm:pt modelId="{3320D6A3-4697-47C6-A08D-DD25CDEBA662}">
+      <dgm:prSet/>
+      <dgm:spPr/>
+      <dgm:t>
+        <a:bodyPr/>
+        <a:lstStyle/>
+        <a:p>
+          <a:r>
+            <a:rPr lang="en-US"/>
+            <a:t>Realtime word validation</a:t>
+          </a:r>
+        </a:p>
+      </dgm:t>
+    </dgm:pt>
+    <dgm:pt modelId="{16558905-D569-45BB-9284-D224B0EBDBD2}" type="parTrans" cxnId="{3C969EEA-DC54-43A7-8544-E2F3ABE51829}">
+      <dgm:prSet/>
+      <dgm:spPr/>
+      <dgm:t>
+        <a:bodyPr/>
+        <a:lstStyle/>
+        <a:p>
+          <a:endParaRPr lang="en-US"/>
+        </a:p>
+      </dgm:t>
+    </dgm:pt>
+    <dgm:pt modelId="{7782C75C-7E79-4F94-A8FC-C4200DB8C9E1}" type="sibTrans" cxnId="{3C969EEA-DC54-43A7-8544-E2F3ABE51829}">
+      <dgm:prSet/>
+      <dgm:spPr/>
+      <dgm:t>
+        <a:bodyPr/>
+        <a:lstStyle/>
+        <a:p>
+          <a:endParaRPr lang="en-US"/>
+        </a:p>
+      </dgm:t>
+    </dgm:pt>
+    <dgm:pt modelId="{CEDFE102-B0BD-498D-A9F3-BD4DE2B2C325}">
+      <dgm:prSet/>
+      <dgm:spPr/>
+      <dgm:t>
+        <a:bodyPr/>
+        <a:lstStyle/>
+        <a:p>
+          <a:r>
+            <a:rPr lang="en-US"/>
+            <a:t>Game modifiers </a:t>
+          </a:r>
+        </a:p>
+      </dgm:t>
+    </dgm:pt>
+    <dgm:pt modelId="{6E6F0D8D-8A41-46A8-91F7-1FE20DC94D0B}" type="parTrans" cxnId="{9A6DA9DE-7311-4B7E-BBDD-EFC85F609A28}">
+      <dgm:prSet/>
+      <dgm:spPr/>
+      <dgm:t>
+        <a:bodyPr/>
+        <a:lstStyle/>
+        <a:p>
+          <a:endParaRPr lang="en-US"/>
+        </a:p>
+      </dgm:t>
+    </dgm:pt>
+    <dgm:pt modelId="{9A68587D-2CF4-45D5-96FA-4F79B356BD89}" type="sibTrans" cxnId="{9A6DA9DE-7311-4B7E-BBDD-EFC85F609A28}">
+      <dgm:prSet/>
+      <dgm:spPr/>
+      <dgm:t>
+        <a:bodyPr/>
+        <a:lstStyle/>
+        <a:p>
+          <a:endParaRPr lang="en-US"/>
+        </a:p>
+      </dgm:t>
+    </dgm:pt>
+    <dgm:pt modelId="{1380D75D-64A8-4EDB-994B-38F139ED1C4C}">
+      <dgm:prSet/>
+      <dgm:spPr/>
+      <dgm:t>
+        <a:bodyPr/>
+        <a:lstStyle/>
+        <a:p>
+          <a:r>
+            <a:rPr lang="en-US"/>
+            <a:t>Tile/word limits</a:t>
+          </a:r>
+        </a:p>
+      </dgm:t>
+    </dgm:pt>
+    <dgm:pt modelId="{9FD7E34E-7E7F-423E-A3F7-C3F5A2F8D2E2}" type="parTrans" cxnId="{F39F76F8-BD60-4767-AD9B-15741CE0A579}">
+      <dgm:prSet/>
+      <dgm:spPr/>
+      <dgm:t>
+        <a:bodyPr/>
+        <a:lstStyle/>
+        <a:p>
+          <a:endParaRPr lang="en-US"/>
+        </a:p>
+      </dgm:t>
+    </dgm:pt>
+    <dgm:pt modelId="{D75F5584-BF64-4276-A05D-1ACD95AD5A61}" type="sibTrans" cxnId="{F39F76F8-BD60-4767-AD9B-15741CE0A579}">
+      <dgm:prSet/>
+      <dgm:spPr/>
+      <dgm:t>
+        <a:bodyPr/>
+        <a:lstStyle/>
+        <a:p>
+          <a:endParaRPr lang="en-US"/>
+        </a:p>
+      </dgm:t>
+    </dgm:pt>
+    <dgm:pt modelId="{6BE87D4F-307B-4C94-890A-6218421FE1FA}">
+      <dgm:prSet/>
+      <dgm:spPr/>
+      <dgm:t>
+        <a:bodyPr/>
+        <a:lstStyle/>
+        <a:p>
+          <a:r>
+            <a:rPr lang="en-US"/>
+            <a:t>Turn time limit</a:t>
+          </a:r>
+        </a:p>
+      </dgm:t>
+    </dgm:pt>
+    <dgm:pt modelId="{65DF5821-9331-4A79-9725-AC4BF02AE9AC}" type="parTrans" cxnId="{C0171921-F261-40F1-9A58-564E56EB974E}">
+      <dgm:prSet/>
+      <dgm:spPr/>
+      <dgm:t>
+        <a:bodyPr/>
+        <a:lstStyle/>
+        <a:p>
+          <a:endParaRPr lang="en-US"/>
+        </a:p>
+      </dgm:t>
+    </dgm:pt>
+    <dgm:pt modelId="{0C074A7B-9AF7-469A-B13C-B5E24F039E01}" type="sibTrans" cxnId="{C0171921-F261-40F1-9A58-564E56EB974E}">
+      <dgm:prSet/>
+      <dgm:spPr/>
+      <dgm:t>
+        <a:bodyPr/>
+        <a:lstStyle/>
+        <a:p>
+          <a:endParaRPr lang="en-US"/>
+        </a:p>
+      </dgm:t>
+    </dgm:pt>
+    <dgm:pt modelId="{97B324CC-1706-42BC-9B5E-6EFE26DB835E}">
+      <dgm:prSet/>
+      <dgm:spPr/>
+      <dgm:t>
+        <a:bodyPr/>
+        <a:lstStyle/>
+        <a:p>
+          <a:r>
+            <a:rPr lang="en-US"/>
+            <a:t>Character selection for blank tiles</a:t>
+          </a:r>
+        </a:p>
+      </dgm:t>
+    </dgm:pt>
+    <dgm:pt modelId="{E7453E4D-7E65-4307-8789-40D70097DE9F}" type="parTrans" cxnId="{FE750BAB-6100-46ED-BE5B-6726E41342B8}">
+      <dgm:prSet/>
+      <dgm:spPr/>
+      <dgm:t>
+        <a:bodyPr/>
+        <a:lstStyle/>
+        <a:p>
+          <a:endParaRPr lang="en-US"/>
+        </a:p>
+      </dgm:t>
+    </dgm:pt>
+    <dgm:pt modelId="{8222BD75-F2CB-47F4-A1F1-78138F4443F7}" type="sibTrans" cxnId="{FE750BAB-6100-46ED-BE5B-6726E41342B8}">
+      <dgm:prSet/>
+      <dgm:spPr/>
+      <dgm:t>
+        <a:bodyPr/>
+        <a:lstStyle/>
+        <a:p>
+          <a:endParaRPr lang="en-US"/>
+        </a:p>
+      </dgm:t>
+    </dgm:pt>
+    <dgm:pt modelId="{443D14E8-58A9-4E11-95F4-C505479E2904}" type="pres">
+      <dgm:prSet presAssocID="{D18A70FB-C6B8-4D41-8E25-76E705DFC639}" presName="diagram" presStyleCnt="0">
+        <dgm:presLayoutVars>
+          <dgm:dir/>
+          <dgm:resizeHandles val="exact"/>
+        </dgm:presLayoutVars>
+      </dgm:prSet>
+      <dgm:spPr/>
+    </dgm:pt>
+    <dgm:pt modelId="{FE0BB55D-226C-458C-A573-341B3A06416B}" type="pres">
+      <dgm:prSet presAssocID="{1C23550A-44CA-479B-ABEE-39F4EFB63893}" presName="node" presStyleLbl="node1" presStyleIdx="0" presStyleCnt="6">
+        <dgm:presLayoutVars>
+          <dgm:bulletEnabled val="1"/>
+        </dgm:presLayoutVars>
+      </dgm:prSet>
+      <dgm:spPr/>
+    </dgm:pt>
+    <dgm:pt modelId="{A4537DFD-86BA-4D30-A239-E0F07B08687C}" type="pres">
+      <dgm:prSet presAssocID="{BEA31556-536E-404B-BEC6-B8671E30073A}" presName="sibTrans" presStyleCnt="0"/>
+      <dgm:spPr/>
+    </dgm:pt>
+    <dgm:pt modelId="{D9FDC1F9-3E2A-45B9-963A-06D90E2A94A2}" type="pres">
+      <dgm:prSet presAssocID="{5FB70007-B1CA-4F61-B5D9-38C0C9E119E6}" presName="node" presStyleLbl="node1" presStyleIdx="1" presStyleCnt="6">
+        <dgm:presLayoutVars>
+          <dgm:bulletEnabled val="1"/>
+        </dgm:presLayoutVars>
+      </dgm:prSet>
+      <dgm:spPr/>
+    </dgm:pt>
+    <dgm:pt modelId="{F5ED1392-963E-4160-92EB-C77A9F32F262}" type="pres">
+      <dgm:prSet presAssocID="{B8C39E32-8237-48A2-8826-5D1128C98C66}" presName="sibTrans" presStyleCnt="0"/>
+      <dgm:spPr/>
+    </dgm:pt>
+    <dgm:pt modelId="{8D20680A-D784-4261-87DD-59888B6E48BF}" type="pres">
+      <dgm:prSet presAssocID="{5D6971A4-C7F8-4EA7-824F-11F73AE92D62}" presName="node" presStyleLbl="node1" presStyleIdx="2" presStyleCnt="6">
+        <dgm:presLayoutVars>
+          <dgm:bulletEnabled val="1"/>
+        </dgm:presLayoutVars>
+      </dgm:prSet>
+      <dgm:spPr/>
+    </dgm:pt>
+    <dgm:pt modelId="{A19AE5BA-CCF5-4E0B-ABEA-EA968DC85B2D}" type="pres">
+      <dgm:prSet presAssocID="{0A131A74-41DB-42ED-938A-FBA28BCFE8CF}" presName="sibTrans" presStyleCnt="0"/>
+      <dgm:spPr/>
+    </dgm:pt>
+    <dgm:pt modelId="{5AE23B98-85B6-4FFC-A2EF-CD153EC42010}" type="pres">
+      <dgm:prSet presAssocID="{3320D6A3-4697-47C6-A08D-DD25CDEBA662}" presName="node" presStyleLbl="node1" presStyleIdx="3" presStyleCnt="6">
+        <dgm:presLayoutVars>
+          <dgm:bulletEnabled val="1"/>
+        </dgm:presLayoutVars>
+      </dgm:prSet>
+      <dgm:spPr/>
+    </dgm:pt>
+    <dgm:pt modelId="{E2B8B87D-94F8-4231-BDA2-AEE67B03AFC3}" type="pres">
+      <dgm:prSet presAssocID="{7782C75C-7E79-4F94-A8FC-C4200DB8C9E1}" presName="sibTrans" presStyleCnt="0"/>
+      <dgm:spPr/>
+    </dgm:pt>
+    <dgm:pt modelId="{882E09FF-C7FD-443D-9055-1C14289B78B7}" type="pres">
+      <dgm:prSet presAssocID="{CEDFE102-B0BD-498D-A9F3-BD4DE2B2C325}" presName="node" presStyleLbl="node1" presStyleIdx="4" presStyleCnt="6">
+        <dgm:presLayoutVars>
+          <dgm:bulletEnabled val="1"/>
+        </dgm:presLayoutVars>
+      </dgm:prSet>
+      <dgm:spPr/>
+    </dgm:pt>
+    <dgm:pt modelId="{C3D9CB78-4124-4AB5-A6D2-7A032332104C}" type="pres">
+      <dgm:prSet presAssocID="{9A68587D-2CF4-45D5-96FA-4F79B356BD89}" presName="sibTrans" presStyleCnt="0"/>
+      <dgm:spPr/>
+    </dgm:pt>
+    <dgm:pt modelId="{F6B6280C-52ED-4D88-BAFE-88EF63B9EE93}" type="pres">
+      <dgm:prSet presAssocID="{97B324CC-1706-42BC-9B5E-6EFE26DB835E}" presName="node" presStyleLbl="node1" presStyleIdx="5" presStyleCnt="6">
+        <dgm:presLayoutVars>
+          <dgm:bulletEnabled val="1"/>
+        </dgm:presLayoutVars>
+      </dgm:prSet>
+      <dgm:spPr/>
+    </dgm:pt>
+  </dgm:ptLst>
+  <dgm:cxnLst>
+    <dgm:cxn modelId="{71C25112-B4A2-45FC-B622-7BAC8F61234F}" type="presOf" srcId="{9A3BFD81-B03D-4DFF-ACAA-FB7FBF6A173F}" destId="{D9FDC1F9-3E2A-45B9-963A-06D90E2A94A2}" srcOrd="0" destOrd="1" presId="urn:microsoft.com/office/officeart/2005/8/layout/default"/>
+    <dgm:cxn modelId="{B2D76518-F297-4516-BB1C-23E0EDE24CFE}" type="presOf" srcId="{97B324CC-1706-42BC-9B5E-6EFE26DB835E}" destId="{F6B6280C-52ED-4D88-BAFE-88EF63B9EE93}" srcOrd="0" destOrd="0" presId="urn:microsoft.com/office/officeart/2005/8/layout/default"/>
+    <dgm:cxn modelId="{E6779B19-6F04-46EA-A61E-7F016C9C6E3F}" srcId="{D18A70FB-C6B8-4D41-8E25-76E705DFC639}" destId="{1C23550A-44CA-479B-ABEE-39F4EFB63893}" srcOrd="0" destOrd="0" parTransId="{A03FA08C-7F35-4BE1-9151-30727F97B412}" sibTransId="{BEA31556-536E-404B-BEC6-B8671E30073A}"/>
+    <dgm:cxn modelId="{C6C2421A-7384-4264-9AE5-781B3F48DD43}" srcId="{5FB70007-B1CA-4F61-B5D9-38C0C9E119E6}" destId="{B21AE485-6E47-4FF8-8D4C-72F3377E8B56}" srcOrd="2" destOrd="0" parTransId="{1C29C88C-EEFD-4F47-B649-2EA7E7F6E02C}" sibTransId="{42F66939-761F-49BC-B8C4-A2D024FDFDDF}"/>
+    <dgm:cxn modelId="{5B44E81B-96D7-4F59-84F6-17D97B1FCDD9}" type="presOf" srcId="{1C23550A-44CA-479B-ABEE-39F4EFB63893}" destId="{FE0BB55D-226C-458C-A573-341B3A06416B}" srcOrd="0" destOrd="0" presId="urn:microsoft.com/office/officeart/2005/8/layout/default"/>
+    <dgm:cxn modelId="{4A5ACA1E-5512-45D0-89A6-F1DEC7BF3AAD}" type="presOf" srcId="{B21AE485-6E47-4FF8-8D4C-72F3377E8B56}" destId="{D9FDC1F9-3E2A-45B9-963A-06D90E2A94A2}" srcOrd="0" destOrd="3" presId="urn:microsoft.com/office/officeart/2005/8/layout/default"/>
+    <dgm:cxn modelId="{C0171921-F261-40F1-9A58-564E56EB974E}" srcId="{CEDFE102-B0BD-498D-A9F3-BD4DE2B2C325}" destId="{6BE87D4F-307B-4C94-890A-6218421FE1FA}" srcOrd="1" destOrd="0" parTransId="{65DF5821-9331-4A79-9725-AC4BF02AE9AC}" sibTransId="{0C074A7B-9AF7-469A-B13C-B5E24F039E01}"/>
+    <dgm:cxn modelId="{07AE5629-6E32-4177-B4D9-A922E5B469E9}" srcId="{D18A70FB-C6B8-4D41-8E25-76E705DFC639}" destId="{5FB70007-B1CA-4F61-B5D9-38C0C9E119E6}" srcOrd="1" destOrd="0" parTransId="{CEA2B7D3-4208-4166-AD58-7AE7F338DDFD}" sibTransId="{B8C39E32-8237-48A2-8826-5D1128C98C66}"/>
+    <dgm:cxn modelId="{E22FD63B-4C20-48C8-86B7-5F62079F8EFB}" type="presOf" srcId="{5D6971A4-C7F8-4EA7-824F-11F73AE92D62}" destId="{8D20680A-D784-4261-87DD-59888B6E48BF}" srcOrd="0" destOrd="0" presId="urn:microsoft.com/office/officeart/2005/8/layout/default"/>
+    <dgm:cxn modelId="{7C066668-D184-4F62-A4CB-61AA861B634B}" type="presOf" srcId="{CEDFE102-B0BD-498D-A9F3-BD4DE2B2C325}" destId="{882E09FF-C7FD-443D-9055-1C14289B78B7}" srcOrd="0" destOrd="0" presId="urn:microsoft.com/office/officeart/2005/8/layout/default"/>
+    <dgm:cxn modelId="{2F87CD70-4B7A-4C19-99E4-8733B7AFBEF0}" srcId="{5FB70007-B1CA-4F61-B5D9-38C0C9E119E6}" destId="{9A3BFD81-B03D-4DFF-ACAA-FB7FBF6A173F}" srcOrd="0" destOrd="0" parTransId="{4E89DF91-A1DD-4895-8CC3-965F9A591A19}" sibTransId="{86DECF8C-7C1C-483D-B257-AEFB0B39540C}"/>
+    <dgm:cxn modelId="{9CF4957D-DFDF-4F01-AE37-AB045FA94545}" type="presOf" srcId="{D18A70FB-C6B8-4D41-8E25-76E705DFC639}" destId="{443D14E8-58A9-4E11-95F4-C505479E2904}" srcOrd="0" destOrd="0" presId="urn:microsoft.com/office/officeart/2005/8/layout/default"/>
+    <dgm:cxn modelId="{1D4A9E82-C755-4C4C-B859-10C1047B4449}" srcId="{5FB70007-B1CA-4F61-B5D9-38C0C9E119E6}" destId="{7652E984-63FA-4A4C-9E81-8D9FE7EBF82C}" srcOrd="1" destOrd="0" parTransId="{42C0C48C-4D99-4C4E-B857-7D8B8C57E7C9}" sibTransId="{F4994F22-2FF4-4A7A-8F53-4277C5AE353D}"/>
+    <dgm:cxn modelId="{2EDB9588-BDF4-4B75-9853-55B5D17DE710}" type="presOf" srcId="{3320D6A3-4697-47C6-A08D-DD25CDEBA662}" destId="{5AE23B98-85B6-4FFC-A2EF-CD153EC42010}" srcOrd="0" destOrd="0" presId="urn:microsoft.com/office/officeart/2005/8/layout/default"/>
+    <dgm:cxn modelId="{F65A9390-E5A2-4ACB-A7D4-EC3A1A15F72F}" type="presOf" srcId="{6BE87D4F-307B-4C94-890A-6218421FE1FA}" destId="{882E09FF-C7FD-443D-9055-1C14289B78B7}" srcOrd="0" destOrd="2" presId="urn:microsoft.com/office/officeart/2005/8/layout/default"/>
+    <dgm:cxn modelId="{6793FD9D-14A8-41F6-95E6-1534CCADA5EB}" type="presOf" srcId="{7652E984-63FA-4A4C-9E81-8D9FE7EBF82C}" destId="{D9FDC1F9-3E2A-45B9-963A-06D90E2A94A2}" srcOrd="0" destOrd="2" presId="urn:microsoft.com/office/officeart/2005/8/layout/default"/>
+    <dgm:cxn modelId="{280A34A8-85AC-4B2B-A798-8BE5A9DCFCFE}" srcId="{D18A70FB-C6B8-4D41-8E25-76E705DFC639}" destId="{5D6971A4-C7F8-4EA7-824F-11F73AE92D62}" srcOrd="2" destOrd="0" parTransId="{AFC705A3-C25E-40C3-999A-A3A976FB7724}" sibTransId="{0A131A74-41DB-42ED-938A-FBA28BCFE8CF}"/>
+    <dgm:cxn modelId="{FE750BAB-6100-46ED-BE5B-6726E41342B8}" srcId="{D18A70FB-C6B8-4D41-8E25-76E705DFC639}" destId="{97B324CC-1706-42BC-9B5E-6EFE26DB835E}" srcOrd="5" destOrd="0" parTransId="{E7453E4D-7E65-4307-8789-40D70097DE9F}" sibTransId="{8222BD75-F2CB-47F4-A1F1-78138F4443F7}"/>
+    <dgm:cxn modelId="{B414AEAB-1914-4228-90D2-4F5BE3639AF9}" type="presOf" srcId="{5FB70007-B1CA-4F61-B5D9-38C0C9E119E6}" destId="{D9FDC1F9-3E2A-45B9-963A-06D90E2A94A2}" srcOrd="0" destOrd="0" presId="urn:microsoft.com/office/officeart/2005/8/layout/default"/>
+    <dgm:cxn modelId="{9A6DA9DE-7311-4B7E-BBDD-EFC85F609A28}" srcId="{D18A70FB-C6B8-4D41-8E25-76E705DFC639}" destId="{CEDFE102-B0BD-498D-A9F3-BD4DE2B2C325}" srcOrd="4" destOrd="0" parTransId="{6E6F0D8D-8A41-46A8-91F7-1FE20DC94D0B}" sibTransId="{9A68587D-2CF4-45D5-96FA-4F79B356BD89}"/>
+    <dgm:cxn modelId="{3C969EEA-DC54-43A7-8544-E2F3ABE51829}" srcId="{D18A70FB-C6B8-4D41-8E25-76E705DFC639}" destId="{3320D6A3-4697-47C6-A08D-DD25CDEBA662}" srcOrd="3" destOrd="0" parTransId="{16558905-D569-45BB-9284-D224B0EBDBD2}" sibTransId="{7782C75C-7E79-4F94-A8FC-C4200DB8C9E1}"/>
+    <dgm:cxn modelId="{04EED6F3-914A-49A7-A42C-DAA487CDA23B}" type="presOf" srcId="{1380D75D-64A8-4EDB-994B-38F139ED1C4C}" destId="{882E09FF-C7FD-443D-9055-1C14289B78B7}" srcOrd="0" destOrd="1" presId="urn:microsoft.com/office/officeart/2005/8/layout/default"/>
+    <dgm:cxn modelId="{F39F76F8-BD60-4767-AD9B-15741CE0A579}" srcId="{CEDFE102-B0BD-498D-A9F3-BD4DE2B2C325}" destId="{1380D75D-64A8-4EDB-994B-38F139ED1C4C}" srcOrd="0" destOrd="0" parTransId="{9FD7E34E-7E7F-423E-A3F7-C3F5A2F8D2E2}" sibTransId="{D75F5584-BF64-4276-A05D-1ACD95AD5A61}"/>
+    <dgm:cxn modelId="{670C8526-5A10-48E2-8AE6-FBC7CAE0484E}" type="presParOf" srcId="{443D14E8-58A9-4E11-95F4-C505479E2904}" destId="{FE0BB55D-226C-458C-A573-341B3A06416B}" srcOrd="0" destOrd="0" presId="urn:microsoft.com/office/officeart/2005/8/layout/default"/>
+    <dgm:cxn modelId="{BDB7E051-5852-4ED2-B690-525FB3FA8220}" type="presParOf" srcId="{443D14E8-58A9-4E11-95F4-C505479E2904}" destId="{A4537DFD-86BA-4D30-A239-E0F07B08687C}" srcOrd="1" destOrd="0" presId="urn:microsoft.com/office/officeart/2005/8/layout/default"/>
+    <dgm:cxn modelId="{E7A7C931-4AD1-46FF-B7AE-F4EEF732D732}" type="presParOf" srcId="{443D14E8-58A9-4E11-95F4-C505479E2904}" destId="{D9FDC1F9-3E2A-45B9-963A-06D90E2A94A2}" srcOrd="2" destOrd="0" presId="urn:microsoft.com/office/officeart/2005/8/layout/default"/>
+    <dgm:cxn modelId="{107C0A60-3513-49DB-A3D1-C63CF42D4498}" type="presParOf" srcId="{443D14E8-58A9-4E11-95F4-C505479E2904}" destId="{F5ED1392-963E-4160-92EB-C77A9F32F262}" srcOrd="3" destOrd="0" presId="urn:microsoft.com/office/officeart/2005/8/layout/default"/>
+    <dgm:cxn modelId="{393E53F7-0CE9-44A2-8971-FEF730A33133}" type="presParOf" srcId="{443D14E8-58A9-4E11-95F4-C505479E2904}" destId="{8D20680A-D784-4261-87DD-59888B6E48BF}" srcOrd="4" destOrd="0" presId="urn:microsoft.com/office/officeart/2005/8/layout/default"/>
+    <dgm:cxn modelId="{2CA76A7D-E645-4442-AC72-B67E4ACBA7B1}" type="presParOf" srcId="{443D14E8-58A9-4E11-95F4-C505479E2904}" destId="{A19AE5BA-CCF5-4E0B-ABEA-EA968DC85B2D}" srcOrd="5" destOrd="0" presId="urn:microsoft.com/office/officeart/2005/8/layout/default"/>
+    <dgm:cxn modelId="{DCEE4B81-6A00-45BA-BA9C-5F1EEC3AC83C}" type="presParOf" srcId="{443D14E8-58A9-4E11-95F4-C505479E2904}" destId="{5AE23B98-85B6-4FFC-A2EF-CD153EC42010}" srcOrd="6" destOrd="0" presId="urn:microsoft.com/office/officeart/2005/8/layout/default"/>
+    <dgm:cxn modelId="{4C7166B8-AB1E-4A0F-B8D6-137C7051593E}" type="presParOf" srcId="{443D14E8-58A9-4E11-95F4-C505479E2904}" destId="{E2B8B87D-94F8-4231-BDA2-AEE67B03AFC3}" srcOrd="7" destOrd="0" presId="urn:microsoft.com/office/officeart/2005/8/layout/default"/>
+    <dgm:cxn modelId="{ABA6A927-B925-4172-B3ED-345947A784CE}" type="presParOf" srcId="{443D14E8-58A9-4E11-95F4-C505479E2904}" destId="{882E09FF-C7FD-443D-9055-1C14289B78B7}" srcOrd="8" destOrd="0" presId="urn:microsoft.com/office/officeart/2005/8/layout/default"/>
+    <dgm:cxn modelId="{342B3CA3-E508-452B-9C67-316A566600FB}" type="presParOf" srcId="{443D14E8-58A9-4E11-95F4-C505479E2904}" destId="{C3D9CB78-4124-4AB5-A6D2-7A032332104C}" srcOrd="9" destOrd="0" presId="urn:microsoft.com/office/officeart/2005/8/layout/default"/>
+    <dgm:cxn modelId="{A591142E-A026-4162-A369-B5A67358FB99}" type="presParOf" srcId="{443D14E8-58A9-4E11-95F4-C505479E2904}" destId="{F6B6280C-52ED-4D88-BAFE-88EF63B9EE93}" srcOrd="10" destOrd="0" presId="urn:microsoft.com/office/officeart/2005/8/layout/default"/>
+  </dgm:cxnLst>
+  <dgm:bg/>
+  <dgm:whole/>
+  <dgm:extLst>
+    <a:ext uri="http://schemas.microsoft.com/office/drawing/2008/diagram">
+      <dsp:dataModelExt xmlns:dsp="http://schemas.microsoft.com/office/drawing/2008/diagram" relId="rId8" minVer="http://schemas.openxmlformats.org/drawingml/2006/diagram"/>
+    </a:ext>
+  </dgm:extLst>
+</dgm:dataModel>
+</file>
+
+<file path=ppt/diagrams/data5.xml><?xml version="1.0" encoding="utf-8"?>
+<dgm:dataModel xmlns:dgm="http://schemas.openxmlformats.org/drawingml/2006/diagram" xmlns:a="http://schemas.openxmlformats.org/drawingml/2006/main">
+  <dgm:ptLst>
     <dgm:pt modelId="{A82EBBEB-02CA-450A-ADF0-7E1C99D8D2D1}" type="doc">
       <dgm:prSet loTypeId="urn:microsoft.com/office/officeart/2005/8/layout/hProcess11" loCatId="process" qsTypeId="urn:microsoft.com/office/officeart/2005/8/quickstyle/simple1" qsCatId="simple" csTypeId="urn:microsoft.com/office/officeart/2005/8/colors/accent3_2" csCatId="accent3" phldr="1"/>
       <dgm:spPr/>
@@ -6471,540 +7005,6 @@
   <dgm:extLst>
     <a:ext uri="http://schemas.microsoft.com/office/drawing/2008/diagram">
       <dsp:dataModelExt xmlns:dsp="http://schemas.microsoft.com/office/drawing/2008/diagram" relId="rId10" minVer="http://schemas.openxmlformats.org/drawingml/2006/diagram"/>
-    </a:ext>
-  </dgm:extLst>
-</dgm:dataModel>
-</file>
-
-<file path=ppt/diagrams/data5.xml><?xml version="1.0" encoding="utf-8"?>
-<dgm:dataModel xmlns:dgm="http://schemas.openxmlformats.org/drawingml/2006/diagram" xmlns:a="http://schemas.openxmlformats.org/drawingml/2006/main">
-  <dgm:ptLst>
-    <dgm:pt modelId="{D18A70FB-C6B8-4D41-8E25-76E705DFC639}" type="doc">
-      <dgm:prSet loTypeId="urn:microsoft.com/office/officeart/2005/8/layout/default" loCatId="list" qsTypeId="urn:microsoft.com/office/officeart/2005/8/quickstyle/simple1" qsCatId="simple" csTypeId="urn:microsoft.com/office/officeart/2005/8/colors/colorful2" csCatId="colorful"/>
-      <dgm:spPr/>
-      <dgm:t>
-        <a:bodyPr/>
-        <a:lstStyle/>
-        <a:p>
-          <a:endParaRPr lang="en-US"/>
-        </a:p>
-      </dgm:t>
-    </dgm:pt>
-    <dgm:pt modelId="{1C23550A-44CA-479B-ABEE-39F4EFB63893}">
-      <dgm:prSet/>
-      <dgm:spPr/>
-      <dgm:t>
-        <a:bodyPr/>
-        <a:lstStyle/>
-        <a:p>
-          <a:r>
-            <a:rPr lang="en-US"/>
-            <a:t>Legal word checking</a:t>
-          </a:r>
-        </a:p>
-      </dgm:t>
-    </dgm:pt>
-    <dgm:pt modelId="{A03FA08C-7F35-4BE1-9151-30727F97B412}" type="parTrans" cxnId="{E6779B19-6F04-46EA-A61E-7F016C9C6E3F}">
-      <dgm:prSet/>
-      <dgm:spPr/>
-      <dgm:t>
-        <a:bodyPr/>
-        <a:lstStyle/>
-        <a:p>
-          <a:endParaRPr lang="en-US"/>
-        </a:p>
-      </dgm:t>
-    </dgm:pt>
-    <dgm:pt modelId="{BEA31556-536E-404B-BEC6-B8671E30073A}" type="sibTrans" cxnId="{E6779B19-6F04-46EA-A61E-7F016C9C6E3F}">
-      <dgm:prSet/>
-      <dgm:spPr/>
-      <dgm:t>
-        <a:bodyPr/>
-        <a:lstStyle/>
-        <a:p>
-          <a:endParaRPr lang="en-US"/>
-        </a:p>
-      </dgm:t>
-    </dgm:pt>
-    <dgm:pt modelId="{5FB70007-B1CA-4F61-B5D9-38C0C9E119E6}">
-      <dgm:prSet/>
-      <dgm:spPr/>
-      <dgm:t>
-        <a:bodyPr/>
-        <a:lstStyle/>
-        <a:p>
-          <a:r>
-            <a:rPr lang="en-US"/>
-            <a:t>Custom legal word checking dictionaries</a:t>
-          </a:r>
-        </a:p>
-      </dgm:t>
-    </dgm:pt>
-    <dgm:pt modelId="{CEA2B7D3-4208-4166-AD58-7AE7F338DDFD}" type="parTrans" cxnId="{07AE5629-6E32-4177-B4D9-A922E5B469E9}">
-      <dgm:prSet/>
-      <dgm:spPr/>
-      <dgm:t>
-        <a:bodyPr/>
-        <a:lstStyle/>
-        <a:p>
-          <a:endParaRPr lang="en-US"/>
-        </a:p>
-      </dgm:t>
-    </dgm:pt>
-    <dgm:pt modelId="{B8C39E32-8237-48A2-8826-5D1128C98C66}" type="sibTrans" cxnId="{07AE5629-6E32-4177-B4D9-A922E5B469E9}">
-      <dgm:prSet/>
-      <dgm:spPr/>
-      <dgm:t>
-        <a:bodyPr/>
-        <a:lstStyle/>
-        <a:p>
-          <a:endParaRPr lang="en-US"/>
-        </a:p>
-      </dgm:t>
-    </dgm:pt>
-    <dgm:pt modelId="{9A3BFD81-B03D-4DFF-ACAA-FB7FBF6A173F}">
-      <dgm:prSet/>
-      <dgm:spPr/>
-      <dgm:t>
-        <a:bodyPr/>
-        <a:lstStyle/>
-        <a:p>
-          <a:r>
-            <a:rPr lang="en-US"/>
-            <a:t>Acronyms</a:t>
-          </a:r>
-        </a:p>
-      </dgm:t>
-    </dgm:pt>
-    <dgm:pt modelId="{4E89DF91-A1DD-4895-8CC3-965F9A591A19}" type="parTrans" cxnId="{2F87CD70-4B7A-4C19-99E4-8733B7AFBEF0}">
-      <dgm:prSet/>
-      <dgm:spPr/>
-      <dgm:t>
-        <a:bodyPr/>
-        <a:lstStyle/>
-        <a:p>
-          <a:endParaRPr lang="en-US"/>
-        </a:p>
-      </dgm:t>
-    </dgm:pt>
-    <dgm:pt modelId="{86DECF8C-7C1C-483D-B257-AEFB0B39540C}" type="sibTrans" cxnId="{2F87CD70-4B7A-4C19-99E4-8733B7AFBEF0}">
-      <dgm:prSet/>
-      <dgm:spPr/>
-      <dgm:t>
-        <a:bodyPr/>
-        <a:lstStyle/>
-        <a:p>
-          <a:endParaRPr lang="en-US"/>
-        </a:p>
-      </dgm:t>
-    </dgm:pt>
-    <dgm:pt modelId="{7652E984-63FA-4A4C-9E81-8D9FE7EBF82C}">
-      <dgm:prSet/>
-      <dgm:spPr/>
-      <dgm:t>
-        <a:bodyPr/>
-        <a:lstStyle/>
-        <a:p>
-          <a:r>
-            <a:rPr lang="en-US"/>
-            <a:t>Foreign language</a:t>
-          </a:r>
-        </a:p>
-      </dgm:t>
-    </dgm:pt>
-    <dgm:pt modelId="{42C0C48C-4D99-4C4E-B857-7D8B8C57E7C9}" type="parTrans" cxnId="{1D4A9E82-C755-4C4C-B859-10C1047B4449}">
-      <dgm:prSet/>
-      <dgm:spPr/>
-      <dgm:t>
-        <a:bodyPr/>
-        <a:lstStyle/>
-        <a:p>
-          <a:endParaRPr lang="en-US"/>
-        </a:p>
-      </dgm:t>
-    </dgm:pt>
-    <dgm:pt modelId="{F4994F22-2FF4-4A7A-8F53-4277C5AE353D}" type="sibTrans" cxnId="{1D4A9E82-C755-4C4C-B859-10C1047B4449}">
-      <dgm:prSet/>
-      <dgm:spPr/>
-      <dgm:t>
-        <a:bodyPr/>
-        <a:lstStyle/>
-        <a:p>
-          <a:endParaRPr lang="en-US"/>
-        </a:p>
-      </dgm:t>
-    </dgm:pt>
-    <dgm:pt modelId="{B21AE485-6E47-4FF8-8D4C-72F3377E8B56}">
-      <dgm:prSet/>
-      <dgm:spPr/>
-      <dgm:t>
-        <a:bodyPr/>
-        <a:lstStyle/>
-        <a:p>
-          <a:r>
-            <a:rPr lang="en-US"/>
-            <a:t>Slang</a:t>
-          </a:r>
-        </a:p>
-      </dgm:t>
-    </dgm:pt>
-    <dgm:pt modelId="{1C29C88C-EEFD-4F47-B649-2EA7E7F6E02C}" type="parTrans" cxnId="{C6C2421A-7384-4264-9AE5-781B3F48DD43}">
-      <dgm:prSet/>
-      <dgm:spPr/>
-      <dgm:t>
-        <a:bodyPr/>
-        <a:lstStyle/>
-        <a:p>
-          <a:endParaRPr lang="en-US"/>
-        </a:p>
-      </dgm:t>
-    </dgm:pt>
-    <dgm:pt modelId="{42F66939-761F-49BC-B8C4-A2D024FDFDDF}" type="sibTrans" cxnId="{C6C2421A-7384-4264-9AE5-781B3F48DD43}">
-      <dgm:prSet/>
-      <dgm:spPr/>
-      <dgm:t>
-        <a:bodyPr/>
-        <a:lstStyle/>
-        <a:p>
-          <a:endParaRPr lang="en-US"/>
-        </a:p>
-      </dgm:t>
-    </dgm:pt>
-    <dgm:pt modelId="{5D6971A4-C7F8-4EA7-824F-11F73AE92D62}">
-      <dgm:prSet/>
-      <dgm:spPr/>
-      <dgm:t>
-        <a:bodyPr/>
-        <a:lstStyle/>
-        <a:p>
-          <a:r>
-            <a:rPr lang="en-US"/>
-            <a:t>Display word definitions</a:t>
-          </a:r>
-        </a:p>
-      </dgm:t>
-    </dgm:pt>
-    <dgm:pt modelId="{AFC705A3-C25E-40C3-999A-A3A976FB7724}" type="parTrans" cxnId="{280A34A8-85AC-4B2B-A798-8BE5A9DCFCFE}">
-      <dgm:prSet/>
-      <dgm:spPr/>
-      <dgm:t>
-        <a:bodyPr/>
-        <a:lstStyle/>
-        <a:p>
-          <a:endParaRPr lang="en-US"/>
-        </a:p>
-      </dgm:t>
-    </dgm:pt>
-    <dgm:pt modelId="{0A131A74-41DB-42ED-938A-FBA28BCFE8CF}" type="sibTrans" cxnId="{280A34A8-85AC-4B2B-A798-8BE5A9DCFCFE}">
-      <dgm:prSet/>
-      <dgm:spPr/>
-      <dgm:t>
-        <a:bodyPr/>
-        <a:lstStyle/>
-        <a:p>
-          <a:endParaRPr lang="en-US"/>
-        </a:p>
-      </dgm:t>
-    </dgm:pt>
-    <dgm:pt modelId="{3320D6A3-4697-47C6-A08D-DD25CDEBA662}">
-      <dgm:prSet/>
-      <dgm:spPr/>
-      <dgm:t>
-        <a:bodyPr/>
-        <a:lstStyle/>
-        <a:p>
-          <a:r>
-            <a:rPr lang="en-US"/>
-            <a:t>Realtime word validation</a:t>
-          </a:r>
-        </a:p>
-      </dgm:t>
-    </dgm:pt>
-    <dgm:pt modelId="{16558905-D569-45BB-9284-D224B0EBDBD2}" type="parTrans" cxnId="{3C969EEA-DC54-43A7-8544-E2F3ABE51829}">
-      <dgm:prSet/>
-      <dgm:spPr/>
-      <dgm:t>
-        <a:bodyPr/>
-        <a:lstStyle/>
-        <a:p>
-          <a:endParaRPr lang="en-US"/>
-        </a:p>
-      </dgm:t>
-    </dgm:pt>
-    <dgm:pt modelId="{7782C75C-7E79-4F94-A8FC-C4200DB8C9E1}" type="sibTrans" cxnId="{3C969EEA-DC54-43A7-8544-E2F3ABE51829}">
-      <dgm:prSet/>
-      <dgm:spPr/>
-      <dgm:t>
-        <a:bodyPr/>
-        <a:lstStyle/>
-        <a:p>
-          <a:endParaRPr lang="en-US"/>
-        </a:p>
-      </dgm:t>
-    </dgm:pt>
-    <dgm:pt modelId="{CEDFE102-B0BD-498D-A9F3-BD4DE2B2C325}">
-      <dgm:prSet/>
-      <dgm:spPr/>
-      <dgm:t>
-        <a:bodyPr/>
-        <a:lstStyle/>
-        <a:p>
-          <a:r>
-            <a:rPr lang="en-US"/>
-            <a:t>Game modifiers </a:t>
-          </a:r>
-        </a:p>
-      </dgm:t>
-    </dgm:pt>
-    <dgm:pt modelId="{6E6F0D8D-8A41-46A8-91F7-1FE20DC94D0B}" type="parTrans" cxnId="{9A6DA9DE-7311-4B7E-BBDD-EFC85F609A28}">
-      <dgm:prSet/>
-      <dgm:spPr/>
-      <dgm:t>
-        <a:bodyPr/>
-        <a:lstStyle/>
-        <a:p>
-          <a:endParaRPr lang="en-US"/>
-        </a:p>
-      </dgm:t>
-    </dgm:pt>
-    <dgm:pt modelId="{9A68587D-2CF4-45D5-96FA-4F79B356BD89}" type="sibTrans" cxnId="{9A6DA9DE-7311-4B7E-BBDD-EFC85F609A28}">
-      <dgm:prSet/>
-      <dgm:spPr/>
-      <dgm:t>
-        <a:bodyPr/>
-        <a:lstStyle/>
-        <a:p>
-          <a:endParaRPr lang="en-US"/>
-        </a:p>
-      </dgm:t>
-    </dgm:pt>
-    <dgm:pt modelId="{1380D75D-64A8-4EDB-994B-38F139ED1C4C}">
-      <dgm:prSet/>
-      <dgm:spPr/>
-      <dgm:t>
-        <a:bodyPr/>
-        <a:lstStyle/>
-        <a:p>
-          <a:r>
-            <a:rPr lang="en-US"/>
-            <a:t>Tile/word limits</a:t>
-          </a:r>
-        </a:p>
-      </dgm:t>
-    </dgm:pt>
-    <dgm:pt modelId="{9FD7E34E-7E7F-423E-A3F7-C3F5A2F8D2E2}" type="parTrans" cxnId="{F39F76F8-BD60-4767-AD9B-15741CE0A579}">
-      <dgm:prSet/>
-      <dgm:spPr/>
-      <dgm:t>
-        <a:bodyPr/>
-        <a:lstStyle/>
-        <a:p>
-          <a:endParaRPr lang="en-US"/>
-        </a:p>
-      </dgm:t>
-    </dgm:pt>
-    <dgm:pt modelId="{D75F5584-BF64-4276-A05D-1ACD95AD5A61}" type="sibTrans" cxnId="{F39F76F8-BD60-4767-AD9B-15741CE0A579}">
-      <dgm:prSet/>
-      <dgm:spPr/>
-      <dgm:t>
-        <a:bodyPr/>
-        <a:lstStyle/>
-        <a:p>
-          <a:endParaRPr lang="en-US"/>
-        </a:p>
-      </dgm:t>
-    </dgm:pt>
-    <dgm:pt modelId="{6BE87D4F-307B-4C94-890A-6218421FE1FA}">
-      <dgm:prSet/>
-      <dgm:spPr/>
-      <dgm:t>
-        <a:bodyPr/>
-        <a:lstStyle/>
-        <a:p>
-          <a:r>
-            <a:rPr lang="en-US"/>
-            <a:t>Turn time limit</a:t>
-          </a:r>
-        </a:p>
-      </dgm:t>
-    </dgm:pt>
-    <dgm:pt modelId="{65DF5821-9331-4A79-9725-AC4BF02AE9AC}" type="parTrans" cxnId="{C0171921-F261-40F1-9A58-564E56EB974E}">
-      <dgm:prSet/>
-      <dgm:spPr/>
-      <dgm:t>
-        <a:bodyPr/>
-        <a:lstStyle/>
-        <a:p>
-          <a:endParaRPr lang="en-US"/>
-        </a:p>
-      </dgm:t>
-    </dgm:pt>
-    <dgm:pt modelId="{0C074A7B-9AF7-469A-B13C-B5E24F039E01}" type="sibTrans" cxnId="{C0171921-F261-40F1-9A58-564E56EB974E}">
-      <dgm:prSet/>
-      <dgm:spPr/>
-      <dgm:t>
-        <a:bodyPr/>
-        <a:lstStyle/>
-        <a:p>
-          <a:endParaRPr lang="en-US"/>
-        </a:p>
-      </dgm:t>
-    </dgm:pt>
-    <dgm:pt modelId="{97B324CC-1706-42BC-9B5E-6EFE26DB835E}">
-      <dgm:prSet/>
-      <dgm:spPr/>
-      <dgm:t>
-        <a:bodyPr/>
-        <a:lstStyle/>
-        <a:p>
-          <a:r>
-            <a:rPr lang="en-US"/>
-            <a:t>Character selection for blank tiles</a:t>
-          </a:r>
-        </a:p>
-      </dgm:t>
-    </dgm:pt>
-    <dgm:pt modelId="{E7453E4D-7E65-4307-8789-40D70097DE9F}" type="parTrans" cxnId="{FE750BAB-6100-46ED-BE5B-6726E41342B8}">
-      <dgm:prSet/>
-      <dgm:spPr/>
-      <dgm:t>
-        <a:bodyPr/>
-        <a:lstStyle/>
-        <a:p>
-          <a:endParaRPr lang="en-US"/>
-        </a:p>
-      </dgm:t>
-    </dgm:pt>
-    <dgm:pt modelId="{8222BD75-F2CB-47F4-A1F1-78138F4443F7}" type="sibTrans" cxnId="{FE750BAB-6100-46ED-BE5B-6726E41342B8}">
-      <dgm:prSet/>
-      <dgm:spPr/>
-      <dgm:t>
-        <a:bodyPr/>
-        <a:lstStyle/>
-        <a:p>
-          <a:endParaRPr lang="en-US"/>
-        </a:p>
-      </dgm:t>
-    </dgm:pt>
-    <dgm:pt modelId="{443D14E8-58A9-4E11-95F4-C505479E2904}" type="pres">
-      <dgm:prSet presAssocID="{D18A70FB-C6B8-4D41-8E25-76E705DFC639}" presName="diagram" presStyleCnt="0">
-        <dgm:presLayoutVars>
-          <dgm:dir/>
-          <dgm:resizeHandles val="exact"/>
-        </dgm:presLayoutVars>
-      </dgm:prSet>
-      <dgm:spPr/>
-    </dgm:pt>
-    <dgm:pt modelId="{FE0BB55D-226C-458C-A573-341B3A06416B}" type="pres">
-      <dgm:prSet presAssocID="{1C23550A-44CA-479B-ABEE-39F4EFB63893}" presName="node" presStyleLbl="node1" presStyleIdx="0" presStyleCnt="6">
-        <dgm:presLayoutVars>
-          <dgm:bulletEnabled val="1"/>
-        </dgm:presLayoutVars>
-      </dgm:prSet>
-      <dgm:spPr/>
-    </dgm:pt>
-    <dgm:pt modelId="{A4537DFD-86BA-4D30-A239-E0F07B08687C}" type="pres">
-      <dgm:prSet presAssocID="{BEA31556-536E-404B-BEC6-B8671E30073A}" presName="sibTrans" presStyleCnt="0"/>
-      <dgm:spPr/>
-    </dgm:pt>
-    <dgm:pt modelId="{D9FDC1F9-3E2A-45B9-963A-06D90E2A94A2}" type="pres">
-      <dgm:prSet presAssocID="{5FB70007-B1CA-4F61-B5D9-38C0C9E119E6}" presName="node" presStyleLbl="node1" presStyleIdx="1" presStyleCnt="6">
-        <dgm:presLayoutVars>
-          <dgm:bulletEnabled val="1"/>
-        </dgm:presLayoutVars>
-      </dgm:prSet>
-      <dgm:spPr/>
-    </dgm:pt>
-    <dgm:pt modelId="{F5ED1392-963E-4160-92EB-C77A9F32F262}" type="pres">
-      <dgm:prSet presAssocID="{B8C39E32-8237-48A2-8826-5D1128C98C66}" presName="sibTrans" presStyleCnt="0"/>
-      <dgm:spPr/>
-    </dgm:pt>
-    <dgm:pt modelId="{8D20680A-D784-4261-87DD-59888B6E48BF}" type="pres">
-      <dgm:prSet presAssocID="{5D6971A4-C7F8-4EA7-824F-11F73AE92D62}" presName="node" presStyleLbl="node1" presStyleIdx="2" presStyleCnt="6">
-        <dgm:presLayoutVars>
-          <dgm:bulletEnabled val="1"/>
-        </dgm:presLayoutVars>
-      </dgm:prSet>
-      <dgm:spPr/>
-    </dgm:pt>
-    <dgm:pt modelId="{A19AE5BA-CCF5-4E0B-ABEA-EA968DC85B2D}" type="pres">
-      <dgm:prSet presAssocID="{0A131A74-41DB-42ED-938A-FBA28BCFE8CF}" presName="sibTrans" presStyleCnt="0"/>
-      <dgm:spPr/>
-    </dgm:pt>
-    <dgm:pt modelId="{5AE23B98-85B6-4FFC-A2EF-CD153EC42010}" type="pres">
-      <dgm:prSet presAssocID="{3320D6A3-4697-47C6-A08D-DD25CDEBA662}" presName="node" presStyleLbl="node1" presStyleIdx="3" presStyleCnt="6">
-        <dgm:presLayoutVars>
-          <dgm:bulletEnabled val="1"/>
-        </dgm:presLayoutVars>
-      </dgm:prSet>
-      <dgm:spPr/>
-    </dgm:pt>
-    <dgm:pt modelId="{E2B8B87D-94F8-4231-BDA2-AEE67B03AFC3}" type="pres">
-      <dgm:prSet presAssocID="{7782C75C-7E79-4F94-A8FC-C4200DB8C9E1}" presName="sibTrans" presStyleCnt="0"/>
-      <dgm:spPr/>
-    </dgm:pt>
-    <dgm:pt modelId="{882E09FF-C7FD-443D-9055-1C14289B78B7}" type="pres">
-      <dgm:prSet presAssocID="{CEDFE102-B0BD-498D-A9F3-BD4DE2B2C325}" presName="node" presStyleLbl="node1" presStyleIdx="4" presStyleCnt="6">
-        <dgm:presLayoutVars>
-          <dgm:bulletEnabled val="1"/>
-        </dgm:presLayoutVars>
-      </dgm:prSet>
-      <dgm:spPr/>
-    </dgm:pt>
-    <dgm:pt modelId="{C3D9CB78-4124-4AB5-A6D2-7A032332104C}" type="pres">
-      <dgm:prSet presAssocID="{9A68587D-2CF4-45D5-96FA-4F79B356BD89}" presName="sibTrans" presStyleCnt="0"/>
-      <dgm:spPr/>
-    </dgm:pt>
-    <dgm:pt modelId="{F6B6280C-52ED-4D88-BAFE-88EF63B9EE93}" type="pres">
-      <dgm:prSet presAssocID="{97B324CC-1706-42BC-9B5E-6EFE26DB835E}" presName="node" presStyleLbl="node1" presStyleIdx="5" presStyleCnt="6">
-        <dgm:presLayoutVars>
-          <dgm:bulletEnabled val="1"/>
-        </dgm:presLayoutVars>
-      </dgm:prSet>
-      <dgm:spPr/>
-    </dgm:pt>
-  </dgm:ptLst>
-  <dgm:cxnLst>
-    <dgm:cxn modelId="{71C25112-B4A2-45FC-B622-7BAC8F61234F}" type="presOf" srcId="{9A3BFD81-B03D-4DFF-ACAA-FB7FBF6A173F}" destId="{D9FDC1F9-3E2A-45B9-963A-06D90E2A94A2}" srcOrd="0" destOrd="1" presId="urn:microsoft.com/office/officeart/2005/8/layout/default"/>
-    <dgm:cxn modelId="{B2D76518-F297-4516-BB1C-23E0EDE24CFE}" type="presOf" srcId="{97B324CC-1706-42BC-9B5E-6EFE26DB835E}" destId="{F6B6280C-52ED-4D88-BAFE-88EF63B9EE93}" srcOrd="0" destOrd="0" presId="urn:microsoft.com/office/officeart/2005/8/layout/default"/>
-    <dgm:cxn modelId="{E6779B19-6F04-46EA-A61E-7F016C9C6E3F}" srcId="{D18A70FB-C6B8-4D41-8E25-76E705DFC639}" destId="{1C23550A-44CA-479B-ABEE-39F4EFB63893}" srcOrd="0" destOrd="0" parTransId="{A03FA08C-7F35-4BE1-9151-30727F97B412}" sibTransId="{BEA31556-536E-404B-BEC6-B8671E30073A}"/>
-    <dgm:cxn modelId="{C6C2421A-7384-4264-9AE5-781B3F48DD43}" srcId="{5FB70007-B1CA-4F61-B5D9-38C0C9E119E6}" destId="{B21AE485-6E47-4FF8-8D4C-72F3377E8B56}" srcOrd="2" destOrd="0" parTransId="{1C29C88C-EEFD-4F47-B649-2EA7E7F6E02C}" sibTransId="{42F66939-761F-49BC-B8C4-A2D024FDFDDF}"/>
-    <dgm:cxn modelId="{5B44E81B-96D7-4F59-84F6-17D97B1FCDD9}" type="presOf" srcId="{1C23550A-44CA-479B-ABEE-39F4EFB63893}" destId="{FE0BB55D-226C-458C-A573-341B3A06416B}" srcOrd="0" destOrd="0" presId="urn:microsoft.com/office/officeart/2005/8/layout/default"/>
-    <dgm:cxn modelId="{4A5ACA1E-5512-45D0-89A6-F1DEC7BF3AAD}" type="presOf" srcId="{B21AE485-6E47-4FF8-8D4C-72F3377E8B56}" destId="{D9FDC1F9-3E2A-45B9-963A-06D90E2A94A2}" srcOrd="0" destOrd="3" presId="urn:microsoft.com/office/officeart/2005/8/layout/default"/>
-    <dgm:cxn modelId="{C0171921-F261-40F1-9A58-564E56EB974E}" srcId="{CEDFE102-B0BD-498D-A9F3-BD4DE2B2C325}" destId="{6BE87D4F-307B-4C94-890A-6218421FE1FA}" srcOrd="1" destOrd="0" parTransId="{65DF5821-9331-4A79-9725-AC4BF02AE9AC}" sibTransId="{0C074A7B-9AF7-469A-B13C-B5E24F039E01}"/>
-    <dgm:cxn modelId="{07AE5629-6E32-4177-B4D9-A922E5B469E9}" srcId="{D18A70FB-C6B8-4D41-8E25-76E705DFC639}" destId="{5FB70007-B1CA-4F61-B5D9-38C0C9E119E6}" srcOrd="1" destOrd="0" parTransId="{CEA2B7D3-4208-4166-AD58-7AE7F338DDFD}" sibTransId="{B8C39E32-8237-48A2-8826-5D1128C98C66}"/>
-    <dgm:cxn modelId="{E22FD63B-4C20-48C8-86B7-5F62079F8EFB}" type="presOf" srcId="{5D6971A4-C7F8-4EA7-824F-11F73AE92D62}" destId="{8D20680A-D784-4261-87DD-59888B6E48BF}" srcOrd="0" destOrd="0" presId="urn:microsoft.com/office/officeart/2005/8/layout/default"/>
-    <dgm:cxn modelId="{7C066668-D184-4F62-A4CB-61AA861B634B}" type="presOf" srcId="{CEDFE102-B0BD-498D-A9F3-BD4DE2B2C325}" destId="{882E09FF-C7FD-443D-9055-1C14289B78B7}" srcOrd="0" destOrd="0" presId="urn:microsoft.com/office/officeart/2005/8/layout/default"/>
-    <dgm:cxn modelId="{2F87CD70-4B7A-4C19-99E4-8733B7AFBEF0}" srcId="{5FB70007-B1CA-4F61-B5D9-38C0C9E119E6}" destId="{9A3BFD81-B03D-4DFF-ACAA-FB7FBF6A173F}" srcOrd="0" destOrd="0" parTransId="{4E89DF91-A1DD-4895-8CC3-965F9A591A19}" sibTransId="{86DECF8C-7C1C-483D-B257-AEFB0B39540C}"/>
-    <dgm:cxn modelId="{9CF4957D-DFDF-4F01-AE37-AB045FA94545}" type="presOf" srcId="{D18A70FB-C6B8-4D41-8E25-76E705DFC639}" destId="{443D14E8-58A9-4E11-95F4-C505479E2904}" srcOrd="0" destOrd="0" presId="urn:microsoft.com/office/officeart/2005/8/layout/default"/>
-    <dgm:cxn modelId="{1D4A9E82-C755-4C4C-B859-10C1047B4449}" srcId="{5FB70007-B1CA-4F61-B5D9-38C0C9E119E6}" destId="{7652E984-63FA-4A4C-9E81-8D9FE7EBF82C}" srcOrd="1" destOrd="0" parTransId="{42C0C48C-4D99-4C4E-B857-7D8B8C57E7C9}" sibTransId="{F4994F22-2FF4-4A7A-8F53-4277C5AE353D}"/>
-    <dgm:cxn modelId="{2EDB9588-BDF4-4B75-9853-55B5D17DE710}" type="presOf" srcId="{3320D6A3-4697-47C6-A08D-DD25CDEBA662}" destId="{5AE23B98-85B6-4FFC-A2EF-CD153EC42010}" srcOrd="0" destOrd="0" presId="urn:microsoft.com/office/officeart/2005/8/layout/default"/>
-    <dgm:cxn modelId="{F65A9390-E5A2-4ACB-A7D4-EC3A1A15F72F}" type="presOf" srcId="{6BE87D4F-307B-4C94-890A-6218421FE1FA}" destId="{882E09FF-C7FD-443D-9055-1C14289B78B7}" srcOrd="0" destOrd="2" presId="urn:microsoft.com/office/officeart/2005/8/layout/default"/>
-    <dgm:cxn modelId="{6793FD9D-14A8-41F6-95E6-1534CCADA5EB}" type="presOf" srcId="{7652E984-63FA-4A4C-9E81-8D9FE7EBF82C}" destId="{D9FDC1F9-3E2A-45B9-963A-06D90E2A94A2}" srcOrd="0" destOrd="2" presId="urn:microsoft.com/office/officeart/2005/8/layout/default"/>
-    <dgm:cxn modelId="{280A34A8-85AC-4B2B-A798-8BE5A9DCFCFE}" srcId="{D18A70FB-C6B8-4D41-8E25-76E705DFC639}" destId="{5D6971A4-C7F8-4EA7-824F-11F73AE92D62}" srcOrd="2" destOrd="0" parTransId="{AFC705A3-C25E-40C3-999A-A3A976FB7724}" sibTransId="{0A131A74-41DB-42ED-938A-FBA28BCFE8CF}"/>
-    <dgm:cxn modelId="{FE750BAB-6100-46ED-BE5B-6726E41342B8}" srcId="{D18A70FB-C6B8-4D41-8E25-76E705DFC639}" destId="{97B324CC-1706-42BC-9B5E-6EFE26DB835E}" srcOrd="5" destOrd="0" parTransId="{E7453E4D-7E65-4307-8789-40D70097DE9F}" sibTransId="{8222BD75-F2CB-47F4-A1F1-78138F4443F7}"/>
-    <dgm:cxn modelId="{B414AEAB-1914-4228-90D2-4F5BE3639AF9}" type="presOf" srcId="{5FB70007-B1CA-4F61-B5D9-38C0C9E119E6}" destId="{D9FDC1F9-3E2A-45B9-963A-06D90E2A94A2}" srcOrd="0" destOrd="0" presId="urn:microsoft.com/office/officeart/2005/8/layout/default"/>
-    <dgm:cxn modelId="{9A6DA9DE-7311-4B7E-BBDD-EFC85F609A28}" srcId="{D18A70FB-C6B8-4D41-8E25-76E705DFC639}" destId="{CEDFE102-B0BD-498D-A9F3-BD4DE2B2C325}" srcOrd="4" destOrd="0" parTransId="{6E6F0D8D-8A41-46A8-91F7-1FE20DC94D0B}" sibTransId="{9A68587D-2CF4-45D5-96FA-4F79B356BD89}"/>
-    <dgm:cxn modelId="{3C969EEA-DC54-43A7-8544-E2F3ABE51829}" srcId="{D18A70FB-C6B8-4D41-8E25-76E705DFC639}" destId="{3320D6A3-4697-47C6-A08D-DD25CDEBA662}" srcOrd="3" destOrd="0" parTransId="{16558905-D569-45BB-9284-D224B0EBDBD2}" sibTransId="{7782C75C-7E79-4F94-A8FC-C4200DB8C9E1}"/>
-    <dgm:cxn modelId="{04EED6F3-914A-49A7-A42C-DAA487CDA23B}" type="presOf" srcId="{1380D75D-64A8-4EDB-994B-38F139ED1C4C}" destId="{882E09FF-C7FD-443D-9055-1C14289B78B7}" srcOrd="0" destOrd="1" presId="urn:microsoft.com/office/officeart/2005/8/layout/default"/>
-    <dgm:cxn modelId="{F39F76F8-BD60-4767-AD9B-15741CE0A579}" srcId="{CEDFE102-B0BD-498D-A9F3-BD4DE2B2C325}" destId="{1380D75D-64A8-4EDB-994B-38F139ED1C4C}" srcOrd="0" destOrd="0" parTransId="{9FD7E34E-7E7F-423E-A3F7-C3F5A2F8D2E2}" sibTransId="{D75F5584-BF64-4276-A05D-1ACD95AD5A61}"/>
-    <dgm:cxn modelId="{670C8526-5A10-48E2-8AE6-FBC7CAE0484E}" type="presParOf" srcId="{443D14E8-58A9-4E11-95F4-C505479E2904}" destId="{FE0BB55D-226C-458C-A573-341B3A06416B}" srcOrd="0" destOrd="0" presId="urn:microsoft.com/office/officeart/2005/8/layout/default"/>
-    <dgm:cxn modelId="{BDB7E051-5852-4ED2-B690-525FB3FA8220}" type="presParOf" srcId="{443D14E8-58A9-4E11-95F4-C505479E2904}" destId="{A4537DFD-86BA-4D30-A239-E0F07B08687C}" srcOrd="1" destOrd="0" presId="urn:microsoft.com/office/officeart/2005/8/layout/default"/>
-    <dgm:cxn modelId="{E7A7C931-4AD1-46FF-B7AE-F4EEF732D732}" type="presParOf" srcId="{443D14E8-58A9-4E11-95F4-C505479E2904}" destId="{D9FDC1F9-3E2A-45B9-963A-06D90E2A94A2}" srcOrd="2" destOrd="0" presId="urn:microsoft.com/office/officeart/2005/8/layout/default"/>
-    <dgm:cxn modelId="{107C0A60-3513-49DB-A3D1-C63CF42D4498}" type="presParOf" srcId="{443D14E8-58A9-4E11-95F4-C505479E2904}" destId="{F5ED1392-963E-4160-92EB-C77A9F32F262}" srcOrd="3" destOrd="0" presId="urn:microsoft.com/office/officeart/2005/8/layout/default"/>
-    <dgm:cxn modelId="{393E53F7-0CE9-44A2-8971-FEF730A33133}" type="presParOf" srcId="{443D14E8-58A9-4E11-95F4-C505479E2904}" destId="{8D20680A-D784-4261-87DD-59888B6E48BF}" srcOrd="4" destOrd="0" presId="urn:microsoft.com/office/officeart/2005/8/layout/default"/>
-    <dgm:cxn modelId="{2CA76A7D-E645-4442-AC72-B67E4ACBA7B1}" type="presParOf" srcId="{443D14E8-58A9-4E11-95F4-C505479E2904}" destId="{A19AE5BA-CCF5-4E0B-ABEA-EA968DC85B2D}" srcOrd="5" destOrd="0" presId="urn:microsoft.com/office/officeart/2005/8/layout/default"/>
-    <dgm:cxn modelId="{DCEE4B81-6A00-45BA-BA9C-5F1EEC3AC83C}" type="presParOf" srcId="{443D14E8-58A9-4E11-95F4-C505479E2904}" destId="{5AE23B98-85B6-4FFC-A2EF-CD153EC42010}" srcOrd="6" destOrd="0" presId="urn:microsoft.com/office/officeart/2005/8/layout/default"/>
-    <dgm:cxn modelId="{4C7166B8-AB1E-4A0F-B8D6-137C7051593E}" type="presParOf" srcId="{443D14E8-58A9-4E11-95F4-C505479E2904}" destId="{E2B8B87D-94F8-4231-BDA2-AEE67B03AFC3}" srcOrd="7" destOrd="0" presId="urn:microsoft.com/office/officeart/2005/8/layout/default"/>
-    <dgm:cxn modelId="{ABA6A927-B925-4172-B3ED-345947A784CE}" type="presParOf" srcId="{443D14E8-58A9-4E11-95F4-C505479E2904}" destId="{882E09FF-C7FD-443D-9055-1C14289B78B7}" srcOrd="8" destOrd="0" presId="urn:microsoft.com/office/officeart/2005/8/layout/default"/>
-    <dgm:cxn modelId="{342B3CA3-E508-452B-9C67-316A566600FB}" type="presParOf" srcId="{443D14E8-58A9-4E11-95F4-C505479E2904}" destId="{C3D9CB78-4124-4AB5-A6D2-7A032332104C}" srcOrd="9" destOrd="0" presId="urn:microsoft.com/office/officeart/2005/8/layout/default"/>
-    <dgm:cxn modelId="{A591142E-A026-4162-A369-B5A67358FB99}" type="presParOf" srcId="{443D14E8-58A9-4E11-95F4-C505479E2904}" destId="{F6B6280C-52ED-4D88-BAFE-88EF63B9EE93}" srcOrd="10" destOrd="0" presId="urn:microsoft.com/office/officeart/2005/8/layout/default"/>
-  </dgm:cxnLst>
-  <dgm:bg/>
-  <dgm:whole/>
-  <dgm:extLst>
-    <a:ext uri="http://schemas.microsoft.com/office/drawing/2008/diagram">
-      <dsp:dataModelExt xmlns:dsp="http://schemas.microsoft.com/office/drawing/2008/diagram" relId="rId8" minVer="http://schemas.openxmlformats.org/drawingml/2006/diagram"/>
     </a:ext>
   </dgm:extLst>
 </dgm:dataModel>
@@ -8646,6 +8646,570 @@
       <dsp:cNvGrpSpPr/>
     </dsp:nvGrpSpPr>
     <dsp:grpSpPr/>
+    <dsp:sp modelId="{FE0BB55D-226C-458C-A573-341B3A06416B}">
+      <dsp:nvSpPr>
+        <dsp:cNvPr id="0" name=""/>
+        <dsp:cNvSpPr/>
+      </dsp:nvSpPr>
+      <dsp:spPr>
+        <a:xfrm>
+          <a:off x="48170" y="660"/>
+          <a:ext cx="2210431" cy="1326259"/>
+        </a:xfrm>
+        <a:prstGeom prst="rect">
+          <a:avLst/>
+        </a:prstGeom>
+        <a:solidFill>
+          <a:schemeClr val="accent2">
+            <a:hueOff val="0"/>
+            <a:satOff val="0"/>
+            <a:lumOff val="0"/>
+            <a:alphaOff val="0"/>
+          </a:schemeClr>
+        </a:solidFill>
+        <a:ln w="15875" cap="flat" cmpd="sng" algn="ctr">
+          <a:solidFill>
+            <a:schemeClr val="lt1">
+              <a:hueOff val="0"/>
+              <a:satOff val="0"/>
+              <a:lumOff val="0"/>
+              <a:alphaOff val="0"/>
+            </a:schemeClr>
+          </a:solidFill>
+          <a:prstDash val="solid"/>
+        </a:ln>
+        <a:effectLst/>
+      </dsp:spPr>
+      <dsp:style>
+        <a:lnRef idx="2">
+          <a:scrgbClr r="0" g="0" b="0"/>
+        </a:lnRef>
+        <a:fillRef idx="1">
+          <a:scrgbClr r="0" g="0" b="0"/>
+        </a:fillRef>
+        <a:effectRef idx="0">
+          <a:scrgbClr r="0" g="0" b="0"/>
+        </a:effectRef>
+        <a:fontRef idx="minor">
+          <a:schemeClr val="lt1"/>
+        </a:fontRef>
+      </dsp:style>
+      <dsp:txBody>
+        <a:bodyPr spcFirstLastPara="0" vert="horz" wrap="square" lIns="68580" tIns="68580" rIns="68580" bIns="68580" numCol="1" spcCol="1270" anchor="ctr" anchorCtr="0">
+          <a:noAutofit/>
+        </a:bodyPr>
+        <a:lstStyle/>
+        <a:p>
+          <a:pPr marL="0" lvl="0" indent="0" algn="ctr" defTabSz="800100">
+            <a:lnSpc>
+              <a:spcPct val="90000"/>
+            </a:lnSpc>
+            <a:spcBef>
+              <a:spcPct val="0"/>
+            </a:spcBef>
+            <a:spcAft>
+              <a:spcPct val="35000"/>
+            </a:spcAft>
+            <a:buNone/>
+          </a:pPr>
+          <a:r>
+            <a:rPr lang="en-US" sz="1800" kern="1200"/>
+            <a:t>Legal word checking</a:t>
+          </a:r>
+        </a:p>
+      </dsp:txBody>
+      <dsp:txXfrm>
+        <a:off x="48170" y="660"/>
+        <a:ext cx="2210431" cy="1326259"/>
+      </dsp:txXfrm>
+    </dsp:sp>
+    <dsp:sp modelId="{D9FDC1F9-3E2A-45B9-963A-06D90E2A94A2}">
+      <dsp:nvSpPr>
+        <dsp:cNvPr id="0" name=""/>
+        <dsp:cNvSpPr/>
+      </dsp:nvSpPr>
+      <dsp:spPr>
+        <a:xfrm>
+          <a:off x="2479645" y="660"/>
+          <a:ext cx="2210431" cy="1326259"/>
+        </a:xfrm>
+        <a:prstGeom prst="rect">
+          <a:avLst/>
+        </a:prstGeom>
+        <a:solidFill>
+          <a:schemeClr val="accent2">
+            <a:hueOff val="672631"/>
+            <a:satOff val="-714"/>
+            <a:lumOff val="549"/>
+            <a:alphaOff val="0"/>
+          </a:schemeClr>
+        </a:solidFill>
+        <a:ln w="15875" cap="flat" cmpd="sng" algn="ctr">
+          <a:solidFill>
+            <a:schemeClr val="lt1">
+              <a:hueOff val="0"/>
+              <a:satOff val="0"/>
+              <a:lumOff val="0"/>
+              <a:alphaOff val="0"/>
+            </a:schemeClr>
+          </a:solidFill>
+          <a:prstDash val="solid"/>
+        </a:ln>
+        <a:effectLst/>
+      </dsp:spPr>
+      <dsp:style>
+        <a:lnRef idx="2">
+          <a:scrgbClr r="0" g="0" b="0"/>
+        </a:lnRef>
+        <a:fillRef idx="1">
+          <a:scrgbClr r="0" g="0" b="0"/>
+        </a:fillRef>
+        <a:effectRef idx="0">
+          <a:scrgbClr r="0" g="0" b="0"/>
+        </a:effectRef>
+        <a:fontRef idx="minor">
+          <a:schemeClr val="lt1"/>
+        </a:fontRef>
+      </dsp:style>
+      <dsp:txBody>
+        <a:bodyPr spcFirstLastPara="0" vert="horz" wrap="square" lIns="68580" tIns="68580" rIns="68580" bIns="68580" numCol="1" spcCol="1270" anchor="t" anchorCtr="0">
+          <a:noAutofit/>
+        </a:bodyPr>
+        <a:lstStyle/>
+        <a:p>
+          <a:pPr marL="0" lvl="0" indent="0" algn="l" defTabSz="800100">
+            <a:lnSpc>
+              <a:spcPct val="90000"/>
+            </a:lnSpc>
+            <a:spcBef>
+              <a:spcPct val="0"/>
+            </a:spcBef>
+            <a:spcAft>
+              <a:spcPct val="35000"/>
+            </a:spcAft>
+            <a:buNone/>
+          </a:pPr>
+          <a:r>
+            <a:rPr lang="en-US" sz="1800" kern="1200"/>
+            <a:t>Custom legal word checking dictionaries</a:t>
+          </a:r>
+        </a:p>
+        <a:p>
+          <a:pPr marL="114300" lvl="1" indent="-114300" algn="l" defTabSz="622300">
+            <a:lnSpc>
+              <a:spcPct val="90000"/>
+            </a:lnSpc>
+            <a:spcBef>
+              <a:spcPct val="0"/>
+            </a:spcBef>
+            <a:spcAft>
+              <a:spcPct val="15000"/>
+            </a:spcAft>
+            <a:buChar char="•"/>
+          </a:pPr>
+          <a:r>
+            <a:rPr lang="en-US" sz="1400" kern="1200"/>
+            <a:t>Acronyms</a:t>
+          </a:r>
+        </a:p>
+        <a:p>
+          <a:pPr marL="114300" lvl="1" indent="-114300" algn="l" defTabSz="622300">
+            <a:lnSpc>
+              <a:spcPct val="90000"/>
+            </a:lnSpc>
+            <a:spcBef>
+              <a:spcPct val="0"/>
+            </a:spcBef>
+            <a:spcAft>
+              <a:spcPct val="15000"/>
+            </a:spcAft>
+            <a:buChar char="•"/>
+          </a:pPr>
+          <a:r>
+            <a:rPr lang="en-US" sz="1400" kern="1200"/>
+            <a:t>Foreign language</a:t>
+          </a:r>
+        </a:p>
+        <a:p>
+          <a:pPr marL="114300" lvl="1" indent="-114300" algn="l" defTabSz="622300">
+            <a:lnSpc>
+              <a:spcPct val="90000"/>
+            </a:lnSpc>
+            <a:spcBef>
+              <a:spcPct val="0"/>
+            </a:spcBef>
+            <a:spcAft>
+              <a:spcPct val="15000"/>
+            </a:spcAft>
+            <a:buChar char="•"/>
+          </a:pPr>
+          <a:r>
+            <a:rPr lang="en-US" sz="1400" kern="1200"/>
+            <a:t>Slang</a:t>
+          </a:r>
+        </a:p>
+      </dsp:txBody>
+      <dsp:txXfrm>
+        <a:off x="2479645" y="660"/>
+        <a:ext cx="2210431" cy="1326259"/>
+      </dsp:txXfrm>
+    </dsp:sp>
+    <dsp:sp modelId="{8D20680A-D784-4261-87DD-59888B6E48BF}">
+      <dsp:nvSpPr>
+        <dsp:cNvPr id="0" name=""/>
+        <dsp:cNvSpPr/>
+      </dsp:nvSpPr>
+      <dsp:spPr>
+        <a:xfrm>
+          <a:off x="4911120" y="660"/>
+          <a:ext cx="2210431" cy="1326259"/>
+        </a:xfrm>
+        <a:prstGeom prst="rect">
+          <a:avLst/>
+        </a:prstGeom>
+        <a:solidFill>
+          <a:schemeClr val="accent2">
+            <a:hueOff val="1345262"/>
+            <a:satOff val="-1429"/>
+            <a:lumOff val="1098"/>
+            <a:alphaOff val="0"/>
+          </a:schemeClr>
+        </a:solidFill>
+        <a:ln w="15875" cap="flat" cmpd="sng" algn="ctr">
+          <a:solidFill>
+            <a:schemeClr val="lt1">
+              <a:hueOff val="0"/>
+              <a:satOff val="0"/>
+              <a:lumOff val="0"/>
+              <a:alphaOff val="0"/>
+            </a:schemeClr>
+          </a:solidFill>
+          <a:prstDash val="solid"/>
+        </a:ln>
+        <a:effectLst/>
+      </dsp:spPr>
+      <dsp:style>
+        <a:lnRef idx="2">
+          <a:scrgbClr r="0" g="0" b="0"/>
+        </a:lnRef>
+        <a:fillRef idx="1">
+          <a:scrgbClr r="0" g="0" b="0"/>
+        </a:fillRef>
+        <a:effectRef idx="0">
+          <a:scrgbClr r="0" g="0" b="0"/>
+        </a:effectRef>
+        <a:fontRef idx="minor">
+          <a:schemeClr val="lt1"/>
+        </a:fontRef>
+      </dsp:style>
+      <dsp:txBody>
+        <a:bodyPr spcFirstLastPara="0" vert="horz" wrap="square" lIns="68580" tIns="68580" rIns="68580" bIns="68580" numCol="1" spcCol="1270" anchor="ctr" anchorCtr="0">
+          <a:noAutofit/>
+        </a:bodyPr>
+        <a:lstStyle/>
+        <a:p>
+          <a:pPr marL="0" lvl="0" indent="0" algn="ctr" defTabSz="800100">
+            <a:lnSpc>
+              <a:spcPct val="90000"/>
+            </a:lnSpc>
+            <a:spcBef>
+              <a:spcPct val="0"/>
+            </a:spcBef>
+            <a:spcAft>
+              <a:spcPct val="35000"/>
+            </a:spcAft>
+            <a:buNone/>
+          </a:pPr>
+          <a:r>
+            <a:rPr lang="en-US" sz="1800" kern="1200"/>
+            <a:t>Display word definitions</a:t>
+          </a:r>
+        </a:p>
+      </dsp:txBody>
+      <dsp:txXfrm>
+        <a:off x="4911120" y="660"/>
+        <a:ext cx="2210431" cy="1326259"/>
+      </dsp:txXfrm>
+    </dsp:sp>
+    <dsp:sp modelId="{5AE23B98-85B6-4FFC-A2EF-CD153EC42010}">
+      <dsp:nvSpPr>
+        <dsp:cNvPr id="0" name=""/>
+        <dsp:cNvSpPr/>
+      </dsp:nvSpPr>
+      <dsp:spPr>
+        <a:xfrm>
+          <a:off x="7342595" y="660"/>
+          <a:ext cx="2210431" cy="1326259"/>
+        </a:xfrm>
+        <a:prstGeom prst="rect">
+          <a:avLst/>
+        </a:prstGeom>
+        <a:solidFill>
+          <a:schemeClr val="accent2">
+            <a:hueOff val="2017893"/>
+            <a:satOff val="-2143"/>
+            <a:lumOff val="1647"/>
+            <a:alphaOff val="0"/>
+          </a:schemeClr>
+        </a:solidFill>
+        <a:ln w="15875" cap="flat" cmpd="sng" algn="ctr">
+          <a:solidFill>
+            <a:schemeClr val="lt1">
+              <a:hueOff val="0"/>
+              <a:satOff val="0"/>
+              <a:lumOff val="0"/>
+              <a:alphaOff val="0"/>
+            </a:schemeClr>
+          </a:solidFill>
+          <a:prstDash val="solid"/>
+        </a:ln>
+        <a:effectLst/>
+      </dsp:spPr>
+      <dsp:style>
+        <a:lnRef idx="2">
+          <a:scrgbClr r="0" g="0" b="0"/>
+        </a:lnRef>
+        <a:fillRef idx="1">
+          <a:scrgbClr r="0" g="0" b="0"/>
+        </a:fillRef>
+        <a:effectRef idx="0">
+          <a:scrgbClr r="0" g="0" b="0"/>
+        </a:effectRef>
+        <a:fontRef idx="minor">
+          <a:schemeClr val="lt1"/>
+        </a:fontRef>
+      </dsp:style>
+      <dsp:txBody>
+        <a:bodyPr spcFirstLastPara="0" vert="horz" wrap="square" lIns="68580" tIns="68580" rIns="68580" bIns="68580" numCol="1" spcCol="1270" anchor="ctr" anchorCtr="0">
+          <a:noAutofit/>
+        </a:bodyPr>
+        <a:lstStyle/>
+        <a:p>
+          <a:pPr marL="0" lvl="0" indent="0" algn="ctr" defTabSz="800100">
+            <a:lnSpc>
+              <a:spcPct val="90000"/>
+            </a:lnSpc>
+            <a:spcBef>
+              <a:spcPct val="0"/>
+            </a:spcBef>
+            <a:spcAft>
+              <a:spcPct val="35000"/>
+            </a:spcAft>
+            <a:buNone/>
+          </a:pPr>
+          <a:r>
+            <a:rPr lang="en-US" sz="1800" kern="1200"/>
+            <a:t>Realtime word validation</a:t>
+          </a:r>
+        </a:p>
+      </dsp:txBody>
+      <dsp:txXfrm>
+        <a:off x="7342595" y="660"/>
+        <a:ext cx="2210431" cy="1326259"/>
+      </dsp:txXfrm>
+    </dsp:sp>
+    <dsp:sp modelId="{882E09FF-C7FD-443D-9055-1C14289B78B7}">
+      <dsp:nvSpPr>
+        <dsp:cNvPr id="0" name=""/>
+        <dsp:cNvSpPr/>
+      </dsp:nvSpPr>
+      <dsp:spPr>
+        <a:xfrm>
+          <a:off x="2479645" y="1547963"/>
+          <a:ext cx="2210431" cy="1326259"/>
+        </a:xfrm>
+        <a:prstGeom prst="rect">
+          <a:avLst/>
+        </a:prstGeom>
+        <a:solidFill>
+          <a:schemeClr val="accent2">
+            <a:hueOff val="2690524"/>
+            <a:satOff val="-2858"/>
+            <a:lumOff val="2196"/>
+            <a:alphaOff val="0"/>
+          </a:schemeClr>
+        </a:solidFill>
+        <a:ln w="15875" cap="flat" cmpd="sng" algn="ctr">
+          <a:solidFill>
+            <a:schemeClr val="lt1">
+              <a:hueOff val="0"/>
+              <a:satOff val="0"/>
+              <a:lumOff val="0"/>
+              <a:alphaOff val="0"/>
+            </a:schemeClr>
+          </a:solidFill>
+          <a:prstDash val="solid"/>
+        </a:ln>
+        <a:effectLst/>
+      </dsp:spPr>
+      <dsp:style>
+        <a:lnRef idx="2">
+          <a:scrgbClr r="0" g="0" b="0"/>
+        </a:lnRef>
+        <a:fillRef idx="1">
+          <a:scrgbClr r="0" g="0" b="0"/>
+        </a:fillRef>
+        <a:effectRef idx="0">
+          <a:scrgbClr r="0" g="0" b="0"/>
+        </a:effectRef>
+        <a:fontRef idx="minor">
+          <a:schemeClr val="lt1"/>
+        </a:fontRef>
+      </dsp:style>
+      <dsp:txBody>
+        <a:bodyPr spcFirstLastPara="0" vert="horz" wrap="square" lIns="68580" tIns="68580" rIns="68580" bIns="68580" numCol="1" spcCol="1270" anchor="t" anchorCtr="0">
+          <a:noAutofit/>
+        </a:bodyPr>
+        <a:lstStyle/>
+        <a:p>
+          <a:pPr marL="0" lvl="0" indent="0" algn="l" defTabSz="800100">
+            <a:lnSpc>
+              <a:spcPct val="90000"/>
+            </a:lnSpc>
+            <a:spcBef>
+              <a:spcPct val="0"/>
+            </a:spcBef>
+            <a:spcAft>
+              <a:spcPct val="35000"/>
+            </a:spcAft>
+            <a:buNone/>
+          </a:pPr>
+          <a:r>
+            <a:rPr lang="en-US" sz="1800" kern="1200"/>
+            <a:t>Game modifiers </a:t>
+          </a:r>
+        </a:p>
+        <a:p>
+          <a:pPr marL="114300" lvl="1" indent="-114300" algn="l" defTabSz="622300">
+            <a:lnSpc>
+              <a:spcPct val="90000"/>
+            </a:lnSpc>
+            <a:spcBef>
+              <a:spcPct val="0"/>
+            </a:spcBef>
+            <a:spcAft>
+              <a:spcPct val="15000"/>
+            </a:spcAft>
+            <a:buChar char="•"/>
+          </a:pPr>
+          <a:r>
+            <a:rPr lang="en-US" sz="1400" kern="1200"/>
+            <a:t>Tile/word limits</a:t>
+          </a:r>
+        </a:p>
+        <a:p>
+          <a:pPr marL="114300" lvl="1" indent="-114300" algn="l" defTabSz="622300">
+            <a:lnSpc>
+              <a:spcPct val="90000"/>
+            </a:lnSpc>
+            <a:spcBef>
+              <a:spcPct val="0"/>
+            </a:spcBef>
+            <a:spcAft>
+              <a:spcPct val="15000"/>
+            </a:spcAft>
+            <a:buChar char="•"/>
+          </a:pPr>
+          <a:r>
+            <a:rPr lang="en-US" sz="1400" kern="1200"/>
+            <a:t>Turn time limit</a:t>
+          </a:r>
+        </a:p>
+      </dsp:txBody>
+      <dsp:txXfrm>
+        <a:off x="2479645" y="1547963"/>
+        <a:ext cx="2210431" cy="1326259"/>
+      </dsp:txXfrm>
+    </dsp:sp>
+    <dsp:sp modelId="{F6B6280C-52ED-4D88-BAFE-88EF63B9EE93}">
+      <dsp:nvSpPr>
+        <dsp:cNvPr id="0" name=""/>
+        <dsp:cNvSpPr/>
+      </dsp:nvSpPr>
+      <dsp:spPr>
+        <a:xfrm>
+          <a:off x="4911120" y="1547963"/>
+          <a:ext cx="2210431" cy="1326259"/>
+        </a:xfrm>
+        <a:prstGeom prst="rect">
+          <a:avLst/>
+        </a:prstGeom>
+        <a:solidFill>
+          <a:schemeClr val="accent2">
+            <a:hueOff val="3363155"/>
+            <a:satOff val="-3572"/>
+            <a:lumOff val="2745"/>
+            <a:alphaOff val="0"/>
+          </a:schemeClr>
+        </a:solidFill>
+        <a:ln w="15875" cap="flat" cmpd="sng" algn="ctr">
+          <a:solidFill>
+            <a:schemeClr val="lt1">
+              <a:hueOff val="0"/>
+              <a:satOff val="0"/>
+              <a:lumOff val="0"/>
+              <a:alphaOff val="0"/>
+            </a:schemeClr>
+          </a:solidFill>
+          <a:prstDash val="solid"/>
+        </a:ln>
+        <a:effectLst/>
+      </dsp:spPr>
+      <dsp:style>
+        <a:lnRef idx="2">
+          <a:scrgbClr r="0" g="0" b="0"/>
+        </a:lnRef>
+        <a:fillRef idx="1">
+          <a:scrgbClr r="0" g="0" b="0"/>
+        </a:fillRef>
+        <a:effectRef idx="0">
+          <a:scrgbClr r="0" g="0" b="0"/>
+        </a:effectRef>
+        <a:fontRef idx="minor">
+          <a:schemeClr val="lt1"/>
+        </a:fontRef>
+      </dsp:style>
+      <dsp:txBody>
+        <a:bodyPr spcFirstLastPara="0" vert="horz" wrap="square" lIns="68580" tIns="68580" rIns="68580" bIns="68580" numCol="1" spcCol="1270" anchor="ctr" anchorCtr="0">
+          <a:noAutofit/>
+        </a:bodyPr>
+        <a:lstStyle/>
+        <a:p>
+          <a:pPr marL="0" lvl="0" indent="0" algn="ctr" defTabSz="800100">
+            <a:lnSpc>
+              <a:spcPct val="90000"/>
+            </a:lnSpc>
+            <a:spcBef>
+              <a:spcPct val="0"/>
+            </a:spcBef>
+            <a:spcAft>
+              <a:spcPct val="35000"/>
+            </a:spcAft>
+            <a:buNone/>
+          </a:pPr>
+          <a:r>
+            <a:rPr lang="en-US" sz="1800" kern="1200"/>
+            <a:t>Character selection for blank tiles</a:t>
+          </a:r>
+        </a:p>
+      </dsp:txBody>
+      <dsp:txXfrm>
+        <a:off x="4911120" y="1547963"/>
+        <a:ext cx="2210431" cy="1326259"/>
+      </dsp:txXfrm>
+    </dsp:sp>
+  </dsp:spTree>
+</dsp:drawing>
+</file>
+
+<file path=ppt/diagrams/drawing5.xml><?xml version="1.0" encoding="utf-8"?>
+<dsp:drawing xmlns:dgm="http://schemas.openxmlformats.org/drawingml/2006/diagram" xmlns:dsp="http://schemas.microsoft.com/office/drawing/2008/diagram" xmlns:a="http://schemas.openxmlformats.org/drawingml/2006/main">
+  <dsp:spTree>
+    <dsp:nvGrpSpPr>
+      <dsp:cNvPr id="0" name=""/>
+      <dsp:cNvGrpSpPr/>
+    </dsp:nvGrpSpPr>
+    <dsp:grpSpPr/>
     <dsp:sp modelId="{CEB893A2-A605-4A7A-9D78-58D02A13ED8A}">
       <dsp:nvSpPr>
         <dsp:cNvPr id="0" name=""/>
@@ -9596,570 +10160,6 @@
 </dsp:drawing>
 </file>
 
-<file path=ppt/diagrams/drawing5.xml><?xml version="1.0" encoding="utf-8"?>
-<dsp:drawing xmlns:dgm="http://schemas.openxmlformats.org/drawingml/2006/diagram" xmlns:dsp="http://schemas.microsoft.com/office/drawing/2008/diagram" xmlns:a="http://schemas.openxmlformats.org/drawingml/2006/main">
-  <dsp:spTree>
-    <dsp:nvGrpSpPr>
-      <dsp:cNvPr id="0" name=""/>
-      <dsp:cNvGrpSpPr/>
-    </dsp:nvGrpSpPr>
-    <dsp:grpSpPr/>
-    <dsp:sp modelId="{FE0BB55D-226C-458C-A573-341B3A06416B}">
-      <dsp:nvSpPr>
-        <dsp:cNvPr id="0" name=""/>
-        <dsp:cNvSpPr/>
-      </dsp:nvSpPr>
-      <dsp:spPr>
-        <a:xfrm>
-          <a:off x="48170" y="660"/>
-          <a:ext cx="2210431" cy="1326259"/>
-        </a:xfrm>
-        <a:prstGeom prst="rect">
-          <a:avLst/>
-        </a:prstGeom>
-        <a:solidFill>
-          <a:schemeClr val="accent2">
-            <a:hueOff val="0"/>
-            <a:satOff val="0"/>
-            <a:lumOff val="0"/>
-            <a:alphaOff val="0"/>
-          </a:schemeClr>
-        </a:solidFill>
-        <a:ln w="15875" cap="flat" cmpd="sng" algn="ctr">
-          <a:solidFill>
-            <a:schemeClr val="lt1">
-              <a:hueOff val="0"/>
-              <a:satOff val="0"/>
-              <a:lumOff val="0"/>
-              <a:alphaOff val="0"/>
-            </a:schemeClr>
-          </a:solidFill>
-          <a:prstDash val="solid"/>
-        </a:ln>
-        <a:effectLst/>
-      </dsp:spPr>
-      <dsp:style>
-        <a:lnRef idx="2">
-          <a:scrgbClr r="0" g="0" b="0"/>
-        </a:lnRef>
-        <a:fillRef idx="1">
-          <a:scrgbClr r="0" g="0" b="0"/>
-        </a:fillRef>
-        <a:effectRef idx="0">
-          <a:scrgbClr r="0" g="0" b="0"/>
-        </a:effectRef>
-        <a:fontRef idx="minor">
-          <a:schemeClr val="lt1"/>
-        </a:fontRef>
-      </dsp:style>
-      <dsp:txBody>
-        <a:bodyPr spcFirstLastPara="0" vert="horz" wrap="square" lIns="68580" tIns="68580" rIns="68580" bIns="68580" numCol="1" spcCol="1270" anchor="ctr" anchorCtr="0">
-          <a:noAutofit/>
-        </a:bodyPr>
-        <a:lstStyle/>
-        <a:p>
-          <a:pPr marL="0" lvl="0" indent="0" algn="ctr" defTabSz="800100">
-            <a:lnSpc>
-              <a:spcPct val="90000"/>
-            </a:lnSpc>
-            <a:spcBef>
-              <a:spcPct val="0"/>
-            </a:spcBef>
-            <a:spcAft>
-              <a:spcPct val="35000"/>
-            </a:spcAft>
-            <a:buNone/>
-          </a:pPr>
-          <a:r>
-            <a:rPr lang="en-US" sz="1800" kern="1200"/>
-            <a:t>Legal word checking</a:t>
-          </a:r>
-        </a:p>
-      </dsp:txBody>
-      <dsp:txXfrm>
-        <a:off x="48170" y="660"/>
-        <a:ext cx="2210431" cy="1326259"/>
-      </dsp:txXfrm>
-    </dsp:sp>
-    <dsp:sp modelId="{D9FDC1F9-3E2A-45B9-963A-06D90E2A94A2}">
-      <dsp:nvSpPr>
-        <dsp:cNvPr id="0" name=""/>
-        <dsp:cNvSpPr/>
-      </dsp:nvSpPr>
-      <dsp:spPr>
-        <a:xfrm>
-          <a:off x="2479645" y="660"/>
-          <a:ext cx="2210431" cy="1326259"/>
-        </a:xfrm>
-        <a:prstGeom prst="rect">
-          <a:avLst/>
-        </a:prstGeom>
-        <a:solidFill>
-          <a:schemeClr val="accent2">
-            <a:hueOff val="672631"/>
-            <a:satOff val="-714"/>
-            <a:lumOff val="549"/>
-            <a:alphaOff val="0"/>
-          </a:schemeClr>
-        </a:solidFill>
-        <a:ln w="15875" cap="flat" cmpd="sng" algn="ctr">
-          <a:solidFill>
-            <a:schemeClr val="lt1">
-              <a:hueOff val="0"/>
-              <a:satOff val="0"/>
-              <a:lumOff val="0"/>
-              <a:alphaOff val="0"/>
-            </a:schemeClr>
-          </a:solidFill>
-          <a:prstDash val="solid"/>
-        </a:ln>
-        <a:effectLst/>
-      </dsp:spPr>
-      <dsp:style>
-        <a:lnRef idx="2">
-          <a:scrgbClr r="0" g="0" b="0"/>
-        </a:lnRef>
-        <a:fillRef idx="1">
-          <a:scrgbClr r="0" g="0" b="0"/>
-        </a:fillRef>
-        <a:effectRef idx="0">
-          <a:scrgbClr r="0" g="0" b="0"/>
-        </a:effectRef>
-        <a:fontRef idx="minor">
-          <a:schemeClr val="lt1"/>
-        </a:fontRef>
-      </dsp:style>
-      <dsp:txBody>
-        <a:bodyPr spcFirstLastPara="0" vert="horz" wrap="square" lIns="68580" tIns="68580" rIns="68580" bIns="68580" numCol="1" spcCol="1270" anchor="t" anchorCtr="0">
-          <a:noAutofit/>
-        </a:bodyPr>
-        <a:lstStyle/>
-        <a:p>
-          <a:pPr marL="0" lvl="0" indent="0" algn="l" defTabSz="800100">
-            <a:lnSpc>
-              <a:spcPct val="90000"/>
-            </a:lnSpc>
-            <a:spcBef>
-              <a:spcPct val="0"/>
-            </a:spcBef>
-            <a:spcAft>
-              <a:spcPct val="35000"/>
-            </a:spcAft>
-            <a:buNone/>
-          </a:pPr>
-          <a:r>
-            <a:rPr lang="en-US" sz="1800" kern="1200"/>
-            <a:t>Custom legal word checking dictionaries</a:t>
-          </a:r>
-        </a:p>
-        <a:p>
-          <a:pPr marL="114300" lvl="1" indent="-114300" algn="l" defTabSz="622300">
-            <a:lnSpc>
-              <a:spcPct val="90000"/>
-            </a:lnSpc>
-            <a:spcBef>
-              <a:spcPct val="0"/>
-            </a:spcBef>
-            <a:spcAft>
-              <a:spcPct val="15000"/>
-            </a:spcAft>
-            <a:buChar char="•"/>
-          </a:pPr>
-          <a:r>
-            <a:rPr lang="en-US" sz="1400" kern="1200"/>
-            <a:t>Acronyms</a:t>
-          </a:r>
-        </a:p>
-        <a:p>
-          <a:pPr marL="114300" lvl="1" indent="-114300" algn="l" defTabSz="622300">
-            <a:lnSpc>
-              <a:spcPct val="90000"/>
-            </a:lnSpc>
-            <a:spcBef>
-              <a:spcPct val="0"/>
-            </a:spcBef>
-            <a:spcAft>
-              <a:spcPct val="15000"/>
-            </a:spcAft>
-            <a:buChar char="•"/>
-          </a:pPr>
-          <a:r>
-            <a:rPr lang="en-US" sz="1400" kern="1200"/>
-            <a:t>Foreign language</a:t>
-          </a:r>
-        </a:p>
-        <a:p>
-          <a:pPr marL="114300" lvl="1" indent="-114300" algn="l" defTabSz="622300">
-            <a:lnSpc>
-              <a:spcPct val="90000"/>
-            </a:lnSpc>
-            <a:spcBef>
-              <a:spcPct val="0"/>
-            </a:spcBef>
-            <a:spcAft>
-              <a:spcPct val="15000"/>
-            </a:spcAft>
-            <a:buChar char="•"/>
-          </a:pPr>
-          <a:r>
-            <a:rPr lang="en-US" sz="1400" kern="1200"/>
-            <a:t>Slang</a:t>
-          </a:r>
-        </a:p>
-      </dsp:txBody>
-      <dsp:txXfrm>
-        <a:off x="2479645" y="660"/>
-        <a:ext cx="2210431" cy="1326259"/>
-      </dsp:txXfrm>
-    </dsp:sp>
-    <dsp:sp modelId="{8D20680A-D784-4261-87DD-59888B6E48BF}">
-      <dsp:nvSpPr>
-        <dsp:cNvPr id="0" name=""/>
-        <dsp:cNvSpPr/>
-      </dsp:nvSpPr>
-      <dsp:spPr>
-        <a:xfrm>
-          <a:off x="4911120" y="660"/>
-          <a:ext cx="2210431" cy="1326259"/>
-        </a:xfrm>
-        <a:prstGeom prst="rect">
-          <a:avLst/>
-        </a:prstGeom>
-        <a:solidFill>
-          <a:schemeClr val="accent2">
-            <a:hueOff val="1345262"/>
-            <a:satOff val="-1429"/>
-            <a:lumOff val="1098"/>
-            <a:alphaOff val="0"/>
-          </a:schemeClr>
-        </a:solidFill>
-        <a:ln w="15875" cap="flat" cmpd="sng" algn="ctr">
-          <a:solidFill>
-            <a:schemeClr val="lt1">
-              <a:hueOff val="0"/>
-              <a:satOff val="0"/>
-              <a:lumOff val="0"/>
-              <a:alphaOff val="0"/>
-            </a:schemeClr>
-          </a:solidFill>
-          <a:prstDash val="solid"/>
-        </a:ln>
-        <a:effectLst/>
-      </dsp:spPr>
-      <dsp:style>
-        <a:lnRef idx="2">
-          <a:scrgbClr r="0" g="0" b="0"/>
-        </a:lnRef>
-        <a:fillRef idx="1">
-          <a:scrgbClr r="0" g="0" b="0"/>
-        </a:fillRef>
-        <a:effectRef idx="0">
-          <a:scrgbClr r="0" g="0" b="0"/>
-        </a:effectRef>
-        <a:fontRef idx="minor">
-          <a:schemeClr val="lt1"/>
-        </a:fontRef>
-      </dsp:style>
-      <dsp:txBody>
-        <a:bodyPr spcFirstLastPara="0" vert="horz" wrap="square" lIns="68580" tIns="68580" rIns="68580" bIns="68580" numCol="1" spcCol="1270" anchor="ctr" anchorCtr="0">
-          <a:noAutofit/>
-        </a:bodyPr>
-        <a:lstStyle/>
-        <a:p>
-          <a:pPr marL="0" lvl="0" indent="0" algn="ctr" defTabSz="800100">
-            <a:lnSpc>
-              <a:spcPct val="90000"/>
-            </a:lnSpc>
-            <a:spcBef>
-              <a:spcPct val="0"/>
-            </a:spcBef>
-            <a:spcAft>
-              <a:spcPct val="35000"/>
-            </a:spcAft>
-            <a:buNone/>
-          </a:pPr>
-          <a:r>
-            <a:rPr lang="en-US" sz="1800" kern="1200"/>
-            <a:t>Display word definitions</a:t>
-          </a:r>
-        </a:p>
-      </dsp:txBody>
-      <dsp:txXfrm>
-        <a:off x="4911120" y="660"/>
-        <a:ext cx="2210431" cy="1326259"/>
-      </dsp:txXfrm>
-    </dsp:sp>
-    <dsp:sp modelId="{5AE23B98-85B6-4FFC-A2EF-CD153EC42010}">
-      <dsp:nvSpPr>
-        <dsp:cNvPr id="0" name=""/>
-        <dsp:cNvSpPr/>
-      </dsp:nvSpPr>
-      <dsp:spPr>
-        <a:xfrm>
-          <a:off x="7342595" y="660"/>
-          <a:ext cx="2210431" cy="1326259"/>
-        </a:xfrm>
-        <a:prstGeom prst="rect">
-          <a:avLst/>
-        </a:prstGeom>
-        <a:solidFill>
-          <a:schemeClr val="accent2">
-            <a:hueOff val="2017893"/>
-            <a:satOff val="-2143"/>
-            <a:lumOff val="1647"/>
-            <a:alphaOff val="0"/>
-          </a:schemeClr>
-        </a:solidFill>
-        <a:ln w="15875" cap="flat" cmpd="sng" algn="ctr">
-          <a:solidFill>
-            <a:schemeClr val="lt1">
-              <a:hueOff val="0"/>
-              <a:satOff val="0"/>
-              <a:lumOff val="0"/>
-              <a:alphaOff val="0"/>
-            </a:schemeClr>
-          </a:solidFill>
-          <a:prstDash val="solid"/>
-        </a:ln>
-        <a:effectLst/>
-      </dsp:spPr>
-      <dsp:style>
-        <a:lnRef idx="2">
-          <a:scrgbClr r="0" g="0" b="0"/>
-        </a:lnRef>
-        <a:fillRef idx="1">
-          <a:scrgbClr r="0" g="0" b="0"/>
-        </a:fillRef>
-        <a:effectRef idx="0">
-          <a:scrgbClr r="0" g="0" b="0"/>
-        </a:effectRef>
-        <a:fontRef idx="minor">
-          <a:schemeClr val="lt1"/>
-        </a:fontRef>
-      </dsp:style>
-      <dsp:txBody>
-        <a:bodyPr spcFirstLastPara="0" vert="horz" wrap="square" lIns="68580" tIns="68580" rIns="68580" bIns="68580" numCol="1" spcCol="1270" anchor="ctr" anchorCtr="0">
-          <a:noAutofit/>
-        </a:bodyPr>
-        <a:lstStyle/>
-        <a:p>
-          <a:pPr marL="0" lvl="0" indent="0" algn="ctr" defTabSz="800100">
-            <a:lnSpc>
-              <a:spcPct val="90000"/>
-            </a:lnSpc>
-            <a:spcBef>
-              <a:spcPct val="0"/>
-            </a:spcBef>
-            <a:spcAft>
-              <a:spcPct val="35000"/>
-            </a:spcAft>
-            <a:buNone/>
-          </a:pPr>
-          <a:r>
-            <a:rPr lang="en-US" sz="1800" kern="1200"/>
-            <a:t>Realtime word validation</a:t>
-          </a:r>
-        </a:p>
-      </dsp:txBody>
-      <dsp:txXfrm>
-        <a:off x="7342595" y="660"/>
-        <a:ext cx="2210431" cy="1326259"/>
-      </dsp:txXfrm>
-    </dsp:sp>
-    <dsp:sp modelId="{882E09FF-C7FD-443D-9055-1C14289B78B7}">
-      <dsp:nvSpPr>
-        <dsp:cNvPr id="0" name=""/>
-        <dsp:cNvSpPr/>
-      </dsp:nvSpPr>
-      <dsp:spPr>
-        <a:xfrm>
-          <a:off x="2479645" y="1547963"/>
-          <a:ext cx="2210431" cy="1326259"/>
-        </a:xfrm>
-        <a:prstGeom prst="rect">
-          <a:avLst/>
-        </a:prstGeom>
-        <a:solidFill>
-          <a:schemeClr val="accent2">
-            <a:hueOff val="2690524"/>
-            <a:satOff val="-2858"/>
-            <a:lumOff val="2196"/>
-            <a:alphaOff val="0"/>
-          </a:schemeClr>
-        </a:solidFill>
-        <a:ln w="15875" cap="flat" cmpd="sng" algn="ctr">
-          <a:solidFill>
-            <a:schemeClr val="lt1">
-              <a:hueOff val="0"/>
-              <a:satOff val="0"/>
-              <a:lumOff val="0"/>
-              <a:alphaOff val="0"/>
-            </a:schemeClr>
-          </a:solidFill>
-          <a:prstDash val="solid"/>
-        </a:ln>
-        <a:effectLst/>
-      </dsp:spPr>
-      <dsp:style>
-        <a:lnRef idx="2">
-          <a:scrgbClr r="0" g="0" b="0"/>
-        </a:lnRef>
-        <a:fillRef idx="1">
-          <a:scrgbClr r="0" g="0" b="0"/>
-        </a:fillRef>
-        <a:effectRef idx="0">
-          <a:scrgbClr r="0" g="0" b="0"/>
-        </a:effectRef>
-        <a:fontRef idx="minor">
-          <a:schemeClr val="lt1"/>
-        </a:fontRef>
-      </dsp:style>
-      <dsp:txBody>
-        <a:bodyPr spcFirstLastPara="0" vert="horz" wrap="square" lIns="68580" tIns="68580" rIns="68580" bIns="68580" numCol="1" spcCol="1270" anchor="t" anchorCtr="0">
-          <a:noAutofit/>
-        </a:bodyPr>
-        <a:lstStyle/>
-        <a:p>
-          <a:pPr marL="0" lvl="0" indent="0" algn="l" defTabSz="800100">
-            <a:lnSpc>
-              <a:spcPct val="90000"/>
-            </a:lnSpc>
-            <a:spcBef>
-              <a:spcPct val="0"/>
-            </a:spcBef>
-            <a:spcAft>
-              <a:spcPct val="35000"/>
-            </a:spcAft>
-            <a:buNone/>
-          </a:pPr>
-          <a:r>
-            <a:rPr lang="en-US" sz="1800" kern="1200"/>
-            <a:t>Game modifiers </a:t>
-          </a:r>
-        </a:p>
-        <a:p>
-          <a:pPr marL="114300" lvl="1" indent="-114300" algn="l" defTabSz="622300">
-            <a:lnSpc>
-              <a:spcPct val="90000"/>
-            </a:lnSpc>
-            <a:spcBef>
-              <a:spcPct val="0"/>
-            </a:spcBef>
-            <a:spcAft>
-              <a:spcPct val="15000"/>
-            </a:spcAft>
-            <a:buChar char="•"/>
-          </a:pPr>
-          <a:r>
-            <a:rPr lang="en-US" sz="1400" kern="1200"/>
-            <a:t>Tile/word limits</a:t>
-          </a:r>
-        </a:p>
-        <a:p>
-          <a:pPr marL="114300" lvl="1" indent="-114300" algn="l" defTabSz="622300">
-            <a:lnSpc>
-              <a:spcPct val="90000"/>
-            </a:lnSpc>
-            <a:spcBef>
-              <a:spcPct val="0"/>
-            </a:spcBef>
-            <a:spcAft>
-              <a:spcPct val="15000"/>
-            </a:spcAft>
-            <a:buChar char="•"/>
-          </a:pPr>
-          <a:r>
-            <a:rPr lang="en-US" sz="1400" kern="1200"/>
-            <a:t>Turn time limit</a:t>
-          </a:r>
-        </a:p>
-      </dsp:txBody>
-      <dsp:txXfrm>
-        <a:off x="2479645" y="1547963"/>
-        <a:ext cx="2210431" cy="1326259"/>
-      </dsp:txXfrm>
-    </dsp:sp>
-    <dsp:sp modelId="{F6B6280C-52ED-4D88-BAFE-88EF63B9EE93}">
-      <dsp:nvSpPr>
-        <dsp:cNvPr id="0" name=""/>
-        <dsp:cNvSpPr/>
-      </dsp:nvSpPr>
-      <dsp:spPr>
-        <a:xfrm>
-          <a:off x="4911120" y="1547963"/>
-          <a:ext cx="2210431" cy="1326259"/>
-        </a:xfrm>
-        <a:prstGeom prst="rect">
-          <a:avLst/>
-        </a:prstGeom>
-        <a:solidFill>
-          <a:schemeClr val="accent2">
-            <a:hueOff val="3363155"/>
-            <a:satOff val="-3572"/>
-            <a:lumOff val="2745"/>
-            <a:alphaOff val="0"/>
-          </a:schemeClr>
-        </a:solidFill>
-        <a:ln w="15875" cap="flat" cmpd="sng" algn="ctr">
-          <a:solidFill>
-            <a:schemeClr val="lt1">
-              <a:hueOff val="0"/>
-              <a:satOff val="0"/>
-              <a:lumOff val="0"/>
-              <a:alphaOff val="0"/>
-            </a:schemeClr>
-          </a:solidFill>
-          <a:prstDash val="solid"/>
-        </a:ln>
-        <a:effectLst/>
-      </dsp:spPr>
-      <dsp:style>
-        <a:lnRef idx="2">
-          <a:scrgbClr r="0" g="0" b="0"/>
-        </a:lnRef>
-        <a:fillRef idx="1">
-          <a:scrgbClr r="0" g="0" b="0"/>
-        </a:fillRef>
-        <a:effectRef idx="0">
-          <a:scrgbClr r="0" g="0" b="0"/>
-        </a:effectRef>
-        <a:fontRef idx="minor">
-          <a:schemeClr val="lt1"/>
-        </a:fontRef>
-      </dsp:style>
-      <dsp:txBody>
-        <a:bodyPr spcFirstLastPara="0" vert="horz" wrap="square" lIns="68580" tIns="68580" rIns="68580" bIns="68580" numCol="1" spcCol="1270" anchor="ctr" anchorCtr="0">
-          <a:noAutofit/>
-        </a:bodyPr>
-        <a:lstStyle/>
-        <a:p>
-          <a:pPr marL="0" lvl="0" indent="0" algn="ctr" defTabSz="800100">
-            <a:lnSpc>
-              <a:spcPct val="90000"/>
-            </a:lnSpc>
-            <a:spcBef>
-              <a:spcPct val="0"/>
-            </a:spcBef>
-            <a:spcAft>
-              <a:spcPct val="35000"/>
-            </a:spcAft>
-            <a:buNone/>
-          </a:pPr>
-          <a:r>
-            <a:rPr lang="en-US" sz="1800" kern="1200"/>
-            <a:t>Character selection for blank tiles</a:t>
-          </a:r>
-        </a:p>
-      </dsp:txBody>
-      <dsp:txXfrm>
-        <a:off x="4911120" y="1547963"/>
-        <a:ext cx="2210431" cy="1326259"/>
-      </dsp:txXfrm>
-    </dsp:sp>
-  </dsp:spTree>
-</dsp:drawing>
-</file>
-
 <file path=ppt/diagrams/layout1.xml><?xml version="1.0" encoding="utf-8"?>
 <dgm:layoutDef xmlns:dgm="http://schemas.openxmlformats.org/drawingml/2006/diagram" xmlns:a="http://schemas.openxmlformats.org/drawingml/2006/main" uniqueId="urn:microsoft.com/office/officeart/2018/2/layout/IconCircleList">
   <dgm:title val="Icon Circle List"/>
@@ -10667,6 +10667,153 @@
 </file>
 
 <file path=ppt/diagrams/layout4.xml><?xml version="1.0" encoding="utf-8"?>
+<dgm:layoutDef xmlns:dgm="http://schemas.openxmlformats.org/drawingml/2006/diagram" xmlns:a="http://schemas.openxmlformats.org/drawingml/2006/main" uniqueId="urn:microsoft.com/office/officeart/2005/8/layout/default">
+  <dgm:title val=""/>
+  <dgm:desc val=""/>
+  <dgm:catLst>
+    <dgm:cat type="list" pri="400"/>
+  </dgm:catLst>
+  <dgm:sampData>
+    <dgm:dataModel>
+      <dgm:ptLst>
+        <dgm:pt modelId="0" type="doc"/>
+        <dgm:pt modelId="1">
+          <dgm:prSet phldr="1"/>
+        </dgm:pt>
+        <dgm:pt modelId="2">
+          <dgm:prSet phldr="1"/>
+        </dgm:pt>
+        <dgm:pt modelId="3">
+          <dgm:prSet phldr="1"/>
+        </dgm:pt>
+        <dgm:pt modelId="4">
+          <dgm:prSet phldr="1"/>
+        </dgm:pt>
+        <dgm:pt modelId="5">
+          <dgm:prSet phldr="1"/>
+        </dgm:pt>
+      </dgm:ptLst>
+      <dgm:cxnLst>
+        <dgm:cxn modelId="6" srcId="0" destId="1" srcOrd="0" destOrd="0"/>
+        <dgm:cxn modelId="7" srcId="0" destId="2" srcOrd="1" destOrd="0"/>
+        <dgm:cxn modelId="8" srcId="0" destId="3" srcOrd="2" destOrd="0"/>
+        <dgm:cxn modelId="9" srcId="0" destId="4" srcOrd="3" destOrd="0"/>
+        <dgm:cxn modelId="10" srcId="0" destId="5" srcOrd="4" destOrd="0"/>
+      </dgm:cxnLst>
+      <dgm:bg/>
+      <dgm:whole/>
+    </dgm:dataModel>
+  </dgm:sampData>
+  <dgm:styleData>
+    <dgm:dataModel>
+      <dgm:ptLst>
+        <dgm:pt modelId="0" type="doc"/>
+        <dgm:pt modelId="1"/>
+        <dgm:pt modelId="2"/>
+      </dgm:ptLst>
+      <dgm:cxnLst>
+        <dgm:cxn modelId="3" srcId="0" destId="1" srcOrd="0" destOrd="0"/>
+        <dgm:cxn modelId="4" srcId="0" destId="2" srcOrd="1" destOrd="0"/>
+      </dgm:cxnLst>
+      <dgm:bg/>
+      <dgm:whole/>
+    </dgm:dataModel>
+  </dgm:styleData>
+  <dgm:clrData>
+    <dgm:dataModel>
+      <dgm:ptLst>
+        <dgm:pt modelId="0" type="doc"/>
+        <dgm:pt modelId="1"/>
+        <dgm:pt modelId="2"/>
+        <dgm:pt modelId="3"/>
+        <dgm:pt modelId="4"/>
+        <dgm:pt modelId="5"/>
+        <dgm:pt modelId="6"/>
+      </dgm:ptLst>
+      <dgm:cxnLst>
+        <dgm:cxn modelId="7" srcId="0" destId="1" srcOrd="0" destOrd="0"/>
+        <dgm:cxn modelId="8" srcId="0" destId="2" srcOrd="1" destOrd="0"/>
+        <dgm:cxn modelId="9" srcId="0" destId="3" srcOrd="2" destOrd="0"/>
+        <dgm:cxn modelId="10" srcId="0" destId="4" srcOrd="3" destOrd="0"/>
+        <dgm:cxn modelId="11" srcId="0" destId="5" srcOrd="4" destOrd="0"/>
+        <dgm:cxn modelId="12" srcId="0" destId="6" srcOrd="5" destOrd="0"/>
+      </dgm:cxnLst>
+      <dgm:bg/>
+      <dgm:whole/>
+    </dgm:dataModel>
+  </dgm:clrData>
+  <dgm:layoutNode name="diagram">
+    <dgm:varLst>
+      <dgm:dir/>
+      <dgm:resizeHandles val="exact"/>
+    </dgm:varLst>
+    <dgm:choose name="Name0">
+      <dgm:if name="Name1" func="var" arg="dir" op="equ" val="norm">
+        <dgm:alg type="snake">
+          <dgm:param type="grDir" val="tL"/>
+          <dgm:param type="flowDir" val="row"/>
+          <dgm:param type="contDir" val="sameDir"/>
+          <dgm:param type="off" val="ctr"/>
+        </dgm:alg>
+      </dgm:if>
+      <dgm:else name="Name2">
+        <dgm:alg type="snake">
+          <dgm:param type="grDir" val="tR"/>
+          <dgm:param type="flowDir" val="row"/>
+          <dgm:param type="contDir" val="sameDir"/>
+          <dgm:param type="off" val="ctr"/>
+        </dgm:alg>
+      </dgm:else>
+    </dgm:choose>
+    <dgm:shape xmlns:r="http://schemas.openxmlformats.org/officeDocument/2006/relationships" r:blip="">
+      <dgm:adjLst/>
+    </dgm:shape>
+    <dgm:presOf/>
+    <dgm:constrLst>
+      <dgm:constr type="w" for="ch" forName="node" refType="w"/>
+      <dgm:constr type="h" for="ch" forName="node" refType="w" refFor="ch" refForName="node" fact="0.6"/>
+      <dgm:constr type="w" for="ch" forName="sibTrans" refType="w" refFor="ch" refForName="node" fact="0.1"/>
+      <dgm:constr type="sp" refType="w" refFor="ch" refForName="sibTrans"/>
+      <dgm:constr type="primFontSz" for="ch" forName="node" op="equ" val="65"/>
+    </dgm:constrLst>
+    <dgm:ruleLst/>
+    <dgm:forEach name="Name3" axis="ch" ptType="node">
+      <dgm:layoutNode name="node">
+        <dgm:varLst>
+          <dgm:bulletEnabled val="1"/>
+        </dgm:varLst>
+        <dgm:alg type="tx"/>
+        <dgm:shape xmlns:r="http://schemas.openxmlformats.org/officeDocument/2006/relationships" type="rect" r:blip="">
+          <dgm:adjLst/>
+        </dgm:shape>
+        <dgm:presOf axis="desOrSelf" ptType="node"/>
+        <dgm:constrLst>
+          <dgm:constr type="lMarg" refType="primFontSz" fact="0.3"/>
+          <dgm:constr type="rMarg" refType="primFontSz" fact="0.3"/>
+          <dgm:constr type="tMarg" refType="primFontSz" fact="0.3"/>
+          <dgm:constr type="bMarg" refType="primFontSz" fact="0.3"/>
+        </dgm:constrLst>
+        <dgm:ruleLst>
+          <dgm:rule type="primFontSz" val="5" fact="NaN" max="NaN"/>
+        </dgm:ruleLst>
+      </dgm:layoutNode>
+      <dgm:forEach name="Name4" axis="followSib" ptType="sibTrans" cnt="1">
+        <dgm:layoutNode name="sibTrans">
+          <dgm:alg type="sp"/>
+          <dgm:shape xmlns:r="http://schemas.openxmlformats.org/officeDocument/2006/relationships" r:blip="">
+            <dgm:adjLst/>
+          </dgm:shape>
+          <dgm:presOf/>
+          <dgm:constrLst/>
+          <dgm:ruleLst/>
+        </dgm:layoutNode>
+      </dgm:forEach>
+    </dgm:forEach>
+  </dgm:layoutNode>
+</dgm:layoutDef>
+</file>
+
+<file path=ppt/diagrams/layout5.xml><?xml version="1.0" encoding="utf-8"?>
 <dgm:layoutDef xmlns:dgm="http://schemas.openxmlformats.org/drawingml/2006/diagram" xmlns:a="http://schemas.openxmlformats.org/drawingml/2006/main" uniqueId="urn:microsoft.com/office/officeart/2005/8/layout/hProcess11">
   <dgm:title val=""/>
   <dgm:desc val=""/>
@@ -10938,153 +11085,6 @@
 </dgm:layoutDef>
 </file>
 
-<file path=ppt/diagrams/layout5.xml><?xml version="1.0" encoding="utf-8"?>
-<dgm:layoutDef xmlns:dgm="http://schemas.openxmlformats.org/drawingml/2006/diagram" xmlns:a="http://schemas.openxmlformats.org/drawingml/2006/main" uniqueId="urn:microsoft.com/office/officeart/2005/8/layout/default">
-  <dgm:title val=""/>
-  <dgm:desc val=""/>
-  <dgm:catLst>
-    <dgm:cat type="list" pri="400"/>
-  </dgm:catLst>
-  <dgm:sampData>
-    <dgm:dataModel>
-      <dgm:ptLst>
-        <dgm:pt modelId="0" type="doc"/>
-        <dgm:pt modelId="1">
-          <dgm:prSet phldr="1"/>
-        </dgm:pt>
-        <dgm:pt modelId="2">
-          <dgm:prSet phldr="1"/>
-        </dgm:pt>
-        <dgm:pt modelId="3">
-          <dgm:prSet phldr="1"/>
-        </dgm:pt>
-        <dgm:pt modelId="4">
-          <dgm:prSet phldr="1"/>
-        </dgm:pt>
-        <dgm:pt modelId="5">
-          <dgm:prSet phldr="1"/>
-        </dgm:pt>
-      </dgm:ptLst>
-      <dgm:cxnLst>
-        <dgm:cxn modelId="6" srcId="0" destId="1" srcOrd="0" destOrd="0"/>
-        <dgm:cxn modelId="7" srcId="0" destId="2" srcOrd="1" destOrd="0"/>
-        <dgm:cxn modelId="8" srcId="0" destId="3" srcOrd="2" destOrd="0"/>
-        <dgm:cxn modelId="9" srcId="0" destId="4" srcOrd="3" destOrd="0"/>
-        <dgm:cxn modelId="10" srcId="0" destId="5" srcOrd="4" destOrd="0"/>
-      </dgm:cxnLst>
-      <dgm:bg/>
-      <dgm:whole/>
-    </dgm:dataModel>
-  </dgm:sampData>
-  <dgm:styleData>
-    <dgm:dataModel>
-      <dgm:ptLst>
-        <dgm:pt modelId="0" type="doc"/>
-        <dgm:pt modelId="1"/>
-        <dgm:pt modelId="2"/>
-      </dgm:ptLst>
-      <dgm:cxnLst>
-        <dgm:cxn modelId="3" srcId="0" destId="1" srcOrd="0" destOrd="0"/>
-        <dgm:cxn modelId="4" srcId="0" destId="2" srcOrd="1" destOrd="0"/>
-      </dgm:cxnLst>
-      <dgm:bg/>
-      <dgm:whole/>
-    </dgm:dataModel>
-  </dgm:styleData>
-  <dgm:clrData>
-    <dgm:dataModel>
-      <dgm:ptLst>
-        <dgm:pt modelId="0" type="doc"/>
-        <dgm:pt modelId="1"/>
-        <dgm:pt modelId="2"/>
-        <dgm:pt modelId="3"/>
-        <dgm:pt modelId="4"/>
-        <dgm:pt modelId="5"/>
-        <dgm:pt modelId="6"/>
-      </dgm:ptLst>
-      <dgm:cxnLst>
-        <dgm:cxn modelId="7" srcId="0" destId="1" srcOrd="0" destOrd="0"/>
-        <dgm:cxn modelId="8" srcId="0" destId="2" srcOrd="1" destOrd="0"/>
-        <dgm:cxn modelId="9" srcId="0" destId="3" srcOrd="2" destOrd="0"/>
-        <dgm:cxn modelId="10" srcId="0" destId="4" srcOrd="3" destOrd="0"/>
-        <dgm:cxn modelId="11" srcId="0" destId="5" srcOrd="4" destOrd="0"/>
-        <dgm:cxn modelId="12" srcId="0" destId="6" srcOrd="5" destOrd="0"/>
-      </dgm:cxnLst>
-      <dgm:bg/>
-      <dgm:whole/>
-    </dgm:dataModel>
-  </dgm:clrData>
-  <dgm:layoutNode name="diagram">
-    <dgm:varLst>
-      <dgm:dir/>
-      <dgm:resizeHandles val="exact"/>
-    </dgm:varLst>
-    <dgm:choose name="Name0">
-      <dgm:if name="Name1" func="var" arg="dir" op="equ" val="norm">
-        <dgm:alg type="snake">
-          <dgm:param type="grDir" val="tL"/>
-          <dgm:param type="flowDir" val="row"/>
-          <dgm:param type="contDir" val="sameDir"/>
-          <dgm:param type="off" val="ctr"/>
-        </dgm:alg>
-      </dgm:if>
-      <dgm:else name="Name2">
-        <dgm:alg type="snake">
-          <dgm:param type="grDir" val="tR"/>
-          <dgm:param type="flowDir" val="row"/>
-          <dgm:param type="contDir" val="sameDir"/>
-          <dgm:param type="off" val="ctr"/>
-        </dgm:alg>
-      </dgm:else>
-    </dgm:choose>
-    <dgm:shape xmlns:r="http://schemas.openxmlformats.org/officeDocument/2006/relationships" r:blip="">
-      <dgm:adjLst/>
-    </dgm:shape>
-    <dgm:presOf/>
-    <dgm:constrLst>
-      <dgm:constr type="w" for="ch" forName="node" refType="w"/>
-      <dgm:constr type="h" for="ch" forName="node" refType="w" refFor="ch" refForName="node" fact="0.6"/>
-      <dgm:constr type="w" for="ch" forName="sibTrans" refType="w" refFor="ch" refForName="node" fact="0.1"/>
-      <dgm:constr type="sp" refType="w" refFor="ch" refForName="sibTrans"/>
-      <dgm:constr type="primFontSz" for="ch" forName="node" op="equ" val="65"/>
-    </dgm:constrLst>
-    <dgm:ruleLst/>
-    <dgm:forEach name="Name3" axis="ch" ptType="node">
-      <dgm:layoutNode name="node">
-        <dgm:varLst>
-          <dgm:bulletEnabled val="1"/>
-        </dgm:varLst>
-        <dgm:alg type="tx"/>
-        <dgm:shape xmlns:r="http://schemas.openxmlformats.org/officeDocument/2006/relationships" type="rect" r:blip="">
-          <dgm:adjLst/>
-        </dgm:shape>
-        <dgm:presOf axis="desOrSelf" ptType="node"/>
-        <dgm:constrLst>
-          <dgm:constr type="lMarg" refType="primFontSz" fact="0.3"/>
-          <dgm:constr type="rMarg" refType="primFontSz" fact="0.3"/>
-          <dgm:constr type="tMarg" refType="primFontSz" fact="0.3"/>
-          <dgm:constr type="bMarg" refType="primFontSz" fact="0.3"/>
-        </dgm:constrLst>
-        <dgm:ruleLst>
-          <dgm:rule type="primFontSz" val="5" fact="NaN" max="NaN"/>
-        </dgm:ruleLst>
-      </dgm:layoutNode>
-      <dgm:forEach name="Name4" axis="followSib" ptType="sibTrans" cnt="1">
-        <dgm:layoutNode name="sibTrans">
-          <dgm:alg type="sp"/>
-          <dgm:shape xmlns:r="http://schemas.openxmlformats.org/officeDocument/2006/relationships" r:blip="">
-            <dgm:adjLst/>
-          </dgm:shape>
-          <dgm:presOf/>
-          <dgm:constrLst/>
-          <dgm:ruleLst/>
-        </dgm:layoutNode>
-      </dgm:forEach>
-    </dgm:forEach>
-  </dgm:layoutNode>
-</dgm:layoutDef>
-</file>
-
 <file path=ppt/diagrams/quickStyle1.xml><?xml version="1.0" encoding="utf-8"?>
 <dgm:styleDef xmlns:dgm="http://schemas.openxmlformats.org/drawingml/2006/diagram" xmlns:a="http://schemas.openxmlformats.org/drawingml/2006/main" uniqueId="urn:microsoft.com/office/officeart/2005/8/quickstyle/simple1">
   <dgm:title val=""/>
@@ -16337,7 +16337,7 @@
           <a:p>
             <a:fld id="{30F92E9B-1B1A-0447-AE91-559C5C836551}" type="datetimeFigureOut">
               <a:rPr lang="en-US" smtClean="0"/>
-              <a:t>8/20/22</a:t>
+              <a:t>8/21/22</a:t>
             </a:fld>
             <a:endParaRPr lang="en-US"/>
           </a:p>
@@ -17474,9 +17474,10 @@
           <a:lstStyle/>
           <a:p>
             <a:r>
-              <a:rPr lang="en-US" dirty="0"/>
+              <a:rPr lang="en-US" dirty="0" err="1"/>
               <a:t>Viktoriia</a:t>
             </a:r>
+            <a:endParaRPr lang="en-US" dirty="0"/>
           </a:p>
         </p:txBody>
       </p:sp>
@@ -17487,7 +17488,7 @@
             <a:spLocks noGrp="1"/>
           </p:cNvSpPr>
           <p:nvPr>
-            <p:ph type="sldNum" sz="quarter" idx="10"/>
+            <p:ph type="sldNum" sz="quarter" idx="5"/>
           </p:nvPr>
         </p:nvSpPr>
         <p:spPr/>
@@ -17495,8 +17496,8 @@
           <a:bodyPr/>
           <a:lstStyle/>
           <a:p>
-            <a:fld id="{70FA3906-5EC9-4029-BF49-DDD886D78639}" type="slidenum">
-              <a:rPr lang="en-US"/>
+            <a:fld id="{BE073169-5C9F-9B44-B9E4-7EFA2D293676}" type="slidenum">
+              <a:rPr lang="en-US" smtClean="0"/>
               <a:t>8</a:t>
             </a:fld>
             <a:endParaRPr lang="en-US"/>
@@ -17506,7 +17507,7 @@
     </p:spTree>
     <p:extLst>
       <p:ext uri="{BB962C8B-B14F-4D97-AF65-F5344CB8AC3E}">
-        <p14:creationId xmlns:p14="http://schemas.microsoft.com/office/powerpoint/2010/main" val="3068896373"/>
+        <p14:creationId xmlns:p14="http://schemas.microsoft.com/office/powerpoint/2010/main" val="1205534946"/>
       </p:ext>
     </p:extLst>
   </p:cSld>
@@ -17561,10 +17562,9 @@
           <a:lstStyle/>
           <a:p>
             <a:r>
-              <a:rPr lang="en-US" dirty="0" err="1"/>
+              <a:rPr lang="en-US" dirty="0"/>
               <a:t>Viktoriia</a:t>
             </a:r>
-            <a:endParaRPr lang="en-US" dirty="0"/>
           </a:p>
         </p:txBody>
       </p:sp>
@@ -17575,7 +17575,7 @@
             <a:spLocks noGrp="1"/>
           </p:cNvSpPr>
           <p:nvPr>
-            <p:ph type="sldNum" sz="quarter" idx="5"/>
+            <p:ph type="sldNum" sz="quarter" idx="10"/>
           </p:nvPr>
         </p:nvSpPr>
         <p:spPr/>
@@ -17583,8 +17583,8 @@
           <a:bodyPr/>
           <a:lstStyle/>
           <a:p>
-            <a:fld id="{BE073169-5C9F-9B44-B9E4-7EFA2D293676}" type="slidenum">
-              <a:rPr lang="en-US" smtClean="0"/>
+            <a:fld id="{70FA3906-5EC9-4029-BF49-DDD886D78639}" type="slidenum">
+              <a:rPr lang="en-US"/>
               <a:t>9</a:t>
             </a:fld>
             <a:endParaRPr lang="en-US"/>
@@ -17594,7 +17594,7 @@
     </p:spTree>
     <p:extLst>
       <p:ext uri="{BB962C8B-B14F-4D97-AF65-F5344CB8AC3E}">
-        <p14:creationId xmlns:p14="http://schemas.microsoft.com/office/powerpoint/2010/main" val="1205534946"/>
+        <p14:creationId xmlns:p14="http://schemas.microsoft.com/office/powerpoint/2010/main" val="3068896373"/>
       </p:ext>
     </p:extLst>
   </p:cSld>
@@ -17936,7 +17936,7 @@
             <a:fld id="{B61BEF0D-F0BB-DE4B-95CE-6DB70DBA9567}" type="datetimeFigureOut">
               <a:rPr lang="en-US" smtClean="0"/>
               <a:pPr/>
-              <a:t>8/20/22</a:t>
+              <a:t>8/21/22</a:t>
             </a:fld>
             <a:endParaRPr lang="en-US" dirty="0"/>
           </a:p>
@@ -18262,7 +18262,7 @@
             <a:fld id="{B61BEF0D-F0BB-DE4B-95CE-6DB70DBA9567}" type="datetimeFigureOut">
               <a:rPr lang="en-US" smtClean="0"/>
               <a:pPr/>
-              <a:t>8/20/22</a:t>
+              <a:t>8/21/22</a:t>
             </a:fld>
             <a:endParaRPr lang="en-US" dirty="0"/>
           </a:p>
@@ -18512,7 +18512,7 @@
             <a:fld id="{B61BEF0D-F0BB-DE4B-95CE-6DB70DBA9567}" type="datetimeFigureOut">
               <a:rPr lang="en-US" smtClean="0"/>
               <a:pPr/>
-              <a:t>8/20/22</a:t>
+              <a:t>8/21/22</a:t>
             </a:fld>
             <a:endParaRPr lang="en-US" dirty="0"/>
           </a:p>
@@ -18853,7 +18853,7 @@
             <a:fld id="{B61BEF0D-F0BB-DE4B-95CE-6DB70DBA9567}" type="datetimeFigureOut">
               <a:rPr lang="en-US" smtClean="0"/>
               <a:pPr/>
-              <a:t>8/20/22</a:t>
+              <a:t>8/21/22</a:t>
             </a:fld>
             <a:endParaRPr lang="en-US" dirty="0"/>
           </a:p>
@@ -19202,7 +19202,7 @@
             <a:fld id="{B61BEF0D-F0BB-DE4B-95CE-6DB70DBA9567}" type="datetimeFigureOut">
               <a:rPr lang="en-US" smtClean="0"/>
               <a:pPr/>
-              <a:t>8/20/22</a:t>
+              <a:t>8/21/22</a:t>
             </a:fld>
             <a:endParaRPr lang="en-US" dirty="0"/>
           </a:p>
@@ -19578,7 +19578,7 @@
             <a:fld id="{B61BEF0D-F0BB-DE4B-95CE-6DB70DBA9567}" type="datetimeFigureOut">
               <a:rPr lang="en-US" smtClean="0"/>
               <a:pPr/>
-              <a:t>8/20/22</a:t>
+              <a:t>8/21/22</a:t>
             </a:fld>
             <a:endParaRPr lang="en-US" dirty="0"/>
           </a:p>
@@ -20050,7 +20050,7 @@
             <a:fld id="{B61BEF0D-F0BB-DE4B-95CE-6DB70DBA9567}" type="datetimeFigureOut">
               <a:rPr lang="en-US" smtClean="0"/>
               <a:pPr/>
-              <a:t>8/20/22</a:t>
+              <a:t>8/21/22</a:t>
             </a:fld>
             <a:endParaRPr lang="en-US" dirty="0"/>
           </a:p>
@@ -20256,7 +20256,7 @@
           <a:p>
             <a:fld id="{55C6B4A9-1611-4792-9094-5F34BCA07E0B}" type="datetimeFigureOut">
               <a:rPr lang="en-US" smtClean="0"/>
-              <a:t>8/20/22</a:t>
+              <a:t>8/21/22</a:t>
             </a:fld>
             <a:endParaRPr lang="en-US" dirty="0"/>
           </a:p>
@@ -20468,7 +20468,7 @@
             <a:fld id="{B61BEF0D-F0BB-DE4B-95CE-6DB70DBA9567}" type="datetimeFigureOut">
               <a:rPr lang="en-US" smtClean="0"/>
               <a:pPr/>
-              <a:t>8/20/22</a:t>
+              <a:t>8/21/22</a:t>
             </a:fld>
             <a:endParaRPr lang="en-US" dirty="0"/>
           </a:p>
@@ -20702,7 +20702,7 @@
             <a:fld id="{B61BEF0D-F0BB-DE4B-95CE-6DB70DBA9567}" type="datetimeFigureOut">
               <a:rPr lang="en-US" smtClean="0"/>
               <a:pPr/>
-              <a:t>8/20/22</a:t>
+              <a:t>8/21/22</a:t>
             </a:fld>
             <a:endParaRPr lang="en-US" dirty="0"/>
           </a:p>
@@ -20952,7 +20952,7 @@
             <a:fld id="{B61BEF0D-F0BB-DE4B-95CE-6DB70DBA9567}" type="datetimeFigureOut">
               <a:rPr lang="en-US" smtClean="0"/>
               <a:pPr/>
-              <a:t>8/20/22</a:t>
+              <a:t>8/21/22</a:t>
             </a:fld>
             <a:endParaRPr lang="en-US" dirty="0"/>
           </a:p>
@@ -21251,7 +21251,7 @@
           <a:p>
             <a:fld id="{EB712588-04B1-427B-82EE-E8DB90309F08}" type="datetimeFigureOut">
               <a:rPr lang="en-US" smtClean="0"/>
-              <a:t>8/20/22</a:t>
+              <a:t>8/21/22</a:t>
             </a:fld>
             <a:endParaRPr lang="en-US" dirty="0"/>
           </a:p>
@@ -21646,7 +21646,7 @@
             <a:fld id="{B61BEF0D-F0BB-DE4B-95CE-6DB70DBA9567}" type="datetimeFigureOut">
               <a:rPr lang="en-US" smtClean="0"/>
               <a:pPr/>
-              <a:t>8/20/22</a:t>
+              <a:t>8/21/22</a:t>
             </a:fld>
             <a:endParaRPr lang="en-US" dirty="0"/>
           </a:p>
@@ -21797,7 +21797,7 @@
             <a:fld id="{B61BEF0D-F0BB-DE4B-95CE-6DB70DBA9567}" type="datetimeFigureOut">
               <a:rPr lang="en-US" smtClean="0"/>
               <a:pPr/>
-              <a:t>8/20/22</a:t>
+              <a:t>8/21/22</a:t>
             </a:fld>
             <a:endParaRPr lang="en-US" dirty="0"/>
           </a:p>
@@ -21925,7 +21925,7 @@
             <a:fld id="{B61BEF0D-F0BB-DE4B-95CE-6DB70DBA9567}" type="datetimeFigureOut">
               <a:rPr lang="en-US" smtClean="0"/>
               <a:pPr/>
-              <a:t>8/20/22</a:t>
+              <a:t>8/21/22</a:t>
             </a:fld>
             <a:endParaRPr lang="en-US" dirty="0"/>
           </a:p>
@@ -22181,7 +22181,7 @@
           <a:p>
             <a:fld id="{42A54C80-263E-416B-A8E0-580EDEADCBDC}" type="datetimeFigureOut">
               <a:rPr lang="en-US" smtClean="0"/>
-              <a:t>8/20/22</a:t>
+              <a:t>8/21/22</a:t>
             </a:fld>
             <a:endParaRPr lang="en-US" dirty="0"/>
           </a:p>
@@ -22497,7 +22497,7 @@
             <a:fld id="{B61BEF0D-F0BB-DE4B-95CE-6DB70DBA9567}" type="datetimeFigureOut">
               <a:rPr lang="en-US" smtClean="0"/>
               <a:pPr/>
-              <a:t>8/20/22</a:t>
+              <a:t>8/21/22</a:t>
             </a:fld>
             <a:endParaRPr lang="en-US" dirty="0"/>
           </a:p>
@@ -22850,7 +22850,7 @@
             <a:fld id="{B61BEF0D-F0BB-DE4B-95CE-6DB70DBA9567}" type="datetimeFigureOut">
               <a:rPr lang="en-US" smtClean="0"/>
               <a:pPr/>
-              <a:t>8/20/22</a:t>
+              <a:t>8/21/22</a:t>
             </a:fld>
             <a:endParaRPr lang="en-US" dirty="0"/>
           </a:p>
@@ -24792,6 +24792,115 @@
           <a:chExt cx="0" cy="0"/>
         </a:xfrm>
       </p:grpSpPr>
+      <p:sp>
+        <p:nvSpPr>
+          <p:cNvPr id="2" name="Title 1">
+            <a:extLst>
+              <a:ext uri="{FF2B5EF4-FFF2-40B4-BE49-F238E27FC236}">
+                <a16:creationId xmlns:a16="http://schemas.microsoft.com/office/drawing/2014/main" id="{A3EA95AE-E96A-4673-72D0-E26A3F209689}"/>
+              </a:ext>
+            </a:extLst>
+          </p:cNvPr>
+          <p:cNvSpPr>
+            <a:spLocks noGrp="1"/>
+          </p:cNvSpPr>
+          <p:nvPr>
+            <p:ph type="title"/>
+          </p:nvPr>
+        </p:nvSpPr>
+        <p:spPr>
+          <a:xfrm>
+            <a:off x="1295402" y="982132"/>
+            <a:ext cx="9601196" cy="1303867"/>
+          </a:xfrm>
+        </p:spPr>
+        <p:txBody>
+          <a:bodyPr>
+            <a:normAutofit/>
+          </a:bodyPr>
+          <a:lstStyle/>
+          <a:p>
+            <a:r>
+              <a:rPr lang="en-US">
+                <a:solidFill>
+                  <a:srgbClr val="262626"/>
+                </a:solidFill>
+              </a:rPr>
+              <a:t>Future Development Opportunities</a:t>
+            </a:r>
+          </a:p>
+        </p:txBody>
+      </p:sp>
+      <p:graphicFrame>
+        <p:nvGraphicFramePr>
+          <p:cNvPr id="7" name="Content Placeholder 2">
+            <a:extLst>
+              <a:ext uri="{FF2B5EF4-FFF2-40B4-BE49-F238E27FC236}">
+                <a16:creationId xmlns:a16="http://schemas.microsoft.com/office/drawing/2014/main" id="{2345AE7D-595C-3208-7D3F-21F43DE263D7}"/>
+              </a:ext>
+            </a:extLst>
+          </p:cNvPr>
+          <p:cNvGraphicFramePr>
+            <a:graphicFrameLocks noGrp="1"/>
+          </p:cNvGraphicFramePr>
+          <p:nvPr>
+            <p:ph idx="1"/>
+            <p:extLst>
+              <p:ext uri="{D42A27DB-BD31-4B8C-83A1-F6EECF244321}">
+                <p14:modId xmlns:p14="http://schemas.microsoft.com/office/powerpoint/2010/main" val="305848654"/>
+              </p:ext>
+            </p:extLst>
+          </p:nvPr>
+        </p:nvGraphicFramePr>
+        <p:xfrm>
+          <a:off x="1295400" y="2772384"/>
+          <a:ext cx="9601197" cy="2874883"/>
+        </p:xfrm>
+        <a:graphic>
+          <a:graphicData uri="http://schemas.openxmlformats.org/drawingml/2006/diagram">
+            <dgm:relIds xmlns:dgm="http://schemas.openxmlformats.org/drawingml/2006/diagram" xmlns:r="http://schemas.openxmlformats.org/officeDocument/2006/relationships" r:dm="rId4" r:lo="rId5" r:qs="rId6" r:cs="rId7"/>
+          </a:graphicData>
+        </a:graphic>
+      </p:graphicFrame>
+    </p:spTree>
+    <p:extLst>
+      <p:ext uri="{BB962C8B-B14F-4D97-AF65-F5344CB8AC3E}">
+        <p14:creationId xmlns:p14="http://schemas.microsoft.com/office/powerpoint/2010/main" val="1936370427"/>
+      </p:ext>
+    </p:extLst>
+  </p:cSld>
+  <p:clrMapOvr>
+    <a:masterClrMapping/>
+  </p:clrMapOvr>
+</p:sld>
+</file>
+
+<file path=ppt/slides/slide9.xml><?xml version="1.0" encoding="utf-8"?>
+<p:sld xmlns:a="http://schemas.openxmlformats.org/drawingml/2006/main" xmlns:r="http://schemas.openxmlformats.org/officeDocument/2006/relationships" xmlns:p="http://schemas.openxmlformats.org/presentationml/2006/main">
+  <p:cSld>
+    <p:bg>
+      <p:bgPr>
+        <a:blipFill>
+          <a:blip r:embed="rId3"/>
+          <a:stretch/>
+        </a:blipFill>
+        <a:effectLst/>
+      </p:bgPr>
+    </p:bg>
+    <p:spTree>
+      <p:nvGrpSpPr>
+        <p:cNvPr id="1" name=""/>
+        <p:cNvGrpSpPr/>
+        <p:nvPr/>
+      </p:nvGrpSpPr>
+      <p:grpSpPr>
+        <a:xfrm>
+          <a:off x="0" y="0"/>
+          <a:ext cx="0" cy="0"/>
+          <a:chOff x="0" y="0"/>
+          <a:chExt cx="0" cy="0"/>
+        </a:xfrm>
+      </p:grpSpPr>
       <p:grpSp>
         <p:nvGrpSpPr>
           <p:cNvPr id="24" name="Group 9">
@@ -25113,115 +25222,6 @@
     <p:extLst>
       <p:ext uri="{BB962C8B-B14F-4D97-AF65-F5344CB8AC3E}">
         <p14:creationId xmlns:p14="http://schemas.microsoft.com/office/powerpoint/2010/main" val="1578448044"/>
-      </p:ext>
-    </p:extLst>
-  </p:cSld>
-  <p:clrMapOvr>
-    <a:masterClrMapping/>
-  </p:clrMapOvr>
-</p:sld>
-</file>
-
-<file path=ppt/slides/slide9.xml><?xml version="1.0" encoding="utf-8"?>
-<p:sld xmlns:a="http://schemas.openxmlformats.org/drawingml/2006/main" xmlns:r="http://schemas.openxmlformats.org/officeDocument/2006/relationships" xmlns:p="http://schemas.openxmlformats.org/presentationml/2006/main">
-  <p:cSld>
-    <p:bg>
-      <p:bgPr>
-        <a:blipFill>
-          <a:blip r:embed="rId3"/>
-          <a:stretch/>
-        </a:blipFill>
-        <a:effectLst/>
-      </p:bgPr>
-    </p:bg>
-    <p:spTree>
-      <p:nvGrpSpPr>
-        <p:cNvPr id="1" name=""/>
-        <p:cNvGrpSpPr/>
-        <p:nvPr/>
-      </p:nvGrpSpPr>
-      <p:grpSpPr>
-        <a:xfrm>
-          <a:off x="0" y="0"/>
-          <a:ext cx="0" cy="0"/>
-          <a:chOff x="0" y="0"/>
-          <a:chExt cx="0" cy="0"/>
-        </a:xfrm>
-      </p:grpSpPr>
-      <p:sp>
-        <p:nvSpPr>
-          <p:cNvPr id="2" name="Title 1">
-            <a:extLst>
-              <a:ext uri="{FF2B5EF4-FFF2-40B4-BE49-F238E27FC236}">
-                <a16:creationId xmlns:a16="http://schemas.microsoft.com/office/drawing/2014/main" id="{A3EA95AE-E96A-4673-72D0-E26A3F209689}"/>
-              </a:ext>
-            </a:extLst>
-          </p:cNvPr>
-          <p:cNvSpPr>
-            <a:spLocks noGrp="1"/>
-          </p:cNvSpPr>
-          <p:nvPr>
-            <p:ph type="title"/>
-          </p:nvPr>
-        </p:nvSpPr>
-        <p:spPr>
-          <a:xfrm>
-            <a:off x="1295402" y="982132"/>
-            <a:ext cx="9601196" cy="1303867"/>
-          </a:xfrm>
-        </p:spPr>
-        <p:txBody>
-          <a:bodyPr>
-            <a:normAutofit/>
-          </a:bodyPr>
-          <a:lstStyle/>
-          <a:p>
-            <a:r>
-              <a:rPr lang="en-US">
-                <a:solidFill>
-                  <a:srgbClr val="262626"/>
-                </a:solidFill>
-              </a:rPr>
-              <a:t>Future Development Opportunities</a:t>
-            </a:r>
-          </a:p>
-        </p:txBody>
-      </p:sp>
-      <p:graphicFrame>
-        <p:nvGraphicFramePr>
-          <p:cNvPr id="7" name="Content Placeholder 2">
-            <a:extLst>
-              <a:ext uri="{FF2B5EF4-FFF2-40B4-BE49-F238E27FC236}">
-                <a16:creationId xmlns:a16="http://schemas.microsoft.com/office/drawing/2014/main" id="{2345AE7D-595C-3208-7D3F-21F43DE263D7}"/>
-              </a:ext>
-            </a:extLst>
-          </p:cNvPr>
-          <p:cNvGraphicFramePr>
-            <a:graphicFrameLocks noGrp="1"/>
-          </p:cNvGraphicFramePr>
-          <p:nvPr>
-            <p:ph idx="1"/>
-            <p:extLst>
-              <p:ext uri="{D42A27DB-BD31-4B8C-83A1-F6EECF244321}">
-                <p14:modId xmlns:p14="http://schemas.microsoft.com/office/powerpoint/2010/main" val="305848654"/>
-              </p:ext>
-            </p:extLst>
-          </p:nvPr>
-        </p:nvGraphicFramePr>
-        <p:xfrm>
-          <a:off x="1295400" y="2772384"/>
-          <a:ext cx="9601197" cy="2874883"/>
-        </p:xfrm>
-        <a:graphic>
-          <a:graphicData uri="http://schemas.openxmlformats.org/drawingml/2006/diagram">
-            <dgm:relIds xmlns:dgm="http://schemas.openxmlformats.org/drawingml/2006/diagram" xmlns:r="http://schemas.openxmlformats.org/officeDocument/2006/relationships" r:dm="rId4" r:lo="rId5" r:qs="rId6" r:cs="rId7"/>
-          </a:graphicData>
-        </a:graphic>
-      </p:graphicFrame>
-    </p:spTree>
-    <p:extLst>
-      <p:ext uri="{BB962C8B-B14F-4D97-AF65-F5344CB8AC3E}">
-        <p14:creationId xmlns:p14="http://schemas.microsoft.com/office/powerpoint/2010/main" val="1936370427"/>
       </p:ext>
     </p:extLst>
   </p:cSld>

</xml_diff>

<commit_message>
Replace TechWise_Team_4_-_Project_1_Presentation.pptx - Updated Lessons Learned tab
</commit_message>
<xml_diff>
--- a/TechWise_Team_4_-_Project_1_Presentation.pptx
+++ b/TechWise_Team_4_-_Project_1_Presentation.pptx
@@ -5125,11 +5125,11 @@
         <a:p>
           <a:r>
             <a:rPr lang="en-US" dirty="0"/>
-            <a:t>Using objects in Python and how to use </a:t>
+            <a:t>Using objects </a:t>
           </a:r>
           <a:r>
-            <a:rPr lang="en-US" dirty="0" err="1"/>
-            <a:t>PyGame</a:t>
+            <a:rPr lang="en-US"/>
+            <a:t>in Python</a:t>
           </a:r>
           <a:endParaRPr lang="en-US" dirty="0"/>
         </a:p>
@@ -5166,7 +5166,7 @@
         <a:p>
           <a:r>
             <a:rPr lang="en-US" dirty="0"/>
-            <a:t>Create development schedule and stick to it</a:t>
+            <a:t>Create development schedule</a:t>
           </a:r>
         </a:p>
       </dgm:t>
@@ -5373,6 +5373,33 @@
         </a:p>
       </dgm:t>
     </dgm:pt>
+    <dgm:pt modelId="{3134F469-6755-794D-AC77-CA50D39BBF3E}">
+      <dgm:prSet/>
+      <dgm:spPr/>
+      <dgm:t>
+        <a:bodyPr/>
+        <a:lstStyle/>
+        <a:p>
+          <a:r>
+            <a:rPr lang="en-US" dirty="0"/>
+            <a:t>Working with </a:t>
+          </a:r>
+          <a:r>
+            <a:rPr lang="en-US" dirty="0" err="1"/>
+            <a:t>PyGame</a:t>
+          </a:r>
+          <a:endParaRPr lang="en-US" dirty="0"/>
+        </a:p>
+      </dgm:t>
+    </dgm:pt>
+    <dgm:pt modelId="{D397CE57-AB1E-3B4F-9610-CCE4AC1FCF36}" type="parTrans" cxnId="{AA123A6B-AE22-9B4D-BEAF-C58E700CCFBE}">
+      <dgm:prSet/>
+      <dgm:spPr/>
+    </dgm:pt>
+    <dgm:pt modelId="{422C9EEE-43A5-534D-ABEB-7B215FD23E8C}" type="sibTrans" cxnId="{AA123A6B-AE22-9B4D-BEAF-C58E700CCFBE}">
+      <dgm:prSet/>
+      <dgm:spPr/>
+    </dgm:pt>
     <dgm:pt modelId="{537BD5B9-19DF-4433-9813-5426E0756F06}" type="pres">
       <dgm:prSet presAssocID="{EE990F0C-FAA8-49B6-A367-C1BDF2F009C4}" presName="diagram" presStyleCnt="0">
         <dgm:presLayoutVars>
@@ -5383,7 +5410,7 @@
       <dgm:spPr/>
     </dgm:pt>
     <dgm:pt modelId="{D5357FA2-08D5-4337-BA1B-046E3C367060}" type="pres">
-      <dgm:prSet presAssocID="{2C81C331-0ABA-4F47-B3DC-A28A8D0BA496}" presName="node" presStyleLbl="node1" presStyleIdx="0" presStyleCnt="7">
+      <dgm:prSet presAssocID="{2C81C331-0ABA-4F47-B3DC-A28A8D0BA496}" presName="node" presStyleLbl="node1" presStyleIdx="0" presStyleCnt="8">
         <dgm:presLayoutVars>
           <dgm:bulletEnabled val="1"/>
         </dgm:presLayoutVars>
@@ -5394,8 +5421,20 @@
       <dgm:prSet presAssocID="{FFD3B416-D696-4CD7-84F3-35E9D0624F96}" presName="sibTrans" presStyleCnt="0"/>
       <dgm:spPr/>
     </dgm:pt>
+    <dgm:pt modelId="{BAA3DA51-DB11-1541-9AE2-1B5058FE274C}" type="pres">
+      <dgm:prSet presAssocID="{3134F469-6755-794D-AC77-CA50D39BBF3E}" presName="node" presStyleLbl="node1" presStyleIdx="1" presStyleCnt="8">
+        <dgm:presLayoutVars>
+          <dgm:bulletEnabled val="1"/>
+        </dgm:presLayoutVars>
+      </dgm:prSet>
+      <dgm:spPr/>
+    </dgm:pt>
+    <dgm:pt modelId="{1D6CF46B-0D86-F142-BC7A-B5F94D24316A}" type="pres">
+      <dgm:prSet presAssocID="{422C9EEE-43A5-534D-ABEB-7B215FD23E8C}" presName="sibTrans" presStyleCnt="0"/>
+      <dgm:spPr/>
+    </dgm:pt>
     <dgm:pt modelId="{DB6F22DC-FF56-8D40-A2C9-3CB192FDCAF1}" type="pres">
-      <dgm:prSet presAssocID="{D438D363-DFE0-6A47-BC42-39EFFA1D0300}" presName="node" presStyleLbl="node1" presStyleIdx="1" presStyleCnt="7">
+      <dgm:prSet presAssocID="{D438D363-DFE0-6A47-BC42-39EFFA1D0300}" presName="node" presStyleLbl="node1" presStyleIdx="2" presStyleCnt="8">
         <dgm:presLayoutVars>
           <dgm:bulletEnabled val="1"/>
         </dgm:presLayoutVars>
@@ -5407,7 +5446,7 @@
       <dgm:spPr/>
     </dgm:pt>
     <dgm:pt modelId="{F01806D4-9AAD-4217-87C9-28874C7D7290}" type="pres">
-      <dgm:prSet presAssocID="{847E8B83-AEBA-4669-86CD-C19EAEEF2802}" presName="node" presStyleLbl="node1" presStyleIdx="2" presStyleCnt="7">
+      <dgm:prSet presAssocID="{847E8B83-AEBA-4669-86CD-C19EAEEF2802}" presName="node" presStyleLbl="node1" presStyleIdx="3" presStyleCnt="8">
         <dgm:presLayoutVars>
           <dgm:bulletEnabled val="1"/>
         </dgm:presLayoutVars>
@@ -5419,7 +5458,7 @@
       <dgm:spPr/>
     </dgm:pt>
     <dgm:pt modelId="{F53A575B-0528-423D-AEC5-48D59396253A}" type="pres">
-      <dgm:prSet presAssocID="{97A2FAE2-1C7E-472B-84B8-978A5914A2B8}" presName="node" presStyleLbl="node1" presStyleIdx="3" presStyleCnt="7">
+      <dgm:prSet presAssocID="{97A2FAE2-1C7E-472B-84B8-978A5914A2B8}" presName="node" presStyleLbl="node1" presStyleIdx="4" presStyleCnt="8">
         <dgm:presLayoutVars>
           <dgm:bulletEnabled val="1"/>
         </dgm:presLayoutVars>
@@ -5431,7 +5470,7 @@
       <dgm:spPr/>
     </dgm:pt>
     <dgm:pt modelId="{A659FA33-1BC3-4E55-A422-F0F12090C59D}" type="pres">
-      <dgm:prSet presAssocID="{C0A12D0B-DAE6-4BEF-9DB0-593754897FE7}" presName="node" presStyleLbl="node1" presStyleIdx="4" presStyleCnt="7">
+      <dgm:prSet presAssocID="{C0A12D0B-DAE6-4BEF-9DB0-593754897FE7}" presName="node" presStyleLbl="node1" presStyleIdx="5" presStyleCnt="8">
         <dgm:presLayoutVars>
           <dgm:bulletEnabled val="1"/>
         </dgm:presLayoutVars>
@@ -5443,7 +5482,7 @@
       <dgm:spPr/>
     </dgm:pt>
     <dgm:pt modelId="{0F08A518-1939-1942-B433-7D3960B5CB76}" type="pres">
-      <dgm:prSet presAssocID="{D0F94F81-3D80-7840-9339-A1D613776EDB}" presName="node" presStyleLbl="node1" presStyleIdx="5" presStyleCnt="7" custLinFactNeighborX="0" custLinFactNeighborY="1942">
+      <dgm:prSet presAssocID="{D0F94F81-3D80-7840-9339-A1D613776EDB}" presName="node" presStyleLbl="node1" presStyleIdx="6" presStyleCnt="8" custLinFactNeighborX="0" custLinFactNeighborY="1942">
         <dgm:presLayoutVars>
           <dgm:bulletEnabled val="1"/>
         </dgm:presLayoutVars>
@@ -5455,7 +5494,7 @@
       <dgm:spPr/>
     </dgm:pt>
     <dgm:pt modelId="{D835B4A0-925E-CA4D-8BFA-E52457CA0F58}" type="pres">
-      <dgm:prSet presAssocID="{A8B9BB61-3AFC-6540-8DEC-26298FEB1229}" presName="node" presStyleLbl="node1" presStyleIdx="6" presStyleCnt="7">
+      <dgm:prSet presAssocID="{A8B9BB61-3AFC-6540-8DEC-26298FEB1229}" presName="node" presStyleLbl="node1" presStyleIdx="7" presStyleCnt="8">
         <dgm:presLayoutVars>
           <dgm:bulletEnabled val="1"/>
         </dgm:presLayoutVars>
@@ -5464,34 +5503,38 @@
     </dgm:pt>
   </dgm:ptLst>
   <dgm:cxnLst>
-    <dgm:cxn modelId="{82132627-1A5F-42A5-B9F3-CDB311BC0BC9}" srcId="{EE990F0C-FAA8-49B6-A367-C1BDF2F009C4}" destId="{97A2FAE2-1C7E-472B-84B8-978A5914A2B8}" srcOrd="3" destOrd="0" parTransId="{C5CB1528-F702-48BC-AA74-9BFA47052943}" sibTransId="{849999D8-51D3-4848-BA52-BE5CB244023B}"/>
+    <dgm:cxn modelId="{82132627-1A5F-42A5-B9F3-CDB311BC0BC9}" srcId="{EE990F0C-FAA8-49B6-A367-C1BDF2F009C4}" destId="{97A2FAE2-1C7E-472B-84B8-978A5914A2B8}" srcOrd="4" destOrd="0" parTransId="{C5CB1528-F702-48BC-AA74-9BFA47052943}" sibTransId="{849999D8-51D3-4848-BA52-BE5CB244023B}"/>
     <dgm:cxn modelId="{2550E042-6BA4-484D-8A32-E792850A0647}" type="presOf" srcId="{EE990F0C-FAA8-49B6-A367-C1BDF2F009C4}" destId="{537BD5B9-19DF-4433-9813-5426E0756F06}" srcOrd="0" destOrd="0" presId="urn:microsoft.com/office/officeart/2005/8/layout/default"/>
     <dgm:cxn modelId="{3DA8BE4A-0D48-4D27-A570-B3FB3EAC2947}" type="presOf" srcId="{97A2FAE2-1C7E-472B-84B8-978A5914A2B8}" destId="{F53A575B-0528-423D-AEC5-48D59396253A}" srcOrd="0" destOrd="0" presId="urn:microsoft.com/office/officeart/2005/8/layout/default"/>
     <dgm:cxn modelId="{81489D5E-44BA-42FE-8E14-BCF00BBC1ACF}" type="presOf" srcId="{2C81C331-0ABA-4F47-B3DC-A28A8D0BA496}" destId="{D5357FA2-08D5-4337-BA1B-046E3C367060}" srcOrd="0" destOrd="0" presId="urn:microsoft.com/office/officeart/2005/8/layout/default"/>
+    <dgm:cxn modelId="{AA123A6B-AE22-9B4D-BEAF-C58E700CCFBE}" srcId="{EE990F0C-FAA8-49B6-A367-C1BDF2F009C4}" destId="{3134F469-6755-794D-AC77-CA50D39BBF3E}" srcOrd="1" destOrd="0" parTransId="{D397CE57-AB1E-3B4F-9610-CCE4AC1FCF36}" sibTransId="{422C9EEE-43A5-534D-ABEB-7B215FD23E8C}"/>
     <dgm:cxn modelId="{972AD776-25C9-471A-91DB-058C25BDDFBC}" srcId="{EE990F0C-FAA8-49B6-A367-C1BDF2F009C4}" destId="{2C81C331-0ABA-4F47-B3DC-A28A8D0BA496}" srcOrd="0" destOrd="0" parTransId="{2B422E19-4212-42D2-A14C-0BA4D18B00D9}" sibTransId="{FFD3B416-D696-4CD7-84F3-35E9D0624F96}"/>
     <dgm:cxn modelId="{CB2FFB7B-7D53-6B4F-AE2A-F043BF2497BD}" type="presOf" srcId="{D0F94F81-3D80-7840-9339-A1D613776EDB}" destId="{0F08A518-1939-1942-B433-7D3960B5CB76}" srcOrd="0" destOrd="0" presId="urn:microsoft.com/office/officeart/2005/8/layout/default"/>
     <dgm:cxn modelId="{C4B98290-6E26-43E0-8FEC-072834BB39DC}" type="presOf" srcId="{C0A12D0B-DAE6-4BEF-9DB0-593754897FE7}" destId="{A659FA33-1BC3-4E55-A422-F0F12090C59D}" srcOrd="0" destOrd="0" presId="urn:microsoft.com/office/officeart/2005/8/layout/default"/>
     <dgm:cxn modelId="{3F7AF996-0588-4ACC-92D5-D86F12D92BB9}" type="presOf" srcId="{847E8B83-AEBA-4669-86CD-C19EAEEF2802}" destId="{F01806D4-9AAD-4217-87C9-28874C7D7290}" srcOrd="0" destOrd="0" presId="urn:microsoft.com/office/officeart/2005/8/layout/default"/>
-    <dgm:cxn modelId="{2E3F03A3-DEA8-6448-924E-EA9A85CAEE2C}" srcId="{EE990F0C-FAA8-49B6-A367-C1BDF2F009C4}" destId="{D0F94F81-3D80-7840-9339-A1D613776EDB}" srcOrd="5" destOrd="0" parTransId="{DEB5736E-48D1-9E45-B3BD-EF9CC5F7C8BF}" sibTransId="{4CAF6348-BFB6-1748-9FC4-DB870521F0B5}"/>
-    <dgm:cxn modelId="{68FC62A4-DEBD-47B9-B7A5-C0C6055BE63C}" srcId="{EE990F0C-FAA8-49B6-A367-C1BDF2F009C4}" destId="{847E8B83-AEBA-4669-86CD-C19EAEEF2802}" srcOrd="2" destOrd="0" parTransId="{19A70BFF-FE45-4E4C-9D95-032602CAC05D}" sibTransId="{02AA933B-9C01-4737-9DC8-0DC3DB1C9D96}"/>
-    <dgm:cxn modelId="{589820A9-A0F3-184C-8194-D475CA8EF7AD}" srcId="{EE990F0C-FAA8-49B6-A367-C1BDF2F009C4}" destId="{D438D363-DFE0-6A47-BC42-39EFFA1D0300}" srcOrd="1" destOrd="0" parTransId="{83E36F1C-3A3F-5545-8BA4-B20896364B25}" sibTransId="{47DA3A77-C316-9341-A65B-16C4938D2B14}"/>
+    <dgm:cxn modelId="{2E3F03A3-DEA8-6448-924E-EA9A85CAEE2C}" srcId="{EE990F0C-FAA8-49B6-A367-C1BDF2F009C4}" destId="{D0F94F81-3D80-7840-9339-A1D613776EDB}" srcOrd="6" destOrd="0" parTransId="{DEB5736E-48D1-9E45-B3BD-EF9CC5F7C8BF}" sibTransId="{4CAF6348-BFB6-1748-9FC4-DB870521F0B5}"/>
+    <dgm:cxn modelId="{68FC62A4-DEBD-47B9-B7A5-C0C6055BE63C}" srcId="{EE990F0C-FAA8-49B6-A367-C1BDF2F009C4}" destId="{847E8B83-AEBA-4669-86CD-C19EAEEF2802}" srcOrd="3" destOrd="0" parTransId="{19A70BFF-FE45-4E4C-9D95-032602CAC05D}" sibTransId="{02AA933B-9C01-4737-9DC8-0DC3DB1C9D96}"/>
+    <dgm:cxn modelId="{589820A9-A0F3-184C-8194-D475CA8EF7AD}" srcId="{EE990F0C-FAA8-49B6-A367-C1BDF2F009C4}" destId="{D438D363-DFE0-6A47-BC42-39EFFA1D0300}" srcOrd="2" destOrd="0" parTransId="{83E36F1C-3A3F-5545-8BA4-B20896364B25}" sibTransId="{47DA3A77-C316-9341-A65B-16C4938D2B14}"/>
     <dgm:cxn modelId="{59A0EACD-62D9-4748-85FD-8A575F3A22C1}" type="presOf" srcId="{D438D363-DFE0-6A47-BC42-39EFFA1D0300}" destId="{DB6F22DC-FF56-8D40-A2C9-3CB192FDCAF1}" srcOrd="0" destOrd="0" presId="urn:microsoft.com/office/officeart/2005/8/layout/default"/>
-    <dgm:cxn modelId="{392371D7-94E7-47A8-8EEB-41C0724056FB}" srcId="{EE990F0C-FAA8-49B6-A367-C1BDF2F009C4}" destId="{C0A12D0B-DAE6-4BEF-9DB0-593754897FE7}" srcOrd="4" destOrd="0" parTransId="{31B708E0-B7D6-43CF-9489-7B293B3FF374}" sibTransId="{80C4F05B-D664-4895-BDBA-C3D11C48790E}"/>
+    <dgm:cxn modelId="{392371D7-94E7-47A8-8EEB-41C0724056FB}" srcId="{EE990F0C-FAA8-49B6-A367-C1BDF2F009C4}" destId="{C0A12D0B-DAE6-4BEF-9DB0-593754897FE7}" srcOrd="5" destOrd="0" parTransId="{31B708E0-B7D6-43CF-9489-7B293B3FF374}" sibTransId="{80C4F05B-D664-4895-BDBA-C3D11C48790E}"/>
     <dgm:cxn modelId="{F4C241D9-04E3-AB43-8053-0314DBD365A0}" type="presOf" srcId="{A8B9BB61-3AFC-6540-8DEC-26298FEB1229}" destId="{D835B4A0-925E-CA4D-8BFA-E52457CA0F58}" srcOrd="0" destOrd="0" presId="urn:microsoft.com/office/officeart/2005/8/layout/default"/>
-    <dgm:cxn modelId="{D1B34FE3-C5CC-5542-ACAC-CD41EFD30DFC}" srcId="{EE990F0C-FAA8-49B6-A367-C1BDF2F009C4}" destId="{A8B9BB61-3AFC-6540-8DEC-26298FEB1229}" srcOrd="6" destOrd="0" parTransId="{E5492FDB-A35B-6640-A09B-6D7CCCB94F4B}" sibTransId="{449FD059-2501-664C-885D-28267043B9E8}"/>
+    <dgm:cxn modelId="{D1B34FE3-C5CC-5542-ACAC-CD41EFD30DFC}" srcId="{EE990F0C-FAA8-49B6-A367-C1BDF2F009C4}" destId="{A8B9BB61-3AFC-6540-8DEC-26298FEB1229}" srcOrd="7" destOrd="0" parTransId="{E5492FDB-A35B-6640-A09B-6D7CCCB94F4B}" sibTransId="{449FD059-2501-664C-885D-28267043B9E8}"/>
+    <dgm:cxn modelId="{4E2BC0F0-A700-5341-8105-08B47A69625A}" type="presOf" srcId="{3134F469-6755-794D-AC77-CA50D39BBF3E}" destId="{BAA3DA51-DB11-1541-9AE2-1B5058FE274C}" srcOrd="0" destOrd="0" presId="urn:microsoft.com/office/officeart/2005/8/layout/default"/>
     <dgm:cxn modelId="{A7F12D66-283E-4407-9BDD-8BDDF684EAB4}" type="presParOf" srcId="{537BD5B9-19DF-4433-9813-5426E0756F06}" destId="{D5357FA2-08D5-4337-BA1B-046E3C367060}" srcOrd="0" destOrd="0" presId="urn:microsoft.com/office/officeart/2005/8/layout/default"/>
     <dgm:cxn modelId="{5DE5C9BF-D6A9-415C-BCBF-29A37512E0D7}" type="presParOf" srcId="{537BD5B9-19DF-4433-9813-5426E0756F06}" destId="{27BC0FE5-9B9D-4DC8-A379-80CF65C93AEC}" srcOrd="1" destOrd="0" presId="urn:microsoft.com/office/officeart/2005/8/layout/default"/>
-    <dgm:cxn modelId="{841EEEF9-076F-A94F-A7D7-10C67A0CAE7B}" type="presParOf" srcId="{537BD5B9-19DF-4433-9813-5426E0756F06}" destId="{DB6F22DC-FF56-8D40-A2C9-3CB192FDCAF1}" srcOrd="2" destOrd="0" presId="urn:microsoft.com/office/officeart/2005/8/layout/default"/>
-    <dgm:cxn modelId="{F20D043F-003B-BE4A-BB1B-ABD1DB87EF5A}" type="presParOf" srcId="{537BD5B9-19DF-4433-9813-5426E0756F06}" destId="{A6B271E9-D754-BD44-99A4-50A20BBA3B36}" srcOrd="3" destOrd="0" presId="urn:microsoft.com/office/officeart/2005/8/layout/default"/>
-    <dgm:cxn modelId="{BB25B7F5-3830-4AF8-B306-E654546141B7}" type="presParOf" srcId="{537BD5B9-19DF-4433-9813-5426E0756F06}" destId="{F01806D4-9AAD-4217-87C9-28874C7D7290}" srcOrd="4" destOrd="0" presId="urn:microsoft.com/office/officeart/2005/8/layout/default"/>
-    <dgm:cxn modelId="{F2CDE415-1EF3-49CD-A9C6-57994391E033}" type="presParOf" srcId="{537BD5B9-19DF-4433-9813-5426E0756F06}" destId="{13107432-11B8-4CF0-8F10-54C1B9D3C227}" srcOrd="5" destOrd="0" presId="urn:microsoft.com/office/officeart/2005/8/layout/default"/>
-    <dgm:cxn modelId="{B1C048F0-F65A-4F9E-9EFD-C926489E5429}" type="presParOf" srcId="{537BD5B9-19DF-4433-9813-5426E0756F06}" destId="{F53A575B-0528-423D-AEC5-48D59396253A}" srcOrd="6" destOrd="0" presId="urn:microsoft.com/office/officeart/2005/8/layout/default"/>
-    <dgm:cxn modelId="{FC771D42-E029-4AC9-BE8E-CB7390A394A6}" type="presParOf" srcId="{537BD5B9-19DF-4433-9813-5426E0756F06}" destId="{012320BC-86D2-4E4E-910C-444BDB974AED}" srcOrd="7" destOrd="0" presId="urn:microsoft.com/office/officeart/2005/8/layout/default"/>
-    <dgm:cxn modelId="{AD8E4014-2D1A-4501-86DA-C15960E1CB21}" type="presParOf" srcId="{537BD5B9-19DF-4433-9813-5426E0756F06}" destId="{A659FA33-1BC3-4E55-A422-F0F12090C59D}" srcOrd="8" destOrd="0" presId="urn:microsoft.com/office/officeart/2005/8/layout/default"/>
-    <dgm:cxn modelId="{CFCDA901-9135-7944-9CB7-0C64EF948D96}" type="presParOf" srcId="{537BD5B9-19DF-4433-9813-5426E0756F06}" destId="{6B2201AA-0D50-CE43-8FC4-C39F0DA6238B}" srcOrd="9" destOrd="0" presId="urn:microsoft.com/office/officeart/2005/8/layout/default"/>
-    <dgm:cxn modelId="{8E8473AD-8483-5240-B32C-8A5D104F9B9E}" type="presParOf" srcId="{537BD5B9-19DF-4433-9813-5426E0756F06}" destId="{0F08A518-1939-1942-B433-7D3960B5CB76}" srcOrd="10" destOrd="0" presId="urn:microsoft.com/office/officeart/2005/8/layout/default"/>
-    <dgm:cxn modelId="{52241FE8-DA71-714A-B775-9D4327BB8468}" type="presParOf" srcId="{537BD5B9-19DF-4433-9813-5426E0756F06}" destId="{BD72DD59-8DF1-234B-973F-A03E9F107989}" srcOrd="11" destOrd="0" presId="urn:microsoft.com/office/officeart/2005/8/layout/default"/>
-    <dgm:cxn modelId="{A4FD3F36-EB40-DA4C-94EA-2B0FB4361A7C}" type="presParOf" srcId="{537BD5B9-19DF-4433-9813-5426E0756F06}" destId="{D835B4A0-925E-CA4D-8BFA-E52457CA0F58}" srcOrd="12" destOrd="0" presId="urn:microsoft.com/office/officeart/2005/8/layout/default"/>
+    <dgm:cxn modelId="{56E5D174-971F-9B45-A337-EF74DB74B8ED}" type="presParOf" srcId="{537BD5B9-19DF-4433-9813-5426E0756F06}" destId="{BAA3DA51-DB11-1541-9AE2-1B5058FE274C}" srcOrd="2" destOrd="0" presId="urn:microsoft.com/office/officeart/2005/8/layout/default"/>
+    <dgm:cxn modelId="{B0B31B0F-6A93-C944-9B7F-5DA2423BE2AA}" type="presParOf" srcId="{537BD5B9-19DF-4433-9813-5426E0756F06}" destId="{1D6CF46B-0D86-F142-BC7A-B5F94D24316A}" srcOrd="3" destOrd="0" presId="urn:microsoft.com/office/officeart/2005/8/layout/default"/>
+    <dgm:cxn modelId="{841EEEF9-076F-A94F-A7D7-10C67A0CAE7B}" type="presParOf" srcId="{537BD5B9-19DF-4433-9813-5426E0756F06}" destId="{DB6F22DC-FF56-8D40-A2C9-3CB192FDCAF1}" srcOrd="4" destOrd="0" presId="urn:microsoft.com/office/officeart/2005/8/layout/default"/>
+    <dgm:cxn modelId="{F20D043F-003B-BE4A-BB1B-ABD1DB87EF5A}" type="presParOf" srcId="{537BD5B9-19DF-4433-9813-5426E0756F06}" destId="{A6B271E9-D754-BD44-99A4-50A20BBA3B36}" srcOrd="5" destOrd="0" presId="urn:microsoft.com/office/officeart/2005/8/layout/default"/>
+    <dgm:cxn modelId="{BB25B7F5-3830-4AF8-B306-E654546141B7}" type="presParOf" srcId="{537BD5B9-19DF-4433-9813-5426E0756F06}" destId="{F01806D4-9AAD-4217-87C9-28874C7D7290}" srcOrd="6" destOrd="0" presId="urn:microsoft.com/office/officeart/2005/8/layout/default"/>
+    <dgm:cxn modelId="{F2CDE415-1EF3-49CD-A9C6-57994391E033}" type="presParOf" srcId="{537BD5B9-19DF-4433-9813-5426E0756F06}" destId="{13107432-11B8-4CF0-8F10-54C1B9D3C227}" srcOrd="7" destOrd="0" presId="urn:microsoft.com/office/officeart/2005/8/layout/default"/>
+    <dgm:cxn modelId="{B1C048F0-F65A-4F9E-9EFD-C926489E5429}" type="presParOf" srcId="{537BD5B9-19DF-4433-9813-5426E0756F06}" destId="{F53A575B-0528-423D-AEC5-48D59396253A}" srcOrd="8" destOrd="0" presId="urn:microsoft.com/office/officeart/2005/8/layout/default"/>
+    <dgm:cxn modelId="{FC771D42-E029-4AC9-BE8E-CB7390A394A6}" type="presParOf" srcId="{537BD5B9-19DF-4433-9813-5426E0756F06}" destId="{012320BC-86D2-4E4E-910C-444BDB974AED}" srcOrd="9" destOrd="0" presId="urn:microsoft.com/office/officeart/2005/8/layout/default"/>
+    <dgm:cxn modelId="{AD8E4014-2D1A-4501-86DA-C15960E1CB21}" type="presParOf" srcId="{537BD5B9-19DF-4433-9813-5426E0756F06}" destId="{A659FA33-1BC3-4E55-A422-F0F12090C59D}" srcOrd="10" destOrd="0" presId="urn:microsoft.com/office/officeart/2005/8/layout/default"/>
+    <dgm:cxn modelId="{CFCDA901-9135-7944-9CB7-0C64EF948D96}" type="presParOf" srcId="{537BD5B9-19DF-4433-9813-5426E0756F06}" destId="{6B2201AA-0D50-CE43-8FC4-C39F0DA6238B}" srcOrd="11" destOrd="0" presId="urn:microsoft.com/office/officeart/2005/8/layout/default"/>
+    <dgm:cxn modelId="{8E8473AD-8483-5240-B32C-8A5D104F9B9E}" type="presParOf" srcId="{537BD5B9-19DF-4433-9813-5426E0756F06}" destId="{0F08A518-1939-1942-B433-7D3960B5CB76}" srcOrd="12" destOrd="0" presId="urn:microsoft.com/office/officeart/2005/8/layout/default"/>
+    <dgm:cxn modelId="{52241FE8-DA71-714A-B775-9D4327BB8468}" type="presParOf" srcId="{537BD5B9-19DF-4433-9813-5426E0756F06}" destId="{BD72DD59-8DF1-234B-973F-A03E9F107989}" srcOrd="13" destOrd="0" presId="urn:microsoft.com/office/officeart/2005/8/layout/default"/>
+    <dgm:cxn modelId="{A4FD3F36-EB40-DA4C-94EA-2B0FB4361A7C}" type="presParOf" srcId="{537BD5B9-19DF-4433-9813-5426E0756F06}" destId="{D835B4A0-925E-CA4D-8BFA-E52457CA0F58}" srcOrd="14" destOrd="0" presId="urn:microsoft.com/office/officeart/2005/8/layout/default"/>
   </dgm:cxnLst>
   <dgm:bg/>
   <dgm:whole/>
@@ -8158,11 +8201,11 @@
           </a:pPr>
           <a:r>
             <a:rPr lang="en-US" sz="2200" kern="1200" dirty="0"/>
-            <a:t>Using objects in Python and how to use </a:t>
+            <a:t>Using objects </a:t>
           </a:r>
           <a:r>
-            <a:rPr lang="en-US" sz="2200" kern="1200" dirty="0" err="1"/>
-            <a:t>PyGame</a:t>
+            <a:rPr lang="en-US" sz="2200" kern="1200"/>
+            <a:t>in Python</a:t>
           </a:r>
           <a:endParaRPr lang="en-US" sz="2200" kern="1200" dirty="0"/>
         </a:p>
@@ -8172,7 +8215,7 @@
         <a:ext cx="2210431" cy="1326259"/>
       </dsp:txXfrm>
     </dsp:sp>
-    <dsp:sp modelId="{DB6F22DC-FF56-8D40-A2C9-3CB192FDCAF1}">
+    <dsp:sp modelId="{BAA3DA51-DB11-1541-9AE2-1B5058FE274C}">
       <dsp:nvSpPr>
         <dsp:cNvPr id="0" name=""/>
         <dsp:cNvSpPr/>
@@ -8187,9 +8230,91 @@
         </a:prstGeom>
         <a:solidFill>
           <a:schemeClr val="accent2">
-            <a:hueOff val="560526"/>
-            <a:satOff val="-595"/>
-            <a:lumOff val="457"/>
+            <a:hueOff val="480451"/>
+            <a:satOff val="-510"/>
+            <a:lumOff val="392"/>
+            <a:alphaOff val="0"/>
+          </a:schemeClr>
+        </a:solidFill>
+        <a:ln w="15875" cap="flat" cmpd="sng" algn="ctr">
+          <a:solidFill>
+            <a:schemeClr val="lt1">
+              <a:hueOff val="0"/>
+              <a:satOff val="0"/>
+              <a:lumOff val="0"/>
+              <a:alphaOff val="0"/>
+            </a:schemeClr>
+          </a:solidFill>
+          <a:prstDash val="solid"/>
+        </a:ln>
+        <a:effectLst/>
+      </dsp:spPr>
+      <dsp:style>
+        <a:lnRef idx="2">
+          <a:scrgbClr r="0" g="0" b="0"/>
+        </a:lnRef>
+        <a:fillRef idx="1">
+          <a:scrgbClr r="0" g="0" b="0"/>
+        </a:fillRef>
+        <a:effectRef idx="0">
+          <a:scrgbClr r="0" g="0" b="0"/>
+        </a:effectRef>
+        <a:fontRef idx="minor">
+          <a:schemeClr val="lt1"/>
+        </a:fontRef>
+      </dsp:style>
+      <dsp:txBody>
+        <a:bodyPr spcFirstLastPara="0" vert="horz" wrap="square" lIns="83820" tIns="83820" rIns="83820" bIns="83820" numCol="1" spcCol="1270" anchor="ctr" anchorCtr="0">
+          <a:noAutofit/>
+        </a:bodyPr>
+        <a:lstStyle/>
+        <a:p>
+          <a:pPr marL="0" lvl="0" indent="0" algn="ctr" defTabSz="977900">
+            <a:lnSpc>
+              <a:spcPct val="90000"/>
+            </a:lnSpc>
+            <a:spcBef>
+              <a:spcPct val="0"/>
+            </a:spcBef>
+            <a:spcAft>
+              <a:spcPct val="35000"/>
+            </a:spcAft>
+            <a:buNone/>
+          </a:pPr>
+          <a:r>
+            <a:rPr lang="en-US" sz="2200" kern="1200" dirty="0"/>
+            <a:t>Working with </a:t>
+          </a:r>
+          <a:r>
+            <a:rPr lang="en-US" sz="2200" kern="1200" dirty="0" err="1"/>
+            <a:t>PyGame</a:t>
+          </a:r>
+          <a:endParaRPr lang="en-US" sz="2200" kern="1200" dirty="0"/>
+        </a:p>
+      </dsp:txBody>
+      <dsp:txXfrm>
+        <a:off x="2479645" y="660"/>
+        <a:ext cx="2210431" cy="1326259"/>
+      </dsp:txXfrm>
+    </dsp:sp>
+    <dsp:sp modelId="{DB6F22DC-FF56-8D40-A2C9-3CB192FDCAF1}">
+      <dsp:nvSpPr>
+        <dsp:cNvPr id="0" name=""/>
+        <dsp:cNvSpPr/>
+      </dsp:nvSpPr>
+      <dsp:spPr>
+        <a:xfrm>
+          <a:off x="4911120" y="660"/>
+          <a:ext cx="2210431" cy="1326259"/>
+        </a:xfrm>
+        <a:prstGeom prst="rect">
+          <a:avLst/>
+        </a:prstGeom>
+        <a:solidFill>
+          <a:schemeClr val="accent2">
+            <a:hueOff val="960901"/>
+            <a:satOff val="-1021"/>
+            <a:lumOff val="784"/>
             <a:alphaOff val="0"/>
           </a:schemeClr>
         </a:solidFill>
@@ -8245,7 +8370,7 @@
         </a:p>
       </dsp:txBody>
       <dsp:txXfrm>
-        <a:off x="2479645" y="660"/>
+        <a:off x="4911120" y="660"/>
         <a:ext cx="2210431" cy="1326259"/>
       </dsp:txXfrm>
     </dsp:sp>
@@ -8256,7 +8381,7 @@
       </dsp:nvSpPr>
       <dsp:spPr>
         <a:xfrm>
-          <a:off x="4911120" y="660"/>
+          <a:off x="7342595" y="660"/>
           <a:ext cx="2210431" cy="1326259"/>
         </a:xfrm>
         <a:prstGeom prst="rect">
@@ -8264,9 +8389,9 @@
         </a:prstGeom>
         <a:solidFill>
           <a:schemeClr val="accent2">
-            <a:hueOff val="1121052"/>
-            <a:satOff val="-1191"/>
-            <a:lumOff val="915"/>
+            <a:hueOff val="1441352"/>
+            <a:satOff val="-1531"/>
+            <a:lumOff val="1176"/>
             <a:alphaOff val="0"/>
           </a:schemeClr>
         </a:solidFill>
@@ -8317,12 +8442,12 @@
           </a:pPr>
           <a:r>
             <a:rPr lang="en-US" sz="2200" kern="1200" dirty="0"/>
-            <a:t>Create development schedule and stick to it</a:t>
+            <a:t>Create development schedule</a:t>
           </a:r>
         </a:p>
       </dsp:txBody>
       <dsp:txXfrm>
-        <a:off x="4911120" y="660"/>
+        <a:off x="7342595" y="660"/>
         <a:ext cx="2210431" cy="1326259"/>
       </dsp:txXfrm>
     </dsp:sp>
@@ -8333,7 +8458,7 @@
       </dsp:nvSpPr>
       <dsp:spPr>
         <a:xfrm>
-          <a:off x="7342595" y="660"/>
+          <a:off x="48170" y="1547963"/>
           <a:ext cx="2210431" cy="1326259"/>
         </a:xfrm>
         <a:prstGeom prst="rect">
@@ -8341,9 +8466,9 @@
         </a:prstGeom>
         <a:solidFill>
           <a:schemeClr val="accent2">
-            <a:hueOff val="1681577"/>
-            <a:satOff val="-1786"/>
-            <a:lumOff val="1372"/>
+            <a:hueOff val="1921803"/>
+            <a:satOff val="-2041"/>
+            <a:lumOff val="1569"/>
             <a:alphaOff val="0"/>
           </a:schemeClr>
         </a:solidFill>
@@ -8399,7 +8524,7 @@
         </a:p>
       </dsp:txBody>
       <dsp:txXfrm>
-        <a:off x="7342595" y="660"/>
+        <a:off x="48170" y="1547963"/>
         <a:ext cx="2210431" cy="1326259"/>
       </dsp:txXfrm>
     </dsp:sp>
@@ -8410,7 +8535,7 @@
       </dsp:nvSpPr>
       <dsp:spPr>
         <a:xfrm>
-          <a:off x="1263907" y="1547963"/>
+          <a:off x="2479645" y="1547963"/>
           <a:ext cx="2210431" cy="1326259"/>
         </a:xfrm>
         <a:prstGeom prst="rect">
@@ -8418,9 +8543,9 @@
         </a:prstGeom>
         <a:solidFill>
           <a:schemeClr val="accent2">
-            <a:hueOff val="2242103"/>
-            <a:satOff val="-2381"/>
-            <a:lumOff val="1830"/>
+            <a:hueOff val="2402254"/>
+            <a:satOff val="-2551"/>
+            <a:lumOff val="1961"/>
             <a:alphaOff val="0"/>
           </a:schemeClr>
         </a:solidFill>
@@ -8476,7 +8601,7 @@
         </a:p>
       </dsp:txBody>
       <dsp:txXfrm>
-        <a:off x="1263907" y="1547963"/>
+        <a:off x="2479645" y="1547963"/>
         <a:ext cx="2210431" cy="1326259"/>
       </dsp:txXfrm>
     </dsp:sp>
@@ -8487,7 +8612,7 @@
       </dsp:nvSpPr>
       <dsp:spPr>
         <a:xfrm>
-          <a:off x="3695382" y="1548623"/>
+          <a:off x="4911120" y="1548623"/>
           <a:ext cx="2210431" cy="1326259"/>
         </a:xfrm>
         <a:prstGeom prst="rect">
@@ -8495,9 +8620,9 @@
         </a:prstGeom>
         <a:solidFill>
           <a:schemeClr val="accent2">
-            <a:hueOff val="2802629"/>
-            <a:satOff val="-2977"/>
-            <a:lumOff val="2287"/>
+            <a:hueOff val="2882704"/>
+            <a:satOff val="-3062"/>
+            <a:lumOff val="2353"/>
             <a:alphaOff val="0"/>
           </a:schemeClr>
         </a:solidFill>
@@ -8553,7 +8678,7 @@
         </a:p>
       </dsp:txBody>
       <dsp:txXfrm>
-        <a:off x="3695382" y="1548623"/>
+        <a:off x="4911120" y="1548623"/>
         <a:ext cx="2210431" cy="1326259"/>
       </dsp:txXfrm>
     </dsp:sp>
@@ -8564,7 +8689,7 @@
       </dsp:nvSpPr>
       <dsp:spPr>
         <a:xfrm>
-          <a:off x="6126857" y="1547963"/>
+          <a:off x="7342595" y="1547963"/>
           <a:ext cx="2210431" cy="1326259"/>
         </a:xfrm>
         <a:prstGeom prst="rect">
@@ -8630,7 +8755,7 @@
         </a:p>
       </dsp:txBody>
       <dsp:txXfrm>
-        <a:off x="6126857" y="1547963"/>
+        <a:off x="7342595" y="1547963"/>
         <a:ext cx="2210431" cy="1326259"/>
       </dsp:txXfrm>
     </dsp:sp>
@@ -24738,7 +24863,7 @@
             <p:ph idx="1"/>
             <p:extLst>
               <p:ext uri="{D42A27DB-BD31-4B8C-83A1-F6EECF244321}">
-                <p14:modId xmlns:p14="http://schemas.microsoft.com/office/powerpoint/2010/main" val="3048995378"/>
+                <p14:modId xmlns:p14="http://schemas.microsoft.com/office/powerpoint/2010/main" val="2207741167"/>
               </p:ext>
             </p:extLst>
           </p:nvPr>

</xml_diff>